<commit_message>
Updated powerpoint; ready for editing
</commit_message>
<xml_diff>
--- a/Drug Mortality and Socio-Economic conditions in Connecticut.pptx
+++ b/Drug Mortality and Socio-Economic conditions in Connecticut.pptx
@@ -8,6 +8,13 @@
     <p:sldId id="256" r:id="rId2"/>
     <p:sldId id="257" r:id="rId3"/>
     <p:sldId id="258" r:id="rId4"/>
+    <p:sldId id="259" r:id="rId5"/>
+    <p:sldId id="260" r:id="rId6"/>
+    <p:sldId id="261" r:id="rId7"/>
+    <p:sldId id="262" r:id="rId8"/>
+    <p:sldId id="263" r:id="rId9"/>
+    <p:sldId id="264" r:id="rId10"/>
+    <p:sldId id="265" r:id="rId11"/>
   </p:sldIdLst>
   <p:sldSz cx="12192000" cy="6858000"/>
   <p:notesSz cx="6858000" cy="9144000"/>
@@ -106,6 +113,11 @@
       </a:defRPr>
     </a:lvl9pPr>
   </p:defaultTextStyle>
+  <p:extLst>
+    <p:ext uri="{EFAFB233-063F-42B5-8137-9DF3F51BA10A}">
+      <p15:sldGuideLst xmlns:p15="http://schemas.microsoft.com/office/powerpoint/2012/main"/>
+    </p:ext>
+  </p:extLst>
 </p:presentation>
 </file>
 
@@ -7714,6 +7726,64 @@
 </p:sld>
 </file>
 
+<file path=ppt/slides/slide10.xml><?xml version="1.0" encoding="utf-8"?>
+<p:sld xmlns:a="http://schemas.openxmlformats.org/drawingml/2006/main" xmlns:r="http://schemas.openxmlformats.org/officeDocument/2006/relationships" xmlns:p="http://schemas.openxmlformats.org/presentationml/2006/main">
+  <p:cSld>
+    <p:spTree>
+      <p:nvGrpSpPr>
+        <p:cNvPr id="1" name=""/>
+        <p:cNvGrpSpPr/>
+        <p:nvPr/>
+      </p:nvGrpSpPr>
+      <p:grpSpPr>
+        <a:xfrm>
+          <a:off x="0" y="0"/>
+          <a:ext cx="0" cy="0"/>
+          <a:chOff x="0" y="0"/>
+          <a:chExt cx="0" cy="0"/>
+        </a:xfrm>
+      </p:grpSpPr>
+      <p:sp>
+        <p:nvSpPr>
+          <p:cNvPr id="4" name="Title 3">
+            <a:extLst>
+              <a:ext uri="{FF2B5EF4-FFF2-40B4-BE49-F238E27FC236}">
+                <a16:creationId xmlns:a16="http://schemas.microsoft.com/office/drawing/2014/main" id="{D910DEF0-367B-4DA7-9C84-06F887D8581E}"/>
+              </a:ext>
+            </a:extLst>
+          </p:cNvPr>
+          <p:cNvSpPr>
+            <a:spLocks noGrp="1"/>
+          </p:cNvSpPr>
+          <p:nvPr>
+            <p:ph type="title"/>
+          </p:nvPr>
+        </p:nvSpPr>
+        <p:spPr/>
+        <p:txBody>
+          <a:bodyPr/>
+          <a:lstStyle/>
+          <a:p>
+            <a:r>
+              <a:rPr lang="en-US" dirty="0"/>
+              <a:t>Questions?</a:t>
+            </a:r>
+          </a:p>
+        </p:txBody>
+      </p:sp>
+    </p:spTree>
+    <p:extLst>
+      <p:ext uri="{BB962C8B-B14F-4D97-AF65-F5344CB8AC3E}">
+        <p14:creationId xmlns:p14="http://schemas.microsoft.com/office/powerpoint/2010/main" val="4241322623"/>
+      </p:ext>
+    </p:extLst>
+  </p:cSld>
+  <p:clrMapOvr>
+    <a:masterClrMapping/>
+  </p:clrMapOvr>
+</p:sld>
+</file>
+
 <file path=ppt/slides/slide2.xml><?xml version="1.0" encoding="utf-8"?>
 <p:sld xmlns:a="http://schemas.openxmlformats.org/drawingml/2006/main" xmlns:r="http://schemas.openxmlformats.org/officeDocument/2006/relationships" xmlns:p="http://schemas.openxmlformats.org/presentationml/2006/main">
   <p:cSld>
@@ -7792,55 +7862,55 @@
             </a:pPr>
             <a:r>
               <a:rPr lang="en-US" sz="2000" dirty="0"/>
-              <a:t>We are looking to analyze trends in drug overdose death rates in Connecticut and suggested improvements in data collection</a:t>
-            </a:r>
-          </a:p>
-          <a:p>
-            <a:pPr marL="0" indent="0">
-              <a:buNone/>
-            </a:pPr>
-            <a:endParaRPr lang="en-US" sz="2000" dirty="0"/>
+              <a:t>We were looking to analyze trends in drug overdose death rates in Connecticut by:</a:t>
+            </a:r>
           </a:p>
           <a:p>
             <a:r>
               <a:rPr lang="en-US" dirty="0"/>
-              <a:t>Drug-induced mortality rates and income</a:t>
+              <a:t>Income</a:t>
             </a:r>
           </a:p>
           <a:p>
             <a:r>
               <a:rPr lang="en-US" dirty="0"/>
-              <a:t>Drug-induced mortality rates and age</a:t>
+              <a:t>Age</a:t>
             </a:r>
           </a:p>
           <a:p>
             <a:r>
               <a:rPr lang="en-US" dirty="0"/>
-              <a:t>Drug-induced mortality rates and education</a:t>
+              <a:t>Education</a:t>
             </a:r>
           </a:p>
           <a:p>
             <a:r>
               <a:rPr lang="en-US" dirty="0"/>
-              <a:t>Drug-induced mortality rates and gender</a:t>
+              <a:t>Gender</a:t>
             </a:r>
           </a:p>
           <a:p>
             <a:r>
               <a:rPr lang="en-US" dirty="0"/>
-              <a:t>Drug-induced mortality rates and geo-location (counties)</a:t>
+              <a:t>Geo-location (counties)</a:t>
             </a:r>
           </a:p>
           <a:p>
             <a:r>
               <a:rPr lang="en-US" dirty="0"/>
-              <a:t>Drug-induced mortality rates and unemployment rates</a:t>
+              <a:t>Unemployment rates</a:t>
             </a:r>
           </a:p>
           <a:p>
             <a:r>
               <a:rPr lang="en-US" dirty="0"/>
-              <a:t>Drug-induced mortality rates and barriers to medical treatment</a:t>
+              <a:t>Barriers to medical treatment</a:t>
+            </a:r>
+          </a:p>
+          <a:p>
+            <a:r>
+              <a:rPr lang="en-US" dirty="0"/>
+              <a:t>Drug</a:t>
             </a:r>
           </a:p>
           <a:p>
@@ -7899,10 +7969,15 @@
         </p:nvSpPr>
         <p:spPr/>
         <p:txBody>
-          <a:bodyPr/>
+          <a:bodyPr>
+            <a:normAutofit/>
+          </a:bodyPr>
           <a:lstStyle/>
           <a:p>
-            <a:endParaRPr lang="en-US"/>
+            <a:r>
+              <a:rPr lang="en-US" dirty="0"/>
+              <a:t>Struggles with data</a:t>
+            </a:r>
           </a:p>
         </p:txBody>
       </p:sp>
@@ -7927,6 +8002,28 @@
           <a:bodyPr/>
           <a:lstStyle/>
           <a:p>
+            <a:pPr marL="0" indent="0">
+              <a:buNone/>
+            </a:pPr>
+            <a:r>
+              <a:rPr lang="en-US" dirty="0"/>
+              <a:t>We were not able to </a:t>
+            </a:r>
+          </a:p>
+          <a:p>
+            <a:r>
+              <a:rPr lang="en-US" dirty="0"/>
+              <a:t>Drug-induced mortality rates and income</a:t>
+            </a:r>
+          </a:p>
+          <a:p>
+            <a:r>
+              <a:rPr lang="en-US" dirty="0"/>
+              <a:t>Drug-induced mortality rates and education</a:t>
+            </a:r>
+            <a:br>
+              <a:rPr lang="en-US" dirty="0"/>
+            </a:br>
             <a:endParaRPr lang="en-US" dirty="0"/>
           </a:p>
         </p:txBody>
@@ -7935,6 +8032,516 @@
     <p:extLst>
       <p:ext uri="{BB962C8B-B14F-4D97-AF65-F5344CB8AC3E}">
         <p14:creationId xmlns:p14="http://schemas.microsoft.com/office/powerpoint/2010/main" val="2289639885"/>
+      </p:ext>
+    </p:extLst>
+  </p:cSld>
+  <p:clrMapOvr>
+    <a:masterClrMapping/>
+  </p:clrMapOvr>
+</p:sld>
+</file>
+
+<file path=ppt/slides/slide4.xml><?xml version="1.0" encoding="utf-8"?>
+<p:sld xmlns:a="http://schemas.openxmlformats.org/drawingml/2006/main" xmlns:r="http://schemas.openxmlformats.org/officeDocument/2006/relationships" xmlns:p="http://schemas.openxmlformats.org/presentationml/2006/main">
+  <p:cSld>
+    <p:spTree>
+      <p:nvGrpSpPr>
+        <p:cNvPr id="1" name=""/>
+        <p:cNvGrpSpPr/>
+        <p:nvPr/>
+      </p:nvGrpSpPr>
+      <p:grpSpPr>
+        <a:xfrm>
+          <a:off x="0" y="0"/>
+          <a:ext cx="0" cy="0"/>
+          <a:chOff x="0" y="0"/>
+          <a:chExt cx="0" cy="0"/>
+        </a:xfrm>
+      </p:grpSpPr>
+      <p:sp>
+        <p:nvSpPr>
+          <p:cNvPr id="2" name="Title 1">
+            <a:extLst>
+              <a:ext uri="{FF2B5EF4-FFF2-40B4-BE49-F238E27FC236}">
+                <a16:creationId xmlns:a16="http://schemas.microsoft.com/office/drawing/2014/main" id="{CBB69504-185D-4B1C-B779-2E7B3E05190F}"/>
+              </a:ext>
+            </a:extLst>
+          </p:cNvPr>
+          <p:cNvSpPr>
+            <a:spLocks noGrp="1"/>
+          </p:cNvSpPr>
+          <p:nvPr>
+            <p:ph type="title"/>
+          </p:nvPr>
+        </p:nvSpPr>
+        <p:spPr/>
+        <p:txBody>
+          <a:bodyPr/>
+          <a:lstStyle/>
+          <a:p>
+            <a:r>
+              <a:rPr lang="en-US" dirty="0"/>
+              <a:t>Drug-induced mortality rates and age</a:t>
+            </a:r>
+            <a:br>
+              <a:rPr lang="en-US" dirty="0"/>
+            </a:br>
+            <a:endParaRPr lang="en-US" dirty="0"/>
+          </a:p>
+        </p:txBody>
+      </p:sp>
+      <p:sp>
+        <p:nvSpPr>
+          <p:cNvPr id="3" name="Content Placeholder 2">
+            <a:extLst>
+              <a:ext uri="{FF2B5EF4-FFF2-40B4-BE49-F238E27FC236}">
+                <a16:creationId xmlns:a16="http://schemas.microsoft.com/office/drawing/2014/main" id="{4E1E6B99-92FF-43AE-B254-085BB1A84BE9}"/>
+              </a:ext>
+            </a:extLst>
+          </p:cNvPr>
+          <p:cNvSpPr>
+            <a:spLocks noGrp="1"/>
+          </p:cNvSpPr>
+          <p:nvPr>
+            <p:ph idx="1"/>
+          </p:nvPr>
+        </p:nvSpPr>
+        <p:spPr/>
+        <p:txBody>
+          <a:bodyPr/>
+          <a:lstStyle/>
+          <a:p>
+            <a:endParaRPr lang="en-US"/>
+          </a:p>
+        </p:txBody>
+      </p:sp>
+    </p:spTree>
+    <p:extLst>
+      <p:ext uri="{BB962C8B-B14F-4D97-AF65-F5344CB8AC3E}">
+        <p14:creationId xmlns:p14="http://schemas.microsoft.com/office/powerpoint/2010/main" val="2290168469"/>
+      </p:ext>
+    </p:extLst>
+  </p:cSld>
+  <p:clrMapOvr>
+    <a:masterClrMapping/>
+  </p:clrMapOvr>
+</p:sld>
+</file>
+
+<file path=ppt/slides/slide5.xml><?xml version="1.0" encoding="utf-8"?>
+<p:sld xmlns:a="http://schemas.openxmlformats.org/drawingml/2006/main" xmlns:r="http://schemas.openxmlformats.org/officeDocument/2006/relationships" xmlns:p="http://schemas.openxmlformats.org/presentationml/2006/main">
+  <p:cSld>
+    <p:spTree>
+      <p:nvGrpSpPr>
+        <p:cNvPr id="1" name=""/>
+        <p:cNvGrpSpPr/>
+        <p:nvPr/>
+      </p:nvGrpSpPr>
+      <p:grpSpPr>
+        <a:xfrm>
+          <a:off x="0" y="0"/>
+          <a:ext cx="0" cy="0"/>
+          <a:chOff x="0" y="0"/>
+          <a:chExt cx="0" cy="0"/>
+        </a:xfrm>
+      </p:grpSpPr>
+      <p:sp>
+        <p:nvSpPr>
+          <p:cNvPr id="2" name="Title 1">
+            <a:extLst>
+              <a:ext uri="{FF2B5EF4-FFF2-40B4-BE49-F238E27FC236}">
+                <a16:creationId xmlns:a16="http://schemas.microsoft.com/office/drawing/2014/main" id="{57709140-C8B7-46DE-A33B-463B5EBE4341}"/>
+              </a:ext>
+            </a:extLst>
+          </p:cNvPr>
+          <p:cNvSpPr>
+            <a:spLocks noGrp="1"/>
+          </p:cNvSpPr>
+          <p:nvPr>
+            <p:ph type="title"/>
+          </p:nvPr>
+        </p:nvSpPr>
+        <p:spPr/>
+        <p:txBody>
+          <a:bodyPr>
+            <a:normAutofit/>
+          </a:bodyPr>
+          <a:lstStyle/>
+          <a:p>
+            <a:r>
+              <a:rPr lang="en-US" dirty="0"/>
+              <a:t>Drug-induced mortality rates and gender</a:t>
+            </a:r>
+          </a:p>
+        </p:txBody>
+      </p:sp>
+      <p:sp>
+        <p:nvSpPr>
+          <p:cNvPr id="3" name="Content Placeholder 2">
+            <a:extLst>
+              <a:ext uri="{FF2B5EF4-FFF2-40B4-BE49-F238E27FC236}">
+                <a16:creationId xmlns:a16="http://schemas.microsoft.com/office/drawing/2014/main" id="{1D9DC6AA-EA65-4975-9213-F1AA957ED778}"/>
+              </a:ext>
+            </a:extLst>
+          </p:cNvPr>
+          <p:cNvSpPr>
+            <a:spLocks noGrp="1"/>
+          </p:cNvSpPr>
+          <p:nvPr>
+            <p:ph idx="1"/>
+          </p:nvPr>
+        </p:nvSpPr>
+        <p:spPr/>
+        <p:txBody>
+          <a:bodyPr/>
+          <a:lstStyle/>
+          <a:p>
+            <a:endParaRPr lang="en-US"/>
+          </a:p>
+        </p:txBody>
+      </p:sp>
+    </p:spTree>
+    <p:extLst>
+      <p:ext uri="{BB962C8B-B14F-4D97-AF65-F5344CB8AC3E}">
+        <p14:creationId xmlns:p14="http://schemas.microsoft.com/office/powerpoint/2010/main" val="956778109"/>
+      </p:ext>
+    </p:extLst>
+  </p:cSld>
+  <p:clrMapOvr>
+    <a:masterClrMapping/>
+  </p:clrMapOvr>
+</p:sld>
+</file>
+
+<file path=ppt/slides/slide6.xml><?xml version="1.0" encoding="utf-8"?>
+<p:sld xmlns:a="http://schemas.openxmlformats.org/drawingml/2006/main" xmlns:r="http://schemas.openxmlformats.org/officeDocument/2006/relationships" xmlns:p="http://schemas.openxmlformats.org/presentationml/2006/main">
+  <p:cSld>
+    <p:spTree>
+      <p:nvGrpSpPr>
+        <p:cNvPr id="1" name=""/>
+        <p:cNvGrpSpPr/>
+        <p:nvPr/>
+      </p:nvGrpSpPr>
+      <p:grpSpPr>
+        <a:xfrm>
+          <a:off x="0" y="0"/>
+          <a:ext cx="0" cy="0"/>
+          <a:chOff x="0" y="0"/>
+          <a:chExt cx="0" cy="0"/>
+        </a:xfrm>
+      </p:grpSpPr>
+      <p:sp>
+        <p:nvSpPr>
+          <p:cNvPr id="2" name="Title 1">
+            <a:extLst>
+              <a:ext uri="{FF2B5EF4-FFF2-40B4-BE49-F238E27FC236}">
+                <a16:creationId xmlns:a16="http://schemas.microsoft.com/office/drawing/2014/main" id="{44E3AE93-826E-4319-B623-63CBCBC0C145}"/>
+              </a:ext>
+            </a:extLst>
+          </p:cNvPr>
+          <p:cNvSpPr>
+            <a:spLocks noGrp="1"/>
+          </p:cNvSpPr>
+          <p:nvPr>
+            <p:ph type="title"/>
+          </p:nvPr>
+        </p:nvSpPr>
+        <p:spPr/>
+        <p:txBody>
+          <a:bodyPr>
+            <a:normAutofit/>
+          </a:bodyPr>
+          <a:lstStyle/>
+          <a:p>
+            <a:r>
+              <a:rPr lang="en-US" dirty="0"/>
+              <a:t>Drug-induced mortality rates and geo-location (counties)</a:t>
+            </a:r>
+          </a:p>
+        </p:txBody>
+      </p:sp>
+      <p:sp>
+        <p:nvSpPr>
+          <p:cNvPr id="3" name="Content Placeholder 2">
+            <a:extLst>
+              <a:ext uri="{FF2B5EF4-FFF2-40B4-BE49-F238E27FC236}">
+                <a16:creationId xmlns:a16="http://schemas.microsoft.com/office/drawing/2014/main" id="{5ECB903B-AD6E-4E0B-984F-08AC2F73AEA4}"/>
+              </a:ext>
+            </a:extLst>
+          </p:cNvPr>
+          <p:cNvSpPr>
+            <a:spLocks noGrp="1"/>
+          </p:cNvSpPr>
+          <p:nvPr>
+            <p:ph idx="1"/>
+          </p:nvPr>
+        </p:nvSpPr>
+        <p:spPr/>
+        <p:txBody>
+          <a:bodyPr/>
+          <a:lstStyle/>
+          <a:p>
+            <a:endParaRPr lang="en-US"/>
+          </a:p>
+        </p:txBody>
+      </p:sp>
+    </p:spTree>
+    <p:extLst>
+      <p:ext uri="{BB962C8B-B14F-4D97-AF65-F5344CB8AC3E}">
+        <p14:creationId xmlns:p14="http://schemas.microsoft.com/office/powerpoint/2010/main" val="712921710"/>
+      </p:ext>
+    </p:extLst>
+  </p:cSld>
+  <p:clrMapOvr>
+    <a:masterClrMapping/>
+  </p:clrMapOvr>
+</p:sld>
+</file>
+
+<file path=ppt/slides/slide7.xml><?xml version="1.0" encoding="utf-8"?>
+<p:sld xmlns:a="http://schemas.openxmlformats.org/drawingml/2006/main" xmlns:r="http://schemas.openxmlformats.org/officeDocument/2006/relationships" xmlns:p="http://schemas.openxmlformats.org/presentationml/2006/main">
+  <p:cSld>
+    <p:spTree>
+      <p:nvGrpSpPr>
+        <p:cNvPr id="1" name=""/>
+        <p:cNvGrpSpPr/>
+        <p:nvPr/>
+      </p:nvGrpSpPr>
+      <p:grpSpPr>
+        <a:xfrm>
+          <a:off x="0" y="0"/>
+          <a:ext cx="0" cy="0"/>
+          <a:chOff x="0" y="0"/>
+          <a:chExt cx="0" cy="0"/>
+        </a:xfrm>
+      </p:grpSpPr>
+      <p:sp>
+        <p:nvSpPr>
+          <p:cNvPr id="2" name="Title 1">
+            <a:extLst>
+              <a:ext uri="{FF2B5EF4-FFF2-40B4-BE49-F238E27FC236}">
+                <a16:creationId xmlns:a16="http://schemas.microsoft.com/office/drawing/2014/main" id="{B8E97443-B866-4821-958D-875892DA966B}"/>
+              </a:ext>
+            </a:extLst>
+          </p:cNvPr>
+          <p:cNvSpPr>
+            <a:spLocks noGrp="1"/>
+          </p:cNvSpPr>
+          <p:nvPr>
+            <p:ph type="title"/>
+          </p:nvPr>
+        </p:nvSpPr>
+        <p:spPr/>
+        <p:txBody>
+          <a:bodyPr>
+            <a:normAutofit/>
+          </a:bodyPr>
+          <a:lstStyle/>
+          <a:p>
+            <a:r>
+              <a:rPr lang="en-US" dirty="0"/>
+              <a:t>Drug-induced mortality rates and unemployment rates</a:t>
+            </a:r>
+          </a:p>
+        </p:txBody>
+      </p:sp>
+      <p:sp>
+        <p:nvSpPr>
+          <p:cNvPr id="3" name="Content Placeholder 2">
+            <a:extLst>
+              <a:ext uri="{FF2B5EF4-FFF2-40B4-BE49-F238E27FC236}">
+                <a16:creationId xmlns:a16="http://schemas.microsoft.com/office/drawing/2014/main" id="{CC681BD8-5A03-4E20-9CBD-9B11D42C8DFC}"/>
+              </a:ext>
+            </a:extLst>
+          </p:cNvPr>
+          <p:cNvSpPr>
+            <a:spLocks noGrp="1"/>
+          </p:cNvSpPr>
+          <p:nvPr>
+            <p:ph idx="1"/>
+          </p:nvPr>
+        </p:nvSpPr>
+        <p:spPr/>
+        <p:txBody>
+          <a:bodyPr/>
+          <a:lstStyle/>
+          <a:p>
+            <a:endParaRPr lang="en-US"/>
+          </a:p>
+        </p:txBody>
+      </p:sp>
+    </p:spTree>
+    <p:extLst>
+      <p:ext uri="{BB962C8B-B14F-4D97-AF65-F5344CB8AC3E}">
+        <p14:creationId xmlns:p14="http://schemas.microsoft.com/office/powerpoint/2010/main" val="2167273281"/>
+      </p:ext>
+    </p:extLst>
+  </p:cSld>
+  <p:clrMapOvr>
+    <a:masterClrMapping/>
+  </p:clrMapOvr>
+</p:sld>
+</file>
+
+<file path=ppt/slides/slide8.xml><?xml version="1.0" encoding="utf-8"?>
+<p:sld xmlns:a="http://schemas.openxmlformats.org/drawingml/2006/main" xmlns:r="http://schemas.openxmlformats.org/officeDocument/2006/relationships" xmlns:p="http://schemas.openxmlformats.org/presentationml/2006/main">
+  <p:cSld>
+    <p:spTree>
+      <p:nvGrpSpPr>
+        <p:cNvPr id="1" name=""/>
+        <p:cNvGrpSpPr/>
+        <p:nvPr/>
+      </p:nvGrpSpPr>
+      <p:grpSpPr>
+        <a:xfrm>
+          <a:off x="0" y="0"/>
+          <a:ext cx="0" cy="0"/>
+          <a:chOff x="0" y="0"/>
+          <a:chExt cx="0" cy="0"/>
+        </a:xfrm>
+      </p:grpSpPr>
+      <p:sp>
+        <p:nvSpPr>
+          <p:cNvPr id="2" name="Title 1">
+            <a:extLst>
+              <a:ext uri="{FF2B5EF4-FFF2-40B4-BE49-F238E27FC236}">
+                <a16:creationId xmlns:a16="http://schemas.microsoft.com/office/drawing/2014/main" id="{8BF87117-1E4E-4EE9-8760-25D09E6E6179}"/>
+              </a:ext>
+            </a:extLst>
+          </p:cNvPr>
+          <p:cNvSpPr>
+            <a:spLocks noGrp="1"/>
+          </p:cNvSpPr>
+          <p:nvPr>
+            <p:ph type="title"/>
+          </p:nvPr>
+        </p:nvSpPr>
+        <p:spPr/>
+        <p:txBody>
+          <a:bodyPr>
+            <a:normAutofit/>
+          </a:bodyPr>
+          <a:lstStyle/>
+          <a:p>
+            <a:r>
+              <a:rPr lang="en-US" dirty="0"/>
+              <a:t>Drug-induced mortality rates and barriers to medical treatment</a:t>
+            </a:r>
+          </a:p>
+        </p:txBody>
+      </p:sp>
+      <p:sp>
+        <p:nvSpPr>
+          <p:cNvPr id="3" name="Content Placeholder 2">
+            <a:extLst>
+              <a:ext uri="{FF2B5EF4-FFF2-40B4-BE49-F238E27FC236}">
+                <a16:creationId xmlns:a16="http://schemas.microsoft.com/office/drawing/2014/main" id="{F37D4F70-3A7A-4527-B5BB-4CBFEE548667}"/>
+              </a:ext>
+            </a:extLst>
+          </p:cNvPr>
+          <p:cNvSpPr>
+            <a:spLocks noGrp="1"/>
+          </p:cNvSpPr>
+          <p:nvPr>
+            <p:ph idx="1"/>
+          </p:nvPr>
+        </p:nvSpPr>
+        <p:spPr/>
+        <p:txBody>
+          <a:bodyPr/>
+          <a:lstStyle/>
+          <a:p>
+            <a:endParaRPr lang="en-US"/>
+          </a:p>
+        </p:txBody>
+      </p:sp>
+    </p:spTree>
+    <p:extLst>
+      <p:ext uri="{BB962C8B-B14F-4D97-AF65-F5344CB8AC3E}">
+        <p14:creationId xmlns:p14="http://schemas.microsoft.com/office/powerpoint/2010/main" val="2699776682"/>
+      </p:ext>
+    </p:extLst>
+  </p:cSld>
+  <p:clrMapOvr>
+    <a:masterClrMapping/>
+  </p:clrMapOvr>
+</p:sld>
+</file>
+
+<file path=ppt/slides/slide9.xml><?xml version="1.0" encoding="utf-8"?>
+<p:sld xmlns:a="http://schemas.openxmlformats.org/drawingml/2006/main" xmlns:r="http://schemas.openxmlformats.org/officeDocument/2006/relationships" xmlns:p="http://schemas.openxmlformats.org/presentationml/2006/main">
+  <p:cSld>
+    <p:spTree>
+      <p:nvGrpSpPr>
+        <p:cNvPr id="1" name=""/>
+        <p:cNvGrpSpPr/>
+        <p:nvPr/>
+      </p:nvGrpSpPr>
+      <p:grpSpPr>
+        <a:xfrm>
+          <a:off x="0" y="0"/>
+          <a:ext cx="0" cy="0"/>
+          <a:chOff x="0" y="0"/>
+          <a:chExt cx="0" cy="0"/>
+        </a:xfrm>
+      </p:grpSpPr>
+      <p:sp>
+        <p:nvSpPr>
+          <p:cNvPr id="2" name="Title 1">
+            <a:extLst>
+              <a:ext uri="{FF2B5EF4-FFF2-40B4-BE49-F238E27FC236}">
+                <a16:creationId xmlns:a16="http://schemas.microsoft.com/office/drawing/2014/main" id="{CCC4A7B5-8082-41BD-8216-D7174D2FC296}"/>
+              </a:ext>
+            </a:extLst>
+          </p:cNvPr>
+          <p:cNvSpPr>
+            <a:spLocks noGrp="1"/>
+          </p:cNvSpPr>
+          <p:nvPr>
+            <p:ph type="title"/>
+          </p:nvPr>
+        </p:nvSpPr>
+        <p:spPr/>
+        <p:txBody>
+          <a:bodyPr/>
+          <a:lstStyle/>
+          <a:p>
+            <a:r>
+              <a:rPr lang="en-US" dirty="0"/>
+              <a:t>Drug-induced mortality rates by drug</a:t>
+            </a:r>
+          </a:p>
+        </p:txBody>
+      </p:sp>
+      <p:sp>
+        <p:nvSpPr>
+          <p:cNvPr id="3" name="Content Placeholder 2">
+            <a:extLst>
+              <a:ext uri="{FF2B5EF4-FFF2-40B4-BE49-F238E27FC236}">
+                <a16:creationId xmlns:a16="http://schemas.microsoft.com/office/drawing/2014/main" id="{A521F9F2-EC27-4859-9030-7912CDDA3BE6}"/>
+              </a:ext>
+            </a:extLst>
+          </p:cNvPr>
+          <p:cNvSpPr>
+            <a:spLocks noGrp="1"/>
+          </p:cNvSpPr>
+          <p:nvPr>
+            <p:ph idx="1"/>
+          </p:nvPr>
+        </p:nvSpPr>
+        <p:spPr/>
+        <p:txBody>
+          <a:bodyPr/>
+          <a:lstStyle/>
+          <a:p>
+            <a:endParaRPr lang="en-US"/>
+          </a:p>
+        </p:txBody>
+      </p:sp>
+    </p:spTree>
+    <p:extLst>
+      <p:ext uri="{BB962C8B-B14F-4D97-AF65-F5344CB8AC3E}">
+        <p14:creationId xmlns:p14="http://schemas.microsoft.com/office/powerpoint/2010/main" val="2160349714"/>
       </p:ext>
     </p:extLst>
   </p:cSld>

</xml_diff>

<commit_message>
Added map and race/sex/gender png
</commit_message>
<xml_diff>
--- a/Drug Mortality and Socio-Economic conditions in Connecticut.pptx
+++ b/Drug Mortality and Socio-Economic conditions in Connecticut.pptx
@@ -11,10 +11,11 @@
     <p:sldId id="259" r:id="rId5"/>
     <p:sldId id="260" r:id="rId6"/>
     <p:sldId id="261" r:id="rId7"/>
-    <p:sldId id="262" r:id="rId8"/>
-    <p:sldId id="263" r:id="rId9"/>
-    <p:sldId id="264" r:id="rId10"/>
-    <p:sldId id="265" r:id="rId11"/>
+    <p:sldId id="266" r:id="rId8"/>
+    <p:sldId id="262" r:id="rId9"/>
+    <p:sldId id="263" r:id="rId10"/>
+    <p:sldId id="264" r:id="rId11"/>
+    <p:sldId id="265" r:id="rId12"/>
   </p:sldIdLst>
   <p:sldSz cx="12192000" cy="6858000"/>
   <p:notesSz cx="6858000" cy="9144000"/>
@@ -7745,6 +7746,89 @@
       </p:grpSpPr>
       <p:sp>
         <p:nvSpPr>
+          <p:cNvPr id="2" name="Title 1">
+            <a:extLst>
+              <a:ext uri="{FF2B5EF4-FFF2-40B4-BE49-F238E27FC236}">
+                <a16:creationId xmlns:a16="http://schemas.microsoft.com/office/drawing/2014/main" id="{CCC4A7B5-8082-41BD-8216-D7174D2FC296}"/>
+              </a:ext>
+            </a:extLst>
+          </p:cNvPr>
+          <p:cNvSpPr>
+            <a:spLocks noGrp="1"/>
+          </p:cNvSpPr>
+          <p:nvPr>
+            <p:ph type="title"/>
+          </p:nvPr>
+        </p:nvSpPr>
+        <p:spPr/>
+        <p:txBody>
+          <a:bodyPr/>
+          <a:lstStyle/>
+          <a:p>
+            <a:r>
+              <a:rPr lang="en-US" dirty="0"/>
+              <a:t>Drug-induced mortality rates by drug</a:t>
+            </a:r>
+          </a:p>
+        </p:txBody>
+      </p:sp>
+      <p:sp>
+        <p:nvSpPr>
+          <p:cNvPr id="3" name="Content Placeholder 2">
+            <a:extLst>
+              <a:ext uri="{FF2B5EF4-FFF2-40B4-BE49-F238E27FC236}">
+                <a16:creationId xmlns:a16="http://schemas.microsoft.com/office/drawing/2014/main" id="{A521F9F2-EC27-4859-9030-7912CDDA3BE6}"/>
+              </a:ext>
+            </a:extLst>
+          </p:cNvPr>
+          <p:cNvSpPr>
+            <a:spLocks noGrp="1"/>
+          </p:cNvSpPr>
+          <p:nvPr>
+            <p:ph idx="1"/>
+          </p:nvPr>
+        </p:nvSpPr>
+        <p:spPr/>
+        <p:txBody>
+          <a:bodyPr/>
+          <a:lstStyle/>
+          <a:p>
+            <a:endParaRPr lang="en-US"/>
+          </a:p>
+        </p:txBody>
+      </p:sp>
+    </p:spTree>
+    <p:extLst>
+      <p:ext uri="{BB962C8B-B14F-4D97-AF65-F5344CB8AC3E}">
+        <p14:creationId xmlns:p14="http://schemas.microsoft.com/office/powerpoint/2010/main" val="2160349714"/>
+      </p:ext>
+    </p:extLst>
+  </p:cSld>
+  <p:clrMapOvr>
+    <a:masterClrMapping/>
+  </p:clrMapOvr>
+</p:sld>
+</file>
+
+<file path=ppt/slides/slide11.xml><?xml version="1.0" encoding="utf-8"?>
+<p:sld xmlns:a="http://schemas.openxmlformats.org/drawingml/2006/main" xmlns:r="http://schemas.openxmlformats.org/officeDocument/2006/relationships" xmlns:p="http://schemas.openxmlformats.org/presentationml/2006/main">
+  <p:cSld>
+    <p:spTree>
+      <p:nvGrpSpPr>
+        <p:cNvPr id="1" name=""/>
+        <p:cNvGrpSpPr/>
+        <p:nvPr/>
+      </p:nvGrpSpPr>
+      <p:grpSpPr>
+        <a:xfrm>
+          <a:off x="0" y="0"/>
+          <a:ext cx="0" cy="0"/>
+          <a:chOff x="0" y="0"/>
+          <a:chExt cx="0" cy="0"/>
+        </a:xfrm>
+      </p:grpSpPr>
+      <p:sp>
+        <p:nvSpPr>
           <p:cNvPr id="4" name="Title 3">
             <a:extLst>
               <a:ext uri="{FF2B5EF4-FFF2-40B4-BE49-F238E27FC236}">
@@ -8161,7 +8245,12 @@
             <p:ph type="title"/>
           </p:nvPr>
         </p:nvSpPr>
-        <p:spPr/>
+        <p:spPr>
+          <a:xfrm>
+            <a:off x="2337847" y="624110"/>
+            <a:ext cx="9166765" cy="1280890"/>
+          </a:xfrm>
+        </p:spPr>
         <p:txBody>
           <a:bodyPr>
             <a:normAutofit/>
@@ -8170,36 +8259,40 @@
           <a:p>
             <a:r>
               <a:rPr lang="en-US" dirty="0"/>
-              <a:t>Drug-induced mortality rates and gender</a:t>
-            </a:r>
-          </a:p>
-        </p:txBody>
-      </p:sp>
-      <p:sp>
-        <p:nvSpPr>
-          <p:cNvPr id="3" name="Content Placeholder 2">
+              <a:t>Drug-induced mortality rates and gender-race-age</a:t>
+            </a:r>
+          </a:p>
+        </p:txBody>
+      </p:sp>
+      <p:pic>
+        <p:nvPicPr>
+          <p:cNvPr id="5" name="Content Placeholder 4">
             <a:extLst>
               <a:ext uri="{FF2B5EF4-FFF2-40B4-BE49-F238E27FC236}">
-                <a16:creationId xmlns:a16="http://schemas.microsoft.com/office/drawing/2014/main" id="{1D9DC6AA-EA65-4975-9213-F1AA957ED778}"/>
+                <a16:creationId xmlns:a16="http://schemas.microsoft.com/office/drawing/2014/main" id="{AA1AA34D-8301-4E4B-9563-73526E6062CE}"/>
               </a:ext>
             </a:extLst>
           </p:cNvPr>
-          <p:cNvSpPr>
-            <a:spLocks noGrp="1"/>
-          </p:cNvSpPr>
+          <p:cNvPicPr>
+            <a:picLocks noGrp="1" noChangeAspect="1"/>
+          </p:cNvPicPr>
           <p:nvPr>
             <p:ph idx="1"/>
           </p:nvPr>
-        </p:nvSpPr>
-        <p:spPr/>
-        <p:txBody>
-          <a:bodyPr/>
-          <a:lstStyle/>
-          <a:p>
-            <a:endParaRPr lang="en-US"/>
-          </a:p>
-        </p:txBody>
-      </p:sp>
+        </p:nvPicPr>
+        <p:blipFill>
+          <a:blip r:embed="rId2"/>
+          <a:stretch>
+            <a:fillRect/>
+          </a:stretch>
+        </p:blipFill>
+        <p:spPr>
+          <a:xfrm>
+            <a:off x="2743200" y="1671685"/>
+            <a:ext cx="7616858" cy="5146065"/>
+          </a:xfrm>
+        </p:spPr>
+      </p:pic>
     </p:spTree>
     <p:extLst>
       <p:ext uri="{BB962C8B-B14F-4D97-AF65-F5344CB8AC3E}">
@@ -8255,36 +8348,40 @@
           <a:p>
             <a:r>
               <a:rPr lang="en-US" dirty="0"/>
-              <a:t>Drug-induced mortality rates and geo-location (counties)</a:t>
-            </a:r>
-          </a:p>
-        </p:txBody>
-      </p:sp>
-      <p:sp>
-        <p:nvSpPr>
-          <p:cNvPr id="3" name="Content Placeholder 2">
+              <a:t>Drug-induced mortality rates counties</a:t>
+            </a:r>
+          </a:p>
+        </p:txBody>
+      </p:sp>
+      <p:pic>
+        <p:nvPicPr>
+          <p:cNvPr id="5" name="Content Placeholder 4">
             <a:extLst>
               <a:ext uri="{FF2B5EF4-FFF2-40B4-BE49-F238E27FC236}">
-                <a16:creationId xmlns:a16="http://schemas.microsoft.com/office/drawing/2014/main" id="{5ECB903B-AD6E-4E0B-984F-08AC2F73AEA4}"/>
+                <a16:creationId xmlns:a16="http://schemas.microsoft.com/office/drawing/2014/main" id="{9EFF8C28-DD7C-462B-8BB9-E8D0DE32DD93}"/>
               </a:ext>
             </a:extLst>
           </p:cNvPr>
-          <p:cNvSpPr>
-            <a:spLocks noGrp="1"/>
-          </p:cNvSpPr>
+          <p:cNvPicPr>
+            <a:picLocks noGrp="1" noChangeAspect="1"/>
+          </p:cNvPicPr>
           <p:nvPr>
             <p:ph idx="1"/>
           </p:nvPr>
-        </p:nvSpPr>
-        <p:spPr/>
-        <p:txBody>
-          <a:bodyPr/>
-          <a:lstStyle/>
-          <a:p>
-            <a:endParaRPr lang="en-US"/>
-          </a:p>
-        </p:txBody>
-      </p:sp>
+        </p:nvPicPr>
+        <p:blipFill>
+          <a:blip r:embed="rId2"/>
+          <a:stretch>
+            <a:fillRect/>
+          </a:stretch>
+        </p:blipFill>
+        <p:spPr>
+          <a:xfrm>
+            <a:off x="2335074" y="2058183"/>
+            <a:ext cx="9715575" cy="4540577"/>
+          </a:xfrm>
+        </p:spPr>
+      </p:pic>
     </p:spTree>
     <p:extLst>
       <p:ext uri="{BB962C8B-B14F-4D97-AF65-F5344CB8AC3E}">
@@ -8320,7 +8417,7 @@
           <p:cNvPr id="2" name="Title 1">
             <a:extLst>
               <a:ext uri="{FF2B5EF4-FFF2-40B4-BE49-F238E27FC236}">
-                <a16:creationId xmlns:a16="http://schemas.microsoft.com/office/drawing/2014/main" id="{B8E97443-B866-4821-958D-875892DA966B}"/>
+                <a16:creationId xmlns:a16="http://schemas.microsoft.com/office/drawing/2014/main" id="{44E3AE93-826E-4319-B623-63CBCBC0C145}"/>
               </a:ext>
             </a:extLst>
           </p:cNvPr>
@@ -8331,7 +8428,12 @@
             <p:ph type="title"/>
           </p:nvPr>
         </p:nvSpPr>
-        <p:spPr/>
+        <p:spPr>
+          <a:xfrm>
+            <a:off x="2366127" y="624110"/>
+            <a:ext cx="10109445" cy="1280890"/>
+          </a:xfrm>
+        </p:spPr>
         <p:txBody>
           <a:bodyPr>
             <a:normAutofit/>
@@ -8340,40 +8442,44 @@
           <a:p>
             <a:r>
               <a:rPr lang="en-US" dirty="0"/>
-              <a:t>Drug-induced mortality rates and unemployment rates</a:t>
-            </a:r>
-          </a:p>
-        </p:txBody>
-      </p:sp>
-      <p:sp>
-        <p:nvSpPr>
-          <p:cNvPr id="3" name="Content Placeholder 2">
+              <a:t>Drug-induced mortality rates and counties</a:t>
+            </a:r>
+          </a:p>
+        </p:txBody>
+      </p:sp>
+      <p:pic>
+        <p:nvPicPr>
+          <p:cNvPr id="7" name="Content Placeholder 6">
             <a:extLst>
               <a:ext uri="{FF2B5EF4-FFF2-40B4-BE49-F238E27FC236}">
-                <a16:creationId xmlns:a16="http://schemas.microsoft.com/office/drawing/2014/main" id="{CC681BD8-5A03-4E20-9CBD-9B11D42C8DFC}"/>
+                <a16:creationId xmlns:a16="http://schemas.microsoft.com/office/drawing/2014/main" id="{BB061FCF-878A-4FE1-BC11-562AB2FDD122}"/>
               </a:ext>
             </a:extLst>
           </p:cNvPr>
-          <p:cNvSpPr>
-            <a:spLocks noGrp="1"/>
-          </p:cNvSpPr>
+          <p:cNvPicPr>
+            <a:picLocks noGrp="1" noChangeAspect="1"/>
+          </p:cNvPicPr>
           <p:nvPr>
             <p:ph idx="1"/>
           </p:nvPr>
-        </p:nvSpPr>
-        <p:spPr/>
-        <p:txBody>
-          <a:bodyPr/>
-          <a:lstStyle/>
-          <a:p>
-            <a:endParaRPr lang="en-US"/>
-          </a:p>
-        </p:txBody>
-      </p:sp>
+        </p:nvPicPr>
+        <p:blipFill>
+          <a:blip r:embed="rId2"/>
+          <a:stretch>
+            <a:fillRect/>
+          </a:stretch>
+        </p:blipFill>
+        <p:spPr>
+          <a:xfrm>
+            <a:off x="2498103" y="1905000"/>
+            <a:ext cx="9323474" cy="4796981"/>
+          </a:xfrm>
+        </p:spPr>
+      </p:pic>
     </p:spTree>
     <p:extLst>
       <p:ext uri="{BB962C8B-B14F-4D97-AF65-F5344CB8AC3E}">
-        <p14:creationId xmlns:p14="http://schemas.microsoft.com/office/powerpoint/2010/main" val="2167273281"/>
+        <p14:creationId xmlns:p14="http://schemas.microsoft.com/office/powerpoint/2010/main" val="1054964012"/>
       </p:ext>
     </p:extLst>
   </p:cSld>
@@ -8405,7 +8511,7 @@
           <p:cNvPr id="2" name="Title 1">
             <a:extLst>
               <a:ext uri="{FF2B5EF4-FFF2-40B4-BE49-F238E27FC236}">
-                <a16:creationId xmlns:a16="http://schemas.microsoft.com/office/drawing/2014/main" id="{8BF87117-1E4E-4EE9-8760-25D09E6E6179}"/>
+                <a16:creationId xmlns:a16="http://schemas.microsoft.com/office/drawing/2014/main" id="{B8E97443-B866-4821-958D-875892DA966B}"/>
               </a:ext>
             </a:extLst>
           </p:cNvPr>
@@ -8425,7 +8531,7 @@
           <a:p>
             <a:r>
               <a:rPr lang="en-US" dirty="0"/>
-              <a:t>Drug-induced mortality rates and barriers to medical treatment</a:t>
+              <a:t>Drug-induced mortality rates and unemployment rates</a:t>
             </a:r>
           </a:p>
         </p:txBody>
@@ -8435,7 +8541,7 @@
           <p:cNvPr id="3" name="Content Placeholder 2">
             <a:extLst>
               <a:ext uri="{FF2B5EF4-FFF2-40B4-BE49-F238E27FC236}">
-                <a16:creationId xmlns:a16="http://schemas.microsoft.com/office/drawing/2014/main" id="{F37D4F70-3A7A-4527-B5BB-4CBFEE548667}"/>
+                <a16:creationId xmlns:a16="http://schemas.microsoft.com/office/drawing/2014/main" id="{CC681BD8-5A03-4E20-9CBD-9B11D42C8DFC}"/>
               </a:ext>
             </a:extLst>
           </p:cNvPr>
@@ -8458,7 +8564,7 @@
     </p:spTree>
     <p:extLst>
       <p:ext uri="{BB962C8B-B14F-4D97-AF65-F5344CB8AC3E}">
-        <p14:creationId xmlns:p14="http://schemas.microsoft.com/office/powerpoint/2010/main" val="2699776682"/>
+        <p14:creationId xmlns:p14="http://schemas.microsoft.com/office/powerpoint/2010/main" val="2167273281"/>
       </p:ext>
     </p:extLst>
   </p:cSld>
@@ -8490,7 +8596,7 @@
           <p:cNvPr id="2" name="Title 1">
             <a:extLst>
               <a:ext uri="{FF2B5EF4-FFF2-40B4-BE49-F238E27FC236}">
-                <a16:creationId xmlns:a16="http://schemas.microsoft.com/office/drawing/2014/main" id="{CCC4A7B5-8082-41BD-8216-D7174D2FC296}"/>
+                <a16:creationId xmlns:a16="http://schemas.microsoft.com/office/drawing/2014/main" id="{8BF87117-1E4E-4EE9-8760-25D09E6E6179}"/>
               </a:ext>
             </a:extLst>
           </p:cNvPr>
@@ -8503,12 +8609,14 @@
         </p:nvSpPr>
         <p:spPr/>
         <p:txBody>
-          <a:bodyPr/>
+          <a:bodyPr>
+            <a:normAutofit/>
+          </a:bodyPr>
           <a:lstStyle/>
           <a:p>
             <a:r>
               <a:rPr lang="en-US" dirty="0"/>
-              <a:t>Drug-induced mortality rates by drug</a:t>
+              <a:t>Drug-induced mortality rates and barriers to medical treatment</a:t>
             </a:r>
           </a:p>
         </p:txBody>
@@ -8518,7 +8626,7 @@
           <p:cNvPr id="3" name="Content Placeholder 2">
             <a:extLst>
               <a:ext uri="{FF2B5EF4-FFF2-40B4-BE49-F238E27FC236}">
-                <a16:creationId xmlns:a16="http://schemas.microsoft.com/office/drawing/2014/main" id="{A521F9F2-EC27-4859-9030-7912CDDA3BE6}"/>
+                <a16:creationId xmlns:a16="http://schemas.microsoft.com/office/drawing/2014/main" id="{F37D4F70-3A7A-4527-B5BB-4CBFEE548667}"/>
               </a:ext>
             </a:extLst>
           </p:cNvPr>
@@ -8541,7 +8649,7 @@
     </p:spTree>
     <p:extLst>
       <p:ext uri="{BB962C8B-B14F-4D97-AF65-F5344CB8AC3E}">
-        <p14:creationId xmlns:p14="http://schemas.microsoft.com/office/powerpoint/2010/main" val="2160349714"/>
+        <p14:creationId xmlns:p14="http://schemas.microsoft.com/office/powerpoint/2010/main" val="2699776682"/>
       </p:ext>
     </p:extLst>
   </p:cSld>

</xml_diff>

<commit_message>
Added Age Group and By drug data
</commit_message>
<xml_diff>
--- a/Drug Mortality and Socio-Economic conditions in Connecticut.pptx
+++ b/Drug Mortality and Socio-Economic conditions in Connecticut.pptx
@@ -7,14 +7,15 @@
   <p:sldIdLst>
     <p:sldId id="256" r:id="rId2"/>
     <p:sldId id="257" r:id="rId3"/>
-    <p:sldId id="258" r:id="rId4"/>
-    <p:sldId id="259" r:id="rId5"/>
-    <p:sldId id="260" r:id="rId6"/>
-    <p:sldId id="261" r:id="rId7"/>
-    <p:sldId id="262" r:id="rId8"/>
-    <p:sldId id="263" r:id="rId9"/>
-    <p:sldId id="264" r:id="rId10"/>
-    <p:sldId id="265" r:id="rId11"/>
+    <p:sldId id="266" r:id="rId4"/>
+    <p:sldId id="258" r:id="rId5"/>
+    <p:sldId id="259" r:id="rId6"/>
+    <p:sldId id="260" r:id="rId7"/>
+    <p:sldId id="261" r:id="rId8"/>
+    <p:sldId id="262" r:id="rId9"/>
+    <p:sldId id="263" r:id="rId10"/>
+    <p:sldId id="264" r:id="rId11"/>
+    <p:sldId id="265" r:id="rId12"/>
   </p:sldIdLst>
   <p:sldSz cx="12192000" cy="6858000"/>
   <p:notesSz cx="6858000" cy="9144000"/>
@@ -7745,6 +7746,93 @@
       </p:grpSpPr>
       <p:sp>
         <p:nvSpPr>
+          <p:cNvPr id="2" name="Title 1">
+            <a:extLst>
+              <a:ext uri="{FF2B5EF4-FFF2-40B4-BE49-F238E27FC236}">
+                <a16:creationId xmlns:a16="http://schemas.microsoft.com/office/drawing/2014/main" id="{CCC4A7B5-8082-41BD-8216-D7174D2FC296}"/>
+              </a:ext>
+            </a:extLst>
+          </p:cNvPr>
+          <p:cNvSpPr>
+            <a:spLocks noGrp="1"/>
+          </p:cNvSpPr>
+          <p:nvPr>
+            <p:ph type="title"/>
+          </p:nvPr>
+        </p:nvSpPr>
+        <p:spPr/>
+        <p:txBody>
+          <a:bodyPr/>
+          <a:lstStyle/>
+          <a:p>
+            <a:r>
+              <a:rPr lang="en-US" dirty="0"/>
+              <a:t>Drug-Induced Mortality Rates by Drug</a:t>
+            </a:r>
+          </a:p>
+        </p:txBody>
+      </p:sp>
+      <p:pic>
+        <p:nvPicPr>
+          <p:cNvPr id="5" name="Content Placeholder 4">
+            <a:extLst>
+              <a:ext uri="{FF2B5EF4-FFF2-40B4-BE49-F238E27FC236}">
+                <a16:creationId xmlns:a16="http://schemas.microsoft.com/office/drawing/2014/main" id="{DFB7AE71-0B7A-462D-932A-2B550F2B7D1C}"/>
+              </a:ext>
+            </a:extLst>
+          </p:cNvPr>
+          <p:cNvPicPr>
+            <a:picLocks noGrp="1" noChangeAspect="1"/>
+          </p:cNvPicPr>
+          <p:nvPr>
+            <p:ph idx="1"/>
+          </p:nvPr>
+        </p:nvPicPr>
+        <p:blipFill>
+          <a:blip r:embed="rId2"/>
+          <a:stretch>
+            <a:fillRect/>
+          </a:stretch>
+        </p:blipFill>
+        <p:spPr>
+          <a:xfrm>
+            <a:off x="2592925" y="1382001"/>
+            <a:ext cx="7968620" cy="5312414"/>
+          </a:xfrm>
+        </p:spPr>
+      </p:pic>
+    </p:spTree>
+    <p:extLst>
+      <p:ext uri="{BB962C8B-B14F-4D97-AF65-F5344CB8AC3E}">
+        <p14:creationId xmlns:p14="http://schemas.microsoft.com/office/powerpoint/2010/main" val="2160349714"/>
+      </p:ext>
+    </p:extLst>
+  </p:cSld>
+  <p:clrMapOvr>
+    <a:masterClrMapping/>
+  </p:clrMapOvr>
+</p:sld>
+</file>
+
+<file path=ppt/slides/slide11.xml><?xml version="1.0" encoding="utf-8"?>
+<p:sld xmlns:a="http://schemas.openxmlformats.org/drawingml/2006/main" xmlns:r="http://schemas.openxmlformats.org/officeDocument/2006/relationships" xmlns:p="http://schemas.openxmlformats.org/presentationml/2006/main">
+  <p:cSld>
+    <p:spTree>
+      <p:nvGrpSpPr>
+        <p:cNvPr id="1" name=""/>
+        <p:cNvGrpSpPr/>
+        <p:nvPr/>
+      </p:nvGrpSpPr>
+      <p:grpSpPr>
+        <a:xfrm>
+          <a:off x="0" y="0"/>
+          <a:ext cx="0" cy="0"/>
+          <a:chOff x="0" y="0"/>
+          <a:chExt cx="0" cy="0"/>
+        </a:xfrm>
+      </p:grpSpPr>
+      <p:sp>
+        <p:nvSpPr>
           <p:cNvPr id="4" name="Title 3">
             <a:extLst>
               <a:ext uri="{FF2B5EF4-FFF2-40B4-BE49-F238E27FC236}">
@@ -7956,7 +8044,7 @@
           <p:cNvPr id="2" name="Title 1">
             <a:extLst>
               <a:ext uri="{FF2B5EF4-FFF2-40B4-BE49-F238E27FC236}">
-                <a16:creationId xmlns:a16="http://schemas.microsoft.com/office/drawing/2014/main" id="{75007935-D4DA-4606-8398-F8A0B284B5E2}"/>
+                <a16:creationId xmlns:a16="http://schemas.microsoft.com/office/drawing/2014/main" id="{5D177DDA-3006-43E9-9D9C-71348C54AF5E}"/>
               </a:ext>
             </a:extLst>
           </p:cNvPr>
@@ -7969,14 +8057,12 @@
         </p:nvSpPr>
         <p:spPr/>
         <p:txBody>
-          <a:bodyPr>
-            <a:normAutofit/>
-          </a:bodyPr>
+          <a:bodyPr/>
           <a:lstStyle/>
           <a:p>
             <a:r>
               <a:rPr lang="en-US" dirty="0"/>
-              <a:t>Struggles with data</a:t>
+              <a:t>Data Sources</a:t>
             </a:r>
           </a:p>
         </p:txBody>
@@ -7986,7 +8072,7 @@
           <p:cNvPr id="3" name="Content Placeholder 2">
             <a:extLst>
               <a:ext uri="{FF2B5EF4-FFF2-40B4-BE49-F238E27FC236}">
-                <a16:creationId xmlns:a16="http://schemas.microsoft.com/office/drawing/2014/main" id="{2629915A-1567-437B-A470-5DA2D92B5ACF}"/>
+                <a16:creationId xmlns:a16="http://schemas.microsoft.com/office/drawing/2014/main" id="{BAE4EA54-CC89-49BF-9D45-2558E58BD415}"/>
               </a:ext>
             </a:extLst>
           </p:cNvPr>
@@ -8002,28 +8088,6 @@
           <a:bodyPr/>
           <a:lstStyle/>
           <a:p>
-            <a:pPr marL="0" indent="0">
-              <a:buNone/>
-            </a:pPr>
-            <a:r>
-              <a:rPr lang="en-US" dirty="0"/>
-              <a:t>We were not able to </a:t>
-            </a:r>
-          </a:p>
-          <a:p>
-            <a:r>
-              <a:rPr lang="en-US" dirty="0"/>
-              <a:t>Drug-induced mortality rates and income</a:t>
-            </a:r>
-          </a:p>
-          <a:p>
-            <a:r>
-              <a:rPr lang="en-US" dirty="0"/>
-              <a:t>Drug-induced mortality rates and education</a:t>
-            </a:r>
-            <a:br>
-              <a:rPr lang="en-US" dirty="0"/>
-            </a:br>
             <a:endParaRPr lang="en-US" dirty="0"/>
           </a:p>
         </p:txBody>
@@ -8031,7 +8095,7 @@
     </p:spTree>
     <p:extLst>
       <p:ext uri="{BB962C8B-B14F-4D97-AF65-F5344CB8AC3E}">
-        <p14:creationId xmlns:p14="http://schemas.microsoft.com/office/powerpoint/2010/main" val="2289639885"/>
+        <p14:creationId xmlns:p14="http://schemas.microsoft.com/office/powerpoint/2010/main" val="416682109"/>
       </p:ext>
     </p:extLst>
   </p:cSld>
@@ -8063,7 +8127,7 @@
           <p:cNvPr id="2" name="Title 1">
             <a:extLst>
               <a:ext uri="{FF2B5EF4-FFF2-40B4-BE49-F238E27FC236}">
-                <a16:creationId xmlns:a16="http://schemas.microsoft.com/office/drawing/2014/main" id="{CBB69504-185D-4B1C-B779-2E7B3E05190F}"/>
+                <a16:creationId xmlns:a16="http://schemas.microsoft.com/office/drawing/2014/main" id="{75007935-D4DA-4606-8398-F8A0B284B5E2}"/>
               </a:ext>
             </a:extLst>
           </p:cNvPr>
@@ -8076,17 +8140,15 @@
         </p:nvSpPr>
         <p:spPr/>
         <p:txBody>
-          <a:bodyPr/>
+          <a:bodyPr>
+            <a:normAutofit/>
+          </a:bodyPr>
           <a:lstStyle/>
           <a:p>
             <a:r>
               <a:rPr lang="en-US" dirty="0"/>
-              <a:t>Drug-induced mortality rates and age</a:t>
-            </a:r>
-            <a:br>
-              <a:rPr lang="en-US" dirty="0"/>
-            </a:br>
-            <a:endParaRPr lang="en-US" dirty="0"/>
+              <a:t>Struggles with data</a:t>
+            </a:r>
           </a:p>
         </p:txBody>
       </p:sp>
@@ -8095,7 +8157,7 @@
           <p:cNvPr id="3" name="Content Placeholder 2">
             <a:extLst>
               <a:ext uri="{FF2B5EF4-FFF2-40B4-BE49-F238E27FC236}">
-                <a16:creationId xmlns:a16="http://schemas.microsoft.com/office/drawing/2014/main" id="{4E1E6B99-92FF-43AE-B254-085BB1A84BE9}"/>
+                <a16:creationId xmlns:a16="http://schemas.microsoft.com/office/drawing/2014/main" id="{2629915A-1567-437B-A470-5DA2D92B5ACF}"/>
               </a:ext>
             </a:extLst>
           </p:cNvPr>
@@ -8108,17 +8170,41 @@
         </p:nvSpPr>
         <p:spPr/>
         <p:txBody>
-          <a:bodyPr/>
+          <a:bodyPr>
+            <a:normAutofit/>
+          </a:bodyPr>
           <a:lstStyle/>
           <a:p>
-            <a:endParaRPr lang="en-US"/>
+            <a:pPr marL="0" indent="0">
+              <a:buNone/>
+            </a:pPr>
+            <a:r>
+              <a:rPr lang="en-US" sz="2800" dirty="0"/>
+              <a:t>We were not able to find reliable data to analyze and plot these trends:  </a:t>
+            </a:r>
+          </a:p>
+          <a:p>
+            <a:r>
+              <a:rPr lang="en-US" sz="2800" dirty="0"/>
+              <a:t>Drug-induced mortality rates and income</a:t>
+            </a:r>
+          </a:p>
+          <a:p>
+            <a:r>
+              <a:rPr lang="en-US" sz="2800" dirty="0"/>
+              <a:t>Drug-induced mortality rates and education</a:t>
+            </a:r>
+            <a:br>
+              <a:rPr lang="en-US" sz="2800" dirty="0"/>
+            </a:br>
+            <a:endParaRPr lang="en-US" sz="2800" dirty="0"/>
           </a:p>
         </p:txBody>
       </p:sp>
     </p:spTree>
     <p:extLst>
       <p:ext uri="{BB962C8B-B14F-4D97-AF65-F5344CB8AC3E}">
-        <p14:creationId xmlns:p14="http://schemas.microsoft.com/office/powerpoint/2010/main" val="2290168469"/>
+        <p14:creationId xmlns:p14="http://schemas.microsoft.com/office/powerpoint/2010/main" val="2289639885"/>
       </p:ext>
     </p:extLst>
   </p:cSld>
@@ -8150,7 +8236,7 @@
           <p:cNvPr id="2" name="Title 1">
             <a:extLst>
               <a:ext uri="{FF2B5EF4-FFF2-40B4-BE49-F238E27FC236}">
-                <a16:creationId xmlns:a16="http://schemas.microsoft.com/office/drawing/2014/main" id="{57709140-C8B7-46DE-A33B-463B5EBE4341}"/>
+                <a16:creationId xmlns:a16="http://schemas.microsoft.com/office/drawing/2014/main" id="{CBB69504-185D-4B1C-B779-2E7B3E05190F}"/>
               </a:ext>
             </a:extLst>
           </p:cNvPr>
@@ -8161,49 +8247,60 @@
             <p:ph type="title"/>
           </p:nvPr>
         </p:nvSpPr>
-        <p:spPr/>
-        <p:txBody>
-          <a:bodyPr>
-            <a:normAutofit/>
-          </a:bodyPr>
+        <p:spPr>
+          <a:xfrm>
+            <a:off x="2509035" y="607332"/>
+            <a:ext cx="8911687" cy="1280890"/>
+          </a:xfrm>
+        </p:spPr>
+        <p:txBody>
+          <a:bodyPr/>
           <a:lstStyle/>
           <a:p>
             <a:r>
               <a:rPr lang="en-US" dirty="0"/>
-              <a:t>Drug-induced mortality rates and gender</a:t>
-            </a:r>
-          </a:p>
-        </p:txBody>
-      </p:sp>
-      <p:sp>
-        <p:nvSpPr>
-          <p:cNvPr id="3" name="Content Placeholder 2">
+              <a:t>Drug-Induced Mortality Rates and Age</a:t>
+            </a:r>
+            <a:br>
+              <a:rPr lang="en-US" dirty="0"/>
+            </a:br>
+            <a:endParaRPr lang="en-US" dirty="0"/>
+          </a:p>
+        </p:txBody>
+      </p:sp>
+      <p:pic>
+        <p:nvPicPr>
+          <p:cNvPr id="5" name="Content Placeholder 4">
             <a:extLst>
               <a:ext uri="{FF2B5EF4-FFF2-40B4-BE49-F238E27FC236}">
-                <a16:creationId xmlns:a16="http://schemas.microsoft.com/office/drawing/2014/main" id="{1D9DC6AA-EA65-4975-9213-F1AA957ED778}"/>
+                <a16:creationId xmlns:a16="http://schemas.microsoft.com/office/drawing/2014/main" id="{45739901-9184-4471-B5FD-A2FC5BB690ED}"/>
               </a:ext>
             </a:extLst>
           </p:cNvPr>
-          <p:cNvSpPr>
-            <a:spLocks noGrp="1"/>
-          </p:cNvSpPr>
+          <p:cNvPicPr>
+            <a:picLocks noGrp="1" noChangeAspect="1"/>
+          </p:cNvPicPr>
           <p:nvPr>
             <p:ph idx="1"/>
           </p:nvPr>
-        </p:nvSpPr>
-        <p:spPr/>
-        <p:txBody>
-          <a:bodyPr/>
-          <a:lstStyle/>
-          <a:p>
-            <a:endParaRPr lang="en-US"/>
-          </a:p>
-        </p:txBody>
-      </p:sp>
+        </p:nvPicPr>
+        <p:blipFill>
+          <a:blip r:embed="rId2"/>
+          <a:stretch>
+            <a:fillRect/>
+          </a:stretch>
+        </p:blipFill>
+        <p:spPr>
+          <a:xfrm>
+            <a:off x="2509035" y="1247777"/>
+            <a:ext cx="8082181" cy="5388122"/>
+          </a:xfrm>
+        </p:spPr>
+      </p:pic>
     </p:spTree>
     <p:extLst>
       <p:ext uri="{BB962C8B-B14F-4D97-AF65-F5344CB8AC3E}">
-        <p14:creationId xmlns:p14="http://schemas.microsoft.com/office/powerpoint/2010/main" val="956778109"/>
+        <p14:creationId xmlns:p14="http://schemas.microsoft.com/office/powerpoint/2010/main" val="2290168469"/>
       </p:ext>
     </p:extLst>
   </p:cSld>
@@ -8235,7 +8332,7 @@
           <p:cNvPr id="2" name="Title 1">
             <a:extLst>
               <a:ext uri="{FF2B5EF4-FFF2-40B4-BE49-F238E27FC236}">
-                <a16:creationId xmlns:a16="http://schemas.microsoft.com/office/drawing/2014/main" id="{44E3AE93-826E-4319-B623-63CBCBC0C145}"/>
+                <a16:creationId xmlns:a16="http://schemas.microsoft.com/office/drawing/2014/main" id="{57709140-C8B7-46DE-A33B-463B5EBE4341}"/>
               </a:ext>
             </a:extLst>
           </p:cNvPr>
@@ -8255,7 +8352,7 @@
           <a:p>
             <a:r>
               <a:rPr lang="en-US" dirty="0"/>
-              <a:t>Drug-induced mortality rates and geo-location (counties)</a:t>
+              <a:t>Drug-induced mortality rates and gender</a:t>
             </a:r>
           </a:p>
         </p:txBody>
@@ -8265,7 +8362,7 @@
           <p:cNvPr id="3" name="Content Placeholder 2">
             <a:extLst>
               <a:ext uri="{FF2B5EF4-FFF2-40B4-BE49-F238E27FC236}">
-                <a16:creationId xmlns:a16="http://schemas.microsoft.com/office/drawing/2014/main" id="{5ECB903B-AD6E-4E0B-984F-08AC2F73AEA4}"/>
+                <a16:creationId xmlns:a16="http://schemas.microsoft.com/office/drawing/2014/main" id="{1D9DC6AA-EA65-4975-9213-F1AA957ED778}"/>
               </a:ext>
             </a:extLst>
           </p:cNvPr>
@@ -8281,14 +8378,14 @@
           <a:bodyPr/>
           <a:lstStyle/>
           <a:p>
-            <a:endParaRPr lang="en-US"/>
+            <a:endParaRPr lang="en-US" dirty="0"/>
           </a:p>
         </p:txBody>
       </p:sp>
     </p:spTree>
     <p:extLst>
       <p:ext uri="{BB962C8B-B14F-4D97-AF65-F5344CB8AC3E}">
-        <p14:creationId xmlns:p14="http://schemas.microsoft.com/office/powerpoint/2010/main" val="712921710"/>
+        <p14:creationId xmlns:p14="http://schemas.microsoft.com/office/powerpoint/2010/main" val="956778109"/>
       </p:ext>
     </p:extLst>
   </p:cSld>
@@ -8320,7 +8417,7 @@
           <p:cNvPr id="2" name="Title 1">
             <a:extLst>
               <a:ext uri="{FF2B5EF4-FFF2-40B4-BE49-F238E27FC236}">
-                <a16:creationId xmlns:a16="http://schemas.microsoft.com/office/drawing/2014/main" id="{B8E97443-B866-4821-958D-875892DA966B}"/>
+                <a16:creationId xmlns:a16="http://schemas.microsoft.com/office/drawing/2014/main" id="{44E3AE93-826E-4319-B623-63CBCBC0C145}"/>
               </a:ext>
             </a:extLst>
           </p:cNvPr>
@@ -8340,7 +8437,7 @@
           <a:p>
             <a:r>
               <a:rPr lang="en-US" dirty="0"/>
-              <a:t>Drug-induced mortality rates and unemployment rates</a:t>
+              <a:t>Drug-induced mortality rates and geo-location (counties)</a:t>
             </a:r>
           </a:p>
         </p:txBody>
@@ -8350,7 +8447,7 @@
           <p:cNvPr id="3" name="Content Placeholder 2">
             <a:extLst>
               <a:ext uri="{FF2B5EF4-FFF2-40B4-BE49-F238E27FC236}">
-                <a16:creationId xmlns:a16="http://schemas.microsoft.com/office/drawing/2014/main" id="{CC681BD8-5A03-4E20-9CBD-9B11D42C8DFC}"/>
+                <a16:creationId xmlns:a16="http://schemas.microsoft.com/office/drawing/2014/main" id="{5ECB903B-AD6E-4E0B-984F-08AC2F73AEA4}"/>
               </a:ext>
             </a:extLst>
           </p:cNvPr>
@@ -8373,7 +8470,7 @@
     </p:spTree>
     <p:extLst>
       <p:ext uri="{BB962C8B-B14F-4D97-AF65-F5344CB8AC3E}">
-        <p14:creationId xmlns:p14="http://schemas.microsoft.com/office/powerpoint/2010/main" val="2167273281"/>
+        <p14:creationId xmlns:p14="http://schemas.microsoft.com/office/powerpoint/2010/main" val="712921710"/>
       </p:ext>
     </p:extLst>
   </p:cSld>
@@ -8405,7 +8502,7 @@
           <p:cNvPr id="2" name="Title 1">
             <a:extLst>
               <a:ext uri="{FF2B5EF4-FFF2-40B4-BE49-F238E27FC236}">
-                <a16:creationId xmlns:a16="http://schemas.microsoft.com/office/drawing/2014/main" id="{8BF87117-1E4E-4EE9-8760-25D09E6E6179}"/>
+                <a16:creationId xmlns:a16="http://schemas.microsoft.com/office/drawing/2014/main" id="{B8E97443-B866-4821-958D-875892DA966B}"/>
               </a:ext>
             </a:extLst>
           </p:cNvPr>
@@ -8425,7 +8522,7 @@
           <a:p>
             <a:r>
               <a:rPr lang="en-US" dirty="0"/>
-              <a:t>Drug-induced mortality rates and barriers to medical treatment</a:t>
+              <a:t>Drug-induced mortality rates and unemployment rates</a:t>
             </a:r>
           </a:p>
         </p:txBody>
@@ -8435,7 +8532,7 @@
           <p:cNvPr id="3" name="Content Placeholder 2">
             <a:extLst>
               <a:ext uri="{FF2B5EF4-FFF2-40B4-BE49-F238E27FC236}">
-                <a16:creationId xmlns:a16="http://schemas.microsoft.com/office/drawing/2014/main" id="{F37D4F70-3A7A-4527-B5BB-4CBFEE548667}"/>
+                <a16:creationId xmlns:a16="http://schemas.microsoft.com/office/drawing/2014/main" id="{CC681BD8-5A03-4E20-9CBD-9B11D42C8DFC}"/>
               </a:ext>
             </a:extLst>
           </p:cNvPr>
@@ -8458,7 +8555,7 @@
     </p:spTree>
     <p:extLst>
       <p:ext uri="{BB962C8B-B14F-4D97-AF65-F5344CB8AC3E}">
-        <p14:creationId xmlns:p14="http://schemas.microsoft.com/office/powerpoint/2010/main" val="2699776682"/>
+        <p14:creationId xmlns:p14="http://schemas.microsoft.com/office/powerpoint/2010/main" val="2167273281"/>
       </p:ext>
     </p:extLst>
   </p:cSld>
@@ -8490,7 +8587,7 @@
           <p:cNvPr id="2" name="Title 1">
             <a:extLst>
               <a:ext uri="{FF2B5EF4-FFF2-40B4-BE49-F238E27FC236}">
-                <a16:creationId xmlns:a16="http://schemas.microsoft.com/office/drawing/2014/main" id="{CCC4A7B5-8082-41BD-8216-D7174D2FC296}"/>
+                <a16:creationId xmlns:a16="http://schemas.microsoft.com/office/drawing/2014/main" id="{8BF87117-1E4E-4EE9-8760-25D09E6E6179}"/>
               </a:ext>
             </a:extLst>
           </p:cNvPr>
@@ -8503,12 +8600,14 @@
         </p:nvSpPr>
         <p:spPr/>
         <p:txBody>
-          <a:bodyPr/>
+          <a:bodyPr>
+            <a:normAutofit/>
+          </a:bodyPr>
           <a:lstStyle/>
           <a:p>
             <a:r>
               <a:rPr lang="en-US" dirty="0"/>
-              <a:t>Drug-induced mortality rates by drug</a:t>
+              <a:t>Drug-induced mortality rates and barriers to medical treatment</a:t>
             </a:r>
           </a:p>
         </p:txBody>
@@ -8518,7 +8617,7 @@
           <p:cNvPr id="3" name="Content Placeholder 2">
             <a:extLst>
               <a:ext uri="{FF2B5EF4-FFF2-40B4-BE49-F238E27FC236}">
-                <a16:creationId xmlns:a16="http://schemas.microsoft.com/office/drawing/2014/main" id="{A521F9F2-EC27-4859-9030-7912CDDA3BE6}"/>
+                <a16:creationId xmlns:a16="http://schemas.microsoft.com/office/drawing/2014/main" id="{F37D4F70-3A7A-4527-B5BB-4CBFEE548667}"/>
               </a:ext>
             </a:extLst>
           </p:cNvPr>
@@ -8541,7 +8640,7 @@
     </p:spTree>
     <p:extLst>
       <p:ext uri="{BB962C8B-B14F-4D97-AF65-F5344CB8AC3E}">
-        <p14:creationId xmlns:p14="http://schemas.microsoft.com/office/powerpoint/2010/main" val="2160349714"/>
+        <p14:creationId xmlns:p14="http://schemas.microsoft.com/office/powerpoint/2010/main" val="2699776682"/>
       </p:ext>
     </p:extLst>
   </p:cSld>

</xml_diff>

<commit_message>
Updated slides with regression and correlation
</commit_message>
<xml_diff>
--- a/Drug Mortality and Socio-Economic conditions in Connecticut.pptx
+++ b/Drug Mortality and Socio-Economic conditions in Connecticut.pptx
@@ -10,14 +10,16 @@
     <p:sldId id="266" r:id="rId4"/>
     <p:sldId id="258" r:id="rId5"/>
     <p:sldId id="259" r:id="rId6"/>
-    <p:sldId id="260" r:id="rId7"/>
-    <p:sldId id="261" r:id="rId8"/>
-    <p:sldId id="267" r:id="rId9"/>
-    <p:sldId id="262" r:id="rId10"/>
-    <p:sldId id="263" r:id="rId11"/>
-    <p:sldId id="264" r:id="rId12"/>
-    <p:sldId id="268" r:id="rId13"/>
-    <p:sldId id="265" r:id="rId14"/>
+    <p:sldId id="262" r:id="rId7"/>
+    <p:sldId id="263" r:id="rId8"/>
+    <p:sldId id="264" r:id="rId9"/>
+    <p:sldId id="268" r:id="rId10"/>
+    <p:sldId id="261" r:id="rId11"/>
+    <p:sldId id="267" r:id="rId12"/>
+    <p:sldId id="260" r:id="rId13"/>
+    <p:sldId id="269" r:id="rId14"/>
+    <p:sldId id="270" r:id="rId15"/>
+    <p:sldId id="265" r:id="rId16"/>
   </p:sldIdLst>
   <p:sldSz cx="12192000" cy="6858000"/>
   <p:notesSz cx="6858000" cy="9144000"/>
@@ -313,7 +315,7 @@
             <a:fld id="{B61BEF0D-F0BB-DE4B-95CE-6DB70DBA9567}" type="datetimeFigureOut">
               <a:rPr lang="en-US" dirty="0"/>
               <a:pPr/>
-              <a:t>6/12/2018</a:t>
+              <a:t>6/13/2018</a:t>
             </a:fld>
             <a:endParaRPr lang="en-US" dirty="0"/>
           </a:p>
@@ -648,7 +650,7 @@
             <a:fld id="{B61BEF0D-F0BB-DE4B-95CE-6DB70DBA9567}" type="datetimeFigureOut">
               <a:rPr lang="en-US" dirty="0"/>
               <a:pPr/>
-              <a:t>6/12/2018</a:t>
+              <a:t>6/13/2018</a:t>
             </a:fld>
             <a:endParaRPr lang="en-US" dirty="0"/>
           </a:p>
@@ -1046,7 +1048,7 @@
             <a:fld id="{B61BEF0D-F0BB-DE4B-95CE-6DB70DBA9567}" type="datetimeFigureOut">
               <a:rPr lang="en-US" dirty="0"/>
               <a:pPr/>
-              <a:t>6/12/2018</a:t>
+              <a:t>6/13/2018</a:t>
             </a:fld>
             <a:endParaRPr lang="en-US" dirty="0"/>
           </a:p>
@@ -1379,7 +1381,7 @@
             <a:fld id="{B61BEF0D-F0BB-DE4B-95CE-6DB70DBA9567}" type="datetimeFigureOut">
               <a:rPr lang="en-US" dirty="0"/>
               <a:pPr/>
-              <a:t>6/12/2018</a:t>
+              <a:t>6/13/2018</a:t>
             </a:fld>
             <a:endParaRPr lang="en-US" dirty="0"/>
           </a:p>
@@ -1696,7 +1698,7 @@
             <a:fld id="{B61BEF0D-F0BB-DE4B-95CE-6DB70DBA9567}" type="datetimeFigureOut">
               <a:rPr lang="en-US" dirty="0"/>
               <a:pPr/>
-              <a:t>6/12/2018</a:t>
+              <a:t>6/13/2018</a:t>
             </a:fld>
             <a:endParaRPr lang="en-US" dirty="0"/>
           </a:p>
@@ -2089,7 +2091,7 @@
             <a:fld id="{B61BEF0D-F0BB-DE4B-95CE-6DB70DBA9567}" type="datetimeFigureOut">
               <a:rPr lang="en-US" dirty="0"/>
               <a:pPr/>
-              <a:t>6/12/2018</a:t>
+              <a:t>6/13/2018</a:t>
             </a:fld>
             <a:endParaRPr lang="en-US" dirty="0"/>
           </a:p>
@@ -2343,7 +2345,7 @@
             <a:fld id="{B61BEF0D-F0BB-DE4B-95CE-6DB70DBA9567}" type="datetimeFigureOut">
               <a:rPr lang="en-US" dirty="0"/>
               <a:pPr/>
-              <a:t>6/12/2018</a:t>
+              <a:t>6/13/2018</a:t>
             </a:fld>
             <a:endParaRPr lang="en-US" dirty="0"/>
           </a:p>
@@ -2602,7 +2604,7 @@
             <a:fld id="{B61BEF0D-F0BB-DE4B-95CE-6DB70DBA9567}" type="datetimeFigureOut">
               <a:rPr lang="en-US" dirty="0"/>
               <a:pPr/>
-              <a:t>6/12/2018</a:t>
+              <a:t>6/13/2018</a:t>
             </a:fld>
             <a:endParaRPr lang="en-US" dirty="0"/>
           </a:p>
@@ -2861,7 +2863,7 @@
             <a:fld id="{B61BEF0D-F0BB-DE4B-95CE-6DB70DBA9567}" type="datetimeFigureOut">
               <a:rPr lang="en-US" dirty="0"/>
               <a:pPr/>
-              <a:t>6/12/2018</a:t>
+              <a:t>6/13/2018</a:t>
             </a:fld>
             <a:endParaRPr lang="en-US" dirty="0"/>
           </a:p>
@@ -3187,7 +3189,7 @@
             <a:fld id="{B61BEF0D-F0BB-DE4B-95CE-6DB70DBA9567}" type="datetimeFigureOut">
               <a:rPr lang="en-US" dirty="0"/>
               <a:pPr/>
-              <a:t>6/12/2018</a:t>
+              <a:t>6/13/2018</a:t>
             </a:fld>
             <a:endParaRPr lang="en-US" dirty="0"/>
           </a:p>
@@ -3507,7 +3509,7 @@
             <a:fld id="{B61BEF0D-F0BB-DE4B-95CE-6DB70DBA9567}" type="datetimeFigureOut">
               <a:rPr lang="en-US" dirty="0"/>
               <a:pPr/>
-              <a:t>6/12/2018</a:t>
+              <a:t>6/13/2018</a:t>
             </a:fld>
             <a:endParaRPr lang="en-US" dirty="0"/>
           </a:p>
@@ -3961,7 +3963,7 @@
             <a:fld id="{B61BEF0D-F0BB-DE4B-95CE-6DB70DBA9567}" type="datetimeFigureOut">
               <a:rPr lang="en-US" dirty="0"/>
               <a:pPr/>
-              <a:t>6/12/2018</a:t>
+              <a:t>6/13/2018</a:t>
             </a:fld>
             <a:endParaRPr lang="en-US" dirty="0"/>
           </a:p>
@@ -4163,7 +4165,7 @@
             <a:fld id="{B61BEF0D-F0BB-DE4B-95CE-6DB70DBA9567}" type="datetimeFigureOut">
               <a:rPr lang="en-US" dirty="0"/>
               <a:pPr/>
-              <a:t>6/12/2018</a:t>
+              <a:t>6/13/2018</a:t>
             </a:fld>
             <a:endParaRPr lang="en-US" dirty="0"/>
           </a:p>
@@ -4337,7 +4339,7 @@
             <a:fld id="{B61BEF0D-F0BB-DE4B-95CE-6DB70DBA9567}" type="datetimeFigureOut">
               <a:rPr lang="en-US" dirty="0"/>
               <a:pPr/>
-              <a:t>6/12/2018</a:t>
+              <a:t>6/13/2018</a:t>
             </a:fld>
             <a:endParaRPr lang="en-US" dirty="0"/>
           </a:p>
@@ -4667,7 +4669,7 @@
             <a:fld id="{B61BEF0D-F0BB-DE4B-95CE-6DB70DBA9567}" type="datetimeFigureOut">
               <a:rPr lang="en-US" dirty="0"/>
               <a:pPr/>
-              <a:t>6/12/2018</a:t>
+              <a:t>6/13/2018</a:t>
             </a:fld>
             <a:endParaRPr lang="en-US" dirty="0"/>
           </a:p>
@@ -5009,7 +5011,7 @@
             <a:fld id="{B61BEF0D-F0BB-DE4B-95CE-6DB70DBA9567}" type="datetimeFigureOut">
               <a:rPr lang="en-US" dirty="0"/>
               <a:pPr/>
-              <a:t>6/12/2018</a:t>
+              <a:t>6/13/2018</a:t>
             </a:fld>
             <a:endParaRPr lang="en-US" dirty="0"/>
           </a:p>
@@ -7123,7 +7125,7 @@
             <a:fld id="{B61BEF0D-F0BB-DE4B-95CE-6DB70DBA9567}" type="datetimeFigureOut">
               <a:rPr lang="en-US" dirty="0"/>
               <a:pPr/>
-              <a:t>6/12/2018</a:t>
+              <a:t>6/13/2018</a:t>
             </a:fld>
             <a:endParaRPr lang="en-US" dirty="0"/>
           </a:p>
@@ -7751,7 +7753,7 @@
           <p:cNvPr id="2" name="Title 1">
             <a:extLst>
               <a:ext uri="{FF2B5EF4-FFF2-40B4-BE49-F238E27FC236}">
-                <a16:creationId xmlns:a16="http://schemas.microsoft.com/office/drawing/2014/main" id="{8BF87117-1E4E-4EE9-8760-25D09E6E6179}"/>
+                <a16:creationId xmlns:a16="http://schemas.microsoft.com/office/drawing/2014/main" id="{44E3AE93-826E-4319-B623-63CBCBC0C145}"/>
               </a:ext>
             </a:extLst>
           </p:cNvPr>
@@ -7771,40 +7773,44 @@
           <a:p>
             <a:r>
               <a:rPr lang="en-US" dirty="0"/>
-              <a:t>Drug-induced mortality rates and barriers to medical treatment</a:t>
-            </a:r>
-          </a:p>
-        </p:txBody>
-      </p:sp>
-      <p:sp>
-        <p:nvSpPr>
-          <p:cNvPr id="3" name="Content Placeholder 2">
+              <a:t>Drug-Induced Total Mortality by County</a:t>
+            </a:r>
+          </a:p>
+        </p:txBody>
+      </p:sp>
+      <p:pic>
+        <p:nvPicPr>
+          <p:cNvPr id="5" name="Content Placeholder 4">
             <a:extLst>
               <a:ext uri="{FF2B5EF4-FFF2-40B4-BE49-F238E27FC236}">
-                <a16:creationId xmlns:a16="http://schemas.microsoft.com/office/drawing/2014/main" id="{F37D4F70-3A7A-4527-B5BB-4CBFEE548667}"/>
+                <a16:creationId xmlns:a16="http://schemas.microsoft.com/office/drawing/2014/main" id="{E2EA595C-4A89-4C5B-A82C-48FA5ABEFE23}"/>
               </a:ext>
             </a:extLst>
           </p:cNvPr>
-          <p:cNvSpPr>
-            <a:spLocks noGrp="1"/>
-          </p:cNvSpPr>
+          <p:cNvPicPr>
+            <a:picLocks noGrp="1" noChangeAspect="1"/>
+          </p:cNvPicPr>
           <p:nvPr>
             <p:ph idx="1"/>
           </p:nvPr>
-        </p:nvSpPr>
-        <p:spPr/>
-        <p:txBody>
-          <a:bodyPr/>
-          <a:lstStyle/>
-          <a:p>
-            <a:endParaRPr lang="en-US"/>
-          </a:p>
-        </p:txBody>
-      </p:sp>
+        </p:nvPicPr>
+        <p:blipFill>
+          <a:blip r:embed="rId2"/>
+          <a:stretch>
+            <a:fillRect/>
+          </a:stretch>
+        </p:blipFill>
+        <p:spPr>
+          <a:xfrm>
+            <a:off x="1242297" y="1928070"/>
+            <a:ext cx="10148347" cy="4742833"/>
+          </a:xfrm>
+        </p:spPr>
+      </p:pic>
     </p:spTree>
     <p:extLst>
       <p:ext uri="{BB962C8B-B14F-4D97-AF65-F5344CB8AC3E}">
-        <p14:creationId xmlns:p14="http://schemas.microsoft.com/office/powerpoint/2010/main" val="2699776682"/>
+        <p14:creationId xmlns:p14="http://schemas.microsoft.com/office/powerpoint/2010/main" val="712921710"/>
       </p:ext>
     </p:extLst>
   </p:cSld>
@@ -7836,7 +7842,7 @@
           <p:cNvPr id="2" name="Title 1">
             <a:extLst>
               <a:ext uri="{FF2B5EF4-FFF2-40B4-BE49-F238E27FC236}">
-                <a16:creationId xmlns:a16="http://schemas.microsoft.com/office/drawing/2014/main" id="{CCC4A7B5-8082-41BD-8216-D7174D2FC296}"/>
+                <a16:creationId xmlns:a16="http://schemas.microsoft.com/office/drawing/2014/main" id="{705B2833-8695-4CE9-B8D7-AA855B1AF473}"/>
               </a:ext>
             </a:extLst>
           </p:cNvPr>
@@ -7854,7 +7860,7 @@
           <a:p>
             <a:r>
               <a:rPr lang="en-US" dirty="0"/>
-              <a:t>Drug-Induced Mortality Rates by Drug</a:t>
+              <a:t>Drug-Induced Mortality by County per 100K</a:t>
             </a:r>
           </a:p>
         </p:txBody>
@@ -7864,7 +7870,7 @@
           <p:cNvPr id="5" name="Content Placeholder 4">
             <a:extLst>
               <a:ext uri="{FF2B5EF4-FFF2-40B4-BE49-F238E27FC236}">
-                <a16:creationId xmlns:a16="http://schemas.microsoft.com/office/drawing/2014/main" id="{DFB7AE71-0B7A-462D-932A-2B550F2B7D1C}"/>
+                <a16:creationId xmlns:a16="http://schemas.microsoft.com/office/drawing/2014/main" id="{95101428-BCFB-4FC4-96B2-C4DE4AF7981D}"/>
               </a:ext>
             </a:extLst>
           </p:cNvPr>
@@ -7883,15 +7889,15 @@
         </p:blipFill>
         <p:spPr>
           <a:xfrm>
-            <a:off x="2592925" y="1382001"/>
-            <a:ext cx="7968620" cy="5312414"/>
+            <a:off x="2125225" y="1905000"/>
+            <a:ext cx="8990188" cy="4625503"/>
           </a:xfrm>
         </p:spPr>
       </p:pic>
     </p:spTree>
     <p:extLst>
       <p:ext uri="{BB962C8B-B14F-4D97-AF65-F5344CB8AC3E}">
-        <p14:creationId xmlns:p14="http://schemas.microsoft.com/office/powerpoint/2010/main" val="2160349714"/>
+        <p14:creationId xmlns:p14="http://schemas.microsoft.com/office/powerpoint/2010/main" val="934962227"/>
       </p:ext>
     </p:extLst>
   </p:cSld>
@@ -7923,7 +7929,7 @@
           <p:cNvPr id="2" name="Title 1">
             <a:extLst>
               <a:ext uri="{FF2B5EF4-FFF2-40B4-BE49-F238E27FC236}">
-                <a16:creationId xmlns:a16="http://schemas.microsoft.com/office/drawing/2014/main" id="{BB1C60A3-10D8-462D-B3B4-AF7F4B5F8101}"/>
+                <a16:creationId xmlns:a16="http://schemas.microsoft.com/office/drawing/2014/main" id="{57709140-C8B7-46DE-A33B-463B5EBE4341}"/>
               </a:ext>
             </a:extLst>
           </p:cNvPr>
@@ -7936,46 +7942,51 @@
         </p:nvSpPr>
         <p:spPr/>
         <p:txBody>
-          <a:bodyPr/>
+          <a:bodyPr>
+            <a:normAutofit/>
+          </a:bodyPr>
           <a:lstStyle/>
           <a:p>
             <a:r>
-              <a:rPr lang="en-US" dirty="0" err="1"/>
-              <a:t>Fentynal</a:t>
-            </a:r>
-            <a:endParaRPr lang="en-US" dirty="0"/>
-          </a:p>
-        </p:txBody>
-      </p:sp>
-      <p:sp>
-        <p:nvSpPr>
-          <p:cNvPr id="3" name="Content Placeholder 2">
+              <a:rPr lang="en-US" dirty="0"/>
+              <a:t>Drug-Induced Mortality by Gender, Race, and Sex</a:t>
+            </a:r>
+          </a:p>
+        </p:txBody>
+      </p:sp>
+      <p:pic>
+        <p:nvPicPr>
+          <p:cNvPr id="7" name="Content Placeholder 6">
             <a:extLst>
               <a:ext uri="{FF2B5EF4-FFF2-40B4-BE49-F238E27FC236}">
-                <a16:creationId xmlns:a16="http://schemas.microsoft.com/office/drawing/2014/main" id="{DE910129-DA90-46EC-8EF1-7D23BD0B5F3F}"/>
+                <a16:creationId xmlns:a16="http://schemas.microsoft.com/office/drawing/2014/main" id="{DDDE963A-EC7A-429A-A734-12256F46FA37}"/>
               </a:ext>
             </a:extLst>
           </p:cNvPr>
-          <p:cNvSpPr>
-            <a:spLocks noGrp="1"/>
-          </p:cNvSpPr>
+          <p:cNvPicPr>
+            <a:picLocks noGrp="1" noChangeAspect="1"/>
+          </p:cNvPicPr>
           <p:nvPr>
             <p:ph idx="1"/>
           </p:nvPr>
-        </p:nvSpPr>
-        <p:spPr/>
-        <p:txBody>
-          <a:bodyPr/>
-          <a:lstStyle/>
-          <a:p>
-            <a:endParaRPr lang="en-US"/>
-          </a:p>
-        </p:txBody>
-      </p:sp>
+        </p:nvPicPr>
+        <p:blipFill>
+          <a:blip r:embed="rId2"/>
+          <a:stretch>
+            <a:fillRect/>
+          </a:stretch>
+        </p:blipFill>
+        <p:spPr>
+          <a:xfrm>
+            <a:off x="2592925" y="1704563"/>
+            <a:ext cx="7710572" cy="5209380"/>
+          </a:xfrm>
+        </p:spPr>
+      </p:pic>
     </p:spTree>
     <p:extLst>
       <p:ext uri="{BB962C8B-B14F-4D97-AF65-F5344CB8AC3E}">
-        <p14:creationId xmlns:p14="http://schemas.microsoft.com/office/powerpoint/2010/main" val="2837072940"/>
+        <p14:creationId xmlns:p14="http://schemas.microsoft.com/office/powerpoint/2010/main" val="956778109"/>
       </p:ext>
     </p:extLst>
   </p:cSld>
@@ -7986,6 +7997,1678 @@
 </file>
 
 <file path=ppt/slides/slide13.xml><?xml version="1.0" encoding="utf-8"?>
+<p:sld xmlns:a="http://schemas.openxmlformats.org/drawingml/2006/main" xmlns:r="http://schemas.openxmlformats.org/officeDocument/2006/relationships" xmlns:p="http://schemas.openxmlformats.org/presentationml/2006/main">
+  <p:cSld>
+    <p:spTree>
+      <p:nvGrpSpPr>
+        <p:cNvPr id="1" name=""/>
+        <p:cNvGrpSpPr/>
+        <p:nvPr/>
+      </p:nvGrpSpPr>
+      <p:grpSpPr>
+        <a:xfrm>
+          <a:off x="0" y="0"/>
+          <a:ext cx="0" cy="0"/>
+          <a:chOff x="0" y="0"/>
+          <a:chExt cx="0" cy="0"/>
+        </a:xfrm>
+      </p:grpSpPr>
+      <p:sp>
+        <p:nvSpPr>
+          <p:cNvPr id="2" name="Title 1">
+            <a:extLst>
+              <a:ext uri="{FF2B5EF4-FFF2-40B4-BE49-F238E27FC236}">
+                <a16:creationId xmlns:a16="http://schemas.microsoft.com/office/drawing/2014/main" id="{57709140-C8B7-46DE-A33B-463B5EBE4341}"/>
+              </a:ext>
+            </a:extLst>
+          </p:cNvPr>
+          <p:cNvSpPr>
+            <a:spLocks noGrp="1"/>
+          </p:cNvSpPr>
+          <p:nvPr>
+            <p:ph type="title"/>
+          </p:nvPr>
+        </p:nvSpPr>
+        <p:spPr/>
+        <p:txBody>
+          <a:bodyPr>
+            <a:normAutofit/>
+          </a:bodyPr>
+          <a:lstStyle/>
+          <a:p>
+            <a:r>
+              <a:rPr lang="en-US" dirty="0"/>
+              <a:t>Drug-Induced Mortality by Gender, Race, and Sex</a:t>
+            </a:r>
+          </a:p>
+        </p:txBody>
+      </p:sp>
+      <p:sp>
+        <p:nvSpPr>
+          <p:cNvPr id="7" name="TextBox 6">
+            <a:extLst>
+              <a:ext uri="{FF2B5EF4-FFF2-40B4-BE49-F238E27FC236}">
+                <a16:creationId xmlns:a16="http://schemas.microsoft.com/office/drawing/2014/main" id="{5C5420DF-FD1F-40BD-9A95-C1A7513FC1FC}"/>
+              </a:ext>
+            </a:extLst>
+          </p:cNvPr>
+          <p:cNvSpPr txBox="1"/>
+          <p:nvPr/>
+        </p:nvSpPr>
+        <p:spPr>
+          <a:xfrm>
+            <a:off x="2818614" y="5976593"/>
+            <a:ext cx="7814821" cy="646331"/>
+          </a:xfrm>
+          <a:prstGeom prst="rect">
+            <a:avLst/>
+          </a:prstGeom>
+          <a:noFill/>
+        </p:spPr>
+        <p:txBody>
+          <a:bodyPr wrap="square" rtlCol="0">
+            <a:spAutoFit/>
+          </a:bodyPr>
+          <a:lstStyle/>
+          <a:p>
+            <a:r>
+              <a:rPr lang="en-US" dirty="0"/>
+              <a:t>Chi-Squared test on both cases gives a p-value of 0, confirming alternate hypothesis (some groups are affected more than others).</a:t>
+            </a:r>
+          </a:p>
+        </p:txBody>
+      </p:sp>
+      <p:graphicFrame>
+        <p:nvGraphicFramePr>
+          <p:cNvPr id="10" name="Content Placeholder 9">
+            <a:extLst>
+              <a:ext uri="{FF2B5EF4-FFF2-40B4-BE49-F238E27FC236}">
+                <a16:creationId xmlns:a16="http://schemas.microsoft.com/office/drawing/2014/main" id="{94D85E88-287E-4D40-B1B0-903EACBF1A3F}"/>
+              </a:ext>
+            </a:extLst>
+          </p:cNvPr>
+          <p:cNvGraphicFramePr>
+            <a:graphicFrameLocks noGrp="1"/>
+          </p:cNvGraphicFramePr>
+          <p:nvPr>
+            <p:ph idx="1"/>
+            <p:extLst>
+              <p:ext uri="{D42A27DB-BD31-4B8C-83A1-F6EECF244321}">
+                <p14:modId xmlns:p14="http://schemas.microsoft.com/office/powerpoint/2010/main" val="3462426241"/>
+              </p:ext>
+            </p:extLst>
+          </p:nvPr>
+        </p:nvGraphicFramePr>
+        <p:xfrm>
+          <a:off x="2394408" y="1979629"/>
+          <a:ext cx="7711127" cy="3647108"/>
+        </p:xfrm>
+        <a:graphic>
+          <a:graphicData uri="http://schemas.openxmlformats.org/drawingml/2006/table">
+            <a:tbl>
+              <a:tblPr>
+                <a:tableStyleId>{5C22544A-7EE6-4342-B048-85BDC9FD1C3A}</a:tableStyleId>
+              </a:tblPr>
+              <a:tblGrid>
+                <a:gridCol w="1870624">
+                  <a:extLst>
+                    <a:ext uri="{9D8B030D-6E8A-4147-A177-3AD203B41FA5}">
+                      <a16:colId xmlns:a16="http://schemas.microsoft.com/office/drawing/2014/main" val="1047430046"/>
+                    </a:ext>
+                  </a:extLst>
+                </a:gridCol>
+                <a:gridCol w="1870624">
+                  <a:extLst>
+                    <a:ext uri="{9D8B030D-6E8A-4147-A177-3AD203B41FA5}">
+                      <a16:colId xmlns:a16="http://schemas.microsoft.com/office/drawing/2014/main" val="421138780"/>
+                    </a:ext>
+                  </a:extLst>
+                </a:gridCol>
+                <a:gridCol w="2099255">
+                  <a:extLst>
+                    <a:ext uri="{9D8B030D-6E8A-4147-A177-3AD203B41FA5}">
+                      <a16:colId xmlns:a16="http://schemas.microsoft.com/office/drawing/2014/main" val="2337895534"/>
+                    </a:ext>
+                  </a:extLst>
+                </a:gridCol>
+                <a:gridCol w="1870624">
+                  <a:extLst>
+                    <a:ext uri="{9D8B030D-6E8A-4147-A177-3AD203B41FA5}">
+                      <a16:colId xmlns:a16="http://schemas.microsoft.com/office/drawing/2014/main" val="3911636789"/>
+                    </a:ext>
+                  </a:extLst>
+                </a:gridCol>
+              </a:tblGrid>
+              <a:tr h="430672">
+                <a:tc>
+                  <a:txBody>
+                    <a:bodyPr/>
+                    <a:lstStyle/>
+                    <a:p>
+                      <a:pPr algn="ctr" fontAlgn="b"/>
+                      <a:r>
+                        <a:rPr lang="en-US" sz="1100" b="1" u="none" strike="noStrike" dirty="0">
+                          <a:effectLst/>
+                        </a:rPr>
+                        <a:t>Race</a:t>
+                      </a:r>
+                      <a:endParaRPr lang="en-US" sz="1100" b="1" i="0" u="none" strike="noStrike" dirty="0">
+                        <a:solidFill>
+                          <a:srgbClr val="000000"/>
+                        </a:solidFill>
+                        <a:effectLst/>
+                        <a:latin typeface="Calibri" panose="020F0502020204030204" pitchFamily="34" charset="0"/>
+                      </a:endParaRPr>
+                    </a:p>
+                  </a:txBody>
+                  <a:tcPr marL="6350" marR="6350" marT="6350" marB="0" anchor="b"/>
+                </a:tc>
+                <a:tc>
+                  <a:txBody>
+                    <a:bodyPr/>
+                    <a:lstStyle/>
+                    <a:p>
+                      <a:pPr algn="ctr" fontAlgn="b"/>
+                      <a:r>
+                        <a:rPr lang="en-US" sz="1100" b="1" u="none" strike="noStrike" dirty="0">
+                          <a:effectLst/>
+                        </a:rPr>
+                        <a:t>General Population</a:t>
+                      </a:r>
+                      <a:endParaRPr lang="en-US" sz="1100" b="1" i="0" u="none" strike="noStrike" dirty="0">
+                        <a:solidFill>
+                          <a:srgbClr val="000000"/>
+                        </a:solidFill>
+                        <a:effectLst/>
+                        <a:latin typeface="Calibri" panose="020F0502020204030204" pitchFamily="34" charset="0"/>
+                      </a:endParaRPr>
+                    </a:p>
+                  </a:txBody>
+                  <a:tcPr marL="6350" marR="6350" marT="6350" marB="0" anchor="b"/>
+                </a:tc>
+                <a:tc>
+                  <a:txBody>
+                    <a:bodyPr/>
+                    <a:lstStyle/>
+                    <a:p>
+                      <a:pPr algn="ctr" fontAlgn="b"/>
+                      <a:r>
+                        <a:rPr lang="en-US" sz="1100" b="1" u="none" strike="noStrike" dirty="0">
+                          <a:effectLst/>
+                        </a:rPr>
+                        <a:t>Drug Mortality</a:t>
+                      </a:r>
+                      <a:endParaRPr lang="en-US" sz="1100" b="1" i="0" u="none" strike="noStrike" dirty="0">
+                        <a:solidFill>
+                          <a:srgbClr val="000000"/>
+                        </a:solidFill>
+                        <a:effectLst/>
+                        <a:latin typeface="Calibri" panose="020F0502020204030204" pitchFamily="34" charset="0"/>
+                      </a:endParaRPr>
+                    </a:p>
+                  </a:txBody>
+                  <a:tcPr marL="6350" marR="6350" marT="6350" marB="0" anchor="b"/>
+                </a:tc>
+                <a:tc>
+                  <a:txBody>
+                    <a:bodyPr/>
+                    <a:lstStyle/>
+                    <a:p>
+                      <a:pPr algn="ctr" fontAlgn="b"/>
+                      <a:r>
+                        <a:rPr lang="en-US" sz="1100" b="1" u="none" strike="noStrike" dirty="0">
+                          <a:effectLst/>
+                        </a:rPr>
+                        <a:t>Estimate</a:t>
+                      </a:r>
+                      <a:endParaRPr lang="en-US" sz="1100" b="1" i="0" u="none" strike="noStrike" dirty="0">
+                        <a:solidFill>
+                          <a:srgbClr val="000000"/>
+                        </a:solidFill>
+                        <a:effectLst/>
+                        <a:latin typeface="Calibri" panose="020F0502020204030204" pitchFamily="34" charset="0"/>
+                      </a:endParaRPr>
+                    </a:p>
+                  </a:txBody>
+                  <a:tcPr marL="6350" marR="6350" marT="6350" marB="0" anchor="b"/>
+                </a:tc>
+                <a:extLst>
+                  <a:ext uri="{0D108BD9-81ED-4DB2-BD59-A6C34878D82A}">
+                    <a16:rowId xmlns:a16="http://schemas.microsoft.com/office/drawing/2014/main" val="1799548080"/>
+                  </a:ext>
+                </a:extLst>
+              </a:tr>
+              <a:tr h="232147">
+                <a:tc>
+                  <a:txBody>
+                    <a:bodyPr/>
+                    <a:lstStyle/>
+                    <a:p>
+                      <a:pPr algn="l" fontAlgn="b"/>
+                      <a:r>
+                        <a:rPr lang="en-US" sz="1100" u="none" strike="noStrike">
+                          <a:effectLst/>
+                        </a:rPr>
+                        <a:t>White</a:t>
+                      </a:r>
+                      <a:endParaRPr lang="en-US" sz="1100" b="0" i="0" u="none" strike="noStrike">
+                        <a:solidFill>
+                          <a:srgbClr val="000000"/>
+                        </a:solidFill>
+                        <a:effectLst/>
+                        <a:latin typeface="Calibri" panose="020F0502020204030204" pitchFamily="34" charset="0"/>
+                      </a:endParaRPr>
+                    </a:p>
+                  </a:txBody>
+                  <a:tcPr marL="6350" marR="6350" marT="6350" marB="0" anchor="b"/>
+                </a:tc>
+                <a:tc>
+                  <a:txBody>
+                    <a:bodyPr/>
+                    <a:lstStyle/>
+                    <a:p>
+                      <a:pPr algn="r" fontAlgn="b"/>
+                      <a:r>
+                        <a:rPr lang="en-US" sz="1100" u="none" strike="noStrike">
+                          <a:effectLst/>
+                        </a:rPr>
+                        <a:t>71.20%</a:t>
+                      </a:r>
+                      <a:endParaRPr lang="en-US" sz="1100" b="0" i="0" u="none" strike="noStrike">
+                        <a:solidFill>
+                          <a:srgbClr val="000000"/>
+                        </a:solidFill>
+                        <a:effectLst/>
+                        <a:latin typeface="Calibri" panose="020F0502020204030204" pitchFamily="34" charset="0"/>
+                      </a:endParaRPr>
+                    </a:p>
+                  </a:txBody>
+                  <a:tcPr marL="6350" marR="6350" marT="6350" marB="0" anchor="b"/>
+                </a:tc>
+                <a:tc>
+                  <a:txBody>
+                    <a:bodyPr/>
+                    <a:lstStyle/>
+                    <a:p>
+                      <a:pPr algn="r" fontAlgn="b"/>
+                      <a:r>
+                        <a:rPr lang="en-US" sz="1100" u="none" strike="noStrike">
+                          <a:effectLst/>
+                        </a:rPr>
+                        <a:t>3242</a:t>
+                      </a:r>
+                      <a:endParaRPr lang="en-US" sz="1100" b="0" i="0" u="none" strike="noStrike">
+                        <a:solidFill>
+                          <a:srgbClr val="000000"/>
+                        </a:solidFill>
+                        <a:effectLst/>
+                        <a:latin typeface="Calibri" panose="020F0502020204030204" pitchFamily="34" charset="0"/>
+                      </a:endParaRPr>
+                    </a:p>
+                  </a:txBody>
+                  <a:tcPr marL="6350" marR="6350" marT="6350" marB="0" anchor="b"/>
+                </a:tc>
+                <a:tc>
+                  <a:txBody>
+                    <a:bodyPr/>
+                    <a:lstStyle/>
+                    <a:p>
+                      <a:pPr algn="r" fontAlgn="b"/>
+                      <a:r>
+                        <a:rPr lang="en-US" sz="1100" u="none" strike="noStrike">
+                          <a:effectLst/>
+                        </a:rPr>
+                        <a:t>2904.248</a:t>
+                      </a:r>
+                      <a:endParaRPr lang="en-US" sz="1100" b="0" i="0" u="none" strike="noStrike">
+                        <a:solidFill>
+                          <a:srgbClr val="000000"/>
+                        </a:solidFill>
+                        <a:effectLst/>
+                        <a:latin typeface="Calibri" panose="020F0502020204030204" pitchFamily="34" charset="0"/>
+                      </a:endParaRPr>
+                    </a:p>
+                  </a:txBody>
+                  <a:tcPr marL="6350" marR="6350" marT="6350" marB="0" anchor="b"/>
+                </a:tc>
+                <a:extLst>
+                  <a:ext uri="{0D108BD9-81ED-4DB2-BD59-A6C34878D82A}">
+                    <a16:rowId xmlns:a16="http://schemas.microsoft.com/office/drawing/2014/main" val="3448598783"/>
+                  </a:ext>
+                </a:extLst>
+              </a:tr>
+              <a:tr h="232147">
+                <a:tc>
+                  <a:txBody>
+                    <a:bodyPr/>
+                    <a:lstStyle/>
+                    <a:p>
+                      <a:pPr algn="l" fontAlgn="b"/>
+                      <a:r>
+                        <a:rPr lang="en-US" sz="1100" u="none" strike="noStrike">
+                          <a:effectLst/>
+                        </a:rPr>
+                        <a:t>Hispanic, White</a:t>
+                      </a:r>
+                      <a:endParaRPr lang="en-US" sz="1100" b="0" i="0" u="none" strike="noStrike">
+                        <a:solidFill>
+                          <a:srgbClr val="000000"/>
+                        </a:solidFill>
+                        <a:effectLst/>
+                        <a:latin typeface="Calibri" panose="020F0502020204030204" pitchFamily="34" charset="0"/>
+                      </a:endParaRPr>
+                    </a:p>
+                  </a:txBody>
+                  <a:tcPr marL="6350" marR="6350" marT="6350" marB="0" anchor="b"/>
+                </a:tc>
+                <a:tc>
+                  <a:txBody>
+                    <a:bodyPr/>
+                    <a:lstStyle/>
+                    <a:p>
+                      <a:pPr algn="r" fontAlgn="b"/>
+                      <a:r>
+                        <a:rPr lang="en-US" sz="1100" u="none" strike="noStrike">
+                          <a:effectLst/>
+                        </a:rPr>
+                        <a:t>6.30%</a:t>
+                      </a:r>
+                      <a:endParaRPr lang="en-US" sz="1100" b="0" i="0" u="none" strike="noStrike">
+                        <a:solidFill>
+                          <a:srgbClr val="000000"/>
+                        </a:solidFill>
+                        <a:effectLst/>
+                        <a:latin typeface="Calibri" panose="020F0502020204030204" pitchFamily="34" charset="0"/>
+                      </a:endParaRPr>
+                    </a:p>
+                  </a:txBody>
+                  <a:tcPr marL="6350" marR="6350" marT="6350" marB="0" anchor="b"/>
+                </a:tc>
+                <a:tc>
+                  <a:txBody>
+                    <a:bodyPr/>
+                    <a:lstStyle/>
+                    <a:p>
+                      <a:pPr algn="r" fontAlgn="b"/>
+                      <a:r>
+                        <a:rPr lang="en-US" sz="1100" u="none" strike="noStrike">
+                          <a:effectLst/>
+                        </a:rPr>
+                        <a:t>432</a:t>
+                      </a:r>
+                      <a:endParaRPr lang="en-US" sz="1100" b="0" i="0" u="none" strike="noStrike">
+                        <a:solidFill>
+                          <a:srgbClr val="000000"/>
+                        </a:solidFill>
+                        <a:effectLst/>
+                        <a:latin typeface="Calibri" panose="020F0502020204030204" pitchFamily="34" charset="0"/>
+                      </a:endParaRPr>
+                    </a:p>
+                  </a:txBody>
+                  <a:tcPr marL="6350" marR="6350" marT="6350" marB="0" anchor="b"/>
+                </a:tc>
+                <a:tc>
+                  <a:txBody>
+                    <a:bodyPr/>
+                    <a:lstStyle/>
+                    <a:p>
+                      <a:pPr algn="r" fontAlgn="b"/>
+                      <a:r>
+                        <a:rPr lang="en-US" sz="1100" u="none" strike="noStrike">
+                          <a:effectLst/>
+                        </a:rPr>
+                        <a:t>256.977</a:t>
+                      </a:r>
+                      <a:endParaRPr lang="en-US" sz="1100" b="0" i="0" u="none" strike="noStrike">
+                        <a:solidFill>
+                          <a:srgbClr val="000000"/>
+                        </a:solidFill>
+                        <a:effectLst/>
+                        <a:latin typeface="Calibri" panose="020F0502020204030204" pitchFamily="34" charset="0"/>
+                      </a:endParaRPr>
+                    </a:p>
+                  </a:txBody>
+                  <a:tcPr marL="6350" marR="6350" marT="6350" marB="0" anchor="b"/>
+                </a:tc>
+                <a:extLst>
+                  <a:ext uri="{0D108BD9-81ED-4DB2-BD59-A6C34878D82A}">
+                    <a16:rowId xmlns:a16="http://schemas.microsoft.com/office/drawing/2014/main" val="2105227070"/>
+                  </a:ext>
+                </a:extLst>
+              </a:tr>
+              <a:tr h="232147">
+                <a:tc>
+                  <a:txBody>
+                    <a:bodyPr/>
+                    <a:lstStyle/>
+                    <a:p>
+                      <a:pPr algn="l" fontAlgn="b"/>
+                      <a:r>
+                        <a:rPr lang="en-US" sz="1100" u="none" strike="noStrike">
+                          <a:effectLst/>
+                        </a:rPr>
+                        <a:t>Black</a:t>
+                      </a:r>
+                      <a:endParaRPr lang="en-US" sz="1100" b="0" i="0" u="none" strike="noStrike">
+                        <a:solidFill>
+                          <a:srgbClr val="000000"/>
+                        </a:solidFill>
+                        <a:effectLst/>
+                        <a:latin typeface="Calibri" panose="020F0502020204030204" pitchFamily="34" charset="0"/>
+                      </a:endParaRPr>
+                    </a:p>
+                  </a:txBody>
+                  <a:tcPr marL="6350" marR="6350" marT="6350" marB="0" anchor="b"/>
+                </a:tc>
+                <a:tc>
+                  <a:txBody>
+                    <a:bodyPr/>
+                    <a:lstStyle/>
+                    <a:p>
+                      <a:pPr algn="r" fontAlgn="b"/>
+                      <a:r>
+                        <a:rPr lang="en-US" sz="1100" u="none" strike="noStrike">
+                          <a:effectLst/>
+                        </a:rPr>
+                        <a:t>9.40%</a:t>
+                      </a:r>
+                      <a:endParaRPr lang="en-US" sz="1100" b="0" i="0" u="none" strike="noStrike">
+                        <a:solidFill>
+                          <a:srgbClr val="000000"/>
+                        </a:solidFill>
+                        <a:effectLst/>
+                        <a:latin typeface="Calibri" panose="020F0502020204030204" pitchFamily="34" charset="0"/>
+                      </a:endParaRPr>
+                    </a:p>
+                  </a:txBody>
+                  <a:tcPr marL="6350" marR="6350" marT="6350" marB="0" anchor="b"/>
+                </a:tc>
+                <a:tc>
+                  <a:txBody>
+                    <a:bodyPr/>
+                    <a:lstStyle/>
+                    <a:p>
+                      <a:pPr algn="r" fontAlgn="b"/>
+                      <a:r>
+                        <a:rPr lang="en-US" sz="1100" u="none" strike="noStrike">
+                          <a:effectLst/>
+                        </a:rPr>
+                        <a:t>329</a:t>
+                      </a:r>
+                      <a:endParaRPr lang="en-US" sz="1100" b="0" i="0" u="none" strike="noStrike">
+                        <a:solidFill>
+                          <a:srgbClr val="000000"/>
+                        </a:solidFill>
+                        <a:effectLst/>
+                        <a:latin typeface="Calibri" panose="020F0502020204030204" pitchFamily="34" charset="0"/>
+                      </a:endParaRPr>
+                    </a:p>
+                  </a:txBody>
+                  <a:tcPr marL="6350" marR="6350" marT="6350" marB="0" anchor="b"/>
+                </a:tc>
+                <a:tc>
+                  <a:txBody>
+                    <a:bodyPr/>
+                    <a:lstStyle/>
+                    <a:p>
+                      <a:pPr algn="r" fontAlgn="b"/>
+                      <a:r>
+                        <a:rPr lang="en-US" sz="1100" u="none" strike="noStrike">
+                          <a:effectLst/>
+                        </a:rPr>
+                        <a:t>383.426</a:t>
+                      </a:r>
+                      <a:endParaRPr lang="en-US" sz="1100" b="0" i="0" u="none" strike="noStrike">
+                        <a:solidFill>
+                          <a:srgbClr val="000000"/>
+                        </a:solidFill>
+                        <a:effectLst/>
+                        <a:latin typeface="Calibri" panose="020F0502020204030204" pitchFamily="34" charset="0"/>
+                      </a:endParaRPr>
+                    </a:p>
+                  </a:txBody>
+                  <a:tcPr marL="6350" marR="6350" marT="6350" marB="0" anchor="b"/>
+                </a:tc>
+                <a:extLst>
+                  <a:ext uri="{0D108BD9-81ED-4DB2-BD59-A6C34878D82A}">
+                    <a16:rowId xmlns:a16="http://schemas.microsoft.com/office/drawing/2014/main" val="2125538796"/>
+                  </a:ext>
+                </a:extLst>
+              </a:tr>
+              <a:tr h="232147">
+                <a:tc>
+                  <a:txBody>
+                    <a:bodyPr/>
+                    <a:lstStyle/>
+                    <a:p>
+                      <a:pPr algn="l" fontAlgn="b"/>
+                      <a:r>
+                        <a:rPr lang="en-US" sz="1100" u="none" strike="noStrike">
+                          <a:effectLst/>
+                        </a:rPr>
+                        <a:t>Hispanic, Black</a:t>
+                      </a:r>
+                      <a:endParaRPr lang="en-US" sz="1100" b="0" i="0" u="none" strike="noStrike">
+                        <a:solidFill>
+                          <a:srgbClr val="000000"/>
+                        </a:solidFill>
+                        <a:effectLst/>
+                        <a:latin typeface="Calibri" panose="020F0502020204030204" pitchFamily="34" charset="0"/>
+                      </a:endParaRPr>
+                    </a:p>
+                  </a:txBody>
+                  <a:tcPr marL="6350" marR="6350" marT="6350" marB="0" anchor="b"/>
+                </a:tc>
+                <a:tc>
+                  <a:txBody>
+                    <a:bodyPr/>
+                    <a:lstStyle/>
+                    <a:p>
+                      <a:pPr algn="r" fontAlgn="b"/>
+                      <a:r>
+                        <a:rPr lang="en-US" sz="1100" u="none" strike="noStrike">
+                          <a:effectLst/>
+                        </a:rPr>
+                        <a:t>0.80%</a:t>
+                      </a:r>
+                      <a:endParaRPr lang="en-US" sz="1100" b="0" i="0" u="none" strike="noStrike">
+                        <a:solidFill>
+                          <a:srgbClr val="000000"/>
+                        </a:solidFill>
+                        <a:effectLst/>
+                        <a:latin typeface="Calibri" panose="020F0502020204030204" pitchFamily="34" charset="0"/>
+                      </a:endParaRPr>
+                    </a:p>
+                  </a:txBody>
+                  <a:tcPr marL="6350" marR="6350" marT="6350" marB="0" anchor="b"/>
+                </a:tc>
+                <a:tc>
+                  <a:txBody>
+                    <a:bodyPr/>
+                    <a:lstStyle/>
+                    <a:p>
+                      <a:pPr algn="r" fontAlgn="b"/>
+                      <a:r>
+                        <a:rPr lang="en-US" sz="1100" u="none" strike="noStrike">
+                          <a:effectLst/>
+                        </a:rPr>
+                        <a:t>17</a:t>
+                      </a:r>
+                      <a:endParaRPr lang="en-US" sz="1100" b="0" i="0" u="none" strike="noStrike">
+                        <a:solidFill>
+                          <a:srgbClr val="000000"/>
+                        </a:solidFill>
+                        <a:effectLst/>
+                        <a:latin typeface="Calibri" panose="020F0502020204030204" pitchFamily="34" charset="0"/>
+                      </a:endParaRPr>
+                    </a:p>
+                  </a:txBody>
+                  <a:tcPr marL="6350" marR="6350" marT="6350" marB="0" anchor="b"/>
+                </a:tc>
+                <a:tc>
+                  <a:txBody>
+                    <a:bodyPr/>
+                    <a:lstStyle/>
+                    <a:p>
+                      <a:pPr algn="r" fontAlgn="b"/>
+                      <a:r>
+                        <a:rPr lang="en-US" sz="1100" u="none" strike="noStrike">
+                          <a:effectLst/>
+                        </a:rPr>
+                        <a:t>32.632</a:t>
+                      </a:r>
+                      <a:endParaRPr lang="en-US" sz="1100" b="0" i="0" u="none" strike="noStrike">
+                        <a:solidFill>
+                          <a:srgbClr val="000000"/>
+                        </a:solidFill>
+                        <a:effectLst/>
+                        <a:latin typeface="Calibri" panose="020F0502020204030204" pitchFamily="34" charset="0"/>
+                      </a:endParaRPr>
+                    </a:p>
+                  </a:txBody>
+                  <a:tcPr marL="6350" marR="6350" marT="6350" marB="0" anchor="b"/>
+                </a:tc>
+                <a:extLst>
+                  <a:ext uri="{0D108BD9-81ED-4DB2-BD59-A6C34878D82A}">
+                    <a16:rowId xmlns:a16="http://schemas.microsoft.com/office/drawing/2014/main" val="3179918076"/>
+                  </a:ext>
+                </a:extLst>
+              </a:tr>
+              <a:tr h="232147">
+                <a:tc>
+                  <a:txBody>
+                    <a:bodyPr/>
+                    <a:lstStyle/>
+                    <a:p>
+                      <a:pPr algn="l" fontAlgn="b"/>
+                      <a:r>
+                        <a:rPr lang="en-US" sz="1100" u="none" strike="noStrike">
+                          <a:effectLst/>
+                        </a:rPr>
+                        <a:t>Asian</a:t>
+                      </a:r>
+                      <a:endParaRPr lang="en-US" sz="1100" b="0" i="0" u="none" strike="noStrike">
+                        <a:solidFill>
+                          <a:srgbClr val="000000"/>
+                        </a:solidFill>
+                        <a:effectLst/>
+                        <a:latin typeface="Calibri" panose="020F0502020204030204" pitchFamily="34" charset="0"/>
+                      </a:endParaRPr>
+                    </a:p>
+                  </a:txBody>
+                  <a:tcPr marL="6350" marR="6350" marT="6350" marB="0" anchor="b"/>
+                </a:tc>
+                <a:tc>
+                  <a:txBody>
+                    <a:bodyPr/>
+                    <a:lstStyle/>
+                    <a:p>
+                      <a:pPr algn="r" fontAlgn="b"/>
+                      <a:r>
+                        <a:rPr lang="en-US" sz="1100" u="none" strike="noStrike">
+                          <a:effectLst/>
+                        </a:rPr>
+                        <a:t>3.80%</a:t>
+                      </a:r>
+                      <a:endParaRPr lang="en-US" sz="1100" b="0" i="0" u="none" strike="noStrike">
+                        <a:solidFill>
+                          <a:srgbClr val="000000"/>
+                        </a:solidFill>
+                        <a:effectLst/>
+                        <a:latin typeface="Calibri" panose="020F0502020204030204" pitchFamily="34" charset="0"/>
+                      </a:endParaRPr>
+                    </a:p>
+                  </a:txBody>
+                  <a:tcPr marL="6350" marR="6350" marT="6350" marB="0" anchor="b"/>
+                </a:tc>
+                <a:tc>
+                  <a:txBody>
+                    <a:bodyPr/>
+                    <a:lstStyle/>
+                    <a:p>
+                      <a:pPr algn="r" fontAlgn="b"/>
+                      <a:r>
+                        <a:rPr lang="en-US" sz="1100" u="none" strike="noStrike">
+                          <a:effectLst/>
+                        </a:rPr>
+                        <a:t>14</a:t>
+                      </a:r>
+                      <a:endParaRPr lang="en-US" sz="1100" b="0" i="0" u="none" strike="noStrike">
+                        <a:solidFill>
+                          <a:srgbClr val="000000"/>
+                        </a:solidFill>
+                        <a:effectLst/>
+                        <a:latin typeface="Calibri" panose="020F0502020204030204" pitchFamily="34" charset="0"/>
+                      </a:endParaRPr>
+                    </a:p>
+                  </a:txBody>
+                  <a:tcPr marL="6350" marR="6350" marT="6350" marB="0" anchor="b"/>
+                </a:tc>
+                <a:tc>
+                  <a:txBody>
+                    <a:bodyPr/>
+                    <a:lstStyle/>
+                    <a:p>
+                      <a:pPr algn="r" fontAlgn="b"/>
+                      <a:r>
+                        <a:rPr lang="en-US" sz="1100" u="none" strike="noStrike">
+                          <a:effectLst/>
+                        </a:rPr>
+                        <a:t>155.002</a:t>
+                      </a:r>
+                      <a:endParaRPr lang="en-US" sz="1100" b="0" i="0" u="none" strike="noStrike">
+                        <a:solidFill>
+                          <a:srgbClr val="000000"/>
+                        </a:solidFill>
+                        <a:effectLst/>
+                        <a:latin typeface="Calibri" panose="020F0502020204030204" pitchFamily="34" charset="0"/>
+                      </a:endParaRPr>
+                    </a:p>
+                  </a:txBody>
+                  <a:tcPr marL="6350" marR="6350" marT="6350" marB="0" anchor="b"/>
+                </a:tc>
+                <a:extLst>
+                  <a:ext uri="{0D108BD9-81ED-4DB2-BD59-A6C34878D82A}">
+                    <a16:rowId xmlns:a16="http://schemas.microsoft.com/office/drawing/2014/main" val="3860567062"/>
+                  </a:ext>
+                </a:extLst>
+              </a:tr>
+              <a:tr h="232147">
+                <a:tc>
+                  <a:txBody>
+                    <a:bodyPr/>
+                    <a:lstStyle/>
+                    <a:p>
+                      <a:pPr algn="l" fontAlgn="b"/>
+                      <a:r>
+                        <a:rPr lang="en-US" sz="1100" u="none" strike="noStrike">
+                          <a:effectLst/>
+                        </a:rPr>
+                        <a:t>Other</a:t>
+                      </a:r>
+                      <a:endParaRPr lang="en-US" sz="1100" b="0" i="0" u="none" strike="noStrike">
+                        <a:solidFill>
+                          <a:srgbClr val="000000"/>
+                        </a:solidFill>
+                        <a:effectLst/>
+                        <a:latin typeface="Calibri" panose="020F0502020204030204" pitchFamily="34" charset="0"/>
+                      </a:endParaRPr>
+                    </a:p>
+                  </a:txBody>
+                  <a:tcPr marL="6350" marR="6350" marT="6350" marB="0" anchor="b"/>
+                </a:tc>
+                <a:tc>
+                  <a:txBody>
+                    <a:bodyPr/>
+                    <a:lstStyle/>
+                    <a:p>
+                      <a:pPr algn="r" fontAlgn="b"/>
+                      <a:r>
+                        <a:rPr lang="en-US" sz="1100" u="none" strike="noStrike">
+                          <a:effectLst/>
+                        </a:rPr>
+                        <a:t>8.50%</a:t>
+                      </a:r>
+                      <a:endParaRPr lang="en-US" sz="1100" b="0" i="0" u="none" strike="noStrike">
+                        <a:solidFill>
+                          <a:srgbClr val="000000"/>
+                        </a:solidFill>
+                        <a:effectLst/>
+                        <a:latin typeface="Calibri" panose="020F0502020204030204" pitchFamily="34" charset="0"/>
+                      </a:endParaRPr>
+                    </a:p>
+                  </a:txBody>
+                  <a:tcPr marL="6350" marR="6350" marT="6350" marB="0" anchor="b"/>
+                </a:tc>
+                <a:tc>
+                  <a:txBody>
+                    <a:bodyPr/>
+                    <a:lstStyle/>
+                    <a:p>
+                      <a:pPr algn="r" fontAlgn="b"/>
+                      <a:r>
+                        <a:rPr lang="en-US" sz="1100" u="none" strike="noStrike">
+                          <a:effectLst/>
+                        </a:rPr>
+                        <a:t>45</a:t>
+                      </a:r>
+                      <a:endParaRPr lang="en-US" sz="1100" b="0" i="0" u="none" strike="noStrike">
+                        <a:solidFill>
+                          <a:srgbClr val="000000"/>
+                        </a:solidFill>
+                        <a:effectLst/>
+                        <a:latin typeface="Calibri" panose="020F0502020204030204" pitchFamily="34" charset="0"/>
+                      </a:endParaRPr>
+                    </a:p>
+                  </a:txBody>
+                  <a:tcPr marL="6350" marR="6350" marT="6350" marB="0" anchor="b"/>
+                </a:tc>
+                <a:tc>
+                  <a:txBody>
+                    <a:bodyPr/>
+                    <a:lstStyle/>
+                    <a:p>
+                      <a:pPr algn="r" fontAlgn="b"/>
+                      <a:r>
+                        <a:rPr lang="en-US" sz="1100" u="none" strike="noStrike">
+                          <a:effectLst/>
+                        </a:rPr>
+                        <a:t>346.715</a:t>
+                      </a:r>
+                      <a:endParaRPr lang="en-US" sz="1100" b="0" i="0" u="none" strike="noStrike">
+                        <a:solidFill>
+                          <a:srgbClr val="000000"/>
+                        </a:solidFill>
+                        <a:effectLst/>
+                        <a:latin typeface="Calibri" panose="020F0502020204030204" pitchFamily="34" charset="0"/>
+                      </a:endParaRPr>
+                    </a:p>
+                  </a:txBody>
+                  <a:tcPr marL="6350" marR="6350" marT="6350" marB="0" anchor="b"/>
+                </a:tc>
+                <a:extLst>
+                  <a:ext uri="{0D108BD9-81ED-4DB2-BD59-A6C34878D82A}">
+                    <a16:rowId xmlns:a16="http://schemas.microsoft.com/office/drawing/2014/main" val="1979520957"/>
+                  </a:ext>
+                </a:extLst>
+              </a:tr>
+              <a:tr h="232147">
+                <a:tc>
+                  <a:txBody>
+                    <a:bodyPr/>
+                    <a:lstStyle/>
+                    <a:p>
+                      <a:pPr algn="l" fontAlgn="b"/>
+                      <a:endParaRPr lang="en-US" sz="1100" b="0" i="0" u="none" strike="noStrike">
+                        <a:solidFill>
+                          <a:srgbClr val="000000"/>
+                        </a:solidFill>
+                        <a:effectLst/>
+                        <a:latin typeface="Calibri" panose="020F0502020204030204" pitchFamily="34" charset="0"/>
+                      </a:endParaRPr>
+                    </a:p>
+                  </a:txBody>
+                  <a:tcPr marL="6350" marR="6350" marT="6350" marB="0" anchor="b"/>
+                </a:tc>
+                <a:tc>
+                  <a:txBody>
+                    <a:bodyPr/>
+                    <a:lstStyle/>
+                    <a:p>
+                      <a:pPr algn="l" fontAlgn="b"/>
+                      <a:endParaRPr lang="en-US" sz="1100" b="0" i="0" u="none" strike="noStrike">
+                        <a:solidFill>
+                          <a:srgbClr val="000000"/>
+                        </a:solidFill>
+                        <a:effectLst/>
+                        <a:latin typeface="Calibri" panose="020F0502020204030204" pitchFamily="34" charset="0"/>
+                      </a:endParaRPr>
+                    </a:p>
+                  </a:txBody>
+                  <a:tcPr marL="6350" marR="6350" marT="6350" marB="0" anchor="b"/>
+                </a:tc>
+                <a:tc>
+                  <a:txBody>
+                    <a:bodyPr/>
+                    <a:lstStyle/>
+                    <a:p>
+                      <a:pPr algn="l" fontAlgn="b"/>
+                      <a:endParaRPr lang="en-US" sz="1100" b="0" i="0" u="none" strike="noStrike">
+                        <a:solidFill>
+                          <a:srgbClr val="000000"/>
+                        </a:solidFill>
+                        <a:effectLst/>
+                        <a:latin typeface="Calibri" panose="020F0502020204030204" pitchFamily="34" charset="0"/>
+                      </a:endParaRPr>
+                    </a:p>
+                  </a:txBody>
+                  <a:tcPr marL="6350" marR="6350" marT="6350" marB="0" anchor="b"/>
+                </a:tc>
+                <a:tc>
+                  <a:txBody>
+                    <a:bodyPr/>
+                    <a:lstStyle/>
+                    <a:p>
+                      <a:pPr algn="l" fontAlgn="b"/>
+                      <a:endParaRPr lang="en-US" sz="1100" b="0" i="0" u="none" strike="noStrike">
+                        <a:solidFill>
+                          <a:srgbClr val="000000"/>
+                        </a:solidFill>
+                        <a:effectLst/>
+                        <a:latin typeface="Calibri" panose="020F0502020204030204" pitchFamily="34" charset="0"/>
+                      </a:endParaRPr>
+                    </a:p>
+                  </a:txBody>
+                  <a:tcPr marL="6350" marR="6350" marT="6350" marB="0" anchor="b"/>
+                </a:tc>
+                <a:extLst>
+                  <a:ext uri="{0D108BD9-81ED-4DB2-BD59-A6C34878D82A}">
+                    <a16:rowId xmlns:a16="http://schemas.microsoft.com/office/drawing/2014/main" val="3429188303"/>
+                  </a:ext>
+                </a:extLst>
+              </a:tr>
+              <a:tr h="430672">
+                <a:tc>
+                  <a:txBody>
+                    <a:bodyPr/>
+                    <a:lstStyle/>
+                    <a:p>
+                      <a:pPr algn="ctr" fontAlgn="b"/>
+                      <a:r>
+                        <a:rPr lang="en-US" sz="1100" b="1" u="none" strike="noStrike" dirty="0">
+                          <a:effectLst/>
+                        </a:rPr>
+                        <a:t>Age Group</a:t>
+                      </a:r>
+                      <a:endParaRPr lang="en-US" sz="1100" b="1" i="0" u="none" strike="noStrike" dirty="0">
+                        <a:solidFill>
+                          <a:srgbClr val="000000"/>
+                        </a:solidFill>
+                        <a:effectLst/>
+                        <a:latin typeface="Calibri" panose="020F0502020204030204" pitchFamily="34" charset="0"/>
+                      </a:endParaRPr>
+                    </a:p>
+                  </a:txBody>
+                  <a:tcPr marL="6350" marR="6350" marT="6350" marB="0" anchor="b"/>
+                </a:tc>
+                <a:tc>
+                  <a:txBody>
+                    <a:bodyPr/>
+                    <a:lstStyle/>
+                    <a:p>
+                      <a:pPr algn="ctr" fontAlgn="b"/>
+                      <a:r>
+                        <a:rPr lang="en-US" sz="1100" b="1" u="none" strike="noStrike">
+                          <a:effectLst/>
+                        </a:rPr>
+                        <a:t>Male Population</a:t>
+                      </a:r>
+                      <a:endParaRPr lang="en-US" sz="1100" b="1" i="0" u="none" strike="noStrike">
+                        <a:solidFill>
+                          <a:srgbClr val="000000"/>
+                        </a:solidFill>
+                        <a:effectLst/>
+                        <a:latin typeface="Calibri" panose="020F0502020204030204" pitchFamily="34" charset="0"/>
+                      </a:endParaRPr>
+                    </a:p>
+                  </a:txBody>
+                  <a:tcPr marL="6350" marR="6350" marT="6350" marB="0" anchor="b"/>
+                </a:tc>
+                <a:tc>
+                  <a:txBody>
+                    <a:bodyPr/>
+                    <a:lstStyle/>
+                    <a:p>
+                      <a:pPr algn="ctr" fontAlgn="b"/>
+                      <a:r>
+                        <a:rPr lang="en-US" sz="1100" b="1" u="none" strike="noStrike" dirty="0">
+                          <a:effectLst/>
+                        </a:rPr>
+                        <a:t>Male Drug Mortality</a:t>
+                      </a:r>
+                      <a:endParaRPr lang="en-US" sz="1100" b="1" i="0" u="none" strike="noStrike" dirty="0">
+                        <a:solidFill>
+                          <a:srgbClr val="000000"/>
+                        </a:solidFill>
+                        <a:effectLst/>
+                        <a:latin typeface="Calibri" panose="020F0502020204030204" pitchFamily="34" charset="0"/>
+                      </a:endParaRPr>
+                    </a:p>
+                  </a:txBody>
+                  <a:tcPr marL="6350" marR="6350" marT="6350" marB="0" anchor="b"/>
+                </a:tc>
+                <a:tc>
+                  <a:txBody>
+                    <a:bodyPr/>
+                    <a:lstStyle/>
+                    <a:p>
+                      <a:pPr algn="ctr" fontAlgn="b"/>
+                      <a:r>
+                        <a:rPr lang="en-US" sz="1100" b="1" u="none" strike="noStrike" dirty="0">
+                          <a:effectLst/>
+                        </a:rPr>
+                        <a:t>Estimate</a:t>
+                      </a:r>
+                      <a:endParaRPr lang="en-US" sz="1100" b="1" i="0" u="none" strike="noStrike" dirty="0">
+                        <a:solidFill>
+                          <a:srgbClr val="000000"/>
+                        </a:solidFill>
+                        <a:effectLst/>
+                        <a:latin typeface="Calibri" panose="020F0502020204030204" pitchFamily="34" charset="0"/>
+                      </a:endParaRPr>
+                    </a:p>
+                  </a:txBody>
+                  <a:tcPr marL="6350" marR="6350" marT="6350" marB="0" anchor="b"/>
+                </a:tc>
+                <a:extLst>
+                  <a:ext uri="{0D108BD9-81ED-4DB2-BD59-A6C34878D82A}">
+                    <a16:rowId xmlns:a16="http://schemas.microsoft.com/office/drawing/2014/main" val="882860184"/>
+                  </a:ext>
+                </a:extLst>
+              </a:tr>
+              <a:tr h="232147">
+                <a:tc>
+                  <a:txBody>
+                    <a:bodyPr/>
+                    <a:lstStyle/>
+                    <a:p>
+                      <a:pPr algn="l" fontAlgn="b"/>
+                      <a:r>
+                        <a:rPr lang="en-US" sz="1100" u="none" strike="noStrike">
+                          <a:effectLst/>
+                        </a:rPr>
+                        <a:t>20-29</a:t>
+                      </a:r>
+                      <a:endParaRPr lang="en-US" sz="1100" b="0" i="0" u="none" strike="noStrike">
+                        <a:solidFill>
+                          <a:srgbClr val="000000"/>
+                        </a:solidFill>
+                        <a:effectLst/>
+                        <a:latin typeface="Calibri" panose="020F0502020204030204" pitchFamily="34" charset="0"/>
+                      </a:endParaRPr>
+                    </a:p>
+                  </a:txBody>
+                  <a:tcPr marL="6350" marR="6350" marT="6350" marB="0" anchor="b"/>
+                </a:tc>
+                <a:tc>
+                  <a:txBody>
+                    <a:bodyPr/>
+                    <a:lstStyle/>
+                    <a:p>
+                      <a:pPr algn="r" fontAlgn="b"/>
+                      <a:r>
+                        <a:rPr lang="en-US" sz="1100" u="none" strike="noStrike" dirty="0">
+                          <a:effectLst/>
+                        </a:rPr>
+                        <a:t>19.87%</a:t>
+                      </a:r>
+                      <a:endParaRPr lang="en-US" sz="1100" b="0" i="0" u="none" strike="noStrike" dirty="0">
+                        <a:solidFill>
+                          <a:srgbClr val="000000"/>
+                        </a:solidFill>
+                        <a:effectLst/>
+                        <a:latin typeface="Calibri" panose="020F0502020204030204" pitchFamily="34" charset="0"/>
+                      </a:endParaRPr>
+                    </a:p>
+                  </a:txBody>
+                  <a:tcPr marL="6350" marR="6350" marT="6350" marB="0" anchor="b"/>
+                </a:tc>
+                <a:tc>
+                  <a:txBody>
+                    <a:bodyPr/>
+                    <a:lstStyle/>
+                    <a:p>
+                      <a:pPr algn="r" fontAlgn="b"/>
+                      <a:r>
+                        <a:rPr lang="en-US" sz="1100" u="none" strike="noStrike" dirty="0">
+                          <a:effectLst/>
+                        </a:rPr>
+                        <a:t>584</a:t>
+                      </a:r>
+                      <a:endParaRPr lang="en-US" sz="1100" b="0" i="0" u="none" strike="noStrike" dirty="0">
+                        <a:solidFill>
+                          <a:srgbClr val="000000"/>
+                        </a:solidFill>
+                        <a:effectLst/>
+                        <a:latin typeface="Calibri" panose="020F0502020204030204" pitchFamily="34" charset="0"/>
+                      </a:endParaRPr>
+                    </a:p>
+                  </a:txBody>
+                  <a:tcPr marL="6350" marR="6350" marT="6350" marB="0" anchor="b"/>
+                </a:tc>
+                <a:tc>
+                  <a:txBody>
+                    <a:bodyPr/>
+                    <a:lstStyle/>
+                    <a:p>
+                      <a:pPr algn="r" fontAlgn="b"/>
+                      <a:r>
+                        <a:rPr lang="en-US" sz="1100" u="none" strike="noStrike">
+                          <a:effectLst/>
+                        </a:rPr>
+                        <a:t>584.5754</a:t>
+                      </a:r>
+                      <a:endParaRPr lang="en-US" sz="1100" b="0" i="0" u="none" strike="noStrike">
+                        <a:solidFill>
+                          <a:srgbClr val="000000"/>
+                        </a:solidFill>
+                        <a:effectLst/>
+                        <a:latin typeface="Calibri" panose="020F0502020204030204" pitchFamily="34" charset="0"/>
+                      </a:endParaRPr>
+                    </a:p>
+                  </a:txBody>
+                  <a:tcPr marL="6350" marR="6350" marT="6350" marB="0" anchor="b"/>
+                </a:tc>
+                <a:extLst>
+                  <a:ext uri="{0D108BD9-81ED-4DB2-BD59-A6C34878D82A}">
+                    <a16:rowId xmlns:a16="http://schemas.microsoft.com/office/drawing/2014/main" val="4253377818"/>
+                  </a:ext>
+                </a:extLst>
+              </a:tr>
+              <a:tr h="232147">
+                <a:tc>
+                  <a:txBody>
+                    <a:bodyPr/>
+                    <a:lstStyle/>
+                    <a:p>
+                      <a:pPr algn="l" fontAlgn="b"/>
+                      <a:r>
+                        <a:rPr lang="en-US" sz="1100" u="none" strike="noStrike">
+                          <a:effectLst/>
+                        </a:rPr>
+                        <a:t>30-39</a:t>
+                      </a:r>
+                      <a:endParaRPr lang="en-US" sz="1100" b="0" i="0" u="none" strike="noStrike">
+                        <a:solidFill>
+                          <a:srgbClr val="000000"/>
+                        </a:solidFill>
+                        <a:effectLst/>
+                        <a:latin typeface="Calibri" panose="020F0502020204030204" pitchFamily="34" charset="0"/>
+                      </a:endParaRPr>
+                    </a:p>
+                  </a:txBody>
+                  <a:tcPr marL="6350" marR="6350" marT="6350" marB="0" anchor="b"/>
+                </a:tc>
+                <a:tc>
+                  <a:txBody>
+                    <a:bodyPr/>
+                    <a:lstStyle/>
+                    <a:p>
+                      <a:pPr algn="r" fontAlgn="b"/>
+                      <a:r>
+                        <a:rPr lang="en-US" sz="1100" u="none" strike="noStrike">
+                          <a:effectLst/>
+                        </a:rPr>
+                        <a:t>18.61%</a:t>
+                      </a:r>
+                      <a:endParaRPr lang="en-US" sz="1100" b="0" i="0" u="none" strike="noStrike">
+                        <a:solidFill>
+                          <a:srgbClr val="000000"/>
+                        </a:solidFill>
+                        <a:effectLst/>
+                        <a:latin typeface="Calibri" panose="020F0502020204030204" pitchFamily="34" charset="0"/>
+                      </a:endParaRPr>
+                    </a:p>
+                  </a:txBody>
+                  <a:tcPr marL="6350" marR="6350" marT="6350" marB="0" anchor="b"/>
+                </a:tc>
+                <a:tc>
+                  <a:txBody>
+                    <a:bodyPr/>
+                    <a:lstStyle/>
+                    <a:p>
+                      <a:pPr algn="r" fontAlgn="b"/>
+                      <a:r>
+                        <a:rPr lang="en-US" sz="1100" u="none" strike="noStrike">
+                          <a:effectLst/>
+                        </a:rPr>
+                        <a:t>780</a:t>
+                      </a:r>
+                      <a:endParaRPr lang="en-US" sz="1100" b="0" i="0" u="none" strike="noStrike">
+                        <a:solidFill>
+                          <a:srgbClr val="000000"/>
+                        </a:solidFill>
+                        <a:effectLst/>
+                        <a:latin typeface="Calibri" panose="020F0502020204030204" pitchFamily="34" charset="0"/>
+                      </a:endParaRPr>
+                    </a:p>
+                  </a:txBody>
+                  <a:tcPr marL="6350" marR="6350" marT="6350" marB="0" anchor="b"/>
+                </a:tc>
+                <a:tc>
+                  <a:txBody>
+                    <a:bodyPr/>
+                    <a:lstStyle/>
+                    <a:p>
+                      <a:pPr algn="r" fontAlgn="b"/>
+                      <a:r>
+                        <a:rPr lang="en-US" sz="1100" u="none" strike="noStrike">
+                          <a:effectLst/>
+                        </a:rPr>
+                        <a:t>547.5062</a:t>
+                      </a:r>
+                      <a:endParaRPr lang="en-US" sz="1100" b="0" i="0" u="none" strike="noStrike">
+                        <a:solidFill>
+                          <a:srgbClr val="000000"/>
+                        </a:solidFill>
+                        <a:effectLst/>
+                        <a:latin typeface="Calibri" panose="020F0502020204030204" pitchFamily="34" charset="0"/>
+                      </a:endParaRPr>
+                    </a:p>
+                  </a:txBody>
+                  <a:tcPr marL="6350" marR="6350" marT="6350" marB="0" anchor="b"/>
+                </a:tc>
+                <a:extLst>
+                  <a:ext uri="{0D108BD9-81ED-4DB2-BD59-A6C34878D82A}">
+                    <a16:rowId xmlns:a16="http://schemas.microsoft.com/office/drawing/2014/main" val="2920152571"/>
+                  </a:ext>
+                </a:extLst>
+              </a:tr>
+              <a:tr h="232147">
+                <a:tc>
+                  <a:txBody>
+                    <a:bodyPr/>
+                    <a:lstStyle/>
+                    <a:p>
+                      <a:pPr algn="l" fontAlgn="b"/>
+                      <a:r>
+                        <a:rPr lang="en-US" sz="1100" u="none" strike="noStrike">
+                          <a:effectLst/>
+                        </a:rPr>
+                        <a:t>40-49</a:t>
+                      </a:r>
+                      <a:endParaRPr lang="en-US" sz="1100" b="0" i="0" u="none" strike="noStrike">
+                        <a:solidFill>
+                          <a:srgbClr val="000000"/>
+                        </a:solidFill>
+                        <a:effectLst/>
+                        <a:latin typeface="Calibri" panose="020F0502020204030204" pitchFamily="34" charset="0"/>
+                      </a:endParaRPr>
+                    </a:p>
+                  </a:txBody>
+                  <a:tcPr marL="6350" marR="6350" marT="6350" marB="0" anchor="b"/>
+                </a:tc>
+                <a:tc>
+                  <a:txBody>
+                    <a:bodyPr/>
+                    <a:lstStyle/>
+                    <a:p>
+                      <a:pPr algn="r" fontAlgn="b"/>
+                      <a:r>
+                        <a:rPr lang="en-US" sz="1100" u="none" strike="noStrike">
+                          <a:effectLst/>
+                        </a:rPr>
+                        <a:t>23.97%</a:t>
+                      </a:r>
+                      <a:endParaRPr lang="en-US" sz="1100" b="0" i="0" u="none" strike="noStrike">
+                        <a:solidFill>
+                          <a:srgbClr val="000000"/>
+                        </a:solidFill>
+                        <a:effectLst/>
+                        <a:latin typeface="Calibri" panose="020F0502020204030204" pitchFamily="34" charset="0"/>
+                      </a:endParaRPr>
+                    </a:p>
+                  </a:txBody>
+                  <a:tcPr marL="6350" marR="6350" marT="6350" marB="0" anchor="b"/>
+                </a:tc>
+                <a:tc>
+                  <a:txBody>
+                    <a:bodyPr/>
+                    <a:lstStyle/>
+                    <a:p>
+                      <a:pPr algn="r" fontAlgn="b"/>
+                      <a:r>
+                        <a:rPr lang="en-US" sz="1100" u="none" strike="noStrike">
+                          <a:effectLst/>
+                        </a:rPr>
+                        <a:t>706</a:t>
+                      </a:r>
+                      <a:endParaRPr lang="en-US" sz="1100" b="0" i="0" u="none" strike="noStrike">
+                        <a:solidFill>
+                          <a:srgbClr val="000000"/>
+                        </a:solidFill>
+                        <a:effectLst/>
+                        <a:latin typeface="Calibri" panose="020F0502020204030204" pitchFamily="34" charset="0"/>
+                      </a:endParaRPr>
+                    </a:p>
+                  </a:txBody>
+                  <a:tcPr marL="6350" marR="6350" marT="6350" marB="0" anchor="b"/>
+                </a:tc>
+                <a:tc>
+                  <a:txBody>
+                    <a:bodyPr/>
+                    <a:lstStyle/>
+                    <a:p>
+                      <a:pPr algn="r" fontAlgn="b"/>
+                      <a:r>
+                        <a:rPr lang="en-US" sz="1100" u="none" strike="noStrike">
+                          <a:effectLst/>
+                        </a:rPr>
+                        <a:t>705.1974</a:t>
+                      </a:r>
+                      <a:endParaRPr lang="en-US" sz="1100" b="0" i="0" u="none" strike="noStrike">
+                        <a:solidFill>
+                          <a:srgbClr val="000000"/>
+                        </a:solidFill>
+                        <a:effectLst/>
+                        <a:latin typeface="Calibri" panose="020F0502020204030204" pitchFamily="34" charset="0"/>
+                      </a:endParaRPr>
+                    </a:p>
+                  </a:txBody>
+                  <a:tcPr marL="6350" marR="6350" marT="6350" marB="0" anchor="b"/>
+                </a:tc>
+                <a:extLst>
+                  <a:ext uri="{0D108BD9-81ED-4DB2-BD59-A6C34878D82A}">
+                    <a16:rowId xmlns:a16="http://schemas.microsoft.com/office/drawing/2014/main" val="372776292"/>
+                  </a:ext>
+                </a:extLst>
+              </a:tr>
+              <a:tr h="232147">
+                <a:tc>
+                  <a:txBody>
+                    <a:bodyPr/>
+                    <a:lstStyle/>
+                    <a:p>
+                      <a:pPr algn="l" fontAlgn="b"/>
+                      <a:r>
+                        <a:rPr lang="en-US" sz="1100" u="none" strike="noStrike">
+                          <a:effectLst/>
+                        </a:rPr>
+                        <a:t>50-59</a:t>
+                      </a:r>
+                      <a:endParaRPr lang="en-US" sz="1100" b="0" i="0" u="none" strike="noStrike">
+                        <a:solidFill>
+                          <a:srgbClr val="000000"/>
+                        </a:solidFill>
+                        <a:effectLst/>
+                        <a:latin typeface="Calibri" panose="020F0502020204030204" pitchFamily="34" charset="0"/>
+                      </a:endParaRPr>
+                    </a:p>
+                  </a:txBody>
+                  <a:tcPr marL="6350" marR="6350" marT="6350" marB="0" anchor="b"/>
+                </a:tc>
+                <a:tc>
+                  <a:txBody>
+                    <a:bodyPr/>
+                    <a:lstStyle/>
+                    <a:p>
+                      <a:pPr algn="r" fontAlgn="b"/>
+                      <a:r>
+                        <a:rPr lang="en-US" sz="1100" u="none" strike="noStrike">
+                          <a:effectLst/>
+                        </a:rPr>
+                        <a:t>22.71%</a:t>
+                      </a:r>
+                      <a:endParaRPr lang="en-US" sz="1100" b="0" i="0" u="none" strike="noStrike">
+                        <a:solidFill>
+                          <a:srgbClr val="000000"/>
+                        </a:solidFill>
+                        <a:effectLst/>
+                        <a:latin typeface="Calibri" panose="020F0502020204030204" pitchFamily="34" charset="0"/>
+                      </a:endParaRPr>
+                    </a:p>
+                  </a:txBody>
+                  <a:tcPr marL="6350" marR="6350" marT="6350" marB="0" anchor="b"/>
+                </a:tc>
+                <a:tc>
+                  <a:txBody>
+                    <a:bodyPr/>
+                    <a:lstStyle/>
+                    <a:p>
+                      <a:pPr algn="r" fontAlgn="b"/>
+                      <a:r>
+                        <a:rPr lang="en-US" sz="1100" u="none" strike="noStrike">
+                          <a:effectLst/>
+                        </a:rPr>
+                        <a:t>673</a:t>
+                      </a:r>
+                      <a:endParaRPr lang="en-US" sz="1100" b="0" i="0" u="none" strike="noStrike">
+                        <a:solidFill>
+                          <a:srgbClr val="000000"/>
+                        </a:solidFill>
+                        <a:effectLst/>
+                        <a:latin typeface="Calibri" panose="020F0502020204030204" pitchFamily="34" charset="0"/>
+                      </a:endParaRPr>
+                    </a:p>
+                  </a:txBody>
+                  <a:tcPr marL="6350" marR="6350" marT="6350" marB="0" anchor="b"/>
+                </a:tc>
+                <a:tc>
+                  <a:txBody>
+                    <a:bodyPr/>
+                    <a:lstStyle/>
+                    <a:p>
+                      <a:pPr algn="r" fontAlgn="b"/>
+                      <a:r>
+                        <a:rPr lang="en-US" sz="1100" u="none" strike="noStrike">
+                          <a:effectLst/>
+                        </a:rPr>
+                        <a:t>668.1282</a:t>
+                      </a:r>
+                      <a:endParaRPr lang="en-US" sz="1100" b="0" i="0" u="none" strike="noStrike">
+                        <a:solidFill>
+                          <a:srgbClr val="000000"/>
+                        </a:solidFill>
+                        <a:effectLst/>
+                        <a:latin typeface="Calibri" panose="020F0502020204030204" pitchFamily="34" charset="0"/>
+                      </a:endParaRPr>
+                    </a:p>
+                  </a:txBody>
+                  <a:tcPr marL="6350" marR="6350" marT="6350" marB="0" anchor="b"/>
+                </a:tc>
+                <a:extLst>
+                  <a:ext uri="{0D108BD9-81ED-4DB2-BD59-A6C34878D82A}">
+                    <a16:rowId xmlns:a16="http://schemas.microsoft.com/office/drawing/2014/main" val="3788235359"/>
+                  </a:ext>
+                </a:extLst>
+              </a:tr>
+              <a:tr h="232147">
+                <a:tc>
+                  <a:txBody>
+                    <a:bodyPr/>
+                    <a:lstStyle/>
+                    <a:p>
+                      <a:pPr algn="l" fontAlgn="b"/>
+                      <a:r>
+                        <a:rPr lang="en-US" sz="1100" u="none" strike="noStrike">
+                          <a:effectLst/>
+                        </a:rPr>
+                        <a:t>60-69</a:t>
+                      </a:r>
+                      <a:endParaRPr lang="en-US" sz="1100" b="0" i="0" u="none" strike="noStrike">
+                        <a:solidFill>
+                          <a:srgbClr val="000000"/>
+                        </a:solidFill>
+                        <a:effectLst/>
+                        <a:latin typeface="Calibri" panose="020F0502020204030204" pitchFamily="34" charset="0"/>
+                      </a:endParaRPr>
+                    </a:p>
+                  </a:txBody>
+                  <a:tcPr marL="6350" marR="6350" marT="6350" marB="0" anchor="b"/>
+                </a:tc>
+                <a:tc>
+                  <a:txBody>
+                    <a:bodyPr/>
+                    <a:lstStyle/>
+                    <a:p>
+                      <a:pPr algn="r" fontAlgn="b"/>
+                      <a:r>
+                        <a:rPr lang="en-US" sz="1100" u="none" strike="noStrike">
+                          <a:effectLst/>
+                        </a:rPr>
+                        <a:t>14.82%</a:t>
+                      </a:r>
+                      <a:endParaRPr lang="en-US" sz="1100" b="0" i="0" u="none" strike="noStrike">
+                        <a:solidFill>
+                          <a:srgbClr val="000000"/>
+                        </a:solidFill>
+                        <a:effectLst/>
+                        <a:latin typeface="Calibri" panose="020F0502020204030204" pitchFamily="34" charset="0"/>
+                      </a:endParaRPr>
+                    </a:p>
+                  </a:txBody>
+                  <a:tcPr marL="6350" marR="6350" marT="6350" marB="0" anchor="b"/>
+                </a:tc>
+                <a:tc>
+                  <a:txBody>
+                    <a:bodyPr/>
+                    <a:lstStyle/>
+                    <a:p>
+                      <a:pPr algn="r" fontAlgn="b"/>
+                      <a:r>
+                        <a:rPr lang="en-US" sz="1100" u="none" strike="noStrike">
+                          <a:effectLst/>
+                        </a:rPr>
+                        <a:t>199</a:t>
+                      </a:r>
+                      <a:endParaRPr lang="en-US" sz="1100" b="0" i="0" u="none" strike="noStrike">
+                        <a:solidFill>
+                          <a:srgbClr val="000000"/>
+                        </a:solidFill>
+                        <a:effectLst/>
+                        <a:latin typeface="Calibri" panose="020F0502020204030204" pitchFamily="34" charset="0"/>
+                      </a:endParaRPr>
+                    </a:p>
+                  </a:txBody>
+                  <a:tcPr marL="6350" marR="6350" marT="6350" marB="0" anchor="b"/>
+                </a:tc>
+                <a:tc>
+                  <a:txBody>
+                    <a:bodyPr/>
+                    <a:lstStyle/>
+                    <a:p>
+                      <a:pPr algn="r" fontAlgn="b"/>
+                      <a:r>
+                        <a:rPr lang="en-US" sz="1100" u="none" strike="noStrike" dirty="0">
+                          <a:effectLst/>
+                        </a:rPr>
+                        <a:t>436.0044</a:t>
+                      </a:r>
+                      <a:endParaRPr lang="en-US" sz="1100" b="0" i="0" u="none" strike="noStrike" dirty="0">
+                        <a:solidFill>
+                          <a:srgbClr val="000000"/>
+                        </a:solidFill>
+                        <a:effectLst/>
+                        <a:latin typeface="Calibri" panose="020F0502020204030204" pitchFamily="34" charset="0"/>
+                      </a:endParaRPr>
+                    </a:p>
+                  </a:txBody>
+                  <a:tcPr marL="6350" marR="6350" marT="6350" marB="0" anchor="b"/>
+                </a:tc>
+                <a:extLst>
+                  <a:ext uri="{0D108BD9-81ED-4DB2-BD59-A6C34878D82A}">
+                    <a16:rowId xmlns:a16="http://schemas.microsoft.com/office/drawing/2014/main" val="806347943"/>
+                  </a:ext>
+                </a:extLst>
+              </a:tr>
+            </a:tbl>
+          </a:graphicData>
+        </a:graphic>
+      </p:graphicFrame>
+    </p:spTree>
+    <p:extLst>
+      <p:ext uri="{BB962C8B-B14F-4D97-AF65-F5344CB8AC3E}">
+        <p14:creationId xmlns:p14="http://schemas.microsoft.com/office/powerpoint/2010/main" val="2510193250"/>
+      </p:ext>
+    </p:extLst>
+  </p:cSld>
+  <p:clrMapOvr>
+    <a:masterClrMapping/>
+  </p:clrMapOvr>
+</p:sld>
+</file>
+
+<file path=ppt/slides/slide14.xml><?xml version="1.0" encoding="utf-8"?>
+<p:sld xmlns:a="http://schemas.openxmlformats.org/drawingml/2006/main" xmlns:r="http://schemas.openxmlformats.org/officeDocument/2006/relationships" xmlns:p="http://schemas.openxmlformats.org/presentationml/2006/main">
+  <p:cSld>
+    <p:spTree>
+      <p:nvGrpSpPr>
+        <p:cNvPr id="1" name=""/>
+        <p:cNvGrpSpPr/>
+        <p:nvPr/>
+      </p:nvGrpSpPr>
+      <p:grpSpPr>
+        <a:xfrm>
+          <a:off x="0" y="0"/>
+          <a:ext cx="0" cy="0"/>
+          <a:chOff x="0" y="0"/>
+          <a:chExt cx="0" cy="0"/>
+        </a:xfrm>
+      </p:grpSpPr>
+      <p:sp>
+        <p:nvSpPr>
+          <p:cNvPr id="2" name="Title 1">
+            <a:extLst>
+              <a:ext uri="{FF2B5EF4-FFF2-40B4-BE49-F238E27FC236}">
+                <a16:creationId xmlns:a16="http://schemas.microsoft.com/office/drawing/2014/main" id="{CDA623AE-D532-4482-9398-887DF1CE9E5E}"/>
+              </a:ext>
+            </a:extLst>
+          </p:cNvPr>
+          <p:cNvSpPr>
+            <a:spLocks noGrp="1"/>
+          </p:cNvSpPr>
+          <p:nvPr>
+            <p:ph type="title"/>
+          </p:nvPr>
+        </p:nvSpPr>
+        <p:spPr/>
+        <p:txBody>
+          <a:bodyPr/>
+          <a:lstStyle/>
+          <a:p>
+            <a:r>
+              <a:rPr lang="en-US" dirty="0"/>
+              <a:t>Drug-induced Mortality by Year</a:t>
+            </a:r>
+          </a:p>
+        </p:txBody>
+      </p:sp>
+      <p:sp>
+        <p:nvSpPr>
+          <p:cNvPr id="3" name="Content Placeholder 2">
+            <a:extLst>
+              <a:ext uri="{FF2B5EF4-FFF2-40B4-BE49-F238E27FC236}">
+                <a16:creationId xmlns:a16="http://schemas.microsoft.com/office/drawing/2014/main" id="{4FE2997F-85AA-49F5-8F1E-E13B6B799A00}"/>
+              </a:ext>
+            </a:extLst>
+          </p:cNvPr>
+          <p:cNvSpPr>
+            <a:spLocks noGrp="1"/>
+          </p:cNvSpPr>
+          <p:nvPr>
+            <p:ph idx="1"/>
+          </p:nvPr>
+        </p:nvSpPr>
+        <p:spPr>
+          <a:xfrm>
+            <a:off x="2592924" y="4468306"/>
+            <a:ext cx="8911688" cy="1999098"/>
+          </a:xfrm>
+        </p:spPr>
+        <p:txBody>
+          <a:bodyPr/>
+          <a:lstStyle/>
+          <a:p>
+            <a:r>
+              <a:rPr lang="en-US" dirty="0"/>
+              <a:t>Fitting linear regression: </a:t>
+            </a:r>
+          </a:p>
+          <a:p>
+            <a:pPr lvl="1"/>
+            <a:r>
+              <a:rPr lang="en-US" dirty="0"/>
+              <a:t>Independent variable: Year number</a:t>
+            </a:r>
+          </a:p>
+          <a:p>
+            <a:pPr lvl="1"/>
+            <a:r>
+              <a:rPr lang="en-US" dirty="0"/>
+              <a:t>Dependent variable : Number of deaths in that year</a:t>
+            </a:r>
+          </a:p>
+          <a:p>
+            <a:r>
+              <a:rPr lang="en-US" dirty="0"/>
+              <a:t>Intercept = 193.33, Slope = 139</a:t>
+            </a:r>
+          </a:p>
+          <a:p>
+            <a:r>
+              <a:rPr lang="en-US" dirty="0"/>
+              <a:t>Prediction for 2018 = 1166 deaths</a:t>
+            </a:r>
+          </a:p>
+          <a:p>
+            <a:endParaRPr lang="en-US" dirty="0"/>
+          </a:p>
+        </p:txBody>
+      </p:sp>
+      <p:pic>
+        <p:nvPicPr>
+          <p:cNvPr id="7" name="Picture 6">
+            <a:extLst>
+              <a:ext uri="{FF2B5EF4-FFF2-40B4-BE49-F238E27FC236}">
+                <a16:creationId xmlns:a16="http://schemas.microsoft.com/office/drawing/2014/main" id="{E4C1265A-7E9C-47BC-ADB0-E65D85BF50C9}"/>
+              </a:ext>
+            </a:extLst>
+          </p:cNvPr>
+          <p:cNvPicPr>
+            <a:picLocks noChangeAspect="1"/>
+          </p:cNvPicPr>
+          <p:nvPr/>
+        </p:nvPicPr>
+        <p:blipFill>
+          <a:blip r:embed="rId2"/>
+          <a:stretch>
+            <a:fillRect/>
+          </a:stretch>
+        </p:blipFill>
+        <p:spPr>
+          <a:xfrm>
+            <a:off x="6330177" y="1219077"/>
+            <a:ext cx="5055752" cy="3378970"/>
+          </a:xfrm>
+          <a:prstGeom prst="rect">
+            <a:avLst/>
+          </a:prstGeom>
+        </p:spPr>
+      </p:pic>
+    </p:spTree>
+    <p:extLst>
+      <p:ext uri="{BB962C8B-B14F-4D97-AF65-F5344CB8AC3E}">
+        <p14:creationId xmlns:p14="http://schemas.microsoft.com/office/powerpoint/2010/main" val="1224483762"/>
+      </p:ext>
+    </p:extLst>
+  </p:cSld>
+  <p:clrMapOvr>
+    <a:masterClrMapping/>
+  </p:clrMapOvr>
+</p:sld>
+</file>
+
+<file path=ppt/slides/slide15.xml><?xml version="1.0" encoding="utf-8"?>
 <p:sld xmlns:a="http://schemas.openxmlformats.org/drawingml/2006/main" xmlns:r="http://schemas.openxmlformats.org/officeDocument/2006/relationships" xmlns:p="http://schemas.openxmlformats.org/presentationml/2006/main">
   <p:cSld>
     <p:spTree>
@@ -8503,7 +10186,7 @@
           <p:cNvPr id="2" name="Title 1">
             <a:extLst>
               <a:ext uri="{FF2B5EF4-FFF2-40B4-BE49-F238E27FC236}">
-                <a16:creationId xmlns:a16="http://schemas.microsoft.com/office/drawing/2014/main" id="{57709140-C8B7-46DE-A33B-463B5EBE4341}"/>
+                <a16:creationId xmlns:a16="http://schemas.microsoft.com/office/drawing/2014/main" id="{B8E97443-B866-4821-958D-875892DA966B}"/>
               </a:ext>
             </a:extLst>
           </p:cNvPr>
@@ -8523,7 +10206,7 @@
           <a:p>
             <a:r>
               <a:rPr lang="en-US" dirty="0"/>
-              <a:t>Drug-Induced Mortality by Gender, Race, and Sex</a:t>
+              <a:t>Drug-induced Mortality and Unemployment rates</a:t>
             </a:r>
           </a:p>
         </p:txBody>
@@ -8533,7 +10216,7 @@
           <p:cNvPr id="5" name="Content Placeholder 4">
             <a:extLst>
               <a:ext uri="{FF2B5EF4-FFF2-40B4-BE49-F238E27FC236}">
-                <a16:creationId xmlns:a16="http://schemas.microsoft.com/office/drawing/2014/main" id="{2CE37F27-8E40-49A1-A91E-AC20FF061BE0}"/>
+                <a16:creationId xmlns:a16="http://schemas.microsoft.com/office/drawing/2014/main" id="{96B55759-06C9-4FBF-8E38-B3BBAF8260FD}"/>
               </a:ext>
             </a:extLst>
           </p:cNvPr>
@@ -8552,15 +10235,15 @@
         </p:blipFill>
         <p:spPr>
           <a:xfrm>
-            <a:off x="2592925" y="1904999"/>
-            <a:ext cx="7339640" cy="4958773"/>
+            <a:off x="3884517" y="2083266"/>
+            <a:ext cx="4538030" cy="4538030"/>
           </a:xfrm>
         </p:spPr>
       </p:pic>
     </p:spTree>
     <p:extLst>
       <p:ext uri="{BB962C8B-B14F-4D97-AF65-F5344CB8AC3E}">
-        <p14:creationId xmlns:p14="http://schemas.microsoft.com/office/powerpoint/2010/main" val="956778109"/>
+        <p14:creationId xmlns:p14="http://schemas.microsoft.com/office/powerpoint/2010/main" val="2167273281"/>
       </p:ext>
     </p:extLst>
   </p:cSld>
@@ -8592,7 +10275,7 @@
           <p:cNvPr id="2" name="Title 1">
             <a:extLst>
               <a:ext uri="{FF2B5EF4-FFF2-40B4-BE49-F238E27FC236}">
-                <a16:creationId xmlns:a16="http://schemas.microsoft.com/office/drawing/2014/main" id="{44E3AE93-826E-4319-B623-63CBCBC0C145}"/>
+                <a16:creationId xmlns:a16="http://schemas.microsoft.com/office/drawing/2014/main" id="{8BF87117-1E4E-4EE9-8760-25D09E6E6179}"/>
               </a:ext>
             </a:extLst>
           </p:cNvPr>
@@ -8612,44 +10295,40 @@
           <a:p>
             <a:r>
               <a:rPr lang="en-US" dirty="0"/>
-              <a:t>Drug-Induced Total Mortality by County</a:t>
-            </a:r>
-          </a:p>
-        </p:txBody>
-      </p:sp>
-      <p:pic>
-        <p:nvPicPr>
-          <p:cNvPr id="5" name="Content Placeholder 4">
+              <a:t>Drug-induced mortality rates and barriers to medical treatment</a:t>
+            </a:r>
+          </a:p>
+        </p:txBody>
+      </p:sp>
+      <p:sp>
+        <p:nvSpPr>
+          <p:cNvPr id="3" name="Content Placeholder 2">
             <a:extLst>
               <a:ext uri="{FF2B5EF4-FFF2-40B4-BE49-F238E27FC236}">
-                <a16:creationId xmlns:a16="http://schemas.microsoft.com/office/drawing/2014/main" id="{E2EA595C-4A89-4C5B-A82C-48FA5ABEFE23}"/>
+                <a16:creationId xmlns:a16="http://schemas.microsoft.com/office/drawing/2014/main" id="{F37D4F70-3A7A-4527-B5BB-4CBFEE548667}"/>
               </a:ext>
             </a:extLst>
           </p:cNvPr>
-          <p:cNvPicPr>
-            <a:picLocks noGrp="1" noChangeAspect="1"/>
-          </p:cNvPicPr>
+          <p:cNvSpPr>
+            <a:spLocks noGrp="1"/>
+          </p:cNvSpPr>
           <p:nvPr>
             <p:ph idx="1"/>
           </p:nvPr>
-        </p:nvPicPr>
-        <p:blipFill>
-          <a:blip r:embed="rId2"/>
-          <a:stretch>
-            <a:fillRect/>
-          </a:stretch>
-        </p:blipFill>
-        <p:spPr>
-          <a:xfrm>
-            <a:off x="1242297" y="1928070"/>
-            <a:ext cx="10148347" cy="4742833"/>
-          </a:xfrm>
-        </p:spPr>
-      </p:pic>
+        </p:nvSpPr>
+        <p:spPr/>
+        <p:txBody>
+          <a:bodyPr/>
+          <a:lstStyle/>
+          <a:p>
+            <a:endParaRPr lang="en-US"/>
+          </a:p>
+        </p:txBody>
+      </p:sp>
     </p:spTree>
     <p:extLst>
       <p:ext uri="{BB962C8B-B14F-4D97-AF65-F5344CB8AC3E}">
-        <p14:creationId xmlns:p14="http://schemas.microsoft.com/office/powerpoint/2010/main" val="712921710"/>
+        <p14:creationId xmlns:p14="http://schemas.microsoft.com/office/powerpoint/2010/main" val="2699776682"/>
       </p:ext>
     </p:extLst>
   </p:cSld>
@@ -8681,7 +10360,7 @@
           <p:cNvPr id="2" name="Title 1">
             <a:extLst>
               <a:ext uri="{FF2B5EF4-FFF2-40B4-BE49-F238E27FC236}">
-                <a16:creationId xmlns:a16="http://schemas.microsoft.com/office/drawing/2014/main" id="{705B2833-8695-4CE9-B8D7-AA855B1AF473}"/>
+                <a16:creationId xmlns:a16="http://schemas.microsoft.com/office/drawing/2014/main" id="{CCC4A7B5-8082-41BD-8216-D7174D2FC296}"/>
               </a:ext>
             </a:extLst>
           </p:cNvPr>
@@ -8699,7 +10378,7 @@
           <a:p>
             <a:r>
               <a:rPr lang="en-US" dirty="0"/>
-              <a:t>Drug-Induced Mortality by County per 100K</a:t>
+              <a:t>Drug-Induced Mortality Rates by Drug</a:t>
             </a:r>
           </a:p>
         </p:txBody>
@@ -8709,7 +10388,7 @@
           <p:cNvPr id="5" name="Content Placeholder 4">
             <a:extLst>
               <a:ext uri="{FF2B5EF4-FFF2-40B4-BE49-F238E27FC236}">
-                <a16:creationId xmlns:a16="http://schemas.microsoft.com/office/drawing/2014/main" id="{95101428-BCFB-4FC4-96B2-C4DE4AF7981D}"/>
+                <a16:creationId xmlns:a16="http://schemas.microsoft.com/office/drawing/2014/main" id="{DFB7AE71-0B7A-462D-932A-2B550F2B7D1C}"/>
               </a:ext>
             </a:extLst>
           </p:cNvPr>
@@ -8728,15 +10407,15 @@
         </p:blipFill>
         <p:spPr>
           <a:xfrm>
-            <a:off x="2125225" y="1905000"/>
-            <a:ext cx="8990188" cy="4625503"/>
+            <a:off x="2592925" y="1382001"/>
+            <a:ext cx="7968620" cy="5312414"/>
           </a:xfrm>
         </p:spPr>
       </p:pic>
     </p:spTree>
     <p:extLst>
       <p:ext uri="{BB962C8B-B14F-4D97-AF65-F5344CB8AC3E}">
-        <p14:creationId xmlns:p14="http://schemas.microsoft.com/office/powerpoint/2010/main" val="934962227"/>
+        <p14:creationId xmlns:p14="http://schemas.microsoft.com/office/powerpoint/2010/main" val="2160349714"/>
       </p:ext>
     </p:extLst>
   </p:cSld>
@@ -8768,7 +10447,7 @@
           <p:cNvPr id="2" name="Title 1">
             <a:extLst>
               <a:ext uri="{FF2B5EF4-FFF2-40B4-BE49-F238E27FC236}">
-                <a16:creationId xmlns:a16="http://schemas.microsoft.com/office/drawing/2014/main" id="{B8E97443-B866-4821-958D-875892DA966B}"/>
+                <a16:creationId xmlns:a16="http://schemas.microsoft.com/office/drawing/2014/main" id="{BB1C60A3-10D8-462D-B3B4-AF7F4B5F8101}"/>
               </a:ext>
             </a:extLst>
           </p:cNvPr>
@@ -8781,51 +10460,46 @@
         </p:nvSpPr>
         <p:spPr/>
         <p:txBody>
-          <a:bodyPr>
-            <a:normAutofit/>
-          </a:bodyPr>
+          <a:bodyPr/>
           <a:lstStyle/>
           <a:p>
             <a:r>
-              <a:rPr lang="en-US" dirty="0"/>
-              <a:t>Drug-induced Mortality and Unemployment rates</a:t>
-            </a:r>
-          </a:p>
-        </p:txBody>
-      </p:sp>
-      <p:pic>
-        <p:nvPicPr>
-          <p:cNvPr id="5" name="Content Placeholder 4">
+              <a:rPr lang="en-US" dirty="0" err="1"/>
+              <a:t>Fentynal</a:t>
+            </a:r>
+            <a:endParaRPr lang="en-US" dirty="0"/>
+          </a:p>
+        </p:txBody>
+      </p:sp>
+      <p:sp>
+        <p:nvSpPr>
+          <p:cNvPr id="3" name="Content Placeholder 2">
             <a:extLst>
               <a:ext uri="{FF2B5EF4-FFF2-40B4-BE49-F238E27FC236}">
-                <a16:creationId xmlns:a16="http://schemas.microsoft.com/office/drawing/2014/main" id="{96B55759-06C9-4FBF-8E38-B3BBAF8260FD}"/>
+                <a16:creationId xmlns:a16="http://schemas.microsoft.com/office/drawing/2014/main" id="{DE910129-DA90-46EC-8EF1-7D23BD0B5F3F}"/>
               </a:ext>
             </a:extLst>
           </p:cNvPr>
-          <p:cNvPicPr>
-            <a:picLocks noGrp="1" noChangeAspect="1"/>
-          </p:cNvPicPr>
+          <p:cNvSpPr>
+            <a:spLocks noGrp="1"/>
+          </p:cNvSpPr>
           <p:nvPr>
             <p:ph idx="1"/>
           </p:nvPr>
-        </p:nvPicPr>
-        <p:blipFill>
-          <a:blip r:embed="rId2"/>
-          <a:stretch>
-            <a:fillRect/>
-          </a:stretch>
-        </p:blipFill>
-        <p:spPr>
-          <a:xfrm>
-            <a:off x="3884517" y="2083266"/>
-            <a:ext cx="4538030" cy="4538030"/>
-          </a:xfrm>
-        </p:spPr>
-      </p:pic>
+        </p:nvSpPr>
+        <p:spPr/>
+        <p:txBody>
+          <a:bodyPr/>
+          <a:lstStyle/>
+          <a:p>
+            <a:endParaRPr lang="en-US"/>
+          </a:p>
+        </p:txBody>
+      </p:sp>
     </p:spTree>
     <p:extLst>
       <p:ext uri="{BB962C8B-B14F-4D97-AF65-F5344CB8AC3E}">
-        <p14:creationId xmlns:p14="http://schemas.microsoft.com/office/powerpoint/2010/main" val="2167273281"/>
+        <p14:creationId xmlns:p14="http://schemas.microsoft.com/office/powerpoint/2010/main" val="2837072940"/>
       </p:ext>
     </p:extLst>
   </p:cSld>

</xml_diff>

<commit_message>
Updated slides with regression and chi-squared test
</commit_message>
<xml_diff>
--- a/Drug Mortality and Socio-Economic conditions in Connecticut.pptx
+++ b/Drug Mortality and Socio-Economic conditions in Connecticut.pptx
@@ -7,15 +7,19 @@
   <p:sldIdLst>
     <p:sldId id="256" r:id="rId2"/>
     <p:sldId id="257" r:id="rId3"/>
-    <p:sldId id="258" r:id="rId4"/>
-    <p:sldId id="259" r:id="rId5"/>
-    <p:sldId id="260" r:id="rId6"/>
-    <p:sldId id="261" r:id="rId7"/>
-    <p:sldId id="266" r:id="rId8"/>
-    <p:sldId id="262" r:id="rId9"/>
-    <p:sldId id="263" r:id="rId10"/>
-    <p:sldId id="264" r:id="rId11"/>
-    <p:sldId id="265" r:id="rId12"/>
+    <p:sldId id="266" r:id="rId4"/>
+    <p:sldId id="258" r:id="rId5"/>
+    <p:sldId id="262" r:id="rId6"/>
+    <p:sldId id="263" r:id="rId7"/>
+    <p:sldId id="259" r:id="rId8"/>
+    <p:sldId id="264" r:id="rId9"/>
+    <p:sldId id="268" r:id="rId10"/>
+    <p:sldId id="261" r:id="rId11"/>
+    <p:sldId id="267" r:id="rId12"/>
+    <p:sldId id="260" r:id="rId13"/>
+    <p:sldId id="269" r:id="rId14"/>
+    <p:sldId id="270" r:id="rId15"/>
+    <p:sldId id="265" r:id="rId16"/>
   </p:sldIdLst>
   <p:sldSz cx="12192000" cy="6858000"/>
   <p:notesSz cx="6858000" cy="9144000"/>
@@ -311,7 +315,7 @@
             <a:fld id="{B61BEF0D-F0BB-DE4B-95CE-6DB70DBA9567}" type="datetimeFigureOut">
               <a:rPr lang="en-US" dirty="0"/>
               <a:pPr/>
-              <a:t>6/12/2018</a:t>
+              <a:t>6/13/2018</a:t>
             </a:fld>
             <a:endParaRPr lang="en-US" dirty="0"/>
           </a:p>
@@ -646,7 +650,7 @@
             <a:fld id="{B61BEF0D-F0BB-DE4B-95CE-6DB70DBA9567}" type="datetimeFigureOut">
               <a:rPr lang="en-US" dirty="0"/>
               <a:pPr/>
-              <a:t>6/12/2018</a:t>
+              <a:t>6/13/2018</a:t>
             </a:fld>
             <a:endParaRPr lang="en-US" dirty="0"/>
           </a:p>
@@ -1044,7 +1048,7 @@
             <a:fld id="{B61BEF0D-F0BB-DE4B-95CE-6DB70DBA9567}" type="datetimeFigureOut">
               <a:rPr lang="en-US" dirty="0"/>
               <a:pPr/>
-              <a:t>6/12/2018</a:t>
+              <a:t>6/13/2018</a:t>
             </a:fld>
             <a:endParaRPr lang="en-US" dirty="0"/>
           </a:p>
@@ -1377,7 +1381,7 @@
             <a:fld id="{B61BEF0D-F0BB-DE4B-95CE-6DB70DBA9567}" type="datetimeFigureOut">
               <a:rPr lang="en-US" dirty="0"/>
               <a:pPr/>
-              <a:t>6/12/2018</a:t>
+              <a:t>6/13/2018</a:t>
             </a:fld>
             <a:endParaRPr lang="en-US" dirty="0"/>
           </a:p>
@@ -1694,7 +1698,7 @@
             <a:fld id="{B61BEF0D-F0BB-DE4B-95CE-6DB70DBA9567}" type="datetimeFigureOut">
               <a:rPr lang="en-US" dirty="0"/>
               <a:pPr/>
-              <a:t>6/12/2018</a:t>
+              <a:t>6/13/2018</a:t>
             </a:fld>
             <a:endParaRPr lang="en-US" dirty="0"/>
           </a:p>
@@ -2087,7 +2091,7 @@
             <a:fld id="{B61BEF0D-F0BB-DE4B-95CE-6DB70DBA9567}" type="datetimeFigureOut">
               <a:rPr lang="en-US" dirty="0"/>
               <a:pPr/>
-              <a:t>6/12/2018</a:t>
+              <a:t>6/13/2018</a:t>
             </a:fld>
             <a:endParaRPr lang="en-US" dirty="0"/>
           </a:p>
@@ -2341,7 +2345,7 @@
             <a:fld id="{B61BEF0D-F0BB-DE4B-95CE-6DB70DBA9567}" type="datetimeFigureOut">
               <a:rPr lang="en-US" dirty="0"/>
               <a:pPr/>
-              <a:t>6/12/2018</a:t>
+              <a:t>6/13/2018</a:t>
             </a:fld>
             <a:endParaRPr lang="en-US" dirty="0"/>
           </a:p>
@@ -2600,7 +2604,7 @@
             <a:fld id="{B61BEF0D-F0BB-DE4B-95CE-6DB70DBA9567}" type="datetimeFigureOut">
               <a:rPr lang="en-US" dirty="0"/>
               <a:pPr/>
-              <a:t>6/12/2018</a:t>
+              <a:t>6/13/2018</a:t>
             </a:fld>
             <a:endParaRPr lang="en-US" dirty="0"/>
           </a:p>
@@ -2859,7 +2863,7 @@
             <a:fld id="{B61BEF0D-F0BB-DE4B-95CE-6DB70DBA9567}" type="datetimeFigureOut">
               <a:rPr lang="en-US" dirty="0"/>
               <a:pPr/>
-              <a:t>6/12/2018</a:t>
+              <a:t>6/13/2018</a:t>
             </a:fld>
             <a:endParaRPr lang="en-US" dirty="0"/>
           </a:p>
@@ -3185,7 +3189,7 @@
             <a:fld id="{B61BEF0D-F0BB-DE4B-95CE-6DB70DBA9567}" type="datetimeFigureOut">
               <a:rPr lang="en-US" dirty="0"/>
               <a:pPr/>
-              <a:t>6/12/2018</a:t>
+              <a:t>6/13/2018</a:t>
             </a:fld>
             <a:endParaRPr lang="en-US" dirty="0"/>
           </a:p>
@@ -3505,7 +3509,7 @@
             <a:fld id="{B61BEF0D-F0BB-DE4B-95CE-6DB70DBA9567}" type="datetimeFigureOut">
               <a:rPr lang="en-US" dirty="0"/>
               <a:pPr/>
-              <a:t>6/12/2018</a:t>
+              <a:t>6/13/2018</a:t>
             </a:fld>
             <a:endParaRPr lang="en-US" dirty="0"/>
           </a:p>
@@ -3959,7 +3963,7 @@
             <a:fld id="{B61BEF0D-F0BB-DE4B-95CE-6DB70DBA9567}" type="datetimeFigureOut">
               <a:rPr lang="en-US" dirty="0"/>
               <a:pPr/>
-              <a:t>6/12/2018</a:t>
+              <a:t>6/13/2018</a:t>
             </a:fld>
             <a:endParaRPr lang="en-US" dirty="0"/>
           </a:p>
@@ -4161,7 +4165,7 @@
             <a:fld id="{B61BEF0D-F0BB-DE4B-95CE-6DB70DBA9567}" type="datetimeFigureOut">
               <a:rPr lang="en-US" dirty="0"/>
               <a:pPr/>
-              <a:t>6/12/2018</a:t>
+              <a:t>6/13/2018</a:t>
             </a:fld>
             <a:endParaRPr lang="en-US" dirty="0"/>
           </a:p>
@@ -4335,7 +4339,7 @@
             <a:fld id="{B61BEF0D-F0BB-DE4B-95CE-6DB70DBA9567}" type="datetimeFigureOut">
               <a:rPr lang="en-US" dirty="0"/>
               <a:pPr/>
-              <a:t>6/12/2018</a:t>
+              <a:t>6/13/2018</a:t>
             </a:fld>
             <a:endParaRPr lang="en-US" dirty="0"/>
           </a:p>
@@ -4665,7 +4669,7 @@
             <a:fld id="{B61BEF0D-F0BB-DE4B-95CE-6DB70DBA9567}" type="datetimeFigureOut">
               <a:rPr lang="en-US" dirty="0"/>
               <a:pPr/>
-              <a:t>6/12/2018</a:t>
+              <a:t>6/13/2018</a:t>
             </a:fld>
             <a:endParaRPr lang="en-US" dirty="0"/>
           </a:p>
@@ -5007,7 +5011,7 @@
             <a:fld id="{B61BEF0D-F0BB-DE4B-95CE-6DB70DBA9567}" type="datetimeFigureOut">
               <a:rPr lang="en-US" dirty="0"/>
               <a:pPr/>
-              <a:t>6/12/2018</a:t>
+              <a:t>6/13/2018</a:t>
             </a:fld>
             <a:endParaRPr lang="en-US" dirty="0"/>
           </a:p>
@@ -7121,7 +7125,7 @@
             <a:fld id="{B61BEF0D-F0BB-DE4B-95CE-6DB70DBA9567}" type="datetimeFigureOut">
               <a:rPr lang="en-US" dirty="0"/>
               <a:pPr/>
-              <a:t>6/12/2018</a:t>
+              <a:t>6/13/2018</a:t>
             </a:fld>
             <a:endParaRPr lang="en-US" dirty="0"/>
           </a:p>
@@ -7749,7 +7753,7 @@
           <p:cNvPr id="2" name="Title 1">
             <a:extLst>
               <a:ext uri="{FF2B5EF4-FFF2-40B4-BE49-F238E27FC236}">
-                <a16:creationId xmlns:a16="http://schemas.microsoft.com/office/drawing/2014/main" id="{CCC4A7B5-8082-41BD-8216-D7174D2FC296}"/>
+                <a16:creationId xmlns:a16="http://schemas.microsoft.com/office/drawing/2014/main" id="{44E3AE93-826E-4319-B623-63CBCBC0C145}"/>
               </a:ext>
             </a:extLst>
           </p:cNvPr>
@@ -7762,45 +7766,51 @@
         </p:nvSpPr>
         <p:spPr/>
         <p:txBody>
-          <a:bodyPr/>
+          <a:bodyPr>
+            <a:normAutofit/>
+          </a:bodyPr>
           <a:lstStyle/>
           <a:p>
             <a:r>
               <a:rPr lang="en-US" dirty="0"/>
-              <a:t>Drug-induced mortality rates by drug</a:t>
-            </a:r>
-          </a:p>
-        </p:txBody>
-      </p:sp>
-      <p:sp>
-        <p:nvSpPr>
-          <p:cNvPr id="3" name="Content Placeholder 2">
+              <a:t>Drug-Induced Total Mortality by County</a:t>
+            </a:r>
+          </a:p>
+        </p:txBody>
+      </p:sp>
+      <p:pic>
+        <p:nvPicPr>
+          <p:cNvPr id="5" name="Content Placeholder 4">
             <a:extLst>
               <a:ext uri="{FF2B5EF4-FFF2-40B4-BE49-F238E27FC236}">
-                <a16:creationId xmlns:a16="http://schemas.microsoft.com/office/drawing/2014/main" id="{A521F9F2-EC27-4859-9030-7912CDDA3BE6}"/>
+                <a16:creationId xmlns:a16="http://schemas.microsoft.com/office/drawing/2014/main" id="{E2EA595C-4A89-4C5B-A82C-48FA5ABEFE23}"/>
               </a:ext>
             </a:extLst>
           </p:cNvPr>
-          <p:cNvSpPr>
-            <a:spLocks noGrp="1"/>
-          </p:cNvSpPr>
+          <p:cNvPicPr>
+            <a:picLocks noGrp="1" noChangeAspect="1"/>
+          </p:cNvPicPr>
           <p:nvPr>
             <p:ph idx="1"/>
           </p:nvPr>
-        </p:nvSpPr>
-        <p:spPr/>
-        <p:txBody>
-          <a:bodyPr/>
-          <a:lstStyle/>
-          <a:p>
-            <a:endParaRPr lang="en-US"/>
-          </a:p>
-        </p:txBody>
-      </p:sp>
+        </p:nvPicPr>
+        <p:blipFill>
+          <a:blip r:embed="rId2"/>
+          <a:stretch>
+            <a:fillRect/>
+          </a:stretch>
+        </p:blipFill>
+        <p:spPr>
+          <a:xfrm>
+            <a:off x="1242297" y="1928070"/>
+            <a:ext cx="10148347" cy="4742833"/>
+          </a:xfrm>
+        </p:spPr>
+      </p:pic>
     </p:spTree>
     <p:extLst>
       <p:ext uri="{BB962C8B-B14F-4D97-AF65-F5344CB8AC3E}">
-        <p14:creationId xmlns:p14="http://schemas.microsoft.com/office/powerpoint/2010/main" val="2160349714"/>
+        <p14:creationId xmlns:p14="http://schemas.microsoft.com/office/powerpoint/2010/main" val="712921710"/>
       </p:ext>
     </p:extLst>
   </p:cSld>
@@ -7811,6 +7821,1854 @@
 </file>
 
 <file path=ppt/slides/slide11.xml><?xml version="1.0" encoding="utf-8"?>
+<p:sld xmlns:a="http://schemas.openxmlformats.org/drawingml/2006/main" xmlns:r="http://schemas.openxmlformats.org/officeDocument/2006/relationships" xmlns:p="http://schemas.openxmlformats.org/presentationml/2006/main">
+  <p:cSld>
+    <p:spTree>
+      <p:nvGrpSpPr>
+        <p:cNvPr id="1" name=""/>
+        <p:cNvGrpSpPr/>
+        <p:nvPr/>
+      </p:nvGrpSpPr>
+      <p:grpSpPr>
+        <a:xfrm>
+          <a:off x="0" y="0"/>
+          <a:ext cx="0" cy="0"/>
+          <a:chOff x="0" y="0"/>
+          <a:chExt cx="0" cy="0"/>
+        </a:xfrm>
+      </p:grpSpPr>
+      <p:sp>
+        <p:nvSpPr>
+          <p:cNvPr id="2" name="Title 1">
+            <a:extLst>
+              <a:ext uri="{FF2B5EF4-FFF2-40B4-BE49-F238E27FC236}">
+                <a16:creationId xmlns:a16="http://schemas.microsoft.com/office/drawing/2014/main" id="{705B2833-8695-4CE9-B8D7-AA855B1AF473}"/>
+              </a:ext>
+            </a:extLst>
+          </p:cNvPr>
+          <p:cNvSpPr>
+            <a:spLocks noGrp="1"/>
+          </p:cNvSpPr>
+          <p:nvPr>
+            <p:ph type="title"/>
+          </p:nvPr>
+        </p:nvSpPr>
+        <p:spPr/>
+        <p:txBody>
+          <a:bodyPr/>
+          <a:lstStyle/>
+          <a:p>
+            <a:r>
+              <a:rPr lang="en-US" dirty="0"/>
+              <a:t>Drug-Induced Mortality by County per 100K</a:t>
+            </a:r>
+          </a:p>
+        </p:txBody>
+      </p:sp>
+      <p:pic>
+        <p:nvPicPr>
+          <p:cNvPr id="5" name="Content Placeholder 4">
+            <a:extLst>
+              <a:ext uri="{FF2B5EF4-FFF2-40B4-BE49-F238E27FC236}">
+                <a16:creationId xmlns:a16="http://schemas.microsoft.com/office/drawing/2014/main" id="{95101428-BCFB-4FC4-96B2-C4DE4AF7981D}"/>
+              </a:ext>
+            </a:extLst>
+          </p:cNvPr>
+          <p:cNvPicPr>
+            <a:picLocks noGrp="1" noChangeAspect="1"/>
+          </p:cNvPicPr>
+          <p:nvPr>
+            <p:ph idx="1"/>
+          </p:nvPr>
+        </p:nvPicPr>
+        <p:blipFill>
+          <a:blip r:embed="rId2"/>
+          <a:stretch>
+            <a:fillRect/>
+          </a:stretch>
+        </p:blipFill>
+        <p:spPr>
+          <a:xfrm>
+            <a:off x="2125225" y="1905000"/>
+            <a:ext cx="8990188" cy="4625503"/>
+          </a:xfrm>
+        </p:spPr>
+      </p:pic>
+    </p:spTree>
+    <p:extLst>
+      <p:ext uri="{BB962C8B-B14F-4D97-AF65-F5344CB8AC3E}">
+        <p14:creationId xmlns:p14="http://schemas.microsoft.com/office/powerpoint/2010/main" val="934962227"/>
+      </p:ext>
+    </p:extLst>
+  </p:cSld>
+  <p:clrMapOvr>
+    <a:masterClrMapping/>
+  </p:clrMapOvr>
+</p:sld>
+</file>
+
+<file path=ppt/slides/slide12.xml><?xml version="1.0" encoding="utf-8"?>
+<p:sld xmlns:a="http://schemas.openxmlformats.org/drawingml/2006/main" xmlns:r="http://schemas.openxmlformats.org/officeDocument/2006/relationships" xmlns:p="http://schemas.openxmlformats.org/presentationml/2006/main">
+  <p:cSld>
+    <p:spTree>
+      <p:nvGrpSpPr>
+        <p:cNvPr id="1" name=""/>
+        <p:cNvGrpSpPr/>
+        <p:nvPr/>
+      </p:nvGrpSpPr>
+      <p:grpSpPr>
+        <a:xfrm>
+          <a:off x="0" y="0"/>
+          <a:ext cx="0" cy="0"/>
+          <a:chOff x="0" y="0"/>
+          <a:chExt cx="0" cy="0"/>
+        </a:xfrm>
+      </p:grpSpPr>
+      <p:sp>
+        <p:nvSpPr>
+          <p:cNvPr id="2" name="Title 1">
+            <a:extLst>
+              <a:ext uri="{FF2B5EF4-FFF2-40B4-BE49-F238E27FC236}">
+                <a16:creationId xmlns:a16="http://schemas.microsoft.com/office/drawing/2014/main" id="{57709140-C8B7-46DE-A33B-463B5EBE4341}"/>
+              </a:ext>
+            </a:extLst>
+          </p:cNvPr>
+          <p:cNvSpPr>
+            <a:spLocks noGrp="1"/>
+          </p:cNvSpPr>
+          <p:nvPr>
+            <p:ph type="title"/>
+          </p:nvPr>
+        </p:nvSpPr>
+        <p:spPr/>
+        <p:txBody>
+          <a:bodyPr>
+            <a:normAutofit/>
+          </a:bodyPr>
+          <a:lstStyle/>
+          <a:p>
+            <a:r>
+              <a:rPr lang="en-US" dirty="0"/>
+              <a:t>Drug-Induced Mortality by Gender, Race, and Sex</a:t>
+            </a:r>
+          </a:p>
+        </p:txBody>
+      </p:sp>
+      <p:pic>
+        <p:nvPicPr>
+          <p:cNvPr id="7" name="Content Placeholder 6">
+            <a:extLst>
+              <a:ext uri="{FF2B5EF4-FFF2-40B4-BE49-F238E27FC236}">
+                <a16:creationId xmlns:a16="http://schemas.microsoft.com/office/drawing/2014/main" id="{DDDE963A-EC7A-429A-A734-12256F46FA37}"/>
+              </a:ext>
+            </a:extLst>
+          </p:cNvPr>
+          <p:cNvPicPr>
+            <a:picLocks noGrp="1" noChangeAspect="1"/>
+          </p:cNvPicPr>
+          <p:nvPr>
+            <p:ph idx="1"/>
+          </p:nvPr>
+        </p:nvPicPr>
+        <p:blipFill>
+          <a:blip r:embed="rId2"/>
+          <a:stretch>
+            <a:fillRect/>
+          </a:stretch>
+        </p:blipFill>
+        <p:spPr>
+          <a:xfrm>
+            <a:off x="2592925" y="1704563"/>
+            <a:ext cx="7710572" cy="5209380"/>
+          </a:xfrm>
+        </p:spPr>
+      </p:pic>
+    </p:spTree>
+    <p:extLst>
+      <p:ext uri="{BB962C8B-B14F-4D97-AF65-F5344CB8AC3E}">
+        <p14:creationId xmlns:p14="http://schemas.microsoft.com/office/powerpoint/2010/main" val="956778109"/>
+      </p:ext>
+    </p:extLst>
+  </p:cSld>
+  <p:clrMapOvr>
+    <a:masterClrMapping/>
+  </p:clrMapOvr>
+</p:sld>
+</file>
+
+<file path=ppt/slides/slide13.xml><?xml version="1.0" encoding="utf-8"?>
+<p:sld xmlns:a="http://schemas.openxmlformats.org/drawingml/2006/main" xmlns:r="http://schemas.openxmlformats.org/officeDocument/2006/relationships" xmlns:p="http://schemas.openxmlformats.org/presentationml/2006/main">
+  <p:cSld>
+    <p:spTree>
+      <p:nvGrpSpPr>
+        <p:cNvPr id="1" name=""/>
+        <p:cNvGrpSpPr/>
+        <p:nvPr/>
+      </p:nvGrpSpPr>
+      <p:grpSpPr>
+        <a:xfrm>
+          <a:off x="0" y="0"/>
+          <a:ext cx="0" cy="0"/>
+          <a:chOff x="0" y="0"/>
+          <a:chExt cx="0" cy="0"/>
+        </a:xfrm>
+      </p:grpSpPr>
+      <p:sp>
+        <p:nvSpPr>
+          <p:cNvPr id="2" name="Title 1">
+            <a:extLst>
+              <a:ext uri="{FF2B5EF4-FFF2-40B4-BE49-F238E27FC236}">
+                <a16:creationId xmlns:a16="http://schemas.microsoft.com/office/drawing/2014/main" id="{57709140-C8B7-46DE-A33B-463B5EBE4341}"/>
+              </a:ext>
+            </a:extLst>
+          </p:cNvPr>
+          <p:cNvSpPr>
+            <a:spLocks noGrp="1"/>
+          </p:cNvSpPr>
+          <p:nvPr>
+            <p:ph type="title"/>
+          </p:nvPr>
+        </p:nvSpPr>
+        <p:spPr/>
+        <p:txBody>
+          <a:bodyPr>
+            <a:normAutofit/>
+          </a:bodyPr>
+          <a:lstStyle/>
+          <a:p>
+            <a:r>
+              <a:rPr lang="en-US" dirty="0"/>
+              <a:t>Drug-Induced Mortality by Gender, Race, and Sex</a:t>
+            </a:r>
+          </a:p>
+        </p:txBody>
+      </p:sp>
+      <p:sp>
+        <p:nvSpPr>
+          <p:cNvPr id="7" name="TextBox 6">
+            <a:extLst>
+              <a:ext uri="{FF2B5EF4-FFF2-40B4-BE49-F238E27FC236}">
+                <a16:creationId xmlns:a16="http://schemas.microsoft.com/office/drawing/2014/main" id="{5C5420DF-FD1F-40BD-9A95-C1A7513FC1FC}"/>
+              </a:ext>
+            </a:extLst>
+          </p:cNvPr>
+          <p:cNvSpPr txBox="1"/>
+          <p:nvPr/>
+        </p:nvSpPr>
+        <p:spPr>
+          <a:xfrm>
+            <a:off x="2818614" y="5976593"/>
+            <a:ext cx="7814821" cy="646331"/>
+          </a:xfrm>
+          <a:prstGeom prst="rect">
+            <a:avLst/>
+          </a:prstGeom>
+          <a:noFill/>
+        </p:spPr>
+        <p:txBody>
+          <a:bodyPr wrap="square" rtlCol="0">
+            <a:spAutoFit/>
+          </a:bodyPr>
+          <a:lstStyle/>
+          <a:p>
+            <a:r>
+              <a:rPr lang="en-US" dirty="0"/>
+              <a:t>Chi-Squared test on both cases gives a p-value of 0, rejecting null hypothesis. (Some groups are affected more than others).</a:t>
+            </a:r>
+          </a:p>
+        </p:txBody>
+      </p:sp>
+      <p:graphicFrame>
+        <p:nvGraphicFramePr>
+          <p:cNvPr id="10" name="Content Placeholder 9">
+            <a:extLst>
+              <a:ext uri="{FF2B5EF4-FFF2-40B4-BE49-F238E27FC236}">
+                <a16:creationId xmlns:a16="http://schemas.microsoft.com/office/drawing/2014/main" id="{94D85E88-287E-4D40-B1B0-903EACBF1A3F}"/>
+              </a:ext>
+            </a:extLst>
+          </p:cNvPr>
+          <p:cNvGraphicFramePr>
+            <a:graphicFrameLocks noGrp="1"/>
+          </p:cNvGraphicFramePr>
+          <p:nvPr>
+            <p:ph idx="1"/>
+            <p:extLst>
+              <p:ext uri="{D42A27DB-BD31-4B8C-83A1-F6EECF244321}">
+                <p14:modId xmlns:p14="http://schemas.microsoft.com/office/powerpoint/2010/main" val="3462426241"/>
+              </p:ext>
+            </p:extLst>
+          </p:nvPr>
+        </p:nvGraphicFramePr>
+        <p:xfrm>
+          <a:off x="2394408" y="1979629"/>
+          <a:ext cx="7711127" cy="3647108"/>
+        </p:xfrm>
+        <a:graphic>
+          <a:graphicData uri="http://schemas.openxmlformats.org/drawingml/2006/table">
+            <a:tbl>
+              <a:tblPr>
+                <a:tableStyleId>{5C22544A-7EE6-4342-B048-85BDC9FD1C3A}</a:tableStyleId>
+              </a:tblPr>
+              <a:tblGrid>
+                <a:gridCol w="1870624">
+                  <a:extLst>
+                    <a:ext uri="{9D8B030D-6E8A-4147-A177-3AD203B41FA5}">
+                      <a16:colId xmlns:a16="http://schemas.microsoft.com/office/drawing/2014/main" val="1047430046"/>
+                    </a:ext>
+                  </a:extLst>
+                </a:gridCol>
+                <a:gridCol w="1870624">
+                  <a:extLst>
+                    <a:ext uri="{9D8B030D-6E8A-4147-A177-3AD203B41FA5}">
+                      <a16:colId xmlns:a16="http://schemas.microsoft.com/office/drawing/2014/main" val="421138780"/>
+                    </a:ext>
+                  </a:extLst>
+                </a:gridCol>
+                <a:gridCol w="2099255">
+                  <a:extLst>
+                    <a:ext uri="{9D8B030D-6E8A-4147-A177-3AD203B41FA5}">
+                      <a16:colId xmlns:a16="http://schemas.microsoft.com/office/drawing/2014/main" val="2337895534"/>
+                    </a:ext>
+                  </a:extLst>
+                </a:gridCol>
+                <a:gridCol w="1870624">
+                  <a:extLst>
+                    <a:ext uri="{9D8B030D-6E8A-4147-A177-3AD203B41FA5}">
+                      <a16:colId xmlns:a16="http://schemas.microsoft.com/office/drawing/2014/main" val="3911636789"/>
+                    </a:ext>
+                  </a:extLst>
+                </a:gridCol>
+              </a:tblGrid>
+              <a:tr h="430672">
+                <a:tc>
+                  <a:txBody>
+                    <a:bodyPr/>
+                    <a:lstStyle/>
+                    <a:p>
+                      <a:pPr algn="ctr" fontAlgn="b"/>
+                      <a:r>
+                        <a:rPr lang="en-US" sz="1100" b="1" u="none" strike="noStrike" dirty="0">
+                          <a:effectLst/>
+                        </a:rPr>
+                        <a:t>Race</a:t>
+                      </a:r>
+                      <a:endParaRPr lang="en-US" sz="1100" b="1" i="0" u="none" strike="noStrike" dirty="0">
+                        <a:solidFill>
+                          <a:srgbClr val="000000"/>
+                        </a:solidFill>
+                        <a:effectLst/>
+                        <a:latin typeface="Calibri" panose="020F0502020204030204" pitchFamily="34" charset="0"/>
+                      </a:endParaRPr>
+                    </a:p>
+                  </a:txBody>
+                  <a:tcPr marL="6350" marR="6350" marT="6350" marB="0" anchor="b"/>
+                </a:tc>
+                <a:tc>
+                  <a:txBody>
+                    <a:bodyPr/>
+                    <a:lstStyle/>
+                    <a:p>
+                      <a:pPr algn="ctr" fontAlgn="b"/>
+                      <a:r>
+                        <a:rPr lang="en-US" sz="1100" b="1" u="none" strike="noStrike" dirty="0">
+                          <a:effectLst/>
+                        </a:rPr>
+                        <a:t>General Population</a:t>
+                      </a:r>
+                      <a:endParaRPr lang="en-US" sz="1100" b="1" i="0" u="none" strike="noStrike" dirty="0">
+                        <a:solidFill>
+                          <a:srgbClr val="000000"/>
+                        </a:solidFill>
+                        <a:effectLst/>
+                        <a:latin typeface="Calibri" panose="020F0502020204030204" pitchFamily="34" charset="0"/>
+                      </a:endParaRPr>
+                    </a:p>
+                  </a:txBody>
+                  <a:tcPr marL="6350" marR="6350" marT="6350" marB="0" anchor="b"/>
+                </a:tc>
+                <a:tc>
+                  <a:txBody>
+                    <a:bodyPr/>
+                    <a:lstStyle/>
+                    <a:p>
+                      <a:pPr algn="ctr" fontAlgn="b"/>
+                      <a:r>
+                        <a:rPr lang="en-US" sz="1100" b="1" u="none" strike="noStrike" dirty="0">
+                          <a:effectLst/>
+                        </a:rPr>
+                        <a:t>Drug Mortality</a:t>
+                      </a:r>
+                      <a:endParaRPr lang="en-US" sz="1100" b="1" i="0" u="none" strike="noStrike" dirty="0">
+                        <a:solidFill>
+                          <a:srgbClr val="000000"/>
+                        </a:solidFill>
+                        <a:effectLst/>
+                        <a:latin typeface="Calibri" panose="020F0502020204030204" pitchFamily="34" charset="0"/>
+                      </a:endParaRPr>
+                    </a:p>
+                  </a:txBody>
+                  <a:tcPr marL="6350" marR="6350" marT="6350" marB="0" anchor="b"/>
+                </a:tc>
+                <a:tc>
+                  <a:txBody>
+                    <a:bodyPr/>
+                    <a:lstStyle/>
+                    <a:p>
+                      <a:pPr algn="ctr" fontAlgn="b"/>
+                      <a:r>
+                        <a:rPr lang="en-US" sz="1100" b="1" u="none" strike="noStrike" dirty="0">
+                          <a:effectLst/>
+                        </a:rPr>
+                        <a:t>Estimate</a:t>
+                      </a:r>
+                      <a:endParaRPr lang="en-US" sz="1100" b="1" i="0" u="none" strike="noStrike" dirty="0">
+                        <a:solidFill>
+                          <a:srgbClr val="000000"/>
+                        </a:solidFill>
+                        <a:effectLst/>
+                        <a:latin typeface="Calibri" panose="020F0502020204030204" pitchFamily="34" charset="0"/>
+                      </a:endParaRPr>
+                    </a:p>
+                  </a:txBody>
+                  <a:tcPr marL="6350" marR="6350" marT="6350" marB="0" anchor="b"/>
+                </a:tc>
+                <a:extLst>
+                  <a:ext uri="{0D108BD9-81ED-4DB2-BD59-A6C34878D82A}">
+                    <a16:rowId xmlns:a16="http://schemas.microsoft.com/office/drawing/2014/main" val="1799548080"/>
+                  </a:ext>
+                </a:extLst>
+              </a:tr>
+              <a:tr h="232147">
+                <a:tc>
+                  <a:txBody>
+                    <a:bodyPr/>
+                    <a:lstStyle/>
+                    <a:p>
+                      <a:pPr algn="l" fontAlgn="b"/>
+                      <a:r>
+                        <a:rPr lang="en-US" sz="1100" u="none" strike="noStrike">
+                          <a:effectLst/>
+                        </a:rPr>
+                        <a:t>White</a:t>
+                      </a:r>
+                      <a:endParaRPr lang="en-US" sz="1100" b="0" i="0" u="none" strike="noStrike">
+                        <a:solidFill>
+                          <a:srgbClr val="000000"/>
+                        </a:solidFill>
+                        <a:effectLst/>
+                        <a:latin typeface="Calibri" panose="020F0502020204030204" pitchFamily="34" charset="0"/>
+                      </a:endParaRPr>
+                    </a:p>
+                  </a:txBody>
+                  <a:tcPr marL="6350" marR="6350" marT="6350" marB="0" anchor="b"/>
+                </a:tc>
+                <a:tc>
+                  <a:txBody>
+                    <a:bodyPr/>
+                    <a:lstStyle/>
+                    <a:p>
+                      <a:pPr algn="r" fontAlgn="b"/>
+                      <a:r>
+                        <a:rPr lang="en-US" sz="1100" u="none" strike="noStrike">
+                          <a:effectLst/>
+                        </a:rPr>
+                        <a:t>71.20%</a:t>
+                      </a:r>
+                      <a:endParaRPr lang="en-US" sz="1100" b="0" i="0" u="none" strike="noStrike">
+                        <a:solidFill>
+                          <a:srgbClr val="000000"/>
+                        </a:solidFill>
+                        <a:effectLst/>
+                        <a:latin typeface="Calibri" panose="020F0502020204030204" pitchFamily="34" charset="0"/>
+                      </a:endParaRPr>
+                    </a:p>
+                  </a:txBody>
+                  <a:tcPr marL="6350" marR="6350" marT="6350" marB="0" anchor="b"/>
+                </a:tc>
+                <a:tc>
+                  <a:txBody>
+                    <a:bodyPr/>
+                    <a:lstStyle/>
+                    <a:p>
+                      <a:pPr algn="r" fontAlgn="b"/>
+                      <a:r>
+                        <a:rPr lang="en-US" sz="1100" u="none" strike="noStrike">
+                          <a:effectLst/>
+                        </a:rPr>
+                        <a:t>3242</a:t>
+                      </a:r>
+                      <a:endParaRPr lang="en-US" sz="1100" b="0" i="0" u="none" strike="noStrike">
+                        <a:solidFill>
+                          <a:srgbClr val="000000"/>
+                        </a:solidFill>
+                        <a:effectLst/>
+                        <a:latin typeface="Calibri" panose="020F0502020204030204" pitchFamily="34" charset="0"/>
+                      </a:endParaRPr>
+                    </a:p>
+                  </a:txBody>
+                  <a:tcPr marL="6350" marR="6350" marT="6350" marB="0" anchor="b"/>
+                </a:tc>
+                <a:tc>
+                  <a:txBody>
+                    <a:bodyPr/>
+                    <a:lstStyle/>
+                    <a:p>
+                      <a:pPr algn="r" fontAlgn="b"/>
+                      <a:r>
+                        <a:rPr lang="en-US" sz="1100" u="none" strike="noStrike">
+                          <a:effectLst/>
+                        </a:rPr>
+                        <a:t>2904.248</a:t>
+                      </a:r>
+                      <a:endParaRPr lang="en-US" sz="1100" b="0" i="0" u="none" strike="noStrike">
+                        <a:solidFill>
+                          <a:srgbClr val="000000"/>
+                        </a:solidFill>
+                        <a:effectLst/>
+                        <a:latin typeface="Calibri" panose="020F0502020204030204" pitchFamily="34" charset="0"/>
+                      </a:endParaRPr>
+                    </a:p>
+                  </a:txBody>
+                  <a:tcPr marL="6350" marR="6350" marT="6350" marB="0" anchor="b"/>
+                </a:tc>
+                <a:extLst>
+                  <a:ext uri="{0D108BD9-81ED-4DB2-BD59-A6C34878D82A}">
+                    <a16:rowId xmlns:a16="http://schemas.microsoft.com/office/drawing/2014/main" val="3448598783"/>
+                  </a:ext>
+                </a:extLst>
+              </a:tr>
+              <a:tr h="232147">
+                <a:tc>
+                  <a:txBody>
+                    <a:bodyPr/>
+                    <a:lstStyle/>
+                    <a:p>
+                      <a:pPr algn="l" fontAlgn="b"/>
+                      <a:r>
+                        <a:rPr lang="en-US" sz="1100" u="none" strike="noStrike">
+                          <a:effectLst/>
+                        </a:rPr>
+                        <a:t>Hispanic, White</a:t>
+                      </a:r>
+                      <a:endParaRPr lang="en-US" sz="1100" b="0" i="0" u="none" strike="noStrike">
+                        <a:solidFill>
+                          <a:srgbClr val="000000"/>
+                        </a:solidFill>
+                        <a:effectLst/>
+                        <a:latin typeface="Calibri" panose="020F0502020204030204" pitchFamily="34" charset="0"/>
+                      </a:endParaRPr>
+                    </a:p>
+                  </a:txBody>
+                  <a:tcPr marL="6350" marR="6350" marT="6350" marB="0" anchor="b"/>
+                </a:tc>
+                <a:tc>
+                  <a:txBody>
+                    <a:bodyPr/>
+                    <a:lstStyle/>
+                    <a:p>
+                      <a:pPr algn="r" fontAlgn="b"/>
+                      <a:r>
+                        <a:rPr lang="en-US" sz="1100" u="none" strike="noStrike">
+                          <a:effectLst/>
+                        </a:rPr>
+                        <a:t>6.30%</a:t>
+                      </a:r>
+                      <a:endParaRPr lang="en-US" sz="1100" b="0" i="0" u="none" strike="noStrike">
+                        <a:solidFill>
+                          <a:srgbClr val="000000"/>
+                        </a:solidFill>
+                        <a:effectLst/>
+                        <a:latin typeface="Calibri" panose="020F0502020204030204" pitchFamily="34" charset="0"/>
+                      </a:endParaRPr>
+                    </a:p>
+                  </a:txBody>
+                  <a:tcPr marL="6350" marR="6350" marT="6350" marB="0" anchor="b"/>
+                </a:tc>
+                <a:tc>
+                  <a:txBody>
+                    <a:bodyPr/>
+                    <a:lstStyle/>
+                    <a:p>
+                      <a:pPr algn="r" fontAlgn="b"/>
+                      <a:r>
+                        <a:rPr lang="en-US" sz="1100" u="none" strike="noStrike">
+                          <a:effectLst/>
+                        </a:rPr>
+                        <a:t>432</a:t>
+                      </a:r>
+                      <a:endParaRPr lang="en-US" sz="1100" b="0" i="0" u="none" strike="noStrike">
+                        <a:solidFill>
+                          <a:srgbClr val="000000"/>
+                        </a:solidFill>
+                        <a:effectLst/>
+                        <a:latin typeface="Calibri" panose="020F0502020204030204" pitchFamily="34" charset="0"/>
+                      </a:endParaRPr>
+                    </a:p>
+                  </a:txBody>
+                  <a:tcPr marL="6350" marR="6350" marT="6350" marB="0" anchor="b"/>
+                </a:tc>
+                <a:tc>
+                  <a:txBody>
+                    <a:bodyPr/>
+                    <a:lstStyle/>
+                    <a:p>
+                      <a:pPr algn="r" fontAlgn="b"/>
+                      <a:r>
+                        <a:rPr lang="en-US" sz="1100" u="none" strike="noStrike">
+                          <a:effectLst/>
+                        </a:rPr>
+                        <a:t>256.977</a:t>
+                      </a:r>
+                      <a:endParaRPr lang="en-US" sz="1100" b="0" i="0" u="none" strike="noStrike">
+                        <a:solidFill>
+                          <a:srgbClr val="000000"/>
+                        </a:solidFill>
+                        <a:effectLst/>
+                        <a:latin typeface="Calibri" panose="020F0502020204030204" pitchFamily="34" charset="0"/>
+                      </a:endParaRPr>
+                    </a:p>
+                  </a:txBody>
+                  <a:tcPr marL="6350" marR="6350" marT="6350" marB="0" anchor="b"/>
+                </a:tc>
+                <a:extLst>
+                  <a:ext uri="{0D108BD9-81ED-4DB2-BD59-A6C34878D82A}">
+                    <a16:rowId xmlns:a16="http://schemas.microsoft.com/office/drawing/2014/main" val="2105227070"/>
+                  </a:ext>
+                </a:extLst>
+              </a:tr>
+              <a:tr h="232147">
+                <a:tc>
+                  <a:txBody>
+                    <a:bodyPr/>
+                    <a:lstStyle/>
+                    <a:p>
+                      <a:pPr algn="l" fontAlgn="b"/>
+                      <a:r>
+                        <a:rPr lang="en-US" sz="1100" u="none" strike="noStrike">
+                          <a:effectLst/>
+                        </a:rPr>
+                        <a:t>Black</a:t>
+                      </a:r>
+                      <a:endParaRPr lang="en-US" sz="1100" b="0" i="0" u="none" strike="noStrike">
+                        <a:solidFill>
+                          <a:srgbClr val="000000"/>
+                        </a:solidFill>
+                        <a:effectLst/>
+                        <a:latin typeface="Calibri" panose="020F0502020204030204" pitchFamily="34" charset="0"/>
+                      </a:endParaRPr>
+                    </a:p>
+                  </a:txBody>
+                  <a:tcPr marL="6350" marR="6350" marT="6350" marB="0" anchor="b"/>
+                </a:tc>
+                <a:tc>
+                  <a:txBody>
+                    <a:bodyPr/>
+                    <a:lstStyle/>
+                    <a:p>
+                      <a:pPr algn="r" fontAlgn="b"/>
+                      <a:r>
+                        <a:rPr lang="en-US" sz="1100" u="none" strike="noStrike">
+                          <a:effectLst/>
+                        </a:rPr>
+                        <a:t>9.40%</a:t>
+                      </a:r>
+                      <a:endParaRPr lang="en-US" sz="1100" b="0" i="0" u="none" strike="noStrike">
+                        <a:solidFill>
+                          <a:srgbClr val="000000"/>
+                        </a:solidFill>
+                        <a:effectLst/>
+                        <a:latin typeface="Calibri" panose="020F0502020204030204" pitchFamily="34" charset="0"/>
+                      </a:endParaRPr>
+                    </a:p>
+                  </a:txBody>
+                  <a:tcPr marL="6350" marR="6350" marT="6350" marB="0" anchor="b"/>
+                </a:tc>
+                <a:tc>
+                  <a:txBody>
+                    <a:bodyPr/>
+                    <a:lstStyle/>
+                    <a:p>
+                      <a:pPr algn="r" fontAlgn="b"/>
+                      <a:r>
+                        <a:rPr lang="en-US" sz="1100" u="none" strike="noStrike">
+                          <a:effectLst/>
+                        </a:rPr>
+                        <a:t>329</a:t>
+                      </a:r>
+                      <a:endParaRPr lang="en-US" sz="1100" b="0" i="0" u="none" strike="noStrike">
+                        <a:solidFill>
+                          <a:srgbClr val="000000"/>
+                        </a:solidFill>
+                        <a:effectLst/>
+                        <a:latin typeface="Calibri" panose="020F0502020204030204" pitchFamily="34" charset="0"/>
+                      </a:endParaRPr>
+                    </a:p>
+                  </a:txBody>
+                  <a:tcPr marL="6350" marR="6350" marT="6350" marB="0" anchor="b"/>
+                </a:tc>
+                <a:tc>
+                  <a:txBody>
+                    <a:bodyPr/>
+                    <a:lstStyle/>
+                    <a:p>
+                      <a:pPr algn="r" fontAlgn="b"/>
+                      <a:r>
+                        <a:rPr lang="en-US" sz="1100" u="none" strike="noStrike">
+                          <a:effectLst/>
+                        </a:rPr>
+                        <a:t>383.426</a:t>
+                      </a:r>
+                      <a:endParaRPr lang="en-US" sz="1100" b="0" i="0" u="none" strike="noStrike">
+                        <a:solidFill>
+                          <a:srgbClr val="000000"/>
+                        </a:solidFill>
+                        <a:effectLst/>
+                        <a:latin typeface="Calibri" panose="020F0502020204030204" pitchFamily="34" charset="0"/>
+                      </a:endParaRPr>
+                    </a:p>
+                  </a:txBody>
+                  <a:tcPr marL="6350" marR="6350" marT="6350" marB="0" anchor="b"/>
+                </a:tc>
+                <a:extLst>
+                  <a:ext uri="{0D108BD9-81ED-4DB2-BD59-A6C34878D82A}">
+                    <a16:rowId xmlns:a16="http://schemas.microsoft.com/office/drawing/2014/main" val="2125538796"/>
+                  </a:ext>
+                </a:extLst>
+              </a:tr>
+              <a:tr h="232147">
+                <a:tc>
+                  <a:txBody>
+                    <a:bodyPr/>
+                    <a:lstStyle/>
+                    <a:p>
+                      <a:pPr algn="l" fontAlgn="b"/>
+                      <a:r>
+                        <a:rPr lang="en-US" sz="1100" u="none" strike="noStrike">
+                          <a:effectLst/>
+                        </a:rPr>
+                        <a:t>Hispanic, Black</a:t>
+                      </a:r>
+                      <a:endParaRPr lang="en-US" sz="1100" b="0" i="0" u="none" strike="noStrike">
+                        <a:solidFill>
+                          <a:srgbClr val="000000"/>
+                        </a:solidFill>
+                        <a:effectLst/>
+                        <a:latin typeface="Calibri" panose="020F0502020204030204" pitchFamily="34" charset="0"/>
+                      </a:endParaRPr>
+                    </a:p>
+                  </a:txBody>
+                  <a:tcPr marL="6350" marR="6350" marT="6350" marB="0" anchor="b"/>
+                </a:tc>
+                <a:tc>
+                  <a:txBody>
+                    <a:bodyPr/>
+                    <a:lstStyle/>
+                    <a:p>
+                      <a:pPr algn="r" fontAlgn="b"/>
+                      <a:r>
+                        <a:rPr lang="en-US" sz="1100" u="none" strike="noStrike">
+                          <a:effectLst/>
+                        </a:rPr>
+                        <a:t>0.80%</a:t>
+                      </a:r>
+                      <a:endParaRPr lang="en-US" sz="1100" b="0" i="0" u="none" strike="noStrike">
+                        <a:solidFill>
+                          <a:srgbClr val="000000"/>
+                        </a:solidFill>
+                        <a:effectLst/>
+                        <a:latin typeface="Calibri" panose="020F0502020204030204" pitchFamily="34" charset="0"/>
+                      </a:endParaRPr>
+                    </a:p>
+                  </a:txBody>
+                  <a:tcPr marL="6350" marR="6350" marT="6350" marB="0" anchor="b"/>
+                </a:tc>
+                <a:tc>
+                  <a:txBody>
+                    <a:bodyPr/>
+                    <a:lstStyle/>
+                    <a:p>
+                      <a:pPr algn="r" fontAlgn="b"/>
+                      <a:r>
+                        <a:rPr lang="en-US" sz="1100" u="none" strike="noStrike">
+                          <a:effectLst/>
+                        </a:rPr>
+                        <a:t>17</a:t>
+                      </a:r>
+                      <a:endParaRPr lang="en-US" sz="1100" b="0" i="0" u="none" strike="noStrike">
+                        <a:solidFill>
+                          <a:srgbClr val="000000"/>
+                        </a:solidFill>
+                        <a:effectLst/>
+                        <a:latin typeface="Calibri" panose="020F0502020204030204" pitchFamily="34" charset="0"/>
+                      </a:endParaRPr>
+                    </a:p>
+                  </a:txBody>
+                  <a:tcPr marL="6350" marR="6350" marT="6350" marB="0" anchor="b"/>
+                </a:tc>
+                <a:tc>
+                  <a:txBody>
+                    <a:bodyPr/>
+                    <a:lstStyle/>
+                    <a:p>
+                      <a:pPr algn="r" fontAlgn="b"/>
+                      <a:r>
+                        <a:rPr lang="en-US" sz="1100" u="none" strike="noStrike">
+                          <a:effectLst/>
+                        </a:rPr>
+                        <a:t>32.632</a:t>
+                      </a:r>
+                      <a:endParaRPr lang="en-US" sz="1100" b="0" i="0" u="none" strike="noStrike">
+                        <a:solidFill>
+                          <a:srgbClr val="000000"/>
+                        </a:solidFill>
+                        <a:effectLst/>
+                        <a:latin typeface="Calibri" panose="020F0502020204030204" pitchFamily="34" charset="0"/>
+                      </a:endParaRPr>
+                    </a:p>
+                  </a:txBody>
+                  <a:tcPr marL="6350" marR="6350" marT="6350" marB="0" anchor="b"/>
+                </a:tc>
+                <a:extLst>
+                  <a:ext uri="{0D108BD9-81ED-4DB2-BD59-A6C34878D82A}">
+                    <a16:rowId xmlns:a16="http://schemas.microsoft.com/office/drawing/2014/main" val="3179918076"/>
+                  </a:ext>
+                </a:extLst>
+              </a:tr>
+              <a:tr h="232147">
+                <a:tc>
+                  <a:txBody>
+                    <a:bodyPr/>
+                    <a:lstStyle/>
+                    <a:p>
+                      <a:pPr algn="l" fontAlgn="b"/>
+                      <a:r>
+                        <a:rPr lang="en-US" sz="1100" u="none" strike="noStrike">
+                          <a:effectLst/>
+                        </a:rPr>
+                        <a:t>Asian</a:t>
+                      </a:r>
+                      <a:endParaRPr lang="en-US" sz="1100" b="0" i="0" u="none" strike="noStrike">
+                        <a:solidFill>
+                          <a:srgbClr val="000000"/>
+                        </a:solidFill>
+                        <a:effectLst/>
+                        <a:latin typeface="Calibri" panose="020F0502020204030204" pitchFamily="34" charset="0"/>
+                      </a:endParaRPr>
+                    </a:p>
+                  </a:txBody>
+                  <a:tcPr marL="6350" marR="6350" marT="6350" marB="0" anchor="b"/>
+                </a:tc>
+                <a:tc>
+                  <a:txBody>
+                    <a:bodyPr/>
+                    <a:lstStyle/>
+                    <a:p>
+                      <a:pPr algn="r" fontAlgn="b"/>
+                      <a:r>
+                        <a:rPr lang="en-US" sz="1100" u="none" strike="noStrike">
+                          <a:effectLst/>
+                        </a:rPr>
+                        <a:t>3.80%</a:t>
+                      </a:r>
+                      <a:endParaRPr lang="en-US" sz="1100" b="0" i="0" u="none" strike="noStrike">
+                        <a:solidFill>
+                          <a:srgbClr val="000000"/>
+                        </a:solidFill>
+                        <a:effectLst/>
+                        <a:latin typeface="Calibri" panose="020F0502020204030204" pitchFamily="34" charset="0"/>
+                      </a:endParaRPr>
+                    </a:p>
+                  </a:txBody>
+                  <a:tcPr marL="6350" marR="6350" marT="6350" marB="0" anchor="b"/>
+                </a:tc>
+                <a:tc>
+                  <a:txBody>
+                    <a:bodyPr/>
+                    <a:lstStyle/>
+                    <a:p>
+                      <a:pPr algn="r" fontAlgn="b"/>
+                      <a:r>
+                        <a:rPr lang="en-US" sz="1100" u="none" strike="noStrike">
+                          <a:effectLst/>
+                        </a:rPr>
+                        <a:t>14</a:t>
+                      </a:r>
+                      <a:endParaRPr lang="en-US" sz="1100" b="0" i="0" u="none" strike="noStrike">
+                        <a:solidFill>
+                          <a:srgbClr val="000000"/>
+                        </a:solidFill>
+                        <a:effectLst/>
+                        <a:latin typeface="Calibri" panose="020F0502020204030204" pitchFamily="34" charset="0"/>
+                      </a:endParaRPr>
+                    </a:p>
+                  </a:txBody>
+                  <a:tcPr marL="6350" marR="6350" marT="6350" marB="0" anchor="b"/>
+                </a:tc>
+                <a:tc>
+                  <a:txBody>
+                    <a:bodyPr/>
+                    <a:lstStyle/>
+                    <a:p>
+                      <a:pPr algn="r" fontAlgn="b"/>
+                      <a:r>
+                        <a:rPr lang="en-US" sz="1100" u="none" strike="noStrike">
+                          <a:effectLst/>
+                        </a:rPr>
+                        <a:t>155.002</a:t>
+                      </a:r>
+                      <a:endParaRPr lang="en-US" sz="1100" b="0" i="0" u="none" strike="noStrike">
+                        <a:solidFill>
+                          <a:srgbClr val="000000"/>
+                        </a:solidFill>
+                        <a:effectLst/>
+                        <a:latin typeface="Calibri" panose="020F0502020204030204" pitchFamily="34" charset="0"/>
+                      </a:endParaRPr>
+                    </a:p>
+                  </a:txBody>
+                  <a:tcPr marL="6350" marR="6350" marT="6350" marB="0" anchor="b"/>
+                </a:tc>
+                <a:extLst>
+                  <a:ext uri="{0D108BD9-81ED-4DB2-BD59-A6C34878D82A}">
+                    <a16:rowId xmlns:a16="http://schemas.microsoft.com/office/drawing/2014/main" val="3860567062"/>
+                  </a:ext>
+                </a:extLst>
+              </a:tr>
+              <a:tr h="232147">
+                <a:tc>
+                  <a:txBody>
+                    <a:bodyPr/>
+                    <a:lstStyle/>
+                    <a:p>
+                      <a:pPr algn="l" fontAlgn="b"/>
+                      <a:r>
+                        <a:rPr lang="en-US" sz="1100" u="none" strike="noStrike">
+                          <a:effectLst/>
+                        </a:rPr>
+                        <a:t>Other</a:t>
+                      </a:r>
+                      <a:endParaRPr lang="en-US" sz="1100" b="0" i="0" u="none" strike="noStrike">
+                        <a:solidFill>
+                          <a:srgbClr val="000000"/>
+                        </a:solidFill>
+                        <a:effectLst/>
+                        <a:latin typeface="Calibri" panose="020F0502020204030204" pitchFamily="34" charset="0"/>
+                      </a:endParaRPr>
+                    </a:p>
+                  </a:txBody>
+                  <a:tcPr marL="6350" marR="6350" marT="6350" marB="0" anchor="b"/>
+                </a:tc>
+                <a:tc>
+                  <a:txBody>
+                    <a:bodyPr/>
+                    <a:lstStyle/>
+                    <a:p>
+                      <a:pPr algn="r" fontAlgn="b"/>
+                      <a:r>
+                        <a:rPr lang="en-US" sz="1100" u="none" strike="noStrike">
+                          <a:effectLst/>
+                        </a:rPr>
+                        <a:t>8.50%</a:t>
+                      </a:r>
+                      <a:endParaRPr lang="en-US" sz="1100" b="0" i="0" u="none" strike="noStrike">
+                        <a:solidFill>
+                          <a:srgbClr val="000000"/>
+                        </a:solidFill>
+                        <a:effectLst/>
+                        <a:latin typeface="Calibri" panose="020F0502020204030204" pitchFamily="34" charset="0"/>
+                      </a:endParaRPr>
+                    </a:p>
+                  </a:txBody>
+                  <a:tcPr marL="6350" marR="6350" marT="6350" marB="0" anchor="b"/>
+                </a:tc>
+                <a:tc>
+                  <a:txBody>
+                    <a:bodyPr/>
+                    <a:lstStyle/>
+                    <a:p>
+                      <a:pPr algn="r" fontAlgn="b"/>
+                      <a:r>
+                        <a:rPr lang="en-US" sz="1100" u="none" strike="noStrike">
+                          <a:effectLst/>
+                        </a:rPr>
+                        <a:t>45</a:t>
+                      </a:r>
+                      <a:endParaRPr lang="en-US" sz="1100" b="0" i="0" u="none" strike="noStrike">
+                        <a:solidFill>
+                          <a:srgbClr val="000000"/>
+                        </a:solidFill>
+                        <a:effectLst/>
+                        <a:latin typeface="Calibri" panose="020F0502020204030204" pitchFamily="34" charset="0"/>
+                      </a:endParaRPr>
+                    </a:p>
+                  </a:txBody>
+                  <a:tcPr marL="6350" marR="6350" marT="6350" marB="0" anchor="b"/>
+                </a:tc>
+                <a:tc>
+                  <a:txBody>
+                    <a:bodyPr/>
+                    <a:lstStyle/>
+                    <a:p>
+                      <a:pPr algn="r" fontAlgn="b"/>
+                      <a:r>
+                        <a:rPr lang="en-US" sz="1100" u="none" strike="noStrike">
+                          <a:effectLst/>
+                        </a:rPr>
+                        <a:t>346.715</a:t>
+                      </a:r>
+                      <a:endParaRPr lang="en-US" sz="1100" b="0" i="0" u="none" strike="noStrike">
+                        <a:solidFill>
+                          <a:srgbClr val="000000"/>
+                        </a:solidFill>
+                        <a:effectLst/>
+                        <a:latin typeface="Calibri" panose="020F0502020204030204" pitchFamily="34" charset="0"/>
+                      </a:endParaRPr>
+                    </a:p>
+                  </a:txBody>
+                  <a:tcPr marL="6350" marR="6350" marT="6350" marB="0" anchor="b"/>
+                </a:tc>
+                <a:extLst>
+                  <a:ext uri="{0D108BD9-81ED-4DB2-BD59-A6C34878D82A}">
+                    <a16:rowId xmlns:a16="http://schemas.microsoft.com/office/drawing/2014/main" val="1979520957"/>
+                  </a:ext>
+                </a:extLst>
+              </a:tr>
+              <a:tr h="232147">
+                <a:tc>
+                  <a:txBody>
+                    <a:bodyPr/>
+                    <a:lstStyle/>
+                    <a:p>
+                      <a:pPr algn="l" fontAlgn="b"/>
+                      <a:endParaRPr lang="en-US" sz="1100" b="0" i="0" u="none" strike="noStrike">
+                        <a:solidFill>
+                          <a:srgbClr val="000000"/>
+                        </a:solidFill>
+                        <a:effectLst/>
+                        <a:latin typeface="Calibri" panose="020F0502020204030204" pitchFamily="34" charset="0"/>
+                      </a:endParaRPr>
+                    </a:p>
+                  </a:txBody>
+                  <a:tcPr marL="6350" marR="6350" marT="6350" marB="0" anchor="b"/>
+                </a:tc>
+                <a:tc>
+                  <a:txBody>
+                    <a:bodyPr/>
+                    <a:lstStyle/>
+                    <a:p>
+                      <a:pPr algn="l" fontAlgn="b"/>
+                      <a:endParaRPr lang="en-US" sz="1100" b="0" i="0" u="none" strike="noStrike">
+                        <a:solidFill>
+                          <a:srgbClr val="000000"/>
+                        </a:solidFill>
+                        <a:effectLst/>
+                        <a:latin typeface="Calibri" panose="020F0502020204030204" pitchFamily="34" charset="0"/>
+                      </a:endParaRPr>
+                    </a:p>
+                  </a:txBody>
+                  <a:tcPr marL="6350" marR="6350" marT="6350" marB="0" anchor="b"/>
+                </a:tc>
+                <a:tc>
+                  <a:txBody>
+                    <a:bodyPr/>
+                    <a:lstStyle/>
+                    <a:p>
+                      <a:pPr algn="l" fontAlgn="b"/>
+                      <a:endParaRPr lang="en-US" sz="1100" b="0" i="0" u="none" strike="noStrike">
+                        <a:solidFill>
+                          <a:srgbClr val="000000"/>
+                        </a:solidFill>
+                        <a:effectLst/>
+                        <a:latin typeface="Calibri" panose="020F0502020204030204" pitchFamily="34" charset="0"/>
+                      </a:endParaRPr>
+                    </a:p>
+                  </a:txBody>
+                  <a:tcPr marL="6350" marR="6350" marT="6350" marB="0" anchor="b"/>
+                </a:tc>
+                <a:tc>
+                  <a:txBody>
+                    <a:bodyPr/>
+                    <a:lstStyle/>
+                    <a:p>
+                      <a:pPr algn="l" fontAlgn="b"/>
+                      <a:endParaRPr lang="en-US" sz="1100" b="0" i="0" u="none" strike="noStrike">
+                        <a:solidFill>
+                          <a:srgbClr val="000000"/>
+                        </a:solidFill>
+                        <a:effectLst/>
+                        <a:latin typeface="Calibri" panose="020F0502020204030204" pitchFamily="34" charset="0"/>
+                      </a:endParaRPr>
+                    </a:p>
+                  </a:txBody>
+                  <a:tcPr marL="6350" marR="6350" marT="6350" marB="0" anchor="b"/>
+                </a:tc>
+                <a:extLst>
+                  <a:ext uri="{0D108BD9-81ED-4DB2-BD59-A6C34878D82A}">
+                    <a16:rowId xmlns:a16="http://schemas.microsoft.com/office/drawing/2014/main" val="3429188303"/>
+                  </a:ext>
+                </a:extLst>
+              </a:tr>
+              <a:tr h="430672">
+                <a:tc>
+                  <a:txBody>
+                    <a:bodyPr/>
+                    <a:lstStyle/>
+                    <a:p>
+                      <a:pPr algn="ctr" fontAlgn="b"/>
+                      <a:r>
+                        <a:rPr lang="en-US" sz="1100" b="1" u="none" strike="noStrike" dirty="0">
+                          <a:effectLst/>
+                        </a:rPr>
+                        <a:t>Age Group</a:t>
+                      </a:r>
+                      <a:endParaRPr lang="en-US" sz="1100" b="1" i="0" u="none" strike="noStrike" dirty="0">
+                        <a:solidFill>
+                          <a:srgbClr val="000000"/>
+                        </a:solidFill>
+                        <a:effectLst/>
+                        <a:latin typeface="Calibri" panose="020F0502020204030204" pitchFamily="34" charset="0"/>
+                      </a:endParaRPr>
+                    </a:p>
+                  </a:txBody>
+                  <a:tcPr marL="6350" marR="6350" marT="6350" marB="0" anchor="b"/>
+                </a:tc>
+                <a:tc>
+                  <a:txBody>
+                    <a:bodyPr/>
+                    <a:lstStyle/>
+                    <a:p>
+                      <a:pPr algn="ctr" fontAlgn="b"/>
+                      <a:r>
+                        <a:rPr lang="en-US" sz="1100" b="1" u="none" strike="noStrike">
+                          <a:effectLst/>
+                        </a:rPr>
+                        <a:t>Male Population</a:t>
+                      </a:r>
+                      <a:endParaRPr lang="en-US" sz="1100" b="1" i="0" u="none" strike="noStrike">
+                        <a:solidFill>
+                          <a:srgbClr val="000000"/>
+                        </a:solidFill>
+                        <a:effectLst/>
+                        <a:latin typeface="Calibri" panose="020F0502020204030204" pitchFamily="34" charset="0"/>
+                      </a:endParaRPr>
+                    </a:p>
+                  </a:txBody>
+                  <a:tcPr marL="6350" marR="6350" marT="6350" marB="0" anchor="b"/>
+                </a:tc>
+                <a:tc>
+                  <a:txBody>
+                    <a:bodyPr/>
+                    <a:lstStyle/>
+                    <a:p>
+                      <a:pPr algn="ctr" fontAlgn="b"/>
+                      <a:r>
+                        <a:rPr lang="en-US" sz="1100" b="1" u="none" strike="noStrike" dirty="0">
+                          <a:effectLst/>
+                        </a:rPr>
+                        <a:t>Male Drug Mortality</a:t>
+                      </a:r>
+                      <a:endParaRPr lang="en-US" sz="1100" b="1" i="0" u="none" strike="noStrike" dirty="0">
+                        <a:solidFill>
+                          <a:srgbClr val="000000"/>
+                        </a:solidFill>
+                        <a:effectLst/>
+                        <a:latin typeface="Calibri" panose="020F0502020204030204" pitchFamily="34" charset="0"/>
+                      </a:endParaRPr>
+                    </a:p>
+                  </a:txBody>
+                  <a:tcPr marL="6350" marR="6350" marT="6350" marB="0" anchor="b"/>
+                </a:tc>
+                <a:tc>
+                  <a:txBody>
+                    <a:bodyPr/>
+                    <a:lstStyle/>
+                    <a:p>
+                      <a:pPr algn="ctr" fontAlgn="b"/>
+                      <a:r>
+                        <a:rPr lang="en-US" sz="1100" b="1" u="none" strike="noStrike" dirty="0">
+                          <a:effectLst/>
+                        </a:rPr>
+                        <a:t>Estimate</a:t>
+                      </a:r>
+                      <a:endParaRPr lang="en-US" sz="1100" b="1" i="0" u="none" strike="noStrike" dirty="0">
+                        <a:solidFill>
+                          <a:srgbClr val="000000"/>
+                        </a:solidFill>
+                        <a:effectLst/>
+                        <a:latin typeface="Calibri" panose="020F0502020204030204" pitchFamily="34" charset="0"/>
+                      </a:endParaRPr>
+                    </a:p>
+                  </a:txBody>
+                  <a:tcPr marL="6350" marR="6350" marT="6350" marB="0" anchor="b"/>
+                </a:tc>
+                <a:extLst>
+                  <a:ext uri="{0D108BD9-81ED-4DB2-BD59-A6C34878D82A}">
+                    <a16:rowId xmlns:a16="http://schemas.microsoft.com/office/drawing/2014/main" val="882860184"/>
+                  </a:ext>
+                </a:extLst>
+              </a:tr>
+              <a:tr h="232147">
+                <a:tc>
+                  <a:txBody>
+                    <a:bodyPr/>
+                    <a:lstStyle/>
+                    <a:p>
+                      <a:pPr algn="l" fontAlgn="b"/>
+                      <a:r>
+                        <a:rPr lang="en-US" sz="1100" u="none" strike="noStrike">
+                          <a:effectLst/>
+                        </a:rPr>
+                        <a:t>20-29</a:t>
+                      </a:r>
+                      <a:endParaRPr lang="en-US" sz="1100" b="0" i="0" u="none" strike="noStrike">
+                        <a:solidFill>
+                          <a:srgbClr val="000000"/>
+                        </a:solidFill>
+                        <a:effectLst/>
+                        <a:latin typeface="Calibri" panose="020F0502020204030204" pitchFamily="34" charset="0"/>
+                      </a:endParaRPr>
+                    </a:p>
+                  </a:txBody>
+                  <a:tcPr marL="6350" marR="6350" marT="6350" marB="0" anchor="b"/>
+                </a:tc>
+                <a:tc>
+                  <a:txBody>
+                    <a:bodyPr/>
+                    <a:lstStyle/>
+                    <a:p>
+                      <a:pPr algn="r" fontAlgn="b"/>
+                      <a:r>
+                        <a:rPr lang="en-US" sz="1100" u="none" strike="noStrike" dirty="0">
+                          <a:effectLst/>
+                        </a:rPr>
+                        <a:t>19.87%</a:t>
+                      </a:r>
+                      <a:endParaRPr lang="en-US" sz="1100" b="0" i="0" u="none" strike="noStrike" dirty="0">
+                        <a:solidFill>
+                          <a:srgbClr val="000000"/>
+                        </a:solidFill>
+                        <a:effectLst/>
+                        <a:latin typeface="Calibri" panose="020F0502020204030204" pitchFamily="34" charset="0"/>
+                      </a:endParaRPr>
+                    </a:p>
+                  </a:txBody>
+                  <a:tcPr marL="6350" marR="6350" marT="6350" marB="0" anchor="b"/>
+                </a:tc>
+                <a:tc>
+                  <a:txBody>
+                    <a:bodyPr/>
+                    <a:lstStyle/>
+                    <a:p>
+                      <a:pPr algn="r" fontAlgn="b"/>
+                      <a:r>
+                        <a:rPr lang="en-US" sz="1100" u="none" strike="noStrike" dirty="0">
+                          <a:effectLst/>
+                        </a:rPr>
+                        <a:t>584</a:t>
+                      </a:r>
+                      <a:endParaRPr lang="en-US" sz="1100" b="0" i="0" u="none" strike="noStrike" dirty="0">
+                        <a:solidFill>
+                          <a:srgbClr val="000000"/>
+                        </a:solidFill>
+                        <a:effectLst/>
+                        <a:latin typeface="Calibri" panose="020F0502020204030204" pitchFamily="34" charset="0"/>
+                      </a:endParaRPr>
+                    </a:p>
+                  </a:txBody>
+                  <a:tcPr marL="6350" marR="6350" marT="6350" marB="0" anchor="b"/>
+                </a:tc>
+                <a:tc>
+                  <a:txBody>
+                    <a:bodyPr/>
+                    <a:lstStyle/>
+                    <a:p>
+                      <a:pPr algn="r" fontAlgn="b"/>
+                      <a:r>
+                        <a:rPr lang="en-US" sz="1100" u="none" strike="noStrike">
+                          <a:effectLst/>
+                        </a:rPr>
+                        <a:t>584.5754</a:t>
+                      </a:r>
+                      <a:endParaRPr lang="en-US" sz="1100" b="0" i="0" u="none" strike="noStrike">
+                        <a:solidFill>
+                          <a:srgbClr val="000000"/>
+                        </a:solidFill>
+                        <a:effectLst/>
+                        <a:latin typeface="Calibri" panose="020F0502020204030204" pitchFamily="34" charset="0"/>
+                      </a:endParaRPr>
+                    </a:p>
+                  </a:txBody>
+                  <a:tcPr marL="6350" marR="6350" marT="6350" marB="0" anchor="b"/>
+                </a:tc>
+                <a:extLst>
+                  <a:ext uri="{0D108BD9-81ED-4DB2-BD59-A6C34878D82A}">
+                    <a16:rowId xmlns:a16="http://schemas.microsoft.com/office/drawing/2014/main" val="4253377818"/>
+                  </a:ext>
+                </a:extLst>
+              </a:tr>
+              <a:tr h="232147">
+                <a:tc>
+                  <a:txBody>
+                    <a:bodyPr/>
+                    <a:lstStyle/>
+                    <a:p>
+                      <a:pPr algn="l" fontAlgn="b"/>
+                      <a:r>
+                        <a:rPr lang="en-US" sz="1100" u="none" strike="noStrike">
+                          <a:effectLst/>
+                        </a:rPr>
+                        <a:t>30-39</a:t>
+                      </a:r>
+                      <a:endParaRPr lang="en-US" sz="1100" b="0" i="0" u="none" strike="noStrike">
+                        <a:solidFill>
+                          <a:srgbClr val="000000"/>
+                        </a:solidFill>
+                        <a:effectLst/>
+                        <a:latin typeface="Calibri" panose="020F0502020204030204" pitchFamily="34" charset="0"/>
+                      </a:endParaRPr>
+                    </a:p>
+                  </a:txBody>
+                  <a:tcPr marL="6350" marR="6350" marT="6350" marB="0" anchor="b"/>
+                </a:tc>
+                <a:tc>
+                  <a:txBody>
+                    <a:bodyPr/>
+                    <a:lstStyle/>
+                    <a:p>
+                      <a:pPr algn="r" fontAlgn="b"/>
+                      <a:r>
+                        <a:rPr lang="en-US" sz="1100" u="none" strike="noStrike">
+                          <a:effectLst/>
+                        </a:rPr>
+                        <a:t>18.61%</a:t>
+                      </a:r>
+                      <a:endParaRPr lang="en-US" sz="1100" b="0" i="0" u="none" strike="noStrike">
+                        <a:solidFill>
+                          <a:srgbClr val="000000"/>
+                        </a:solidFill>
+                        <a:effectLst/>
+                        <a:latin typeface="Calibri" panose="020F0502020204030204" pitchFamily="34" charset="0"/>
+                      </a:endParaRPr>
+                    </a:p>
+                  </a:txBody>
+                  <a:tcPr marL="6350" marR="6350" marT="6350" marB="0" anchor="b"/>
+                </a:tc>
+                <a:tc>
+                  <a:txBody>
+                    <a:bodyPr/>
+                    <a:lstStyle/>
+                    <a:p>
+                      <a:pPr algn="r" fontAlgn="b"/>
+                      <a:r>
+                        <a:rPr lang="en-US" sz="1100" u="none" strike="noStrike">
+                          <a:effectLst/>
+                        </a:rPr>
+                        <a:t>780</a:t>
+                      </a:r>
+                      <a:endParaRPr lang="en-US" sz="1100" b="0" i="0" u="none" strike="noStrike">
+                        <a:solidFill>
+                          <a:srgbClr val="000000"/>
+                        </a:solidFill>
+                        <a:effectLst/>
+                        <a:latin typeface="Calibri" panose="020F0502020204030204" pitchFamily="34" charset="0"/>
+                      </a:endParaRPr>
+                    </a:p>
+                  </a:txBody>
+                  <a:tcPr marL="6350" marR="6350" marT="6350" marB="0" anchor="b"/>
+                </a:tc>
+                <a:tc>
+                  <a:txBody>
+                    <a:bodyPr/>
+                    <a:lstStyle/>
+                    <a:p>
+                      <a:pPr algn="r" fontAlgn="b"/>
+                      <a:r>
+                        <a:rPr lang="en-US" sz="1100" u="none" strike="noStrike">
+                          <a:effectLst/>
+                        </a:rPr>
+                        <a:t>547.5062</a:t>
+                      </a:r>
+                      <a:endParaRPr lang="en-US" sz="1100" b="0" i="0" u="none" strike="noStrike">
+                        <a:solidFill>
+                          <a:srgbClr val="000000"/>
+                        </a:solidFill>
+                        <a:effectLst/>
+                        <a:latin typeface="Calibri" panose="020F0502020204030204" pitchFamily="34" charset="0"/>
+                      </a:endParaRPr>
+                    </a:p>
+                  </a:txBody>
+                  <a:tcPr marL="6350" marR="6350" marT="6350" marB="0" anchor="b"/>
+                </a:tc>
+                <a:extLst>
+                  <a:ext uri="{0D108BD9-81ED-4DB2-BD59-A6C34878D82A}">
+                    <a16:rowId xmlns:a16="http://schemas.microsoft.com/office/drawing/2014/main" val="2920152571"/>
+                  </a:ext>
+                </a:extLst>
+              </a:tr>
+              <a:tr h="232147">
+                <a:tc>
+                  <a:txBody>
+                    <a:bodyPr/>
+                    <a:lstStyle/>
+                    <a:p>
+                      <a:pPr algn="l" fontAlgn="b"/>
+                      <a:r>
+                        <a:rPr lang="en-US" sz="1100" u="none" strike="noStrike">
+                          <a:effectLst/>
+                        </a:rPr>
+                        <a:t>40-49</a:t>
+                      </a:r>
+                      <a:endParaRPr lang="en-US" sz="1100" b="0" i="0" u="none" strike="noStrike">
+                        <a:solidFill>
+                          <a:srgbClr val="000000"/>
+                        </a:solidFill>
+                        <a:effectLst/>
+                        <a:latin typeface="Calibri" panose="020F0502020204030204" pitchFamily="34" charset="0"/>
+                      </a:endParaRPr>
+                    </a:p>
+                  </a:txBody>
+                  <a:tcPr marL="6350" marR="6350" marT="6350" marB="0" anchor="b"/>
+                </a:tc>
+                <a:tc>
+                  <a:txBody>
+                    <a:bodyPr/>
+                    <a:lstStyle/>
+                    <a:p>
+                      <a:pPr algn="r" fontAlgn="b"/>
+                      <a:r>
+                        <a:rPr lang="en-US" sz="1100" u="none" strike="noStrike">
+                          <a:effectLst/>
+                        </a:rPr>
+                        <a:t>23.97%</a:t>
+                      </a:r>
+                      <a:endParaRPr lang="en-US" sz="1100" b="0" i="0" u="none" strike="noStrike">
+                        <a:solidFill>
+                          <a:srgbClr val="000000"/>
+                        </a:solidFill>
+                        <a:effectLst/>
+                        <a:latin typeface="Calibri" panose="020F0502020204030204" pitchFamily="34" charset="0"/>
+                      </a:endParaRPr>
+                    </a:p>
+                  </a:txBody>
+                  <a:tcPr marL="6350" marR="6350" marT="6350" marB="0" anchor="b"/>
+                </a:tc>
+                <a:tc>
+                  <a:txBody>
+                    <a:bodyPr/>
+                    <a:lstStyle/>
+                    <a:p>
+                      <a:pPr algn="r" fontAlgn="b"/>
+                      <a:r>
+                        <a:rPr lang="en-US" sz="1100" u="none" strike="noStrike">
+                          <a:effectLst/>
+                        </a:rPr>
+                        <a:t>706</a:t>
+                      </a:r>
+                      <a:endParaRPr lang="en-US" sz="1100" b="0" i="0" u="none" strike="noStrike">
+                        <a:solidFill>
+                          <a:srgbClr val="000000"/>
+                        </a:solidFill>
+                        <a:effectLst/>
+                        <a:latin typeface="Calibri" panose="020F0502020204030204" pitchFamily="34" charset="0"/>
+                      </a:endParaRPr>
+                    </a:p>
+                  </a:txBody>
+                  <a:tcPr marL="6350" marR="6350" marT="6350" marB="0" anchor="b"/>
+                </a:tc>
+                <a:tc>
+                  <a:txBody>
+                    <a:bodyPr/>
+                    <a:lstStyle/>
+                    <a:p>
+                      <a:pPr algn="r" fontAlgn="b"/>
+                      <a:r>
+                        <a:rPr lang="en-US" sz="1100" u="none" strike="noStrike">
+                          <a:effectLst/>
+                        </a:rPr>
+                        <a:t>705.1974</a:t>
+                      </a:r>
+                      <a:endParaRPr lang="en-US" sz="1100" b="0" i="0" u="none" strike="noStrike">
+                        <a:solidFill>
+                          <a:srgbClr val="000000"/>
+                        </a:solidFill>
+                        <a:effectLst/>
+                        <a:latin typeface="Calibri" panose="020F0502020204030204" pitchFamily="34" charset="0"/>
+                      </a:endParaRPr>
+                    </a:p>
+                  </a:txBody>
+                  <a:tcPr marL="6350" marR="6350" marT="6350" marB="0" anchor="b"/>
+                </a:tc>
+                <a:extLst>
+                  <a:ext uri="{0D108BD9-81ED-4DB2-BD59-A6C34878D82A}">
+                    <a16:rowId xmlns:a16="http://schemas.microsoft.com/office/drawing/2014/main" val="372776292"/>
+                  </a:ext>
+                </a:extLst>
+              </a:tr>
+              <a:tr h="232147">
+                <a:tc>
+                  <a:txBody>
+                    <a:bodyPr/>
+                    <a:lstStyle/>
+                    <a:p>
+                      <a:pPr algn="l" fontAlgn="b"/>
+                      <a:r>
+                        <a:rPr lang="en-US" sz="1100" u="none" strike="noStrike">
+                          <a:effectLst/>
+                        </a:rPr>
+                        <a:t>50-59</a:t>
+                      </a:r>
+                      <a:endParaRPr lang="en-US" sz="1100" b="0" i="0" u="none" strike="noStrike">
+                        <a:solidFill>
+                          <a:srgbClr val="000000"/>
+                        </a:solidFill>
+                        <a:effectLst/>
+                        <a:latin typeface="Calibri" panose="020F0502020204030204" pitchFamily="34" charset="0"/>
+                      </a:endParaRPr>
+                    </a:p>
+                  </a:txBody>
+                  <a:tcPr marL="6350" marR="6350" marT="6350" marB="0" anchor="b"/>
+                </a:tc>
+                <a:tc>
+                  <a:txBody>
+                    <a:bodyPr/>
+                    <a:lstStyle/>
+                    <a:p>
+                      <a:pPr algn="r" fontAlgn="b"/>
+                      <a:r>
+                        <a:rPr lang="en-US" sz="1100" u="none" strike="noStrike">
+                          <a:effectLst/>
+                        </a:rPr>
+                        <a:t>22.71%</a:t>
+                      </a:r>
+                      <a:endParaRPr lang="en-US" sz="1100" b="0" i="0" u="none" strike="noStrike">
+                        <a:solidFill>
+                          <a:srgbClr val="000000"/>
+                        </a:solidFill>
+                        <a:effectLst/>
+                        <a:latin typeface="Calibri" panose="020F0502020204030204" pitchFamily="34" charset="0"/>
+                      </a:endParaRPr>
+                    </a:p>
+                  </a:txBody>
+                  <a:tcPr marL="6350" marR="6350" marT="6350" marB="0" anchor="b"/>
+                </a:tc>
+                <a:tc>
+                  <a:txBody>
+                    <a:bodyPr/>
+                    <a:lstStyle/>
+                    <a:p>
+                      <a:pPr algn="r" fontAlgn="b"/>
+                      <a:r>
+                        <a:rPr lang="en-US" sz="1100" u="none" strike="noStrike">
+                          <a:effectLst/>
+                        </a:rPr>
+                        <a:t>673</a:t>
+                      </a:r>
+                      <a:endParaRPr lang="en-US" sz="1100" b="0" i="0" u="none" strike="noStrike">
+                        <a:solidFill>
+                          <a:srgbClr val="000000"/>
+                        </a:solidFill>
+                        <a:effectLst/>
+                        <a:latin typeface="Calibri" panose="020F0502020204030204" pitchFamily="34" charset="0"/>
+                      </a:endParaRPr>
+                    </a:p>
+                  </a:txBody>
+                  <a:tcPr marL="6350" marR="6350" marT="6350" marB="0" anchor="b"/>
+                </a:tc>
+                <a:tc>
+                  <a:txBody>
+                    <a:bodyPr/>
+                    <a:lstStyle/>
+                    <a:p>
+                      <a:pPr algn="r" fontAlgn="b"/>
+                      <a:r>
+                        <a:rPr lang="en-US" sz="1100" u="none" strike="noStrike">
+                          <a:effectLst/>
+                        </a:rPr>
+                        <a:t>668.1282</a:t>
+                      </a:r>
+                      <a:endParaRPr lang="en-US" sz="1100" b="0" i="0" u="none" strike="noStrike">
+                        <a:solidFill>
+                          <a:srgbClr val="000000"/>
+                        </a:solidFill>
+                        <a:effectLst/>
+                        <a:latin typeface="Calibri" panose="020F0502020204030204" pitchFamily="34" charset="0"/>
+                      </a:endParaRPr>
+                    </a:p>
+                  </a:txBody>
+                  <a:tcPr marL="6350" marR="6350" marT="6350" marB="0" anchor="b"/>
+                </a:tc>
+                <a:extLst>
+                  <a:ext uri="{0D108BD9-81ED-4DB2-BD59-A6C34878D82A}">
+                    <a16:rowId xmlns:a16="http://schemas.microsoft.com/office/drawing/2014/main" val="3788235359"/>
+                  </a:ext>
+                </a:extLst>
+              </a:tr>
+              <a:tr h="232147">
+                <a:tc>
+                  <a:txBody>
+                    <a:bodyPr/>
+                    <a:lstStyle/>
+                    <a:p>
+                      <a:pPr algn="l" fontAlgn="b"/>
+                      <a:r>
+                        <a:rPr lang="en-US" sz="1100" u="none" strike="noStrike">
+                          <a:effectLst/>
+                        </a:rPr>
+                        <a:t>60-69</a:t>
+                      </a:r>
+                      <a:endParaRPr lang="en-US" sz="1100" b="0" i="0" u="none" strike="noStrike">
+                        <a:solidFill>
+                          <a:srgbClr val="000000"/>
+                        </a:solidFill>
+                        <a:effectLst/>
+                        <a:latin typeface="Calibri" panose="020F0502020204030204" pitchFamily="34" charset="0"/>
+                      </a:endParaRPr>
+                    </a:p>
+                  </a:txBody>
+                  <a:tcPr marL="6350" marR="6350" marT="6350" marB="0" anchor="b"/>
+                </a:tc>
+                <a:tc>
+                  <a:txBody>
+                    <a:bodyPr/>
+                    <a:lstStyle/>
+                    <a:p>
+                      <a:pPr algn="r" fontAlgn="b"/>
+                      <a:r>
+                        <a:rPr lang="en-US" sz="1100" u="none" strike="noStrike">
+                          <a:effectLst/>
+                        </a:rPr>
+                        <a:t>14.82%</a:t>
+                      </a:r>
+                      <a:endParaRPr lang="en-US" sz="1100" b="0" i="0" u="none" strike="noStrike">
+                        <a:solidFill>
+                          <a:srgbClr val="000000"/>
+                        </a:solidFill>
+                        <a:effectLst/>
+                        <a:latin typeface="Calibri" panose="020F0502020204030204" pitchFamily="34" charset="0"/>
+                      </a:endParaRPr>
+                    </a:p>
+                  </a:txBody>
+                  <a:tcPr marL="6350" marR="6350" marT="6350" marB="0" anchor="b"/>
+                </a:tc>
+                <a:tc>
+                  <a:txBody>
+                    <a:bodyPr/>
+                    <a:lstStyle/>
+                    <a:p>
+                      <a:pPr algn="r" fontAlgn="b"/>
+                      <a:r>
+                        <a:rPr lang="en-US" sz="1100" u="none" strike="noStrike">
+                          <a:effectLst/>
+                        </a:rPr>
+                        <a:t>199</a:t>
+                      </a:r>
+                      <a:endParaRPr lang="en-US" sz="1100" b="0" i="0" u="none" strike="noStrike">
+                        <a:solidFill>
+                          <a:srgbClr val="000000"/>
+                        </a:solidFill>
+                        <a:effectLst/>
+                        <a:latin typeface="Calibri" panose="020F0502020204030204" pitchFamily="34" charset="0"/>
+                      </a:endParaRPr>
+                    </a:p>
+                  </a:txBody>
+                  <a:tcPr marL="6350" marR="6350" marT="6350" marB="0" anchor="b"/>
+                </a:tc>
+                <a:tc>
+                  <a:txBody>
+                    <a:bodyPr/>
+                    <a:lstStyle/>
+                    <a:p>
+                      <a:pPr algn="r" fontAlgn="b"/>
+                      <a:r>
+                        <a:rPr lang="en-US" sz="1100" u="none" strike="noStrike" dirty="0">
+                          <a:effectLst/>
+                        </a:rPr>
+                        <a:t>436.0044</a:t>
+                      </a:r>
+                      <a:endParaRPr lang="en-US" sz="1100" b="0" i="0" u="none" strike="noStrike" dirty="0">
+                        <a:solidFill>
+                          <a:srgbClr val="000000"/>
+                        </a:solidFill>
+                        <a:effectLst/>
+                        <a:latin typeface="Calibri" panose="020F0502020204030204" pitchFamily="34" charset="0"/>
+                      </a:endParaRPr>
+                    </a:p>
+                  </a:txBody>
+                  <a:tcPr marL="6350" marR="6350" marT="6350" marB="0" anchor="b"/>
+                </a:tc>
+                <a:extLst>
+                  <a:ext uri="{0D108BD9-81ED-4DB2-BD59-A6C34878D82A}">
+                    <a16:rowId xmlns:a16="http://schemas.microsoft.com/office/drawing/2014/main" val="806347943"/>
+                  </a:ext>
+                </a:extLst>
+              </a:tr>
+            </a:tbl>
+          </a:graphicData>
+        </a:graphic>
+      </p:graphicFrame>
+    </p:spTree>
+    <p:extLst>
+      <p:ext uri="{BB962C8B-B14F-4D97-AF65-F5344CB8AC3E}">
+        <p14:creationId xmlns:p14="http://schemas.microsoft.com/office/powerpoint/2010/main" val="2510193250"/>
+      </p:ext>
+    </p:extLst>
+  </p:cSld>
+  <p:clrMapOvr>
+    <a:masterClrMapping/>
+  </p:clrMapOvr>
+</p:sld>
+</file>
+
+<file path=ppt/slides/slide14.xml><?xml version="1.0" encoding="utf-8"?>
+<p:sld xmlns:a="http://schemas.openxmlformats.org/drawingml/2006/main" xmlns:r="http://schemas.openxmlformats.org/officeDocument/2006/relationships" xmlns:p="http://schemas.openxmlformats.org/presentationml/2006/main">
+  <p:cSld>
+    <p:spTree>
+      <p:nvGrpSpPr>
+        <p:cNvPr id="1" name=""/>
+        <p:cNvGrpSpPr/>
+        <p:nvPr/>
+      </p:nvGrpSpPr>
+      <p:grpSpPr>
+        <a:xfrm>
+          <a:off x="0" y="0"/>
+          <a:ext cx="0" cy="0"/>
+          <a:chOff x="0" y="0"/>
+          <a:chExt cx="0" cy="0"/>
+        </a:xfrm>
+      </p:grpSpPr>
+      <p:sp>
+        <p:nvSpPr>
+          <p:cNvPr id="2" name="Title 1">
+            <a:extLst>
+              <a:ext uri="{FF2B5EF4-FFF2-40B4-BE49-F238E27FC236}">
+                <a16:creationId xmlns:a16="http://schemas.microsoft.com/office/drawing/2014/main" id="{CDA623AE-D532-4482-9398-887DF1CE9E5E}"/>
+              </a:ext>
+            </a:extLst>
+          </p:cNvPr>
+          <p:cNvSpPr>
+            <a:spLocks noGrp="1"/>
+          </p:cNvSpPr>
+          <p:nvPr>
+            <p:ph type="title"/>
+          </p:nvPr>
+        </p:nvSpPr>
+        <p:spPr/>
+        <p:txBody>
+          <a:bodyPr/>
+          <a:lstStyle/>
+          <a:p>
+            <a:r>
+              <a:rPr lang="en-US" dirty="0"/>
+              <a:t>Drug-induced Mortality by Year</a:t>
+            </a:r>
+          </a:p>
+        </p:txBody>
+      </p:sp>
+      <p:sp>
+        <p:nvSpPr>
+          <p:cNvPr id="3" name="Content Placeholder 2">
+            <a:extLst>
+              <a:ext uri="{FF2B5EF4-FFF2-40B4-BE49-F238E27FC236}">
+                <a16:creationId xmlns:a16="http://schemas.microsoft.com/office/drawing/2014/main" id="{4FE2997F-85AA-49F5-8F1E-E13B6B799A00}"/>
+              </a:ext>
+            </a:extLst>
+          </p:cNvPr>
+          <p:cNvSpPr>
+            <a:spLocks noGrp="1"/>
+          </p:cNvSpPr>
+          <p:nvPr>
+            <p:ph idx="1"/>
+          </p:nvPr>
+        </p:nvSpPr>
+        <p:spPr>
+          <a:xfrm>
+            <a:off x="2592924" y="4468306"/>
+            <a:ext cx="8911688" cy="1999098"/>
+          </a:xfrm>
+        </p:spPr>
+        <p:txBody>
+          <a:bodyPr/>
+          <a:lstStyle/>
+          <a:p>
+            <a:r>
+              <a:rPr lang="en-US" dirty="0"/>
+              <a:t>Fitting linear regression: </a:t>
+            </a:r>
+          </a:p>
+          <a:p>
+            <a:pPr lvl="1"/>
+            <a:r>
+              <a:rPr lang="en-US" dirty="0"/>
+              <a:t>Independent variable: Year number</a:t>
+            </a:r>
+          </a:p>
+          <a:p>
+            <a:pPr lvl="1"/>
+            <a:r>
+              <a:rPr lang="en-US" dirty="0"/>
+              <a:t>Dependent variable : Number of deaths in that year</a:t>
+            </a:r>
+          </a:p>
+          <a:p>
+            <a:r>
+              <a:rPr lang="en-US" dirty="0"/>
+              <a:t>Intercept = 193.33, Slope = 139</a:t>
+            </a:r>
+          </a:p>
+          <a:p>
+            <a:r>
+              <a:rPr lang="en-US" dirty="0"/>
+              <a:t>Prediction for 2018 = 1166 deaths</a:t>
+            </a:r>
+          </a:p>
+          <a:p>
+            <a:endParaRPr lang="en-US" dirty="0"/>
+          </a:p>
+        </p:txBody>
+      </p:sp>
+      <p:pic>
+        <p:nvPicPr>
+          <p:cNvPr id="7" name="Picture 6">
+            <a:extLst>
+              <a:ext uri="{FF2B5EF4-FFF2-40B4-BE49-F238E27FC236}">
+                <a16:creationId xmlns:a16="http://schemas.microsoft.com/office/drawing/2014/main" id="{E4C1265A-7E9C-47BC-ADB0-E65D85BF50C9}"/>
+              </a:ext>
+            </a:extLst>
+          </p:cNvPr>
+          <p:cNvPicPr>
+            <a:picLocks noChangeAspect="1"/>
+          </p:cNvPicPr>
+          <p:nvPr/>
+        </p:nvPicPr>
+        <p:blipFill>
+          <a:blip r:embed="rId2"/>
+          <a:stretch>
+            <a:fillRect/>
+          </a:stretch>
+        </p:blipFill>
+        <p:spPr>
+          <a:xfrm>
+            <a:off x="6330177" y="1219077"/>
+            <a:ext cx="5055752" cy="3378970"/>
+          </a:xfrm>
+          <a:prstGeom prst="rect">
+            <a:avLst/>
+          </a:prstGeom>
+        </p:spPr>
+      </p:pic>
+    </p:spTree>
+    <p:extLst>
+      <p:ext uri="{BB962C8B-B14F-4D97-AF65-F5344CB8AC3E}">
+        <p14:creationId xmlns:p14="http://schemas.microsoft.com/office/powerpoint/2010/main" val="1224483762"/>
+      </p:ext>
+    </p:extLst>
+  </p:cSld>
+  <p:clrMapOvr>
+    <a:masterClrMapping/>
+  </p:clrMapOvr>
+</p:sld>
+</file>
+
+<file path=ppt/slides/slide15.xml><?xml version="1.0" encoding="utf-8"?>
 <p:sld xmlns:a="http://schemas.openxmlformats.org/drawingml/2006/main" xmlns:r="http://schemas.openxmlformats.org/officeDocument/2006/relationships" xmlns:p="http://schemas.openxmlformats.org/presentationml/2006/main">
   <p:cSld>
     <p:spTree>
@@ -8040,7 +9898,7 @@
           <p:cNvPr id="2" name="Title 1">
             <a:extLst>
               <a:ext uri="{FF2B5EF4-FFF2-40B4-BE49-F238E27FC236}">
-                <a16:creationId xmlns:a16="http://schemas.microsoft.com/office/drawing/2014/main" id="{75007935-D4DA-4606-8398-F8A0B284B5E2}"/>
+                <a16:creationId xmlns:a16="http://schemas.microsoft.com/office/drawing/2014/main" id="{5D177DDA-3006-43E9-9D9C-71348C54AF5E}"/>
               </a:ext>
             </a:extLst>
           </p:cNvPr>
@@ -8053,14 +9911,12 @@
         </p:nvSpPr>
         <p:spPr/>
         <p:txBody>
-          <a:bodyPr>
-            <a:normAutofit/>
-          </a:bodyPr>
+          <a:bodyPr/>
           <a:lstStyle/>
           <a:p>
             <a:r>
               <a:rPr lang="en-US" dirty="0"/>
-              <a:t>Struggles with data</a:t>
+              <a:t>Data Sources</a:t>
             </a:r>
           </a:p>
         </p:txBody>
@@ -8070,7 +9926,7 @@
           <p:cNvPr id="3" name="Content Placeholder 2">
             <a:extLst>
               <a:ext uri="{FF2B5EF4-FFF2-40B4-BE49-F238E27FC236}">
-                <a16:creationId xmlns:a16="http://schemas.microsoft.com/office/drawing/2014/main" id="{2629915A-1567-437B-A470-5DA2D92B5ACF}"/>
+                <a16:creationId xmlns:a16="http://schemas.microsoft.com/office/drawing/2014/main" id="{BAE4EA54-CC89-49BF-9D45-2558E58BD415}"/>
               </a:ext>
             </a:extLst>
           </p:cNvPr>
@@ -8086,28 +9942,6 @@
           <a:bodyPr/>
           <a:lstStyle/>
           <a:p>
-            <a:pPr marL="0" indent="0">
-              <a:buNone/>
-            </a:pPr>
-            <a:r>
-              <a:rPr lang="en-US" dirty="0"/>
-              <a:t>We were not able to </a:t>
-            </a:r>
-          </a:p>
-          <a:p>
-            <a:r>
-              <a:rPr lang="en-US" dirty="0"/>
-              <a:t>Drug-induced mortality rates and income</a:t>
-            </a:r>
-          </a:p>
-          <a:p>
-            <a:r>
-              <a:rPr lang="en-US" dirty="0"/>
-              <a:t>Drug-induced mortality rates and education</a:t>
-            </a:r>
-            <a:br>
-              <a:rPr lang="en-US" dirty="0"/>
-            </a:br>
             <a:endParaRPr lang="en-US" dirty="0"/>
           </a:p>
         </p:txBody>
@@ -8115,7 +9949,7 @@
     </p:spTree>
     <p:extLst>
       <p:ext uri="{BB962C8B-B14F-4D97-AF65-F5344CB8AC3E}">
-        <p14:creationId xmlns:p14="http://schemas.microsoft.com/office/powerpoint/2010/main" val="2289639885"/>
+        <p14:creationId xmlns:p14="http://schemas.microsoft.com/office/powerpoint/2010/main" val="416682109"/>
       </p:ext>
     </p:extLst>
   </p:cSld>
@@ -8147,7 +9981,7 @@
           <p:cNvPr id="2" name="Title 1">
             <a:extLst>
               <a:ext uri="{FF2B5EF4-FFF2-40B4-BE49-F238E27FC236}">
-                <a16:creationId xmlns:a16="http://schemas.microsoft.com/office/drawing/2014/main" id="{CBB69504-185D-4B1C-B779-2E7B3E05190F}"/>
+                <a16:creationId xmlns:a16="http://schemas.microsoft.com/office/drawing/2014/main" id="{75007935-D4DA-4606-8398-F8A0B284B5E2}"/>
               </a:ext>
             </a:extLst>
           </p:cNvPr>
@@ -8160,17 +9994,15 @@
         </p:nvSpPr>
         <p:spPr/>
         <p:txBody>
-          <a:bodyPr/>
+          <a:bodyPr>
+            <a:normAutofit/>
+          </a:bodyPr>
           <a:lstStyle/>
           <a:p>
             <a:r>
               <a:rPr lang="en-US" dirty="0"/>
-              <a:t>Drug-induced mortality rates and age</a:t>
-            </a:r>
-            <a:br>
-              <a:rPr lang="en-US" dirty="0"/>
-            </a:br>
-            <a:endParaRPr lang="en-US" dirty="0"/>
+              <a:t>Struggles with data</a:t>
+            </a:r>
           </a:p>
         </p:txBody>
       </p:sp>
@@ -8179,7 +10011,7 @@
           <p:cNvPr id="3" name="Content Placeholder 2">
             <a:extLst>
               <a:ext uri="{FF2B5EF4-FFF2-40B4-BE49-F238E27FC236}">
-                <a16:creationId xmlns:a16="http://schemas.microsoft.com/office/drawing/2014/main" id="{4E1E6B99-92FF-43AE-B254-085BB1A84BE9}"/>
+                <a16:creationId xmlns:a16="http://schemas.microsoft.com/office/drawing/2014/main" id="{2629915A-1567-437B-A470-5DA2D92B5ACF}"/>
               </a:ext>
             </a:extLst>
           </p:cNvPr>
@@ -8192,17 +10024,41 @@
         </p:nvSpPr>
         <p:spPr/>
         <p:txBody>
-          <a:bodyPr/>
+          <a:bodyPr>
+            <a:normAutofit/>
+          </a:bodyPr>
           <a:lstStyle/>
           <a:p>
-            <a:endParaRPr lang="en-US"/>
+            <a:pPr marL="0" indent="0">
+              <a:buNone/>
+            </a:pPr>
+            <a:r>
+              <a:rPr lang="en-US" sz="2800" dirty="0"/>
+              <a:t>We were not able to find reliable data to analyze and plot these trends:  </a:t>
+            </a:r>
+          </a:p>
+          <a:p>
+            <a:r>
+              <a:rPr lang="en-US" sz="2800" dirty="0"/>
+              <a:t>Drug-induced mortality rates and income</a:t>
+            </a:r>
+          </a:p>
+          <a:p>
+            <a:r>
+              <a:rPr lang="en-US" sz="2800" dirty="0"/>
+              <a:t>Drug-induced mortality rates and education</a:t>
+            </a:r>
+            <a:br>
+              <a:rPr lang="en-US" sz="2800" dirty="0"/>
+            </a:br>
+            <a:endParaRPr lang="en-US" sz="2800" dirty="0"/>
           </a:p>
         </p:txBody>
       </p:sp>
     </p:spTree>
     <p:extLst>
       <p:ext uri="{BB962C8B-B14F-4D97-AF65-F5344CB8AC3E}">
-        <p14:creationId xmlns:p14="http://schemas.microsoft.com/office/powerpoint/2010/main" val="2290168469"/>
+        <p14:creationId xmlns:p14="http://schemas.microsoft.com/office/powerpoint/2010/main" val="2289639885"/>
       </p:ext>
     </p:extLst>
   </p:cSld>
@@ -8234,7 +10090,7 @@
           <p:cNvPr id="2" name="Title 1">
             <a:extLst>
               <a:ext uri="{FF2B5EF4-FFF2-40B4-BE49-F238E27FC236}">
-                <a16:creationId xmlns:a16="http://schemas.microsoft.com/office/drawing/2014/main" id="{57709140-C8B7-46DE-A33B-463B5EBE4341}"/>
+                <a16:creationId xmlns:a16="http://schemas.microsoft.com/office/drawing/2014/main" id="{B8E97443-B866-4821-958D-875892DA966B}"/>
               </a:ext>
             </a:extLst>
           </p:cNvPr>
@@ -8245,12 +10101,7 @@
             <p:ph type="title"/>
           </p:nvPr>
         </p:nvSpPr>
-        <p:spPr>
-          <a:xfrm>
-            <a:off x="2337847" y="624110"/>
-            <a:ext cx="9166765" cy="1280890"/>
-          </a:xfrm>
-        </p:spPr>
+        <p:spPr/>
         <p:txBody>
           <a:bodyPr>
             <a:normAutofit/>
@@ -8259,7 +10110,7 @@
           <a:p>
             <a:r>
               <a:rPr lang="en-US" dirty="0"/>
-              <a:t>Drug-induced mortality rates and gender-race-age</a:t>
+              <a:t>Drug-induced Mortality and Unemployment rates</a:t>
             </a:r>
           </a:p>
         </p:txBody>
@@ -8269,7 +10120,7 @@
           <p:cNvPr id="5" name="Content Placeholder 4">
             <a:extLst>
               <a:ext uri="{FF2B5EF4-FFF2-40B4-BE49-F238E27FC236}">
-                <a16:creationId xmlns:a16="http://schemas.microsoft.com/office/drawing/2014/main" id="{AA1AA34D-8301-4E4B-9563-73526E6062CE}"/>
+                <a16:creationId xmlns:a16="http://schemas.microsoft.com/office/drawing/2014/main" id="{96B55759-06C9-4FBF-8E38-B3BBAF8260FD}"/>
               </a:ext>
             </a:extLst>
           </p:cNvPr>
@@ -8288,15 +10139,15 @@
         </p:blipFill>
         <p:spPr>
           <a:xfrm>
-            <a:off x="2743200" y="1671685"/>
-            <a:ext cx="7616858" cy="5146065"/>
+            <a:off x="3884517" y="2083266"/>
+            <a:ext cx="4538030" cy="4538030"/>
           </a:xfrm>
         </p:spPr>
       </p:pic>
     </p:spTree>
     <p:extLst>
       <p:ext uri="{BB962C8B-B14F-4D97-AF65-F5344CB8AC3E}">
-        <p14:creationId xmlns:p14="http://schemas.microsoft.com/office/powerpoint/2010/main" val="956778109"/>
+        <p14:creationId xmlns:p14="http://schemas.microsoft.com/office/powerpoint/2010/main" val="2167273281"/>
       </p:ext>
     </p:extLst>
   </p:cSld>
@@ -8328,7 +10179,7 @@
           <p:cNvPr id="2" name="Title 1">
             <a:extLst>
               <a:ext uri="{FF2B5EF4-FFF2-40B4-BE49-F238E27FC236}">
-                <a16:creationId xmlns:a16="http://schemas.microsoft.com/office/drawing/2014/main" id="{44E3AE93-826E-4319-B623-63CBCBC0C145}"/>
+                <a16:creationId xmlns:a16="http://schemas.microsoft.com/office/drawing/2014/main" id="{8BF87117-1E4E-4EE9-8760-25D09E6E6179}"/>
               </a:ext>
             </a:extLst>
           </p:cNvPr>
@@ -8348,44 +10199,40 @@
           <a:p>
             <a:r>
               <a:rPr lang="en-US" dirty="0"/>
-              <a:t>Drug-induced mortality rates counties</a:t>
-            </a:r>
-          </a:p>
-        </p:txBody>
-      </p:sp>
-      <p:pic>
-        <p:nvPicPr>
-          <p:cNvPr id="5" name="Content Placeholder 4">
+              <a:t>Drug-induced mortality rates and barriers to medical treatment</a:t>
+            </a:r>
+          </a:p>
+        </p:txBody>
+      </p:sp>
+      <p:sp>
+        <p:nvSpPr>
+          <p:cNvPr id="3" name="Content Placeholder 2">
             <a:extLst>
               <a:ext uri="{FF2B5EF4-FFF2-40B4-BE49-F238E27FC236}">
-                <a16:creationId xmlns:a16="http://schemas.microsoft.com/office/drawing/2014/main" id="{9EFF8C28-DD7C-462B-8BB9-E8D0DE32DD93}"/>
+                <a16:creationId xmlns:a16="http://schemas.microsoft.com/office/drawing/2014/main" id="{F37D4F70-3A7A-4527-B5BB-4CBFEE548667}"/>
               </a:ext>
             </a:extLst>
           </p:cNvPr>
-          <p:cNvPicPr>
-            <a:picLocks noGrp="1" noChangeAspect="1"/>
-          </p:cNvPicPr>
+          <p:cNvSpPr>
+            <a:spLocks noGrp="1"/>
+          </p:cNvSpPr>
           <p:nvPr>
             <p:ph idx="1"/>
           </p:nvPr>
-        </p:nvPicPr>
-        <p:blipFill>
-          <a:blip r:embed="rId2"/>
-          <a:stretch>
-            <a:fillRect/>
-          </a:stretch>
-        </p:blipFill>
-        <p:spPr>
-          <a:xfrm>
-            <a:off x="2335074" y="2058183"/>
-            <a:ext cx="9715575" cy="4540577"/>
-          </a:xfrm>
-        </p:spPr>
-      </p:pic>
+        </p:nvSpPr>
+        <p:spPr/>
+        <p:txBody>
+          <a:bodyPr/>
+          <a:lstStyle/>
+          <a:p>
+            <a:endParaRPr lang="en-US"/>
+          </a:p>
+        </p:txBody>
+      </p:sp>
     </p:spTree>
     <p:extLst>
       <p:ext uri="{BB962C8B-B14F-4D97-AF65-F5344CB8AC3E}">
-        <p14:creationId xmlns:p14="http://schemas.microsoft.com/office/powerpoint/2010/main" val="712921710"/>
+        <p14:creationId xmlns:p14="http://schemas.microsoft.com/office/powerpoint/2010/main" val="2699776682"/>
       </p:ext>
     </p:extLst>
   </p:cSld>
@@ -8417,7 +10264,7 @@
           <p:cNvPr id="2" name="Title 1">
             <a:extLst>
               <a:ext uri="{FF2B5EF4-FFF2-40B4-BE49-F238E27FC236}">
-                <a16:creationId xmlns:a16="http://schemas.microsoft.com/office/drawing/2014/main" id="{44E3AE93-826E-4319-B623-63CBCBC0C145}"/>
+                <a16:creationId xmlns:a16="http://schemas.microsoft.com/office/drawing/2014/main" id="{CBB69504-185D-4B1C-B779-2E7B3E05190F}"/>
               </a:ext>
             </a:extLst>
           </p:cNvPr>
@@ -8430,29 +10277,31 @@
         </p:nvSpPr>
         <p:spPr>
           <a:xfrm>
-            <a:off x="2366127" y="624110"/>
-            <a:ext cx="10109445" cy="1280890"/>
+            <a:off x="2509035" y="607332"/>
+            <a:ext cx="8911687" cy="1280890"/>
           </a:xfrm>
         </p:spPr>
         <p:txBody>
-          <a:bodyPr>
-            <a:normAutofit/>
-          </a:bodyPr>
+          <a:bodyPr/>
           <a:lstStyle/>
           <a:p>
             <a:r>
               <a:rPr lang="en-US" dirty="0"/>
-              <a:t>Drug-induced mortality rates and counties</a:t>
-            </a:r>
+              <a:t>Drug-Induced Mortality Rates and Age</a:t>
+            </a:r>
+            <a:br>
+              <a:rPr lang="en-US" dirty="0"/>
+            </a:br>
+            <a:endParaRPr lang="en-US" dirty="0"/>
           </a:p>
         </p:txBody>
       </p:sp>
       <p:pic>
         <p:nvPicPr>
-          <p:cNvPr id="7" name="Content Placeholder 6">
+          <p:cNvPr id="5" name="Content Placeholder 4">
             <a:extLst>
               <a:ext uri="{FF2B5EF4-FFF2-40B4-BE49-F238E27FC236}">
-                <a16:creationId xmlns:a16="http://schemas.microsoft.com/office/drawing/2014/main" id="{BB061FCF-878A-4FE1-BC11-562AB2FDD122}"/>
+                <a16:creationId xmlns:a16="http://schemas.microsoft.com/office/drawing/2014/main" id="{45739901-9184-4471-B5FD-A2FC5BB690ED}"/>
               </a:ext>
             </a:extLst>
           </p:cNvPr>
@@ -8471,15 +10320,15 @@
         </p:blipFill>
         <p:spPr>
           <a:xfrm>
-            <a:off x="2498103" y="1905000"/>
-            <a:ext cx="9323474" cy="4796981"/>
+            <a:off x="2509035" y="1247777"/>
+            <a:ext cx="8082181" cy="5388122"/>
           </a:xfrm>
         </p:spPr>
       </p:pic>
     </p:spTree>
     <p:extLst>
       <p:ext uri="{BB962C8B-B14F-4D97-AF65-F5344CB8AC3E}">
-        <p14:creationId xmlns:p14="http://schemas.microsoft.com/office/powerpoint/2010/main" val="1054964012"/>
+        <p14:creationId xmlns:p14="http://schemas.microsoft.com/office/powerpoint/2010/main" val="2290168469"/>
       </p:ext>
     </p:extLst>
   </p:cSld>
@@ -8511,7 +10360,7 @@
           <p:cNvPr id="2" name="Title 1">
             <a:extLst>
               <a:ext uri="{FF2B5EF4-FFF2-40B4-BE49-F238E27FC236}">
-                <a16:creationId xmlns:a16="http://schemas.microsoft.com/office/drawing/2014/main" id="{B8E97443-B866-4821-958D-875892DA966B}"/>
+                <a16:creationId xmlns:a16="http://schemas.microsoft.com/office/drawing/2014/main" id="{CCC4A7B5-8082-41BD-8216-D7174D2FC296}"/>
               </a:ext>
             </a:extLst>
           </p:cNvPr>
@@ -8524,47 +10373,49 @@
         </p:nvSpPr>
         <p:spPr/>
         <p:txBody>
-          <a:bodyPr>
-            <a:normAutofit/>
-          </a:bodyPr>
+          <a:bodyPr/>
           <a:lstStyle/>
           <a:p>
             <a:r>
               <a:rPr lang="en-US" dirty="0"/>
-              <a:t>Drug-induced mortality rates and unemployment rates</a:t>
-            </a:r>
-          </a:p>
-        </p:txBody>
-      </p:sp>
-      <p:sp>
-        <p:nvSpPr>
-          <p:cNvPr id="3" name="Content Placeholder 2">
+              <a:t>Drug-Induced Mortality Rates by Drug</a:t>
+            </a:r>
+          </a:p>
+        </p:txBody>
+      </p:sp>
+      <p:pic>
+        <p:nvPicPr>
+          <p:cNvPr id="5" name="Content Placeholder 4">
             <a:extLst>
               <a:ext uri="{FF2B5EF4-FFF2-40B4-BE49-F238E27FC236}">
-                <a16:creationId xmlns:a16="http://schemas.microsoft.com/office/drawing/2014/main" id="{CC681BD8-5A03-4E20-9CBD-9B11D42C8DFC}"/>
+                <a16:creationId xmlns:a16="http://schemas.microsoft.com/office/drawing/2014/main" id="{DFB7AE71-0B7A-462D-932A-2B550F2B7D1C}"/>
               </a:ext>
             </a:extLst>
           </p:cNvPr>
-          <p:cNvSpPr>
-            <a:spLocks noGrp="1"/>
-          </p:cNvSpPr>
+          <p:cNvPicPr>
+            <a:picLocks noGrp="1" noChangeAspect="1"/>
+          </p:cNvPicPr>
           <p:nvPr>
             <p:ph idx="1"/>
           </p:nvPr>
-        </p:nvSpPr>
-        <p:spPr/>
-        <p:txBody>
-          <a:bodyPr/>
-          <a:lstStyle/>
-          <a:p>
-            <a:endParaRPr lang="en-US"/>
-          </a:p>
-        </p:txBody>
-      </p:sp>
+        </p:nvPicPr>
+        <p:blipFill>
+          <a:blip r:embed="rId2"/>
+          <a:stretch>
+            <a:fillRect/>
+          </a:stretch>
+        </p:blipFill>
+        <p:spPr>
+          <a:xfrm>
+            <a:off x="2592925" y="1382001"/>
+            <a:ext cx="7968620" cy="5312414"/>
+          </a:xfrm>
+        </p:spPr>
+      </p:pic>
     </p:spTree>
     <p:extLst>
       <p:ext uri="{BB962C8B-B14F-4D97-AF65-F5344CB8AC3E}">
-        <p14:creationId xmlns:p14="http://schemas.microsoft.com/office/powerpoint/2010/main" val="2167273281"/>
+        <p14:creationId xmlns:p14="http://schemas.microsoft.com/office/powerpoint/2010/main" val="2160349714"/>
       </p:ext>
     </p:extLst>
   </p:cSld>
@@ -8596,7 +10447,7 @@
           <p:cNvPr id="2" name="Title 1">
             <a:extLst>
               <a:ext uri="{FF2B5EF4-FFF2-40B4-BE49-F238E27FC236}">
-                <a16:creationId xmlns:a16="http://schemas.microsoft.com/office/drawing/2014/main" id="{8BF87117-1E4E-4EE9-8760-25D09E6E6179}"/>
+                <a16:creationId xmlns:a16="http://schemas.microsoft.com/office/drawing/2014/main" id="{BB1C60A3-10D8-462D-B3B4-AF7F4B5F8101}"/>
               </a:ext>
             </a:extLst>
           </p:cNvPr>
@@ -8609,15 +10460,14 @@
         </p:nvSpPr>
         <p:spPr/>
         <p:txBody>
-          <a:bodyPr>
-            <a:normAutofit/>
-          </a:bodyPr>
+          <a:bodyPr/>
           <a:lstStyle/>
           <a:p>
             <a:r>
-              <a:rPr lang="en-US" dirty="0"/>
-              <a:t>Drug-induced mortality rates and barriers to medical treatment</a:t>
-            </a:r>
+              <a:rPr lang="en-US" dirty="0" err="1"/>
+              <a:t>Fentynal</a:t>
+            </a:r>
+            <a:endParaRPr lang="en-US" dirty="0"/>
           </a:p>
         </p:txBody>
       </p:sp>
@@ -8626,7 +10476,7 @@
           <p:cNvPr id="3" name="Content Placeholder 2">
             <a:extLst>
               <a:ext uri="{FF2B5EF4-FFF2-40B4-BE49-F238E27FC236}">
-                <a16:creationId xmlns:a16="http://schemas.microsoft.com/office/drawing/2014/main" id="{F37D4F70-3A7A-4527-B5BB-4CBFEE548667}"/>
+                <a16:creationId xmlns:a16="http://schemas.microsoft.com/office/drawing/2014/main" id="{DE910129-DA90-46EC-8EF1-7D23BD0B5F3F}"/>
               </a:ext>
             </a:extLst>
           </p:cNvPr>
@@ -8649,7 +10499,7 @@
     </p:spTree>
     <p:extLst>
       <p:ext uri="{BB962C8B-B14F-4D97-AF65-F5344CB8AC3E}">
-        <p14:creationId xmlns:p14="http://schemas.microsoft.com/office/powerpoint/2010/main" val="2699776682"/>
+        <p14:creationId xmlns:p14="http://schemas.microsoft.com/office/powerpoint/2010/main" val="2837072940"/>
       </p:ext>
     </p:extLst>
   </p:cSld>

</xml_diff>

<commit_message>
Corrected chi-square calculation and added r-value to regresison
</commit_message>
<xml_diff>
--- a/Drug Mortality and Socio-Economic conditions in Connecticut.pptx
+++ b/Drug Mortality and Socio-Economic conditions in Connecticut.pptx
@@ -19,7 +19,8 @@
     <p:sldId id="260" r:id="rId13"/>
     <p:sldId id="269" r:id="rId14"/>
     <p:sldId id="270" r:id="rId15"/>
-    <p:sldId id="265" r:id="rId16"/>
+    <p:sldId id="271" r:id="rId16"/>
+    <p:sldId id="265" r:id="rId17"/>
   </p:sldIdLst>
   <p:sldSz cx="12192000" cy="6858000"/>
   <p:notesSz cx="6858000" cy="9144000"/>
@@ -315,7 +316,7 @@
             <a:fld id="{B61BEF0D-F0BB-DE4B-95CE-6DB70DBA9567}" type="datetimeFigureOut">
               <a:rPr lang="en-US" dirty="0"/>
               <a:pPr/>
-              <a:t>6/13/2018</a:t>
+              <a:t>6/14/2018</a:t>
             </a:fld>
             <a:endParaRPr lang="en-US" dirty="0"/>
           </a:p>
@@ -650,7 +651,7 @@
             <a:fld id="{B61BEF0D-F0BB-DE4B-95CE-6DB70DBA9567}" type="datetimeFigureOut">
               <a:rPr lang="en-US" dirty="0"/>
               <a:pPr/>
-              <a:t>6/13/2018</a:t>
+              <a:t>6/14/2018</a:t>
             </a:fld>
             <a:endParaRPr lang="en-US" dirty="0"/>
           </a:p>
@@ -1048,7 +1049,7 @@
             <a:fld id="{B61BEF0D-F0BB-DE4B-95CE-6DB70DBA9567}" type="datetimeFigureOut">
               <a:rPr lang="en-US" dirty="0"/>
               <a:pPr/>
-              <a:t>6/13/2018</a:t>
+              <a:t>6/14/2018</a:t>
             </a:fld>
             <a:endParaRPr lang="en-US" dirty="0"/>
           </a:p>
@@ -1381,7 +1382,7 @@
             <a:fld id="{B61BEF0D-F0BB-DE4B-95CE-6DB70DBA9567}" type="datetimeFigureOut">
               <a:rPr lang="en-US" dirty="0"/>
               <a:pPr/>
-              <a:t>6/13/2018</a:t>
+              <a:t>6/14/2018</a:t>
             </a:fld>
             <a:endParaRPr lang="en-US" dirty="0"/>
           </a:p>
@@ -1698,7 +1699,7 @@
             <a:fld id="{B61BEF0D-F0BB-DE4B-95CE-6DB70DBA9567}" type="datetimeFigureOut">
               <a:rPr lang="en-US" dirty="0"/>
               <a:pPr/>
-              <a:t>6/13/2018</a:t>
+              <a:t>6/14/2018</a:t>
             </a:fld>
             <a:endParaRPr lang="en-US" dirty="0"/>
           </a:p>
@@ -2091,7 +2092,7 @@
             <a:fld id="{B61BEF0D-F0BB-DE4B-95CE-6DB70DBA9567}" type="datetimeFigureOut">
               <a:rPr lang="en-US" dirty="0"/>
               <a:pPr/>
-              <a:t>6/13/2018</a:t>
+              <a:t>6/14/2018</a:t>
             </a:fld>
             <a:endParaRPr lang="en-US" dirty="0"/>
           </a:p>
@@ -2345,7 +2346,7 @@
             <a:fld id="{B61BEF0D-F0BB-DE4B-95CE-6DB70DBA9567}" type="datetimeFigureOut">
               <a:rPr lang="en-US" dirty="0"/>
               <a:pPr/>
-              <a:t>6/13/2018</a:t>
+              <a:t>6/14/2018</a:t>
             </a:fld>
             <a:endParaRPr lang="en-US" dirty="0"/>
           </a:p>
@@ -2604,7 +2605,7 @@
             <a:fld id="{B61BEF0D-F0BB-DE4B-95CE-6DB70DBA9567}" type="datetimeFigureOut">
               <a:rPr lang="en-US" dirty="0"/>
               <a:pPr/>
-              <a:t>6/13/2018</a:t>
+              <a:t>6/14/2018</a:t>
             </a:fld>
             <a:endParaRPr lang="en-US" dirty="0"/>
           </a:p>
@@ -2863,7 +2864,7 @@
             <a:fld id="{B61BEF0D-F0BB-DE4B-95CE-6DB70DBA9567}" type="datetimeFigureOut">
               <a:rPr lang="en-US" dirty="0"/>
               <a:pPr/>
-              <a:t>6/13/2018</a:t>
+              <a:t>6/14/2018</a:t>
             </a:fld>
             <a:endParaRPr lang="en-US" dirty="0"/>
           </a:p>
@@ -3189,7 +3190,7 @@
             <a:fld id="{B61BEF0D-F0BB-DE4B-95CE-6DB70DBA9567}" type="datetimeFigureOut">
               <a:rPr lang="en-US" dirty="0"/>
               <a:pPr/>
-              <a:t>6/13/2018</a:t>
+              <a:t>6/14/2018</a:t>
             </a:fld>
             <a:endParaRPr lang="en-US" dirty="0"/>
           </a:p>
@@ -3509,7 +3510,7 @@
             <a:fld id="{B61BEF0D-F0BB-DE4B-95CE-6DB70DBA9567}" type="datetimeFigureOut">
               <a:rPr lang="en-US" dirty="0"/>
               <a:pPr/>
-              <a:t>6/13/2018</a:t>
+              <a:t>6/14/2018</a:t>
             </a:fld>
             <a:endParaRPr lang="en-US" dirty="0"/>
           </a:p>
@@ -3963,7 +3964,7 @@
             <a:fld id="{B61BEF0D-F0BB-DE4B-95CE-6DB70DBA9567}" type="datetimeFigureOut">
               <a:rPr lang="en-US" dirty="0"/>
               <a:pPr/>
-              <a:t>6/13/2018</a:t>
+              <a:t>6/14/2018</a:t>
             </a:fld>
             <a:endParaRPr lang="en-US" dirty="0"/>
           </a:p>
@@ -4165,7 +4166,7 @@
             <a:fld id="{B61BEF0D-F0BB-DE4B-95CE-6DB70DBA9567}" type="datetimeFigureOut">
               <a:rPr lang="en-US" dirty="0"/>
               <a:pPr/>
-              <a:t>6/13/2018</a:t>
+              <a:t>6/14/2018</a:t>
             </a:fld>
             <a:endParaRPr lang="en-US" dirty="0"/>
           </a:p>
@@ -4339,7 +4340,7 @@
             <a:fld id="{B61BEF0D-F0BB-DE4B-95CE-6DB70DBA9567}" type="datetimeFigureOut">
               <a:rPr lang="en-US" dirty="0"/>
               <a:pPr/>
-              <a:t>6/13/2018</a:t>
+              <a:t>6/14/2018</a:t>
             </a:fld>
             <a:endParaRPr lang="en-US" dirty="0"/>
           </a:p>
@@ -4669,7 +4670,7 @@
             <a:fld id="{B61BEF0D-F0BB-DE4B-95CE-6DB70DBA9567}" type="datetimeFigureOut">
               <a:rPr lang="en-US" dirty="0"/>
               <a:pPr/>
-              <a:t>6/13/2018</a:t>
+              <a:t>6/14/2018</a:t>
             </a:fld>
             <a:endParaRPr lang="en-US" dirty="0"/>
           </a:p>
@@ -5011,7 +5012,7 @@
             <a:fld id="{B61BEF0D-F0BB-DE4B-95CE-6DB70DBA9567}" type="datetimeFigureOut">
               <a:rPr lang="en-US" dirty="0"/>
               <a:pPr/>
-              <a:t>6/13/2018</a:t>
+              <a:t>6/14/2018</a:t>
             </a:fld>
             <a:endParaRPr lang="en-US" dirty="0"/>
           </a:p>
@@ -7125,7 +7126,7 @@
             <a:fld id="{B61BEF0D-F0BB-DE4B-95CE-6DB70DBA9567}" type="datetimeFigureOut">
               <a:rPr lang="en-US" dirty="0"/>
               <a:pPr/>
-              <a:t>6/13/2018</a:t>
+              <a:t>6/14/2018</a:t>
             </a:fld>
             <a:endParaRPr lang="en-US" dirty="0"/>
           </a:p>
@@ -8073,17 +8074,17 @@
           <a:p>
             <a:r>
               <a:rPr lang="en-US" dirty="0"/>
-              <a:t>Chi-Squared test on both cases gives a p-value of 0, rejecting null hypothesis. (Some groups are affected more than others).</a:t>
+              <a:t>Chi-Squared test on both cases gives a p-value of almost 0, rejecting null hypothesis. (Some groups are affected more than others).</a:t>
             </a:r>
           </a:p>
         </p:txBody>
       </p:sp>
       <p:graphicFrame>
         <p:nvGraphicFramePr>
-          <p:cNvPr id="10" name="Content Placeholder 9">
+          <p:cNvPr id="9" name="Content Placeholder 8">
             <a:extLst>
               <a:ext uri="{FF2B5EF4-FFF2-40B4-BE49-F238E27FC236}">
-                <a16:creationId xmlns:a16="http://schemas.microsoft.com/office/drawing/2014/main" id="{94D85E88-287E-4D40-B1B0-903EACBF1A3F}"/>
+                <a16:creationId xmlns:a16="http://schemas.microsoft.com/office/drawing/2014/main" id="{D6BA4ED2-2DB2-4756-A3F1-9D907519DEF9}"/>
               </a:ext>
             </a:extLst>
           </p:cNvPr>
@@ -8094,14 +8095,14 @@
             <p:ph idx="1"/>
             <p:extLst>
               <p:ext uri="{D42A27DB-BD31-4B8C-83A1-F6EECF244321}">
-                <p14:modId xmlns:p14="http://schemas.microsoft.com/office/powerpoint/2010/main" val="3462426241"/>
+                <p14:modId xmlns:p14="http://schemas.microsoft.com/office/powerpoint/2010/main" val="3121684132"/>
               </p:ext>
             </p:extLst>
           </p:nvPr>
         </p:nvGraphicFramePr>
         <p:xfrm>
-          <a:off x="2394408" y="1979629"/>
-          <a:ext cx="7711127" cy="3647108"/>
+          <a:off x="2941162" y="2133597"/>
+          <a:ext cx="7286920" cy="3778257"/>
         </p:xfrm>
         <a:graphic>
           <a:graphicData uri="http://schemas.openxmlformats.org/drawingml/2006/table">
@@ -8110,36 +8111,1034 @@
                 <a:tableStyleId>{5C22544A-7EE6-4342-B048-85BDC9FD1C3A}</a:tableStyleId>
               </a:tblPr>
               <a:tblGrid>
-                <a:gridCol w="1870624">
+                <a:gridCol w="1821730">
                   <a:extLst>
                     <a:ext uri="{9D8B030D-6E8A-4147-A177-3AD203B41FA5}">
-                      <a16:colId xmlns:a16="http://schemas.microsoft.com/office/drawing/2014/main" val="1047430046"/>
+                      <a16:colId xmlns:a16="http://schemas.microsoft.com/office/drawing/2014/main" val="1858910488"/>
                     </a:ext>
                   </a:extLst>
                 </a:gridCol>
-                <a:gridCol w="1870624">
+                <a:gridCol w="1821730">
                   <a:extLst>
                     <a:ext uri="{9D8B030D-6E8A-4147-A177-3AD203B41FA5}">
-                      <a16:colId xmlns:a16="http://schemas.microsoft.com/office/drawing/2014/main" val="421138780"/>
+                      <a16:colId xmlns:a16="http://schemas.microsoft.com/office/drawing/2014/main" val="1894328362"/>
                     </a:ext>
                   </a:extLst>
                 </a:gridCol>
-                <a:gridCol w="2099255">
+                <a:gridCol w="1821730">
                   <a:extLst>
                     <a:ext uri="{9D8B030D-6E8A-4147-A177-3AD203B41FA5}">
-                      <a16:colId xmlns:a16="http://schemas.microsoft.com/office/drawing/2014/main" val="2337895534"/>
+                      <a16:colId xmlns:a16="http://schemas.microsoft.com/office/drawing/2014/main" val="3677548323"/>
                     </a:ext>
                   </a:extLst>
                 </a:gridCol>
-                <a:gridCol w="1870624">
+                <a:gridCol w="1821730">
                   <a:extLst>
                     <a:ext uri="{9D8B030D-6E8A-4147-A177-3AD203B41FA5}">
-                      <a16:colId xmlns:a16="http://schemas.microsoft.com/office/drawing/2014/main" val="3911636789"/>
+                      <a16:colId xmlns:a16="http://schemas.microsoft.com/office/drawing/2014/main" val="1768132450"/>
                     </a:ext>
                   </a:extLst>
                 </a:gridCol>
               </a:tblGrid>
-              <a:tr h="430672">
+              <a:tr h="179917">
+                <a:tc>
+                  <a:txBody>
+                    <a:bodyPr/>
+                    <a:lstStyle/>
+                    <a:p>
+                      <a:pPr algn="ctr" fontAlgn="b"/>
+                      <a:r>
+                        <a:rPr lang="en-US" sz="1100" b="1" u="none" strike="noStrike" dirty="0">
+                          <a:effectLst/>
+                        </a:rPr>
+                        <a:t>Age Group</a:t>
+                      </a:r>
+                      <a:endParaRPr lang="en-US" sz="1100" b="1" i="0" u="none" strike="noStrike" dirty="0">
+                        <a:solidFill>
+                          <a:srgbClr val="000000"/>
+                        </a:solidFill>
+                        <a:effectLst/>
+                        <a:latin typeface="Calibri" panose="020F0502020204030204" pitchFamily="34" charset="0"/>
+                      </a:endParaRPr>
+                    </a:p>
+                  </a:txBody>
+                  <a:tcPr marL="6204" marR="6204" marT="6204" marB="0" anchor="b"/>
+                </a:tc>
+                <a:tc>
+                  <a:txBody>
+                    <a:bodyPr/>
+                    <a:lstStyle/>
+                    <a:p>
+                      <a:pPr algn="ctr" fontAlgn="b"/>
+                      <a:r>
+                        <a:rPr lang="en-US" sz="1100" b="1" u="none" strike="noStrike" dirty="0">
+                          <a:effectLst/>
+                        </a:rPr>
+                        <a:t>Population %</a:t>
+                      </a:r>
+                      <a:endParaRPr lang="en-US" sz="1100" b="1" i="0" u="none" strike="noStrike" dirty="0">
+                        <a:solidFill>
+                          <a:srgbClr val="000000"/>
+                        </a:solidFill>
+                        <a:effectLst/>
+                        <a:latin typeface="Calibri" panose="020F0502020204030204" pitchFamily="34" charset="0"/>
+                      </a:endParaRPr>
+                    </a:p>
+                  </a:txBody>
+                  <a:tcPr marL="6204" marR="6204" marT="6204" marB="0" anchor="b"/>
+                </a:tc>
+                <a:tc>
+                  <a:txBody>
+                    <a:bodyPr/>
+                    <a:lstStyle/>
+                    <a:p>
+                      <a:pPr algn="ctr" fontAlgn="b"/>
+                      <a:r>
+                        <a:rPr lang="en-US" sz="1100" b="1" u="none" strike="noStrike" dirty="0">
+                          <a:effectLst/>
+                        </a:rPr>
+                        <a:t>Expected</a:t>
+                      </a:r>
+                      <a:endParaRPr lang="en-US" sz="1100" b="1" i="0" u="none" strike="noStrike" dirty="0">
+                        <a:solidFill>
+                          <a:srgbClr val="000000"/>
+                        </a:solidFill>
+                        <a:effectLst/>
+                        <a:latin typeface="Calibri" panose="020F0502020204030204" pitchFamily="34" charset="0"/>
+                      </a:endParaRPr>
+                    </a:p>
+                  </a:txBody>
+                  <a:tcPr marL="6204" marR="6204" marT="6204" marB="0" anchor="b"/>
+                </a:tc>
+                <a:tc>
+                  <a:txBody>
+                    <a:bodyPr/>
+                    <a:lstStyle/>
+                    <a:p>
+                      <a:pPr algn="ctr" fontAlgn="b"/>
+                      <a:r>
+                        <a:rPr lang="en-US" sz="1100" b="1" u="none" strike="noStrike" dirty="0">
+                          <a:effectLst/>
+                        </a:rPr>
+                        <a:t>Observed</a:t>
+                      </a:r>
+                      <a:endParaRPr lang="en-US" sz="1100" b="1" i="0" u="none" strike="noStrike" dirty="0">
+                        <a:solidFill>
+                          <a:srgbClr val="000000"/>
+                        </a:solidFill>
+                        <a:effectLst/>
+                        <a:latin typeface="Calibri" panose="020F0502020204030204" pitchFamily="34" charset="0"/>
+                      </a:endParaRPr>
+                    </a:p>
+                  </a:txBody>
+                  <a:tcPr marL="6204" marR="6204" marT="6204" marB="0" anchor="b"/>
+                </a:tc>
+                <a:extLst>
+                  <a:ext uri="{0D108BD9-81ED-4DB2-BD59-A6C34878D82A}">
+                    <a16:rowId xmlns:a16="http://schemas.microsoft.com/office/drawing/2014/main" val="2096222795"/>
+                  </a:ext>
+                </a:extLst>
+              </a:tr>
+              <a:tr h="179917">
+                <a:tc>
+                  <a:txBody>
+                    <a:bodyPr/>
+                    <a:lstStyle/>
+                    <a:p>
+                      <a:pPr algn="l" fontAlgn="b"/>
+                      <a:r>
+                        <a:rPr lang="en-US" sz="1100" u="none" strike="noStrike">
+                          <a:effectLst/>
+                        </a:rPr>
+                        <a:t>20-29 years</a:t>
+                      </a:r>
+                      <a:endParaRPr lang="en-US" sz="1100" b="0" i="0" u="none" strike="noStrike">
+                        <a:solidFill>
+                          <a:srgbClr val="000000"/>
+                        </a:solidFill>
+                        <a:effectLst/>
+                        <a:latin typeface="Calibri" panose="020F0502020204030204" pitchFamily="34" charset="0"/>
+                      </a:endParaRPr>
+                    </a:p>
+                  </a:txBody>
+                  <a:tcPr marL="6204" marR="6204" marT="6204" marB="0" anchor="b"/>
+                </a:tc>
+                <a:tc>
+                  <a:txBody>
+                    <a:bodyPr/>
+                    <a:lstStyle/>
+                    <a:p>
+                      <a:pPr algn="r" fontAlgn="b"/>
+                      <a:r>
+                        <a:rPr lang="en-US" sz="1100" u="none" strike="noStrike">
+                          <a:effectLst/>
+                        </a:rPr>
+                        <a:t>19.88</a:t>
+                      </a:r>
+                      <a:endParaRPr lang="en-US" sz="1100" b="0" i="0" u="none" strike="noStrike">
+                        <a:solidFill>
+                          <a:srgbClr val="000000"/>
+                        </a:solidFill>
+                        <a:effectLst/>
+                        <a:latin typeface="Calibri" panose="020F0502020204030204" pitchFamily="34" charset="0"/>
+                      </a:endParaRPr>
+                    </a:p>
+                  </a:txBody>
+                  <a:tcPr marL="6204" marR="6204" marT="6204" marB="0" anchor="b"/>
+                </a:tc>
+                <a:tc>
+                  <a:txBody>
+                    <a:bodyPr/>
+                    <a:lstStyle/>
+                    <a:p>
+                      <a:pPr algn="r" fontAlgn="b"/>
+                      <a:r>
+                        <a:rPr lang="en-US" sz="1100" u="none" strike="noStrike">
+                          <a:effectLst/>
+                        </a:rPr>
+                        <a:t>584.8696</a:t>
+                      </a:r>
+                      <a:endParaRPr lang="en-US" sz="1100" b="0" i="0" u="none" strike="noStrike">
+                        <a:solidFill>
+                          <a:srgbClr val="000000"/>
+                        </a:solidFill>
+                        <a:effectLst/>
+                        <a:latin typeface="Calibri" panose="020F0502020204030204" pitchFamily="34" charset="0"/>
+                      </a:endParaRPr>
+                    </a:p>
+                  </a:txBody>
+                  <a:tcPr marL="6204" marR="6204" marT="6204" marB="0" anchor="b"/>
+                </a:tc>
+                <a:tc>
+                  <a:txBody>
+                    <a:bodyPr/>
+                    <a:lstStyle/>
+                    <a:p>
+                      <a:pPr algn="r" fontAlgn="b"/>
+                      <a:r>
+                        <a:rPr lang="en-US" sz="1100" u="none" strike="noStrike" dirty="0">
+                          <a:effectLst/>
+                        </a:rPr>
+                        <a:t>584</a:t>
+                      </a:r>
+                      <a:endParaRPr lang="en-US" sz="1100" b="0" i="0" u="none" strike="noStrike" dirty="0">
+                        <a:solidFill>
+                          <a:srgbClr val="000000"/>
+                        </a:solidFill>
+                        <a:effectLst/>
+                        <a:latin typeface="Calibri" panose="020F0502020204030204" pitchFamily="34" charset="0"/>
+                      </a:endParaRPr>
+                    </a:p>
+                  </a:txBody>
+                  <a:tcPr marL="6204" marR="6204" marT="6204" marB="0" anchor="b"/>
+                </a:tc>
+                <a:extLst>
+                  <a:ext uri="{0D108BD9-81ED-4DB2-BD59-A6C34878D82A}">
+                    <a16:rowId xmlns:a16="http://schemas.microsoft.com/office/drawing/2014/main" val="173712571"/>
+                  </a:ext>
+                </a:extLst>
+              </a:tr>
+              <a:tr h="179917">
+                <a:tc>
+                  <a:txBody>
+                    <a:bodyPr/>
+                    <a:lstStyle/>
+                    <a:p>
+                      <a:pPr algn="l" fontAlgn="b"/>
+                      <a:r>
+                        <a:rPr lang="en-US" sz="1100" u="none" strike="noStrike">
+                          <a:effectLst/>
+                        </a:rPr>
+                        <a:t>30-39 years</a:t>
+                      </a:r>
+                      <a:endParaRPr lang="en-US" sz="1100" b="0" i="0" u="none" strike="noStrike">
+                        <a:solidFill>
+                          <a:srgbClr val="000000"/>
+                        </a:solidFill>
+                        <a:effectLst/>
+                        <a:latin typeface="Calibri" panose="020F0502020204030204" pitchFamily="34" charset="0"/>
+                      </a:endParaRPr>
+                    </a:p>
+                  </a:txBody>
+                  <a:tcPr marL="6204" marR="6204" marT="6204" marB="0" anchor="b"/>
+                </a:tc>
+                <a:tc>
+                  <a:txBody>
+                    <a:bodyPr/>
+                    <a:lstStyle/>
+                    <a:p>
+                      <a:pPr algn="r" fontAlgn="b"/>
+                      <a:r>
+                        <a:rPr lang="en-US" sz="1100" u="none" strike="noStrike">
+                          <a:effectLst/>
+                        </a:rPr>
+                        <a:t>18.61</a:t>
+                      </a:r>
+                      <a:endParaRPr lang="en-US" sz="1100" b="0" i="0" u="none" strike="noStrike">
+                        <a:solidFill>
+                          <a:srgbClr val="000000"/>
+                        </a:solidFill>
+                        <a:effectLst/>
+                        <a:latin typeface="Calibri" panose="020F0502020204030204" pitchFamily="34" charset="0"/>
+                      </a:endParaRPr>
+                    </a:p>
+                  </a:txBody>
+                  <a:tcPr marL="6204" marR="6204" marT="6204" marB="0" anchor="b"/>
+                </a:tc>
+                <a:tc>
+                  <a:txBody>
+                    <a:bodyPr/>
+                    <a:lstStyle/>
+                    <a:p>
+                      <a:pPr algn="r" fontAlgn="b"/>
+                      <a:r>
+                        <a:rPr lang="en-US" sz="1100" u="none" strike="noStrike">
+                          <a:effectLst/>
+                        </a:rPr>
+                        <a:t>547.5062</a:t>
+                      </a:r>
+                      <a:endParaRPr lang="en-US" sz="1100" b="0" i="0" u="none" strike="noStrike">
+                        <a:solidFill>
+                          <a:srgbClr val="000000"/>
+                        </a:solidFill>
+                        <a:effectLst/>
+                        <a:latin typeface="Calibri" panose="020F0502020204030204" pitchFamily="34" charset="0"/>
+                      </a:endParaRPr>
+                    </a:p>
+                  </a:txBody>
+                  <a:tcPr marL="6204" marR="6204" marT="6204" marB="0" anchor="b"/>
+                </a:tc>
+                <a:tc>
+                  <a:txBody>
+                    <a:bodyPr/>
+                    <a:lstStyle/>
+                    <a:p>
+                      <a:pPr algn="r" fontAlgn="b"/>
+                      <a:r>
+                        <a:rPr lang="en-US" sz="1100" u="none" strike="noStrike" dirty="0">
+                          <a:effectLst/>
+                        </a:rPr>
+                        <a:t>780</a:t>
+                      </a:r>
+                      <a:endParaRPr lang="en-US" sz="1100" b="0" i="0" u="none" strike="noStrike" dirty="0">
+                        <a:solidFill>
+                          <a:srgbClr val="000000"/>
+                        </a:solidFill>
+                        <a:effectLst/>
+                        <a:latin typeface="Calibri" panose="020F0502020204030204" pitchFamily="34" charset="0"/>
+                      </a:endParaRPr>
+                    </a:p>
+                  </a:txBody>
+                  <a:tcPr marL="6204" marR="6204" marT="6204" marB="0" anchor="b"/>
+                </a:tc>
+                <a:extLst>
+                  <a:ext uri="{0D108BD9-81ED-4DB2-BD59-A6C34878D82A}">
+                    <a16:rowId xmlns:a16="http://schemas.microsoft.com/office/drawing/2014/main" val="4175885457"/>
+                  </a:ext>
+                </a:extLst>
+              </a:tr>
+              <a:tr h="179917">
+                <a:tc>
+                  <a:txBody>
+                    <a:bodyPr/>
+                    <a:lstStyle/>
+                    <a:p>
+                      <a:pPr algn="l" fontAlgn="b"/>
+                      <a:r>
+                        <a:rPr lang="en-US" sz="1100" u="none" strike="noStrike" dirty="0">
+                          <a:effectLst/>
+                        </a:rPr>
+                        <a:t>40-49 years</a:t>
+                      </a:r>
+                      <a:endParaRPr lang="en-US" sz="1100" b="0" i="0" u="none" strike="noStrike" dirty="0">
+                        <a:solidFill>
+                          <a:srgbClr val="000000"/>
+                        </a:solidFill>
+                        <a:effectLst/>
+                        <a:latin typeface="Calibri" panose="020F0502020204030204" pitchFamily="34" charset="0"/>
+                      </a:endParaRPr>
+                    </a:p>
+                  </a:txBody>
+                  <a:tcPr marL="6204" marR="6204" marT="6204" marB="0" anchor="b"/>
+                </a:tc>
+                <a:tc>
+                  <a:txBody>
+                    <a:bodyPr/>
+                    <a:lstStyle/>
+                    <a:p>
+                      <a:pPr algn="r" fontAlgn="b"/>
+                      <a:r>
+                        <a:rPr lang="en-US" sz="1100" u="none" strike="noStrike">
+                          <a:effectLst/>
+                        </a:rPr>
+                        <a:t>23.98</a:t>
+                      </a:r>
+                      <a:endParaRPr lang="en-US" sz="1100" b="0" i="0" u="none" strike="noStrike">
+                        <a:solidFill>
+                          <a:srgbClr val="000000"/>
+                        </a:solidFill>
+                        <a:effectLst/>
+                        <a:latin typeface="Calibri" panose="020F0502020204030204" pitchFamily="34" charset="0"/>
+                      </a:endParaRPr>
+                    </a:p>
+                  </a:txBody>
+                  <a:tcPr marL="6204" marR="6204" marT="6204" marB="0" anchor="b"/>
+                </a:tc>
+                <a:tc>
+                  <a:txBody>
+                    <a:bodyPr/>
+                    <a:lstStyle/>
+                    <a:p>
+                      <a:pPr algn="r" fontAlgn="b"/>
+                      <a:r>
+                        <a:rPr lang="en-US" sz="1100" u="none" strike="noStrike">
+                          <a:effectLst/>
+                        </a:rPr>
+                        <a:t>705.4916</a:t>
+                      </a:r>
+                      <a:endParaRPr lang="en-US" sz="1100" b="0" i="0" u="none" strike="noStrike">
+                        <a:solidFill>
+                          <a:srgbClr val="000000"/>
+                        </a:solidFill>
+                        <a:effectLst/>
+                        <a:latin typeface="Calibri" panose="020F0502020204030204" pitchFamily="34" charset="0"/>
+                      </a:endParaRPr>
+                    </a:p>
+                  </a:txBody>
+                  <a:tcPr marL="6204" marR="6204" marT="6204" marB="0" anchor="b"/>
+                </a:tc>
+                <a:tc>
+                  <a:txBody>
+                    <a:bodyPr/>
+                    <a:lstStyle/>
+                    <a:p>
+                      <a:pPr algn="r" fontAlgn="b"/>
+                      <a:r>
+                        <a:rPr lang="en-US" sz="1100" u="none" strike="noStrike" dirty="0">
+                          <a:effectLst/>
+                        </a:rPr>
+                        <a:t>706</a:t>
+                      </a:r>
+                      <a:endParaRPr lang="en-US" sz="1100" b="0" i="0" u="none" strike="noStrike" dirty="0">
+                        <a:solidFill>
+                          <a:srgbClr val="000000"/>
+                        </a:solidFill>
+                        <a:effectLst/>
+                        <a:latin typeface="Calibri" panose="020F0502020204030204" pitchFamily="34" charset="0"/>
+                      </a:endParaRPr>
+                    </a:p>
+                  </a:txBody>
+                  <a:tcPr marL="6204" marR="6204" marT="6204" marB="0" anchor="b"/>
+                </a:tc>
+                <a:extLst>
+                  <a:ext uri="{0D108BD9-81ED-4DB2-BD59-A6C34878D82A}">
+                    <a16:rowId xmlns:a16="http://schemas.microsoft.com/office/drawing/2014/main" val="50741914"/>
+                  </a:ext>
+                </a:extLst>
+              </a:tr>
+              <a:tr h="179917">
+                <a:tc>
+                  <a:txBody>
+                    <a:bodyPr/>
+                    <a:lstStyle/>
+                    <a:p>
+                      <a:pPr algn="l" fontAlgn="b"/>
+                      <a:r>
+                        <a:rPr lang="en-US" sz="1100" u="none" strike="noStrike">
+                          <a:effectLst/>
+                        </a:rPr>
+                        <a:t>50-59 years</a:t>
+                      </a:r>
+                      <a:endParaRPr lang="en-US" sz="1100" b="0" i="0" u="none" strike="noStrike">
+                        <a:solidFill>
+                          <a:srgbClr val="000000"/>
+                        </a:solidFill>
+                        <a:effectLst/>
+                        <a:latin typeface="Calibri" panose="020F0502020204030204" pitchFamily="34" charset="0"/>
+                      </a:endParaRPr>
+                    </a:p>
+                  </a:txBody>
+                  <a:tcPr marL="6204" marR="6204" marT="6204" marB="0" anchor="b"/>
+                </a:tc>
+                <a:tc>
+                  <a:txBody>
+                    <a:bodyPr/>
+                    <a:lstStyle/>
+                    <a:p>
+                      <a:pPr algn="r" fontAlgn="b"/>
+                      <a:r>
+                        <a:rPr lang="en-US" sz="1100" u="none" strike="noStrike">
+                          <a:effectLst/>
+                        </a:rPr>
+                        <a:t>22.71</a:t>
+                      </a:r>
+                      <a:endParaRPr lang="en-US" sz="1100" b="0" i="0" u="none" strike="noStrike">
+                        <a:solidFill>
+                          <a:srgbClr val="000000"/>
+                        </a:solidFill>
+                        <a:effectLst/>
+                        <a:latin typeface="Calibri" panose="020F0502020204030204" pitchFamily="34" charset="0"/>
+                      </a:endParaRPr>
+                    </a:p>
+                  </a:txBody>
+                  <a:tcPr marL="6204" marR="6204" marT="6204" marB="0" anchor="b"/>
+                </a:tc>
+                <a:tc>
+                  <a:txBody>
+                    <a:bodyPr/>
+                    <a:lstStyle/>
+                    <a:p>
+                      <a:pPr algn="r" fontAlgn="b"/>
+                      <a:r>
+                        <a:rPr lang="en-US" sz="1100" u="none" strike="noStrike">
+                          <a:effectLst/>
+                        </a:rPr>
+                        <a:t>668.1282</a:t>
+                      </a:r>
+                      <a:endParaRPr lang="en-US" sz="1100" b="0" i="0" u="none" strike="noStrike">
+                        <a:solidFill>
+                          <a:srgbClr val="000000"/>
+                        </a:solidFill>
+                        <a:effectLst/>
+                        <a:latin typeface="Calibri" panose="020F0502020204030204" pitchFamily="34" charset="0"/>
+                      </a:endParaRPr>
+                    </a:p>
+                  </a:txBody>
+                  <a:tcPr marL="6204" marR="6204" marT="6204" marB="0" anchor="b"/>
+                </a:tc>
+                <a:tc>
+                  <a:txBody>
+                    <a:bodyPr/>
+                    <a:lstStyle/>
+                    <a:p>
+                      <a:pPr algn="r" fontAlgn="b"/>
+                      <a:r>
+                        <a:rPr lang="en-US" sz="1100" u="none" strike="noStrike" dirty="0">
+                          <a:effectLst/>
+                        </a:rPr>
+                        <a:t>673</a:t>
+                      </a:r>
+                      <a:endParaRPr lang="en-US" sz="1100" b="0" i="0" u="none" strike="noStrike" dirty="0">
+                        <a:solidFill>
+                          <a:srgbClr val="000000"/>
+                        </a:solidFill>
+                        <a:effectLst/>
+                        <a:latin typeface="Calibri" panose="020F0502020204030204" pitchFamily="34" charset="0"/>
+                      </a:endParaRPr>
+                    </a:p>
+                  </a:txBody>
+                  <a:tcPr marL="6204" marR="6204" marT="6204" marB="0" anchor="b"/>
+                </a:tc>
+                <a:extLst>
+                  <a:ext uri="{0D108BD9-81ED-4DB2-BD59-A6C34878D82A}">
+                    <a16:rowId xmlns:a16="http://schemas.microsoft.com/office/drawing/2014/main" val="4197843445"/>
+                  </a:ext>
+                </a:extLst>
+              </a:tr>
+              <a:tr h="179917">
+                <a:tc>
+                  <a:txBody>
+                    <a:bodyPr/>
+                    <a:lstStyle/>
+                    <a:p>
+                      <a:pPr algn="l" fontAlgn="b"/>
+                      <a:r>
+                        <a:rPr lang="en-US" sz="1100" u="none" strike="noStrike">
+                          <a:effectLst/>
+                        </a:rPr>
+                        <a:t>60-69 years</a:t>
+                      </a:r>
+                      <a:endParaRPr lang="en-US" sz="1100" b="0" i="0" u="none" strike="noStrike">
+                        <a:solidFill>
+                          <a:srgbClr val="000000"/>
+                        </a:solidFill>
+                        <a:effectLst/>
+                        <a:latin typeface="Calibri" panose="020F0502020204030204" pitchFamily="34" charset="0"/>
+                      </a:endParaRPr>
+                    </a:p>
+                  </a:txBody>
+                  <a:tcPr marL="6204" marR="6204" marT="6204" marB="0" anchor="b"/>
+                </a:tc>
+                <a:tc>
+                  <a:txBody>
+                    <a:bodyPr/>
+                    <a:lstStyle/>
+                    <a:p>
+                      <a:pPr algn="r" fontAlgn="b"/>
+                      <a:r>
+                        <a:rPr lang="en-US" sz="1100" u="none" strike="noStrike">
+                          <a:effectLst/>
+                        </a:rPr>
+                        <a:t>14.82</a:t>
+                      </a:r>
+                      <a:endParaRPr lang="en-US" sz="1100" b="0" i="0" u="none" strike="noStrike">
+                        <a:solidFill>
+                          <a:srgbClr val="000000"/>
+                        </a:solidFill>
+                        <a:effectLst/>
+                        <a:latin typeface="Calibri" panose="020F0502020204030204" pitchFamily="34" charset="0"/>
+                      </a:endParaRPr>
+                    </a:p>
+                  </a:txBody>
+                  <a:tcPr marL="6204" marR="6204" marT="6204" marB="0" anchor="b"/>
+                </a:tc>
+                <a:tc>
+                  <a:txBody>
+                    <a:bodyPr/>
+                    <a:lstStyle/>
+                    <a:p>
+                      <a:pPr algn="r" fontAlgn="b"/>
+                      <a:r>
+                        <a:rPr lang="en-US" sz="1100" u="none" strike="noStrike">
+                          <a:effectLst/>
+                        </a:rPr>
+                        <a:t>436.0044</a:t>
+                      </a:r>
+                      <a:endParaRPr lang="en-US" sz="1100" b="0" i="0" u="none" strike="noStrike">
+                        <a:solidFill>
+                          <a:srgbClr val="000000"/>
+                        </a:solidFill>
+                        <a:effectLst/>
+                        <a:latin typeface="Calibri" panose="020F0502020204030204" pitchFamily="34" charset="0"/>
+                      </a:endParaRPr>
+                    </a:p>
+                  </a:txBody>
+                  <a:tcPr marL="6204" marR="6204" marT="6204" marB="0" anchor="b"/>
+                </a:tc>
+                <a:tc>
+                  <a:txBody>
+                    <a:bodyPr/>
+                    <a:lstStyle/>
+                    <a:p>
+                      <a:pPr algn="r" fontAlgn="b"/>
+                      <a:r>
+                        <a:rPr lang="en-US" sz="1100" u="none" strike="noStrike" dirty="0">
+                          <a:effectLst/>
+                        </a:rPr>
+                        <a:t>199</a:t>
+                      </a:r>
+                      <a:endParaRPr lang="en-US" sz="1100" b="0" i="0" u="none" strike="noStrike" dirty="0">
+                        <a:solidFill>
+                          <a:srgbClr val="000000"/>
+                        </a:solidFill>
+                        <a:effectLst/>
+                        <a:latin typeface="Calibri" panose="020F0502020204030204" pitchFamily="34" charset="0"/>
+                      </a:endParaRPr>
+                    </a:p>
+                  </a:txBody>
+                  <a:tcPr marL="6204" marR="6204" marT="6204" marB="0" anchor="b"/>
+                </a:tc>
+                <a:extLst>
+                  <a:ext uri="{0D108BD9-81ED-4DB2-BD59-A6C34878D82A}">
+                    <a16:rowId xmlns:a16="http://schemas.microsoft.com/office/drawing/2014/main" val="460903798"/>
+                  </a:ext>
+                </a:extLst>
+              </a:tr>
+              <a:tr h="179917">
+                <a:tc>
+                  <a:txBody>
+                    <a:bodyPr/>
+                    <a:lstStyle/>
+                    <a:p>
+                      <a:pPr algn="l" fontAlgn="b"/>
+                      <a:r>
+                        <a:rPr lang="en-US" sz="1100" u="none" strike="noStrike">
+                          <a:effectLst/>
+                        </a:rPr>
+                        <a:t>Total</a:t>
+                      </a:r>
+                      <a:endParaRPr lang="en-US" sz="1100" b="0" i="0" u="none" strike="noStrike">
+                        <a:solidFill>
+                          <a:srgbClr val="000000"/>
+                        </a:solidFill>
+                        <a:effectLst/>
+                        <a:latin typeface="Calibri" panose="020F0502020204030204" pitchFamily="34" charset="0"/>
+                      </a:endParaRPr>
+                    </a:p>
+                  </a:txBody>
+                  <a:tcPr marL="6204" marR="6204" marT="6204" marB="0" anchor="b"/>
+                </a:tc>
+                <a:tc>
+                  <a:txBody>
+                    <a:bodyPr/>
+                    <a:lstStyle/>
+                    <a:p>
+                      <a:pPr algn="r" fontAlgn="b"/>
+                      <a:r>
+                        <a:rPr lang="en-US" sz="1100" u="none" strike="noStrike">
+                          <a:effectLst/>
+                        </a:rPr>
+                        <a:t>100</a:t>
+                      </a:r>
+                      <a:endParaRPr lang="en-US" sz="1100" b="0" i="0" u="none" strike="noStrike">
+                        <a:solidFill>
+                          <a:srgbClr val="000000"/>
+                        </a:solidFill>
+                        <a:effectLst/>
+                        <a:latin typeface="Calibri" panose="020F0502020204030204" pitchFamily="34" charset="0"/>
+                      </a:endParaRPr>
+                    </a:p>
+                  </a:txBody>
+                  <a:tcPr marL="6204" marR="6204" marT="6204" marB="0" anchor="b"/>
+                </a:tc>
+                <a:tc>
+                  <a:txBody>
+                    <a:bodyPr/>
+                    <a:lstStyle/>
+                    <a:p>
+                      <a:pPr algn="r" fontAlgn="b"/>
+                      <a:r>
+                        <a:rPr lang="en-US" sz="1100" u="none" strike="noStrike">
+                          <a:effectLst/>
+                        </a:rPr>
+                        <a:t>2942</a:t>
+                      </a:r>
+                      <a:endParaRPr lang="en-US" sz="1100" b="0" i="0" u="none" strike="noStrike">
+                        <a:solidFill>
+                          <a:srgbClr val="000000"/>
+                        </a:solidFill>
+                        <a:effectLst/>
+                        <a:latin typeface="Calibri" panose="020F0502020204030204" pitchFamily="34" charset="0"/>
+                      </a:endParaRPr>
+                    </a:p>
+                  </a:txBody>
+                  <a:tcPr marL="6204" marR="6204" marT="6204" marB="0" anchor="b"/>
+                </a:tc>
+                <a:tc>
+                  <a:txBody>
+                    <a:bodyPr/>
+                    <a:lstStyle/>
+                    <a:p>
+                      <a:pPr algn="r" fontAlgn="b"/>
+                      <a:r>
+                        <a:rPr lang="en-US" sz="1100" u="none" strike="noStrike" dirty="0">
+                          <a:effectLst/>
+                        </a:rPr>
+                        <a:t>2942</a:t>
+                      </a:r>
+                      <a:endParaRPr lang="en-US" sz="1100" b="0" i="0" u="none" strike="noStrike" dirty="0">
+                        <a:solidFill>
+                          <a:srgbClr val="000000"/>
+                        </a:solidFill>
+                        <a:effectLst/>
+                        <a:latin typeface="Calibri" panose="020F0502020204030204" pitchFamily="34" charset="0"/>
+                      </a:endParaRPr>
+                    </a:p>
+                  </a:txBody>
+                  <a:tcPr marL="6204" marR="6204" marT="6204" marB="0" anchor="b"/>
+                </a:tc>
+                <a:extLst>
+                  <a:ext uri="{0D108BD9-81ED-4DB2-BD59-A6C34878D82A}">
+                    <a16:rowId xmlns:a16="http://schemas.microsoft.com/office/drawing/2014/main" val="405455060"/>
+                  </a:ext>
+                </a:extLst>
+              </a:tr>
+              <a:tr h="179917">
+                <a:tc>
+                  <a:txBody>
+                    <a:bodyPr/>
+                    <a:lstStyle/>
+                    <a:p>
+                      <a:pPr algn="l" fontAlgn="b"/>
+                      <a:endParaRPr lang="en-US" sz="1100" b="0" i="0" u="none" strike="noStrike">
+                        <a:solidFill>
+                          <a:srgbClr val="000000"/>
+                        </a:solidFill>
+                        <a:effectLst/>
+                        <a:latin typeface="Calibri" panose="020F0502020204030204" pitchFamily="34" charset="0"/>
+                      </a:endParaRPr>
+                    </a:p>
+                  </a:txBody>
+                  <a:tcPr marL="6204" marR="6204" marT="6204" marB="0" anchor="b"/>
+                </a:tc>
+                <a:tc>
+                  <a:txBody>
+                    <a:bodyPr/>
+                    <a:lstStyle/>
+                    <a:p>
+                      <a:pPr algn="l" fontAlgn="b"/>
+                      <a:endParaRPr lang="en-US" sz="1100" b="0" i="0" u="none" strike="noStrike">
+                        <a:solidFill>
+                          <a:srgbClr val="000000"/>
+                        </a:solidFill>
+                        <a:effectLst/>
+                        <a:latin typeface="Calibri" panose="020F0502020204030204" pitchFamily="34" charset="0"/>
+                      </a:endParaRPr>
+                    </a:p>
+                  </a:txBody>
+                  <a:tcPr marL="6204" marR="6204" marT="6204" marB="0" anchor="b"/>
+                </a:tc>
+                <a:tc>
+                  <a:txBody>
+                    <a:bodyPr/>
+                    <a:lstStyle/>
+                    <a:p>
+                      <a:pPr algn="l" fontAlgn="b"/>
+                      <a:endParaRPr lang="en-US" sz="1100" b="0" i="0" u="none" strike="noStrike">
+                        <a:solidFill>
+                          <a:srgbClr val="000000"/>
+                        </a:solidFill>
+                        <a:effectLst/>
+                        <a:latin typeface="Calibri" panose="020F0502020204030204" pitchFamily="34" charset="0"/>
+                      </a:endParaRPr>
+                    </a:p>
+                  </a:txBody>
+                  <a:tcPr marL="6204" marR="6204" marT="6204" marB="0" anchor="b"/>
+                </a:tc>
+                <a:tc>
+                  <a:txBody>
+                    <a:bodyPr/>
+                    <a:lstStyle/>
+                    <a:p>
+                      <a:pPr algn="l" fontAlgn="b"/>
+                      <a:endParaRPr lang="en-US" sz="1100" b="0" i="0" u="none" strike="noStrike" dirty="0">
+                        <a:solidFill>
+                          <a:srgbClr val="000000"/>
+                        </a:solidFill>
+                        <a:effectLst/>
+                        <a:latin typeface="Calibri" panose="020F0502020204030204" pitchFamily="34" charset="0"/>
+                      </a:endParaRPr>
+                    </a:p>
+                  </a:txBody>
+                  <a:tcPr marL="6204" marR="6204" marT="6204" marB="0" anchor="b"/>
+                </a:tc>
+                <a:extLst>
+                  <a:ext uri="{0D108BD9-81ED-4DB2-BD59-A6C34878D82A}">
+                    <a16:rowId xmlns:a16="http://schemas.microsoft.com/office/drawing/2014/main" val="3331287035"/>
+                  </a:ext>
+                </a:extLst>
+              </a:tr>
+              <a:tr h="179917">
+                <a:tc gridSpan="2">
+                  <a:txBody>
+                    <a:bodyPr/>
+                    <a:lstStyle/>
+                    <a:p>
+                      <a:pPr algn="l" fontAlgn="b"/>
+                      <a:r>
+                        <a:rPr lang="en-US" sz="1100" u="none" strike="noStrike">
+                          <a:effectLst/>
+                        </a:rPr>
+                        <a:t>Chi-Squared Test p-value:</a:t>
+                      </a:r>
+                      <a:endParaRPr lang="en-US" sz="1100" b="0" i="0" u="none" strike="noStrike">
+                        <a:solidFill>
+                          <a:srgbClr val="000000"/>
+                        </a:solidFill>
+                        <a:effectLst/>
+                        <a:latin typeface="Calibri" panose="020F0502020204030204" pitchFamily="34" charset="0"/>
+                      </a:endParaRPr>
+                    </a:p>
+                  </a:txBody>
+                  <a:tcPr marL="6204" marR="6204" marT="6204" marB="0" anchor="b"/>
+                </a:tc>
+                <a:tc hMerge="1">
+                  <a:txBody>
+                    <a:bodyPr/>
+                    <a:lstStyle/>
+                    <a:p>
+                      <a:endParaRPr lang="en-US"/>
+                    </a:p>
+                  </a:txBody>
+                  <a:tcPr/>
+                </a:tc>
+                <a:tc>
+                  <a:txBody>
+                    <a:bodyPr/>
+                    <a:lstStyle/>
+                    <a:p>
+                      <a:pPr algn="r" fontAlgn="b"/>
+                      <a:r>
+                        <a:rPr lang="en-US" sz="1100" u="none" strike="noStrike">
+                          <a:effectLst/>
+                        </a:rPr>
+                        <a:t>4.34786E-48</a:t>
+                      </a:r>
+                      <a:endParaRPr lang="en-US" sz="1100" b="0" i="0" u="none" strike="noStrike">
+                        <a:solidFill>
+                          <a:srgbClr val="000000"/>
+                        </a:solidFill>
+                        <a:effectLst/>
+                        <a:latin typeface="Calibri" panose="020F0502020204030204" pitchFamily="34" charset="0"/>
+                      </a:endParaRPr>
+                    </a:p>
+                  </a:txBody>
+                  <a:tcPr marL="6204" marR="6204" marT="6204" marB="0" anchor="b"/>
+                </a:tc>
+                <a:tc>
+                  <a:txBody>
+                    <a:bodyPr/>
+                    <a:lstStyle/>
+                    <a:p>
+                      <a:pPr algn="l" fontAlgn="b"/>
+                      <a:endParaRPr lang="en-US" sz="1100" b="0" i="0" u="none" strike="noStrike" dirty="0">
+                        <a:solidFill>
+                          <a:srgbClr val="000000"/>
+                        </a:solidFill>
+                        <a:effectLst/>
+                        <a:latin typeface="Calibri" panose="020F0502020204030204" pitchFamily="34" charset="0"/>
+                      </a:endParaRPr>
+                    </a:p>
+                  </a:txBody>
+                  <a:tcPr marL="6204" marR="6204" marT="6204" marB="0" anchor="b"/>
+                </a:tc>
+                <a:extLst>
+                  <a:ext uri="{0D108BD9-81ED-4DB2-BD59-A6C34878D82A}">
+                    <a16:rowId xmlns:a16="http://schemas.microsoft.com/office/drawing/2014/main" val="916385977"/>
+                  </a:ext>
+                </a:extLst>
+              </a:tr>
+              <a:tr h="179917">
+                <a:tc>
+                  <a:txBody>
+                    <a:bodyPr/>
+                    <a:lstStyle/>
+                    <a:p>
+                      <a:pPr algn="l" fontAlgn="b"/>
+                      <a:endParaRPr lang="en-US" sz="1100" b="0" i="0" u="none" strike="noStrike">
+                        <a:solidFill>
+                          <a:srgbClr val="000000"/>
+                        </a:solidFill>
+                        <a:effectLst/>
+                        <a:latin typeface="Calibri" panose="020F0502020204030204" pitchFamily="34" charset="0"/>
+                      </a:endParaRPr>
+                    </a:p>
+                  </a:txBody>
+                  <a:tcPr marL="6204" marR="6204" marT="6204" marB="0" anchor="b"/>
+                </a:tc>
+                <a:tc>
+                  <a:txBody>
+                    <a:bodyPr/>
+                    <a:lstStyle/>
+                    <a:p>
+                      <a:pPr algn="l" fontAlgn="b"/>
+                      <a:endParaRPr lang="en-US" sz="1100" b="0" i="0" u="none" strike="noStrike">
+                        <a:solidFill>
+                          <a:srgbClr val="000000"/>
+                        </a:solidFill>
+                        <a:effectLst/>
+                        <a:latin typeface="Calibri" panose="020F0502020204030204" pitchFamily="34" charset="0"/>
+                      </a:endParaRPr>
+                    </a:p>
+                  </a:txBody>
+                  <a:tcPr marL="6204" marR="6204" marT="6204" marB="0" anchor="b"/>
+                </a:tc>
+                <a:tc>
+                  <a:txBody>
+                    <a:bodyPr/>
+                    <a:lstStyle/>
+                    <a:p>
+                      <a:pPr algn="l" fontAlgn="b"/>
+                      <a:endParaRPr lang="en-US" sz="1100" b="0" i="0" u="none" strike="noStrike">
+                        <a:solidFill>
+                          <a:srgbClr val="000000"/>
+                        </a:solidFill>
+                        <a:effectLst/>
+                        <a:latin typeface="Calibri" panose="020F0502020204030204" pitchFamily="34" charset="0"/>
+                      </a:endParaRPr>
+                    </a:p>
+                  </a:txBody>
+                  <a:tcPr marL="6204" marR="6204" marT="6204" marB="0" anchor="b"/>
+                </a:tc>
+                <a:tc>
+                  <a:txBody>
+                    <a:bodyPr/>
+                    <a:lstStyle/>
+                    <a:p>
+                      <a:pPr algn="l" fontAlgn="b"/>
+                      <a:endParaRPr lang="en-US" sz="1100" b="0" i="0" u="none" strike="noStrike" dirty="0">
+                        <a:solidFill>
+                          <a:srgbClr val="000000"/>
+                        </a:solidFill>
+                        <a:effectLst/>
+                        <a:latin typeface="Calibri" panose="020F0502020204030204" pitchFamily="34" charset="0"/>
+                      </a:endParaRPr>
+                    </a:p>
+                  </a:txBody>
+                  <a:tcPr marL="6204" marR="6204" marT="6204" marB="0" anchor="b"/>
+                </a:tc>
+                <a:extLst>
+                  <a:ext uri="{0D108BD9-81ED-4DB2-BD59-A6C34878D82A}">
+                    <a16:rowId xmlns:a16="http://schemas.microsoft.com/office/drawing/2014/main" val="1293915635"/>
+                  </a:ext>
+                </a:extLst>
+              </a:tr>
+              <a:tr h="179917">
+                <a:tc>
+                  <a:txBody>
+                    <a:bodyPr/>
+                    <a:lstStyle/>
+                    <a:p>
+                      <a:pPr algn="l" fontAlgn="b"/>
+                      <a:endParaRPr lang="en-US" sz="1100" b="0" i="0" u="none" strike="noStrike">
+                        <a:solidFill>
+                          <a:srgbClr val="000000"/>
+                        </a:solidFill>
+                        <a:effectLst/>
+                        <a:latin typeface="Calibri" panose="020F0502020204030204" pitchFamily="34" charset="0"/>
+                      </a:endParaRPr>
+                    </a:p>
+                  </a:txBody>
+                  <a:tcPr marL="6204" marR="6204" marT="6204" marB="0" anchor="b"/>
+                </a:tc>
+                <a:tc>
+                  <a:txBody>
+                    <a:bodyPr/>
+                    <a:lstStyle/>
+                    <a:p>
+                      <a:pPr algn="l" fontAlgn="b"/>
+                      <a:endParaRPr lang="en-US" sz="1100" b="0" i="0" u="none" strike="noStrike">
+                        <a:solidFill>
+                          <a:srgbClr val="000000"/>
+                        </a:solidFill>
+                        <a:effectLst/>
+                        <a:latin typeface="Calibri" panose="020F0502020204030204" pitchFamily="34" charset="0"/>
+                      </a:endParaRPr>
+                    </a:p>
+                  </a:txBody>
+                  <a:tcPr marL="6204" marR="6204" marT="6204" marB="0" anchor="b"/>
+                </a:tc>
+                <a:tc>
+                  <a:txBody>
+                    <a:bodyPr/>
+                    <a:lstStyle/>
+                    <a:p>
+                      <a:pPr algn="l" fontAlgn="b"/>
+                      <a:endParaRPr lang="en-US" sz="1100" b="0" i="0" u="none" strike="noStrike">
+                        <a:solidFill>
+                          <a:srgbClr val="000000"/>
+                        </a:solidFill>
+                        <a:effectLst/>
+                        <a:latin typeface="Calibri" panose="020F0502020204030204" pitchFamily="34" charset="0"/>
+                      </a:endParaRPr>
+                    </a:p>
+                  </a:txBody>
+                  <a:tcPr marL="6204" marR="6204" marT="6204" marB="0" anchor="b"/>
+                </a:tc>
+                <a:tc>
+                  <a:txBody>
+                    <a:bodyPr/>
+                    <a:lstStyle/>
+                    <a:p>
+                      <a:pPr algn="l" fontAlgn="b"/>
+                      <a:endParaRPr lang="en-US" sz="1100" b="0" i="0" u="none" strike="noStrike" dirty="0">
+                        <a:solidFill>
+                          <a:srgbClr val="000000"/>
+                        </a:solidFill>
+                        <a:effectLst/>
+                        <a:latin typeface="Calibri" panose="020F0502020204030204" pitchFamily="34" charset="0"/>
+                      </a:endParaRPr>
+                    </a:p>
+                  </a:txBody>
+                  <a:tcPr marL="6204" marR="6204" marT="6204" marB="0" anchor="b"/>
+                </a:tc>
+                <a:extLst>
+                  <a:ext uri="{0D108BD9-81ED-4DB2-BD59-A6C34878D82A}">
+                    <a16:rowId xmlns:a16="http://schemas.microsoft.com/office/drawing/2014/main" val="3173208722"/>
+                  </a:ext>
+                </a:extLst>
+              </a:tr>
+              <a:tr h="179917">
                 <a:tc>
                   <a:txBody>
                     <a:bodyPr/>
@@ -8161,7 +9160,7 @@
                       </a:endParaRPr>
                     </a:p>
                   </a:txBody>
-                  <a:tcPr marL="6350" marR="6350" marT="6350" marB="0" anchor="b"/>
+                  <a:tcPr marL="6204" marR="6204" marT="6204" marB="0" anchor="b"/>
                 </a:tc>
                 <a:tc>
                   <a:txBody>
@@ -8173,7 +9172,7 @@
                         <a:rPr lang="en-US" sz="1100" b="1" u="none" strike="noStrike" dirty="0">
                           <a:effectLst/>
                         </a:rPr>
-                        <a:t>General Population</a:t>
+                        <a:t>Population %</a:t>
                       </a:r>
                       <a:endParaRPr lang="en-US" sz="1100" b="1" i="0" u="none" strike="noStrike" dirty="0">
                         <a:solidFill>
@@ -8184,7 +9183,7 @@
                       </a:endParaRPr>
                     </a:p>
                   </a:txBody>
-                  <a:tcPr marL="6350" marR="6350" marT="6350" marB="0" anchor="b"/>
+                  <a:tcPr marL="6204" marR="6204" marT="6204" marB="0" anchor="b"/>
                 </a:tc>
                 <a:tc>
                   <a:txBody>
@@ -8196,7 +9195,7 @@
                         <a:rPr lang="en-US" sz="1100" b="1" u="none" strike="noStrike" dirty="0">
                           <a:effectLst/>
                         </a:rPr>
-                        <a:t>Drug Mortality</a:t>
+                        <a:t>Expected </a:t>
                       </a:r>
                       <a:endParaRPr lang="en-US" sz="1100" b="1" i="0" u="none" strike="noStrike" dirty="0">
                         <a:solidFill>
@@ -8207,7 +9206,7 @@
                       </a:endParaRPr>
                     </a:p>
                   </a:txBody>
-                  <a:tcPr marL="6350" marR="6350" marT="6350" marB="0" anchor="b"/>
+                  <a:tcPr marL="6204" marR="6204" marT="6204" marB="0" anchor="b"/>
                 </a:tc>
                 <a:tc>
                   <a:txBody>
@@ -8219,7 +9218,7 @@
                         <a:rPr lang="en-US" sz="1100" b="1" u="none" strike="noStrike" dirty="0">
                           <a:effectLst/>
                         </a:rPr>
-                        <a:t>Estimate</a:t>
+                        <a:t>Observed</a:t>
                       </a:r>
                       <a:endParaRPr lang="en-US" sz="1100" b="1" i="0" u="none" strike="noStrike" dirty="0">
                         <a:solidFill>
@@ -8230,15 +9229,15 @@
                       </a:endParaRPr>
                     </a:p>
                   </a:txBody>
-                  <a:tcPr marL="6350" marR="6350" marT="6350" marB="0" anchor="b"/>
+                  <a:tcPr marL="6204" marR="6204" marT="6204" marB="0" anchor="b"/>
                 </a:tc>
                 <a:extLst>
                   <a:ext uri="{0D108BD9-81ED-4DB2-BD59-A6C34878D82A}">
-                    <a16:rowId xmlns:a16="http://schemas.microsoft.com/office/drawing/2014/main" val="1799548080"/>
+                    <a16:rowId xmlns:a16="http://schemas.microsoft.com/office/drawing/2014/main" val="4029430975"/>
                   </a:ext>
                 </a:extLst>
               </a:tr>
-              <a:tr h="232147">
+              <a:tr h="179917">
                 <a:tc>
                   <a:txBody>
                     <a:bodyPr/>
@@ -8260,7 +9259,7 @@
                       </a:endParaRPr>
                     </a:p>
                   </a:txBody>
-                  <a:tcPr marL="6350" marR="6350" marT="6350" marB="0" anchor="b"/>
+                  <a:tcPr marL="6204" marR="6204" marT="6204" marB="0" anchor="b"/>
                 </a:tc>
                 <a:tc>
                   <a:txBody>
@@ -8272,7 +9271,7 @@
                         <a:rPr lang="en-US" sz="1100" u="none" strike="noStrike">
                           <a:effectLst/>
                         </a:rPr>
-                        <a:t>71.20%</a:t>
+                        <a:t>71.2</a:t>
                       </a:r>
                       <a:endParaRPr lang="en-US" sz="1100" b="0" i="0" u="none" strike="noStrike">
                         <a:solidFill>
@@ -8283,30 +9282,7 @@
                       </a:endParaRPr>
                     </a:p>
                   </a:txBody>
-                  <a:tcPr marL="6350" marR="6350" marT="6350" marB="0" anchor="b"/>
-                </a:tc>
-                <a:tc>
-                  <a:txBody>
-                    <a:bodyPr/>
-                    <a:lstStyle/>
-                    <a:p>
-                      <a:pPr algn="r" fontAlgn="b"/>
-                      <a:r>
-                        <a:rPr lang="en-US" sz="1100" u="none" strike="noStrike">
-                          <a:effectLst/>
-                        </a:rPr>
-                        <a:t>3242</a:t>
-                      </a:r>
-                      <a:endParaRPr lang="en-US" sz="1100" b="0" i="0" u="none" strike="noStrike">
-                        <a:solidFill>
-                          <a:srgbClr val="000000"/>
-                        </a:solidFill>
-                        <a:effectLst/>
-                        <a:latin typeface="Calibri" panose="020F0502020204030204" pitchFamily="34" charset="0"/>
-                      </a:endParaRPr>
-                    </a:p>
-                  </a:txBody>
-                  <a:tcPr marL="6350" marR="6350" marT="6350" marB="0" anchor="b"/>
+                  <a:tcPr marL="6204" marR="6204" marT="6204" marB="0" anchor="b"/>
                 </a:tc>
                 <a:tc>
                   <a:txBody>
@@ -8329,15 +9305,38 @@
                       </a:endParaRPr>
                     </a:p>
                   </a:txBody>
-                  <a:tcPr marL="6350" marR="6350" marT="6350" marB="0" anchor="b"/>
+                  <a:tcPr marL="6204" marR="6204" marT="6204" marB="0" anchor="b"/>
+                </a:tc>
+                <a:tc>
+                  <a:txBody>
+                    <a:bodyPr/>
+                    <a:lstStyle/>
+                    <a:p>
+                      <a:pPr algn="r" fontAlgn="b"/>
+                      <a:r>
+                        <a:rPr lang="en-US" sz="1100" u="none" strike="noStrike" dirty="0">
+                          <a:effectLst/>
+                        </a:rPr>
+                        <a:t>3242</a:t>
+                      </a:r>
+                      <a:endParaRPr lang="en-US" sz="1100" b="0" i="0" u="none" strike="noStrike" dirty="0">
+                        <a:solidFill>
+                          <a:srgbClr val="000000"/>
+                        </a:solidFill>
+                        <a:effectLst/>
+                        <a:latin typeface="Calibri" panose="020F0502020204030204" pitchFamily="34" charset="0"/>
+                      </a:endParaRPr>
+                    </a:p>
+                  </a:txBody>
+                  <a:tcPr marL="6204" marR="6204" marT="6204" marB="0" anchor="b"/>
                 </a:tc>
                 <a:extLst>
                   <a:ext uri="{0D108BD9-81ED-4DB2-BD59-A6C34878D82A}">
-                    <a16:rowId xmlns:a16="http://schemas.microsoft.com/office/drawing/2014/main" val="3448598783"/>
+                    <a16:rowId xmlns:a16="http://schemas.microsoft.com/office/drawing/2014/main" val="898732155"/>
                   </a:ext>
                 </a:extLst>
               </a:tr>
-              <a:tr h="232147">
+              <a:tr h="179917">
                 <a:tc>
                   <a:txBody>
                     <a:bodyPr/>
@@ -8348,7 +9347,7 @@
                         <a:rPr lang="en-US" sz="1100" u="none" strike="noStrike">
                           <a:effectLst/>
                         </a:rPr>
-                        <a:t>Hispanic, White</a:t>
+                        <a:t>Hispanic White</a:t>
                       </a:r>
                       <a:endParaRPr lang="en-US" sz="1100" b="0" i="0" u="none" strike="noStrike">
                         <a:solidFill>
@@ -8359,7 +9358,7 @@
                       </a:endParaRPr>
                     </a:p>
                   </a:txBody>
-                  <a:tcPr marL="6350" marR="6350" marT="6350" marB="0" anchor="b"/>
+                  <a:tcPr marL="6204" marR="6204" marT="6204" marB="0" anchor="b"/>
                 </a:tc>
                 <a:tc>
                   <a:txBody>
@@ -8371,7 +9370,7 @@
                         <a:rPr lang="en-US" sz="1100" u="none" strike="noStrike">
                           <a:effectLst/>
                         </a:rPr>
-                        <a:t>6.30%</a:t>
+                        <a:t>6.3</a:t>
                       </a:r>
                       <a:endParaRPr lang="en-US" sz="1100" b="0" i="0" u="none" strike="noStrike">
                         <a:solidFill>
@@ -8382,30 +9381,7 @@
                       </a:endParaRPr>
                     </a:p>
                   </a:txBody>
-                  <a:tcPr marL="6350" marR="6350" marT="6350" marB="0" anchor="b"/>
-                </a:tc>
-                <a:tc>
-                  <a:txBody>
-                    <a:bodyPr/>
-                    <a:lstStyle/>
-                    <a:p>
-                      <a:pPr algn="r" fontAlgn="b"/>
-                      <a:r>
-                        <a:rPr lang="en-US" sz="1100" u="none" strike="noStrike">
-                          <a:effectLst/>
-                        </a:rPr>
-                        <a:t>432</a:t>
-                      </a:r>
-                      <a:endParaRPr lang="en-US" sz="1100" b="0" i="0" u="none" strike="noStrike">
-                        <a:solidFill>
-                          <a:srgbClr val="000000"/>
-                        </a:solidFill>
-                        <a:effectLst/>
-                        <a:latin typeface="Calibri" panose="020F0502020204030204" pitchFamily="34" charset="0"/>
-                      </a:endParaRPr>
-                    </a:p>
-                  </a:txBody>
-                  <a:tcPr marL="6350" marR="6350" marT="6350" marB="0" anchor="b"/>
+                  <a:tcPr marL="6204" marR="6204" marT="6204" marB="0" anchor="b"/>
                 </a:tc>
                 <a:tc>
                   <a:txBody>
@@ -8428,15 +9404,38 @@
                       </a:endParaRPr>
                     </a:p>
                   </a:txBody>
-                  <a:tcPr marL="6350" marR="6350" marT="6350" marB="0" anchor="b"/>
+                  <a:tcPr marL="6204" marR="6204" marT="6204" marB="0" anchor="b"/>
+                </a:tc>
+                <a:tc>
+                  <a:txBody>
+                    <a:bodyPr/>
+                    <a:lstStyle/>
+                    <a:p>
+                      <a:pPr algn="r" fontAlgn="b"/>
+                      <a:r>
+                        <a:rPr lang="en-US" sz="1100" u="none" strike="noStrike" dirty="0">
+                          <a:effectLst/>
+                        </a:rPr>
+                        <a:t>432</a:t>
+                      </a:r>
+                      <a:endParaRPr lang="en-US" sz="1100" b="0" i="0" u="none" strike="noStrike" dirty="0">
+                        <a:solidFill>
+                          <a:srgbClr val="000000"/>
+                        </a:solidFill>
+                        <a:effectLst/>
+                        <a:latin typeface="Calibri" panose="020F0502020204030204" pitchFamily="34" charset="0"/>
+                      </a:endParaRPr>
+                    </a:p>
+                  </a:txBody>
+                  <a:tcPr marL="6204" marR="6204" marT="6204" marB="0" anchor="b"/>
                 </a:tc>
                 <a:extLst>
                   <a:ext uri="{0D108BD9-81ED-4DB2-BD59-A6C34878D82A}">
-                    <a16:rowId xmlns:a16="http://schemas.microsoft.com/office/drawing/2014/main" val="2105227070"/>
+                    <a16:rowId xmlns:a16="http://schemas.microsoft.com/office/drawing/2014/main" val="709426102"/>
                   </a:ext>
                 </a:extLst>
               </a:tr>
-              <a:tr h="232147">
+              <a:tr h="179917">
                 <a:tc>
                   <a:txBody>
                     <a:bodyPr/>
@@ -8458,7 +9457,7 @@
                       </a:endParaRPr>
                     </a:p>
                   </a:txBody>
-                  <a:tcPr marL="6350" marR="6350" marT="6350" marB="0" anchor="b"/>
+                  <a:tcPr marL="6204" marR="6204" marT="6204" marB="0" anchor="b"/>
                 </a:tc>
                 <a:tc>
                   <a:txBody>
@@ -8470,7 +9469,7 @@
                         <a:rPr lang="en-US" sz="1100" u="none" strike="noStrike">
                           <a:effectLst/>
                         </a:rPr>
-                        <a:t>9.40%</a:t>
+                        <a:t>9.4</a:t>
                       </a:r>
                       <a:endParaRPr lang="en-US" sz="1100" b="0" i="0" u="none" strike="noStrike">
                         <a:solidFill>
@@ -8481,30 +9480,7 @@
                       </a:endParaRPr>
                     </a:p>
                   </a:txBody>
-                  <a:tcPr marL="6350" marR="6350" marT="6350" marB="0" anchor="b"/>
-                </a:tc>
-                <a:tc>
-                  <a:txBody>
-                    <a:bodyPr/>
-                    <a:lstStyle/>
-                    <a:p>
-                      <a:pPr algn="r" fontAlgn="b"/>
-                      <a:r>
-                        <a:rPr lang="en-US" sz="1100" u="none" strike="noStrike">
-                          <a:effectLst/>
-                        </a:rPr>
-                        <a:t>329</a:t>
-                      </a:r>
-                      <a:endParaRPr lang="en-US" sz="1100" b="0" i="0" u="none" strike="noStrike">
-                        <a:solidFill>
-                          <a:srgbClr val="000000"/>
-                        </a:solidFill>
-                        <a:effectLst/>
-                        <a:latin typeface="Calibri" panose="020F0502020204030204" pitchFamily="34" charset="0"/>
-                      </a:endParaRPr>
-                    </a:p>
-                  </a:txBody>
-                  <a:tcPr marL="6350" marR="6350" marT="6350" marB="0" anchor="b"/>
+                  <a:tcPr marL="6204" marR="6204" marT="6204" marB="0" anchor="b"/>
                 </a:tc>
                 <a:tc>
                   <a:txBody>
@@ -8527,15 +9503,38 @@
                       </a:endParaRPr>
                     </a:p>
                   </a:txBody>
-                  <a:tcPr marL="6350" marR="6350" marT="6350" marB="0" anchor="b"/>
+                  <a:tcPr marL="6204" marR="6204" marT="6204" marB="0" anchor="b"/>
+                </a:tc>
+                <a:tc>
+                  <a:txBody>
+                    <a:bodyPr/>
+                    <a:lstStyle/>
+                    <a:p>
+                      <a:pPr algn="r" fontAlgn="b"/>
+                      <a:r>
+                        <a:rPr lang="en-US" sz="1100" u="none" strike="noStrike" dirty="0">
+                          <a:effectLst/>
+                        </a:rPr>
+                        <a:t>329</a:t>
+                      </a:r>
+                      <a:endParaRPr lang="en-US" sz="1100" b="0" i="0" u="none" strike="noStrike" dirty="0">
+                        <a:solidFill>
+                          <a:srgbClr val="000000"/>
+                        </a:solidFill>
+                        <a:effectLst/>
+                        <a:latin typeface="Calibri" panose="020F0502020204030204" pitchFamily="34" charset="0"/>
+                      </a:endParaRPr>
+                    </a:p>
+                  </a:txBody>
+                  <a:tcPr marL="6204" marR="6204" marT="6204" marB="0" anchor="b"/>
                 </a:tc>
                 <a:extLst>
                   <a:ext uri="{0D108BD9-81ED-4DB2-BD59-A6C34878D82A}">
-                    <a16:rowId xmlns:a16="http://schemas.microsoft.com/office/drawing/2014/main" val="2125538796"/>
+                    <a16:rowId xmlns:a16="http://schemas.microsoft.com/office/drawing/2014/main" val="502412046"/>
                   </a:ext>
                 </a:extLst>
               </a:tr>
-              <a:tr h="232147">
+              <a:tr h="179917">
                 <a:tc>
                   <a:txBody>
                     <a:bodyPr/>
@@ -8546,7 +9545,7 @@
                         <a:rPr lang="en-US" sz="1100" u="none" strike="noStrike">
                           <a:effectLst/>
                         </a:rPr>
-                        <a:t>Hispanic, Black</a:t>
+                        <a:t>Hispanic Black</a:t>
                       </a:r>
                       <a:endParaRPr lang="en-US" sz="1100" b="0" i="0" u="none" strike="noStrike">
                         <a:solidFill>
@@ -8557,7 +9556,7 @@
                       </a:endParaRPr>
                     </a:p>
                   </a:txBody>
-                  <a:tcPr marL="6350" marR="6350" marT="6350" marB="0" anchor="b"/>
+                  <a:tcPr marL="6204" marR="6204" marT="6204" marB="0" anchor="b"/>
                 </a:tc>
                 <a:tc>
                   <a:txBody>
@@ -8569,7 +9568,7 @@
                         <a:rPr lang="en-US" sz="1100" u="none" strike="noStrike">
                           <a:effectLst/>
                         </a:rPr>
-                        <a:t>0.80%</a:t>
+                        <a:t>0.8</a:t>
                       </a:r>
                       <a:endParaRPr lang="en-US" sz="1100" b="0" i="0" u="none" strike="noStrike">
                         <a:solidFill>
@@ -8580,7 +9579,30 @@
                       </a:endParaRPr>
                     </a:p>
                   </a:txBody>
-                  <a:tcPr marL="6350" marR="6350" marT="6350" marB="0" anchor="b"/>
+                  <a:tcPr marL="6204" marR="6204" marT="6204" marB="0" anchor="b"/>
+                </a:tc>
+                <a:tc>
+                  <a:txBody>
+                    <a:bodyPr/>
+                    <a:lstStyle/>
+                    <a:p>
+                      <a:pPr algn="r" fontAlgn="b"/>
+                      <a:r>
+                        <a:rPr lang="en-US" sz="1100" u="none" strike="noStrike">
+                          <a:effectLst/>
+                        </a:rPr>
+                        <a:t>32.632</a:t>
+                      </a:r>
+                      <a:endParaRPr lang="en-US" sz="1100" b="0" i="0" u="none" strike="noStrike">
+                        <a:solidFill>
+                          <a:srgbClr val="000000"/>
+                        </a:solidFill>
+                        <a:effectLst/>
+                        <a:latin typeface="Calibri" panose="020F0502020204030204" pitchFamily="34" charset="0"/>
+                      </a:endParaRPr>
+                    </a:p>
+                  </a:txBody>
+                  <a:tcPr marL="6204" marR="6204" marT="6204" marB="0" anchor="b"/>
                 </a:tc>
                 <a:tc>
                   <a:txBody>
@@ -8603,38 +9625,15 @@
                       </a:endParaRPr>
                     </a:p>
                   </a:txBody>
-                  <a:tcPr marL="6350" marR="6350" marT="6350" marB="0" anchor="b"/>
-                </a:tc>
-                <a:tc>
-                  <a:txBody>
-                    <a:bodyPr/>
-                    <a:lstStyle/>
-                    <a:p>
-                      <a:pPr algn="r" fontAlgn="b"/>
-                      <a:r>
-                        <a:rPr lang="en-US" sz="1100" u="none" strike="noStrike">
-                          <a:effectLst/>
-                        </a:rPr>
-                        <a:t>32.632</a:t>
-                      </a:r>
-                      <a:endParaRPr lang="en-US" sz="1100" b="0" i="0" u="none" strike="noStrike">
-                        <a:solidFill>
-                          <a:srgbClr val="000000"/>
-                        </a:solidFill>
-                        <a:effectLst/>
-                        <a:latin typeface="Calibri" panose="020F0502020204030204" pitchFamily="34" charset="0"/>
-                      </a:endParaRPr>
-                    </a:p>
-                  </a:txBody>
-                  <a:tcPr marL="6350" marR="6350" marT="6350" marB="0" anchor="b"/>
+                  <a:tcPr marL="6204" marR="6204" marT="6204" marB="0" anchor="b"/>
                 </a:tc>
                 <a:extLst>
                   <a:ext uri="{0D108BD9-81ED-4DB2-BD59-A6C34878D82A}">
-                    <a16:rowId xmlns:a16="http://schemas.microsoft.com/office/drawing/2014/main" val="3179918076"/>
+                    <a16:rowId xmlns:a16="http://schemas.microsoft.com/office/drawing/2014/main" val="2633984212"/>
                   </a:ext>
                 </a:extLst>
               </a:tr>
-              <a:tr h="232147">
+              <a:tr h="179917">
                 <a:tc>
                   <a:txBody>
                     <a:bodyPr/>
@@ -8656,7 +9655,7 @@
                       </a:endParaRPr>
                     </a:p>
                   </a:txBody>
-                  <a:tcPr marL="6350" marR="6350" marT="6350" marB="0" anchor="b"/>
+                  <a:tcPr marL="6204" marR="6204" marT="6204" marB="0" anchor="b"/>
                 </a:tc>
                 <a:tc>
                   <a:txBody>
@@ -8668,7 +9667,7 @@
                         <a:rPr lang="en-US" sz="1100" u="none" strike="noStrike">
                           <a:effectLst/>
                         </a:rPr>
-                        <a:t>3.80%</a:t>
+                        <a:t>3.8</a:t>
                       </a:r>
                       <a:endParaRPr lang="en-US" sz="1100" b="0" i="0" u="none" strike="noStrike">
                         <a:solidFill>
@@ -8679,7 +9678,30 @@
                       </a:endParaRPr>
                     </a:p>
                   </a:txBody>
-                  <a:tcPr marL="6350" marR="6350" marT="6350" marB="0" anchor="b"/>
+                  <a:tcPr marL="6204" marR="6204" marT="6204" marB="0" anchor="b"/>
+                </a:tc>
+                <a:tc>
+                  <a:txBody>
+                    <a:bodyPr/>
+                    <a:lstStyle/>
+                    <a:p>
+                      <a:pPr algn="r" fontAlgn="b"/>
+                      <a:r>
+                        <a:rPr lang="en-US" sz="1100" u="none" strike="noStrike">
+                          <a:effectLst/>
+                        </a:rPr>
+                        <a:t>155.002</a:t>
+                      </a:r>
+                      <a:endParaRPr lang="en-US" sz="1100" b="0" i="0" u="none" strike="noStrike">
+                        <a:solidFill>
+                          <a:srgbClr val="000000"/>
+                        </a:solidFill>
+                        <a:effectLst/>
+                        <a:latin typeface="Calibri" panose="020F0502020204030204" pitchFamily="34" charset="0"/>
+                      </a:endParaRPr>
+                    </a:p>
+                  </a:txBody>
+                  <a:tcPr marL="6204" marR="6204" marT="6204" marB="0" anchor="b"/>
                 </a:tc>
                 <a:tc>
                   <a:txBody>
@@ -8702,38 +9724,15 @@
                       </a:endParaRPr>
                     </a:p>
                   </a:txBody>
-                  <a:tcPr marL="6350" marR="6350" marT="6350" marB="0" anchor="b"/>
-                </a:tc>
-                <a:tc>
-                  <a:txBody>
-                    <a:bodyPr/>
-                    <a:lstStyle/>
-                    <a:p>
-                      <a:pPr algn="r" fontAlgn="b"/>
-                      <a:r>
-                        <a:rPr lang="en-US" sz="1100" u="none" strike="noStrike">
-                          <a:effectLst/>
-                        </a:rPr>
-                        <a:t>155.002</a:t>
-                      </a:r>
-                      <a:endParaRPr lang="en-US" sz="1100" b="0" i="0" u="none" strike="noStrike">
-                        <a:solidFill>
-                          <a:srgbClr val="000000"/>
-                        </a:solidFill>
-                        <a:effectLst/>
-                        <a:latin typeface="Calibri" panose="020F0502020204030204" pitchFamily="34" charset="0"/>
-                      </a:endParaRPr>
-                    </a:p>
-                  </a:txBody>
-                  <a:tcPr marL="6350" marR="6350" marT="6350" marB="0" anchor="b"/>
+                  <a:tcPr marL="6204" marR="6204" marT="6204" marB="0" anchor="b"/>
                 </a:tc>
                 <a:extLst>
                   <a:ext uri="{0D108BD9-81ED-4DB2-BD59-A6C34878D82A}">
-                    <a16:rowId xmlns:a16="http://schemas.microsoft.com/office/drawing/2014/main" val="3860567062"/>
+                    <a16:rowId xmlns:a16="http://schemas.microsoft.com/office/drawing/2014/main" val="1168005990"/>
                   </a:ext>
                 </a:extLst>
               </a:tr>
-              <a:tr h="232147">
+              <a:tr h="179917">
                 <a:tc>
                   <a:txBody>
                     <a:bodyPr/>
@@ -8755,7 +9754,7 @@
                       </a:endParaRPr>
                     </a:p>
                   </a:txBody>
-                  <a:tcPr marL="6350" marR="6350" marT="6350" marB="0" anchor="b"/>
+                  <a:tcPr marL="6204" marR="6204" marT="6204" marB="0" anchor="b"/>
                 </a:tc>
                 <a:tc>
                   <a:txBody>
@@ -8767,7 +9766,7 @@
                         <a:rPr lang="en-US" sz="1100" u="none" strike="noStrike">
                           <a:effectLst/>
                         </a:rPr>
-                        <a:t>8.50%</a:t>
+                        <a:t>8.5</a:t>
                       </a:r>
                       <a:endParaRPr lang="en-US" sz="1100" b="0" i="0" u="none" strike="noStrike">
                         <a:solidFill>
@@ -8778,7 +9777,30 @@
                       </a:endParaRPr>
                     </a:p>
                   </a:txBody>
-                  <a:tcPr marL="6350" marR="6350" marT="6350" marB="0" anchor="b"/>
+                  <a:tcPr marL="6204" marR="6204" marT="6204" marB="0" anchor="b"/>
+                </a:tc>
+                <a:tc>
+                  <a:txBody>
+                    <a:bodyPr/>
+                    <a:lstStyle/>
+                    <a:p>
+                      <a:pPr algn="r" fontAlgn="b"/>
+                      <a:r>
+                        <a:rPr lang="en-US" sz="1100" u="none" strike="noStrike">
+                          <a:effectLst/>
+                        </a:rPr>
+                        <a:t>346.715</a:t>
+                      </a:r>
+                      <a:endParaRPr lang="en-US" sz="1100" b="0" i="0" u="none" strike="noStrike">
+                        <a:solidFill>
+                          <a:srgbClr val="000000"/>
+                        </a:solidFill>
+                        <a:effectLst/>
+                        <a:latin typeface="Calibri" panose="020F0502020204030204" pitchFamily="34" charset="0"/>
+                      </a:endParaRPr>
+                    </a:p>
+                  </a:txBody>
+                  <a:tcPr marL="6204" marR="6204" marT="6204" marB="0" anchor="b"/>
                 </a:tc>
                 <a:tc>
                   <a:txBody>
@@ -8801,38 +9823,15 @@
                       </a:endParaRPr>
                     </a:p>
                   </a:txBody>
-                  <a:tcPr marL="6350" marR="6350" marT="6350" marB="0" anchor="b"/>
-                </a:tc>
-                <a:tc>
-                  <a:txBody>
-                    <a:bodyPr/>
-                    <a:lstStyle/>
-                    <a:p>
-                      <a:pPr algn="r" fontAlgn="b"/>
-                      <a:r>
-                        <a:rPr lang="en-US" sz="1100" u="none" strike="noStrike">
-                          <a:effectLst/>
-                        </a:rPr>
-                        <a:t>346.715</a:t>
-                      </a:r>
-                      <a:endParaRPr lang="en-US" sz="1100" b="0" i="0" u="none" strike="noStrike">
-                        <a:solidFill>
-                          <a:srgbClr val="000000"/>
-                        </a:solidFill>
-                        <a:effectLst/>
-                        <a:latin typeface="Calibri" panose="020F0502020204030204" pitchFamily="34" charset="0"/>
-                      </a:endParaRPr>
-                    </a:p>
-                  </a:txBody>
-                  <a:tcPr marL="6350" marR="6350" marT="6350" marB="0" anchor="b"/>
+                  <a:tcPr marL="6204" marR="6204" marT="6204" marB="0" anchor="b"/>
                 </a:tc>
                 <a:extLst>
                   <a:ext uri="{0D108BD9-81ED-4DB2-BD59-A6C34878D82A}">
-                    <a16:rowId xmlns:a16="http://schemas.microsoft.com/office/drawing/2014/main" val="1979520957"/>
+                    <a16:rowId xmlns:a16="http://schemas.microsoft.com/office/drawing/2014/main" val="2921143667"/>
                   </a:ext>
                 </a:extLst>
               </a:tr>
-              <a:tr h="232147">
+              <a:tr h="179917">
                 <a:tc>
                   <a:txBody>
                     <a:bodyPr/>
@@ -8848,7 +9847,100 @@
                       </a:endParaRPr>
                     </a:p>
                   </a:txBody>
-                  <a:tcPr marL="6350" marR="6350" marT="6350" marB="0" anchor="b"/>
+                  <a:tcPr marL="6204" marR="6204" marT="6204" marB="0" anchor="b"/>
+                </a:tc>
+                <a:tc>
+                  <a:txBody>
+                    <a:bodyPr/>
+                    <a:lstStyle/>
+                    <a:p>
+                      <a:pPr algn="r" fontAlgn="b"/>
+                      <a:r>
+                        <a:rPr lang="en-US" sz="1100" u="none" strike="noStrike">
+                          <a:effectLst/>
+                        </a:rPr>
+                        <a:t>100</a:t>
+                      </a:r>
+                      <a:endParaRPr lang="en-US" sz="1100" b="0" i="0" u="none" strike="noStrike">
+                        <a:solidFill>
+                          <a:srgbClr val="000000"/>
+                        </a:solidFill>
+                        <a:effectLst/>
+                        <a:latin typeface="Calibri" panose="020F0502020204030204" pitchFamily="34" charset="0"/>
+                      </a:endParaRPr>
+                    </a:p>
+                  </a:txBody>
+                  <a:tcPr marL="6204" marR="6204" marT="6204" marB="0" anchor="b"/>
+                </a:tc>
+                <a:tc>
+                  <a:txBody>
+                    <a:bodyPr/>
+                    <a:lstStyle/>
+                    <a:p>
+                      <a:pPr algn="r" fontAlgn="b"/>
+                      <a:r>
+                        <a:rPr lang="en-US" sz="1100" u="none" strike="noStrike">
+                          <a:effectLst/>
+                        </a:rPr>
+                        <a:t>4079</a:t>
+                      </a:r>
+                      <a:endParaRPr lang="en-US" sz="1100" b="0" i="0" u="none" strike="noStrike">
+                        <a:solidFill>
+                          <a:srgbClr val="000000"/>
+                        </a:solidFill>
+                        <a:effectLst/>
+                        <a:latin typeface="Calibri" panose="020F0502020204030204" pitchFamily="34" charset="0"/>
+                      </a:endParaRPr>
+                    </a:p>
+                  </a:txBody>
+                  <a:tcPr marL="6204" marR="6204" marT="6204" marB="0" anchor="b"/>
+                </a:tc>
+                <a:tc>
+                  <a:txBody>
+                    <a:bodyPr/>
+                    <a:lstStyle/>
+                    <a:p>
+                      <a:pPr algn="r" fontAlgn="b"/>
+                      <a:r>
+                        <a:rPr lang="en-US" sz="1100" u="none" strike="noStrike">
+                          <a:effectLst/>
+                        </a:rPr>
+                        <a:t>4079</a:t>
+                      </a:r>
+                      <a:endParaRPr lang="en-US" sz="1100" b="0" i="0" u="none" strike="noStrike">
+                        <a:solidFill>
+                          <a:srgbClr val="000000"/>
+                        </a:solidFill>
+                        <a:effectLst/>
+                        <a:latin typeface="Calibri" panose="020F0502020204030204" pitchFamily="34" charset="0"/>
+                      </a:endParaRPr>
+                    </a:p>
+                  </a:txBody>
+                  <a:tcPr marL="6204" marR="6204" marT="6204" marB="0" anchor="b"/>
+                </a:tc>
+                <a:extLst>
+                  <a:ext uri="{0D108BD9-81ED-4DB2-BD59-A6C34878D82A}">
+                    <a16:rowId xmlns:a16="http://schemas.microsoft.com/office/drawing/2014/main" val="4034455059"/>
+                  </a:ext>
+                </a:extLst>
+              </a:tr>
+              <a:tr h="179917">
+                <a:tc>
+                  <a:txBody>
+                    <a:bodyPr/>
+                    <a:lstStyle/>
+                    <a:p>
+                      <a:pPr algn="l" fontAlgn="b"/>
+                      <a:endParaRPr lang="en-US" sz="1100" b="0" i="0" u="none" strike="noStrike">
+                        <a:solidFill>
+                          <a:srgbClr val="000000"/>
+                        </a:solidFill>
+                        <a:effectLst/>
+                        <a:latin typeface="Calibri" panose="020F0502020204030204" pitchFamily="34" charset="0"/>
+                      </a:endParaRPr>
+                    </a:p>
+                  </a:txBody>
+                  <a:tcPr marL="6204" marR="6204" marT="6204" marB="0" anchor="b"/>
                 </a:tc>
                 <a:tc>
                   <a:txBody>
@@ -8865,7 +9957,7 @@
                       </a:endParaRPr>
                     </a:p>
                   </a:txBody>
-                  <a:tcPr marL="6350" marR="6350" marT="6350" marB="0" anchor="b"/>
+                  <a:tcPr marL="6204" marR="6204" marT="6204" marB="0" anchor="b"/>
                 </a:tc>
                 <a:tc>
                   <a:txBody>
@@ -8882,7 +9974,7 @@
                       </a:endParaRPr>
                     </a:p>
                   </a:txBody>
-                  <a:tcPr marL="6350" marR="6350" marT="6350" marB="0" anchor="b"/>
+                  <a:tcPr marL="6204" marR="6204" marT="6204" marB="0" anchor="b"/>
                 </a:tc>
                 <a:tc>
                   <a:txBody>
@@ -8899,115 +9991,16 @@
                       </a:endParaRPr>
                     </a:p>
                   </a:txBody>
-                  <a:tcPr marL="6350" marR="6350" marT="6350" marB="0" anchor="b"/>
+                  <a:tcPr marL="6204" marR="6204" marT="6204" marB="0" anchor="b"/>
                 </a:tc>
                 <a:extLst>
                   <a:ext uri="{0D108BD9-81ED-4DB2-BD59-A6C34878D82A}">
-                    <a16:rowId xmlns:a16="http://schemas.microsoft.com/office/drawing/2014/main" val="3429188303"/>
+                    <a16:rowId xmlns:a16="http://schemas.microsoft.com/office/drawing/2014/main" val="2501455775"/>
                   </a:ext>
                 </a:extLst>
               </a:tr>
-              <a:tr h="430672">
-                <a:tc>
-                  <a:txBody>
-                    <a:bodyPr/>
-                    <a:lstStyle/>
-                    <a:p>
-                      <a:pPr algn="ctr" fontAlgn="b"/>
-                      <a:r>
-                        <a:rPr lang="en-US" sz="1100" b="1" u="none" strike="noStrike" dirty="0">
-                          <a:effectLst/>
-                        </a:rPr>
-                        <a:t>Age Group</a:t>
-                      </a:r>
-                      <a:endParaRPr lang="en-US" sz="1100" b="1" i="0" u="none" strike="noStrike" dirty="0">
-                        <a:solidFill>
-                          <a:srgbClr val="000000"/>
-                        </a:solidFill>
-                        <a:effectLst/>
-                        <a:latin typeface="Calibri" panose="020F0502020204030204" pitchFamily="34" charset="0"/>
-                      </a:endParaRPr>
-                    </a:p>
-                  </a:txBody>
-                  <a:tcPr marL="6350" marR="6350" marT="6350" marB="0" anchor="b"/>
-                </a:tc>
-                <a:tc>
-                  <a:txBody>
-                    <a:bodyPr/>
-                    <a:lstStyle/>
-                    <a:p>
-                      <a:pPr algn="ctr" fontAlgn="b"/>
-                      <a:r>
-                        <a:rPr lang="en-US" sz="1100" b="1" u="none" strike="noStrike">
-                          <a:effectLst/>
-                        </a:rPr>
-                        <a:t>Male Population</a:t>
-                      </a:r>
-                      <a:endParaRPr lang="en-US" sz="1100" b="1" i="0" u="none" strike="noStrike">
-                        <a:solidFill>
-                          <a:srgbClr val="000000"/>
-                        </a:solidFill>
-                        <a:effectLst/>
-                        <a:latin typeface="Calibri" panose="020F0502020204030204" pitchFamily="34" charset="0"/>
-                      </a:endParaRPr>
-                    </a:p>
-                  </a:txBody>
-                  <a:tcPr marL="6350" marR="6350" marT="6350" marB="0" anchor="b"/>
-                </a:tc>
-                <a:tc>
-                  <a:txBody>
-                    <a:bodyPr/>
-                    <a:lstStyle/>
-                    <a:p>
-                      <a:pPr algn="ctr" fontAlgn="b"/>
-                      <a:r>
-                        <a:rPr lang="en-US" sz="1100" b="1" u="none" strike="noStrike" dirty="0">
-                          <a:effectLst/>
-                        </a:rPr>
-                        <a:t>Male Drug Mortality</a:t>
-                      </a:r>
-                      <a:endParaRPr lang="en-US" sz="1100" b="1" i="0" u="none" strike="noStrike" dirty="0">
-                        <a:solidFill>
-                          <a:srgbClr val="000000"/>
-                        </a:solidFill>
-                        <a:effectLst/>
-                        <a:latin typeface="Calibri" panose="020F0502020204030204" pitchFamily="34" charset="0"/>
-                      </a:endParaRPr>
-                    </a:p>
-                  </a:txBody>
-                  <a:tcPr marL="6350" marR="6350" marT="6350" marB="0" anchor="b"/>
-                </a:tc>
-                <a:tc>
-                  <a:txBody>
-                    <a:bodyPr/>
-                    <a:lstStyle/>
-                    <a:p>
-                      <a:pPr algn="ctr" fontAlgn="b"/>
-                      <a:r>
-                        <a:rPr lang="en-US" sz="1100" b="1" u="none" strike="noStrike" dirty="0">
-                          <a:effectLst/>
-                        </a:rPr>
-                        <a:t>Estimate</a:t>
-                      </a:r>
-                      <a:endParaRPr lang="en-US" sz="1100" b="1" i="0" u="none" strike="noStrike" dirty="0">
-                        <a:solidFill>
-                          <a:srgbClr val="000000"/>
-                        </a:solidFill>
-                        <a:effectLst/>
-                        <a:latin typeface="Calibri" panose="020F0502020204030204" pitchFamily="34" charset="0"/>
-                      </a:endParaRPr>
-                    </a:p>
-                  </a:txBody>
-                  <a:tcPr marL="6350" marR="6350" marT="6350" marB="0" anchor="b"/>
-                </a:tc>
-                <a:extLst>
-                  <a:ext uri="{0D108BD9-81ED-4DB2-BD59-A6C34878D82A}">
-                    <a16:rowId xmlns:a16="http://schemas.microsoft.com/office/drawing/2014/main" val="882860184"/>
-                  </a:ext>
-                </a:extLst>
-              </a:tr>
-              <a:tr h="232147">
-                <a:tc>
+              <a:tr h="179917">
+                <a:tc gridSpan="2">
                   <a:txBody>
                     <a:bodyPr/>
                     <a:lstStyle/>
@@ -9017,7 +10010,7 @@
                         <a:rPr lang="en-US" sz="1100" u="none" strike="noStrike">
                           <a:effectLst/>
                         </a:rPr>
-                        <a:t>20-29</a:t>
+                        <a:t>Chi-Squared Test p-value:</a:t>
                       </a:r>
                       <a:endParaRPr lang="en-US" sz="1100" b="0" i="0" u="none" strike="noStrike">
                         <a:solidFill>
@@ -9028,53 +10021,17 @@
                       </a:endParaRPr>
                     </a:p>
                   </a:txBody>
-                  <a:tcPr marL="6350" marR="6350" marT="6350" marB="0" anchor="b"/>
+                  <a:tcPr marL="6204" marR="6204" marT="6204" marB="0" anchor="b"/>
                 </a:tc>
-                <a:tc>
+                <a:tc hMerge="1">
                   <a:txBody>
                     <a:bodyPr/>
                     <a:lstStyle/>
                     <a:p>
-                      <a:pPr algn="r" fontAlgn="b"/>
-                      <a:r>
-                        <a:rPr lang="en-US" sz="1100" u="none" strike="noStrike" dirty="0">
-                          <a:effectLst/>
-                        </a:rPr>
-                        <a:t>19.87%</a:t>
-                      </a:r>
-                      <a:endParaRPr lang="en-US" sz="1100" b="0" i="0" u="none" strike="noStrike" dirty="0">
-                        <a:solidFill>
-                          <a:srgbClr val="000000"/>
-                        </a:solidFill>
-                        <a:effectLst/>
-                        <a:latin typeface="Calibri" panose="020F0502020204030204" pitchFamily="34" charset="0"/>
-                      </a:endParaRPr>
+                      <a:endParaRPr lang="en-US"/>
                     </a:p>
                   </a:txBody>
-                  <a:tcPr marL="6350" marR="6350" marT="6350" marB="0" anchor="b"/>
-                </a:tc>
-                <a:tc>
-                  <a:txBody>
-                    <a:bodyPr/>
-                    <a:lstStyle/>
-                    <a:p>
-                      <a:pPr algn="r" fontAlgn="b"/>
-                      <a:r>
-                        <a:rPr lang="en-US" sz="1100" u="none" strike="noStrike" dirty="0">
-                          <a:effectLst/>
-                        </a:rPr>
-                        <a:t>584</a:t>
-                      </a:r>
-                      <a:endParaRPr lang="en-US" sz="1100" b="0" i="0" u="none" strike="noStrike" dirty="0">
-                        <a:solidFill>
-                          <a:srgbClr val="000000"/>
-                        </a:solidFill>
-                        <a:effectLst/>
-                        <a:latin typeface="Calibri" panose="020F0502020204030204" pitchFamily="34" charset="0"/>
-                      </a:endParaRPr>
-                    </a:p>
-                  </a:txBody>
-                  <a:tcPr marL="6350" marR="6350" marT="6350" marB="0" anchor="b"/>
+                  <a:tcPr/>
                 </a:tc>
                 <a:tc>
                   <a:txBody>
@@ -9086,7 +10043,7 @@
                         <a:rPr lang="en-US" sz="1100" u="none" strike="noStrike">
                           <a:effectLst/>
                         </a:rPr>
-                        <a:t>584.5754</a:t>
+                        <a:t>9.3448E-120</a:t>
                       </a:r>
                       <a:endParaRPr lang="en-US" sz="1100" b="0" i="0" u="none" strike="noStrike">
                         <a:solidFill>
@@ -9097,393 +10054,14 @@
                       </a:endParaRPr>
                     </a:p>
                   </a:txBody>
-                  <a:tcPr marL="6350" marR="6350" marT="6350" marB="0" anchor="b"/>
+                  <a:tcPr marL="6204" marR="6204" marT="6204" marB="0" anchor="b"/>
                 </a:tc>
-                <a:extLst>
-                  <a:ext uri="{0D108BD9-81ED-4DB2-BD59-A6C34878D82A}">
-                    <a16:rowId xmlns:a16="http://schemas.microsoft.com/office/drawing/2014/main" val="4253377818"/>
-                  </a:ext>
-                </a:extLst>
-              </a:tr>
-              <a:tr h="232147">
                 <a:tc>
                   <a:txBody>
                     <a:bodyPr/>
                     <a:lstStyle/>
                     <a:p>
                       <a:pPr algn="l" fontAlgn="b"/>
-                      <a:r>
-                        <a:rPr lang="en-US" sz="1100" u="none" strike="noStrike">
-                          <a:effectLst/>
-                        </a:rPr>
-                        <a:t>30-39</a:t>
-                      </a:r>
-                      <a:endParaRPr lang="en-US" sz="1100" b="0" i="0" u="none" strike="noStrike">
-                        <a:solidFill>
-                          <a:srgbClr val="000000"/>
-                        </a:solidFill>
-                        <a:effectLst/>
-                        <a:latin typeface="Calibri" panose="020F0502020204030204" pitchFamily="34" charset="0"/>
-                      </a:endParaRPr>
-                    </a:p>
-                  </a:txBody>
-                  <a:tcPr marL="6350" marR="6350" marT="6350" marB="0" anchor="b"/>
-                </a:tc>
-                <a:tc>
-                  <a:txBody>
-                    <a:bodyPr/>
-                    <a:lstStyle/>
-                    <a:p>
-                      <a:pPr algn="r" fontAlgn="b"/>
-                      <a:r>
-                        <a:rPr lang="en-US" sz="1100" u="none" strike="noStrike">
-                          <a:effectLst/>
-                        </a:rPr>
-                        <a:t>18.61%</a:t>
-                      </a:r>
-                      <a:endParaRPr lang="en-US" sz="1100" b="0" i="0" u="none" strike="noStrike">
-                        <a:solidFill>
-                          <a:srgbClr val="000000"/>
-                        </a:solidFill>
-                        <a:effectLst/>
-                        <a:latin typeface="Calibri" panose="020F0502020204030204" pitchFamily="34" charset="0"/>
-                      </a:endParaRPr>
-                    </a:p>
-                  </a:txBody>
-                  <a:tcPr marL="6350" marR="6350" marT="6350" marB="0" anchor="b"/>
-                </a:tc>
-                <a:tc>
-                  <a:txBody>
-                    <a:bodyPr/>
-                    <a:lstStyle/>
-                    <a:p>
-                      <a:pPr algn="r" fontAlgn="b"/>
-                      <a:r>
-                        <a:rPr lang="en-US" sz="1100" u="none" strike="noStrike">
-                          <a:effectLst/>
-                        </a:rPr>
-                        <a:t>780</a:t>
-                      </a:r>
-                      <a:endParaRPr lang="en-US" sz="1100" b="0" i="0" u="none" strike="noStrike">
-                        <a:solidFill>
-                          <a:srgbClr val="000000"/>
-                        </a:solidFill>
-                        <a:effectLst/>
-                        <a:latin typeface="Calibri" panose="020F0502020204030204" pitchFamily="34" charset="0"/>
-                      </a:endParaRPr>
-                    </a:p>
-                  </a:txBody>
-                  <a:tcPr marL="6350" marR="6350" marT="6350" marB="0" anchor="b"/>
-                </a:tc>
-                <a:tc>
-                  <a:txBody>
-                    <a:bodyPr/>
-                    <a:lstStyle/>
-                    <a:p>
-                      <a:pPr algn="r" fontAlgn="b"/>
-                      <a:r>
-                        <a:rPr lang="en-US" sz="1100" u="none" strike="noStrike">
-                          <a:effectLst/>
-                        </a:rPr>
-                        <a:t>547.5062</a:t>
-                      </a:r>
-                      <a:endParaRPr lang="en-US" sz="1100" b="0" i="0" u="none" strike="noStrike">
-                        <a:solidFill>
-                          <a:srgbClr val="000000"/>
-                        </a:solidFill>
-                        <a:effectLst/>
-                        <a:latin typeface="Calibri" panose="020F0502020204030204" pitchFamily="34" charset="0"/>
-                      </a:endParaRPr>
-                    </a:p>
-                  </a:txBody>
-                  <a:tcPr marL="6350" marR="6350" marT="6350" marB="0" anchor="b"/>
-                </a:tc>
-                <a:extLst>
-                  <a:ext uri="{0D108BD9-81ED-4DB2-BD59-A6C34878D82A}">
-                    <a16:rowId xmlns:a16="http://schemas.microsoft.com/office/drawing/2014/main" val="2920152571"/>
-                  </a:ext>
-                </a:extLst>
-              </a:tr>
-              <a:tr h="232147">
-                <a:tc>
-                  <a:txBody>
-                    <a:bodyPr/>
-                    <a:lstStyle/>
-                    <a:p>
-                      <a:pPr algn="l" fontAlgn="b"/>
-                      <a:r>
-                        <a:rPr lang="en-US" sz="1100" u="none" strike="noStrike">
-                          <a:effectLst/>
-                        </a:rPr>
-                        <a:t>40-49</a:t>
-                      </a:r>
-                      <a:endParaRPr lang="en-US" sz="1100" b="0" i="0" u="none" strike="noStrike">
-                        <a:solidFill>
-                          <a:srgbClr val="000000"/>
-                        </a:solidFill>
-                        <a:effectLst/>
-                        <a:latin typeface="Calibri" panose="020F0502020204030204" pitchFamily="34" charset="0"/>
-                      </a:endParaRPr>
-                    </a:p>
-                  </a:txBody>
-                  <a:tcPr marL="6350" marR="6350" marT="6350" marB="0" anchor="b"/>
-                </a:tc>
-                <a:tc>
-                  <a:txBody>
-                    <a:bodyPr/>
-                    <a:lstStyle/>
-                    <a:p>
-                      <a:pPr algn="r" fontAlgn="b"/>
-                      <a:r>
-                        <a:rPr lang="en-US" sz="1100" u="none" strike="noStrike">
-                          <a:effectLst/>
-                        </a:rPr>
-                        <a:t>23.97%</a:t>
-                      </a:r>
-                      <a:endParaRPr lang="en-US" sz="1100" b="0" i="0" u="none" strike="noStrike">
-                        <a:solidFill>
-                          <a:srgbClr val="000000"/>
-                        </a:solidFill>
-                        <a:effectLst/>
-                        <a:latin typeface="Calibri" panose="020F0502020204030204" pitchFamily="34" charset="0"/>
-                      </a:endParaRPr>
-                    </a:p>
-                  </a:txBody>
-                  <a:tcPr marL="6350" marR="6350" marT="6350" marB="0" anchor="b"/>
-                </a:tc>
-                <a:tc>
-                  <a:txBody>
-                    <a:bodyPr/>
-                    <a:lstStyle/>
-                    <a:p>
-                      <a:pPr algn="r" fontAlgn="b"/>
-                      <a:r>
-                        <a:rPr lang="en-US" sz="1100" u="none" strike="noStrike">
-                          <a:effectLst/>
-                        </a:rPr>
-                        <a:t>706</a:t>
-                      </a:r>
-                      <a:endParaRPr lang="en-US" sz="1100" b="0" i="0" u="none" strike="noStrike">
-                        <a:solidFill>
-                          <a:srgbClr val="000000"/>
-                        </a:solidFill>
-                        <a:effectLst/>
-                        <a:latin typeface="Calibri" panose="020F0502020204030204" pitchFamily="34" charset="0"/>
-                      </a:endParaRPr>
-                    </a:p>
-                  </a:txBody>
-                  <a:tcPr marL="6350" marR="6350" marT="6350" marB="0" anchor="b"/>
-                </a:tc>
-                <a:tc>
-                  <a:txBody>
-                    <a:bodyPr/>
-                    <a:lstStyle/>
-                    <a:p>
-                      <a:pPr algn="r" fontAlgn="b"/>
-                      <a:r>
-                        <a:rPr lang="en-US" sz="1100" u="none" strike="noStrike">
-                          <a:effectLst/>
-                        </a:rPr>
-                        <a:t>705.1974</a:t>
-                      </a:r>
-                      <a:endParaRPr lang="en-US" sz="1100" b="0" i="0" u="none" strike="noStrike">
-                        <a:solidFill>
-                          <a:srgbClr val="000000"/>
-                        </a:solidFill>
-                        <a:effectLst/>
-                        <a:latin typeface="Calibri" panose="020F0502020204030204" pitchFamily="34" charset="0"/>
-                      </a:endParaRPr>
-                    </a:p>
-                  </a:txBody>
-                  <a:tcPr marL="6350" marR="6350" marT="6350" marB="0" anchor="b"/>
-                </a:tc>
-                <a:extLst>
-                  <a:ext uri="{0D108BD9-81ED-4DB2-BD59-A6C34878D82A}">
-                    <a16:rowId xmlns:a16="http://schemas.microsoft.com/office/drawing/2014/main" val="372776292"/>
-                  </a:ext>
-                </a:extLst>
-              </a:tr>
-              <a:tr h="232147">
-                <a:tc>
-                  <a:txBody>
-                    <a:bodyPr/>
-                    <a:lstStyle/>
-                    <a:p>
-                      <a:pPr algn="l" fontAlgn="b"/>
-                      <a:r>
-                        <a:rPr lang="en-US" sz="1100" u="none" strike="noStrike">
-                          <a:effectLst/>
-                        </a:rPr>
-                        <a:t>50-59</a:t>
-                      </a:r>
-                      <a:endParaRPr lang="en-US" sz="1100" b="0" i="0" u="none" strike="noStrike">
-                        <a:solidFill>
-                          <a:srgbClr val="000000"/>
-                        </a:solidFill>
-                        <a:effectLst/>
-                        <a:latin typeface="Calibri" panose="020F0502020204030204" pitchFamily="34" charset="0"/>
-                      </a:endParaRPr>
-                    </a:p>
-                  </a:txBody>
-                  <a:tcPr marL="6350" marR="6350" marT="6350" marB="0" anchor="b"/>
-                </a:tc>
-                <a:tc>
-                  <a:txBody>
-                    <a:bodyPr/>
-                    <a:lstStyle/>
-                    <a:p>
-                      <a:pPr algn="r" fontAlgn="b"/>
-                      <a:r>
-                        <a:rPr lang="en-US" sz="1100" u="none" strike="noStrike">
-                          <a:effectLst/>
-                        </a:rPr>
-                        <a:t>22.71%</a:t>
-                      </a:r>
-                      <a:endParaRPr lang="en-US" sz="1100" b="0" i="0" u="none" strike="noStrike">
-                        <a:solidFill>
-                          <a:srgbClr val="000000"/>
-                        </a:solidFill>
-                        <a:effectLst/>
-                        <a:latin typeface="Calibri" panose="020F0502020204030204" pitchFamily="34" charset="0"/>
-                      </a:endParaRPr>
-                    </a:p>
-                  </a:txBody>
-                  <a:tcPr marL="6350" marR="6350" marT="6350" marB="0" anchor="b"/>
-                </a:tc>
-                <a:tc>
-                  <a:txBody>
-                    <a:bodyPr/>
-                    <a:lstStyle/>
-                    <a:p>
-                      <a:pPr algn="r" fontAlgn="b"/>
-                      <a:r>
-                        <a:rPr lang="en-US" sz="1100" u="none" strike="noStrike">
-                          <a:effectLst/>
-                        </a:rPr>
-                        <a:t>673</a:t>
-                      </a:r>
-                      <a:endParaRPr lang="en-US" sz="1100" b="0" i="0" u="none" strike="noStrike">
-                        <a:solidFill>
-                          <a:srgbClr val="000000"/>
-                        </a:solidFill>
-                        <a:effectLst/>
-                        <a:latin typeface="Calibri" panose="020F0502020204030204" pitchFamily="34" charset="0"/>
-                      </a:endParaRPr>
-                    </a:p>
-                  </a:txBody>
-                  <a:tcPr marL="6350" marR="6350" marT="6350" marB="0" anchor="b"/>
-                </a:tc>
-                <a:tc>
-                  <a:txBody>
-                    <a:bodyPr/>
-                    <a:lstStyle/>
-                    <a:p>
-                      <a:pPr algn="r" fontAlgn="b"/>
-                      <a:r>
-                        <a:rPr lang="en-US" sz="1100" u="none" strike="noStrike">
-                          <a:effectLst/>
-                        </a:rPr>
-                        <a:t>668.1282</a:t>
-                      </a:r>
-                      <a:endParaRPr lang="en-US" sz="1100" b="0" i="0" u="none" strike="noStrike">
-                        <a:solidFill>
-                          <a:srgbClr val="000000"/>
-                        </a:solidFill>
-                        <a:effectLst/>
-                        <a:latin typeface="Calibri" panose="020F0502020204030204" pitchFamily="34" charset="0"/>
-                      </a:endParaRPr>
-                    </a:p>
-                  </a:txBody>
-                  <a:tcPr marL="6350" marR="6350" marT="6350" marB="0" anchor="b"/>
-                </a:tc>
-                <a:extLst>
-                  <a:ext uri="{0D108BD9-81ED-4DB2-BD59-A6C34878D82A}">
-                    <a16:rowId xmlns:a16="http://schemas.microsoft.com/office/drawing/2014/main" val="3788235359"/>
-                  </a:ext>
-                </a:extLst>
-              </a:tr>
-              <a:tr h="232147">
-                <a:tc>
-                  <a:txBody>
-                    <a:bodyPr/>
-                    <a:lstStyle/>
-                    <a:p>
-                      <a:pPr algn="l" fontAlgn="b"/>
-                      <a:r>
-                        <a:rPr lang="en-US" sz="1100" u="none" strike="noStrike">
-                          <a:effectLst/>
-                        </a:rPr>
-                        <a:t>60-69</a:t>
-                      </a:r>
-                      <a:endParaRPr lang="en-US" sz="1100" b="0" i="0" u="none" strike="noStrike">
-                        <a:solidFill>
-                          <a:srgbClr val="000000"/>
-                        </a:solidFill>
-                        <a:effectLst/>
-                        <a:latin typeface="Calibri" panose="020F0502020204030204" pitchFamily="34" charset="0"/>
-                      </a:endParaRPr>
-                    </a:p>
-                  </a:txBody>
-                  <a:tcPr marL="6350" marR="6350" marT="6350" marB="0" anchor="b"/>
-                </a:tc>
-                <a:tc>
-                  <a:txBody>
-                    <a:bodyPr/>
-                    <a:lstStyle/>
-                    <a:p>
-                      <a:pPr algn="r" fontAlgn="b"/>
-                      <a:r>
-                        <a:rPr lang="en-US" sz="1100" u="none" strike="noStrike">
-                          <a:effectLst/>
-                        </a:rPr>
-                        <a:t>14.82%</a:t>
-                      </a:r>
-                      <a:endParaRPr lang="en-US" sz="1100" b="0" i="0" u="none" strike="noStrike">
-                        <a:solidFill>
-                          <a:srgbClr val="000000"/>
-                        </a:solidFill>
-                        <a:effectLst/>
-                        <a:latin typeface="Calibri" panose="020F0502020204030204" pitchFamily="34" charset="0"/>
-                      </a:endParaRPr>
-                    </a:p>
-                  </a:txBody>
-                  <a:tcPr marL="6350" marR="6350" marT="6350" marB="0" anchor="b"/>
-                </a:tc>
-                <a:tc>
-                  <a:txBody>
-                    <a:bodyPr/>
-                    <a:lstStyle/>
-                    <a:p>
-                      <a:pPr algn="r" fontAlgn="b"/>
-                      <a:r>
-                        <a:rPr lang="en-US" sz="1100" u="none" strike="noStrike">
-                          <a:effectLst/>
-                        </a:rPr>
-                        <a:t>199</a:t>
-                      </a:r>
-                      <a:endParaRPr lang="en-US" sz="1100" b="0" i="0" u="none" strike="noStrike">
-                        <a:solidFill>
-                          <a:srgbClr val="000000"/>
-                        </a:solidFill>
-                        <a:effectLst/>
-                        <a:latin typeface="Calibri" panose="020F0502020204030204" pitchFamily="34" charset="0"/>
-                      </a:endParaRPr>
-                    </a:p>
-                  </a:txBody>
-                  <a:tcPr marL="6350" marR="6350" marT="6350" marB="0" anchor="b"/>
-                </a:tc>
-                <a:tc>
-                  <a:txBody>
-                    <a:bodyPr/>
-                    <a:lstStyle/>
-                    <a:p>
-                      <a:pPr algn="r" fontAlgn="b"/>
-                      <a:r>
-                        <a:rPr lang="en-US" sz="1100" u="none" strike="noStrike" dirty="0">
-                          <a:effectLst/>
-                        </a:rPr>
-                        <a:t>436.0044</a:t>
-                      </a:r>
                       <a:endParaRPr lang="en-US" sz="1100" b="0" i="0" u="none" strike="noStrike" dirty="0">
                         <a:solidFill>
                           <a:srgbClr val="000000"/>
@@ -9493,11 +10071,11 @@
                       </a:endParaRPr>
                     </a:p>
                   </a:txBody>
-                  <a:tcPr marL="6350" marR="6350" marT="6350" marB="0" anchor="b"/>
+                  <a:tcPr marL="6204" marR="6204" marT="6204" marB="0" anchor="b"/>
                 </a:tc>
                 <a:extLst>
                   <a:ext uri="{0D108BD9-81ED-4DB2-BD59-A6C34878D82A}">
-                    <a16:rowId xmlns:a16="http://schemas.microsoft.com/office/drawing/2014/main" val="806347943"/>
+                    <a16:rowId xmlns:a16="http://schemas.microsoft.com/office/drawing/2014/main" val="1671302069"/>
                   </a:ext>
                 </a:extLst>
               </a:tr>
@@ -9669,6 +10247,115 @@
 </file>
 
 <file path=ppt/slides/slide15.xml><?xml version="1.0" encoding="utf-8"?>
+<p:sld xmlns:a="http://schemas.openxmlformats.org/drawingml/2006/main" xmlns:r="http://schemas.openxmlformats.org/officeDocument/2006/relationships" xmlns:p="http://schemas.openxmlformats.org/presentationml/2006/main">
+  <p:cSld>
+    <p:spTree>
+      <p:nvGrpSpPr>
+        <p:cNvPr id="1" name=""/>
+        <p:cNvGrpSpPr/>
+        <p:nvPr/>
+      </p:nvGrpSpPr>
+      <p:grpSpPr>
+        <a:xfrm>
+          <a:off x="0" y="0"/>
+          <a:ext cx="0" cy="0"/>
+          <a:chOff x="0" y="0"/>
+          <a:chExt cx="0" cy="0"/>
+        </a:xfrm>
+      </p:grpSpPr>
+      <p:sp>
+        <p:nvSpPr>
+          <p:cNvPr id="2" name="Title 1">
+            <a:extLst>
+              <a:ext uri="{FF2B5EF4-FFF2-40B4-BE49-F238E27FC236}">
+                <a16:creationId xmlns:a16="http://schemas.microsoft.com/office/drawing/2014/main" id="{1CD3A979-029E-4483-9B62-80931FADF360}"/>
+              </a:ext>
+            </a:extLst>
+          </p:cNvPr>
+          <p:cNvSpPr>
+            <a:spLocks noGrp="1"/>
+          </p:cNvSpPr>
+          <p:nvPr>
+            <p:ph type="title"/>
+          </p:nvPr>
+        </p:nvSpPr>
+        <p:spPr/>
+        <p:txBody>
+          <a:bodyPr/>
+          <a:lstStyle/>
+          <a:p>
+            <a:r>
+              <a:rPr lang="en-US" dirty="0"/>
+              <a:t>Conclusions</a:t>
+            </a:r>
+          </a:p>
+        </p:txBody>
+      </p:sp>
+      <p:sp>
+        <p:nvSpPr>
+          <p:cNvPr id="3" name="Content Placeholder 2">
+            <a:extLst>
+              <a:ext uri="{FF2B5EF4-FFF2-40B4-BE49-F238E27FC236}">
+                <a16:creationId xmlns:a16="http://schemas.microsoft.com/office/drawing/2014/main" id="{E82706EF-A9EA-40FF-BBB5-63FB3B8BB9B9}"/>
+              </a:ext>
+            </a:extLst>
+          </p:cNvPr>
+          <p:cNvSpPr>
+            <a:spLocks noGrp="1"/>
+          </p:cNvSpPr>
+          <p:nvPr>
+            <p:ph idx="1"/>
+          </p:nvPr>
+        </p:nvSpPr>
+        <p:spPr/>
+        <p:txBody>
+          <a:bodyPr/>
+          <a:lstStyle/>
+          <a:p>
+            <a:r>
+              <a:rPr lang="en-US" dirty="0"/>
+              <a:t>Drug related mortality is expected to go up year-over-year.</a:t>
+            </a:r>
+          </a:p>
+          <a:p>
+            <a:r>
+              <a:rPr lang="en-US" dirty="0"/>
+              <a:t>Fentanyl is fueling the increase.</a:t>
+            </a:r>
+          </a:p>
+          <a:p>
+            <a:r>
+              <a:rPr lang="en-US" dirty="0"/>
+              <a:t>Some groups (Males; White and Hispanic White; 30-39 </a:t>
+            </a:r>
+            <a:r>
+              <a:rPr lang="en-US"/>
+              <a:t>age group) </a:t>
+            </a:r>
+            <a:r>
+              <a:rPr lang="en-US" dirty="0"/>
+              <a:t>are affected disproportionately.</a:t>
+            </a:r>
+          </a:p>
+          <a:p>
+            <a:endParaRPr lang="en-US" dirty="0"/>
+          </a:p>
+        </p:txBody>
+      </p:sp>
+    </p:spTree>
+    <p:extLst>
+      <p:ext uri="{BB962C8B-B14F-4D97-AF65-F5344CB8AC3E}">
+        <p14:creationId xmlns:p14="http://schemas.microsoft.com/office/powerpoint/2010/main" val="2956422025"/>
+      </p:ext>
+    </p:extLst>
+  </p:cSld>
+  <p:clrMapOvr>
+    <a:masterClrMapping/>
+  </p:clrMapOvr>
+</p:sld>
+</file>
+
+<file path=ppt/slides/slide16.xml><?xml version="1.0" encoding="utf-8"?>
 <p:sld xmlns:a="http://schemas.openxmlformats.org/drawingml/2006/main" xmlns:r="http://schemas.openxmlformats.org/officeDocument/2006/relationships" xmlns:p="http://schemas.openxmlformats.org/presentationml/2006/main">
   <p:cSld>
     <p:spTree>

</xml_diff>

<commit_message>
Added pvalue to regression
</commit_message>
<xml_diff>
--- a/Drug Mortality and Socio-Economic conditions in Connecticut.pptx
+++ b/Drug Mortality and Socio-Economic conditions in Connecticut.pptx
@@ -10205,10 +10205,10 @@
       </p:sp>
       <p:pic>
         <p:nvPicPr>
-          <p:cNvPr id="7" name="Picture 6">
+          <p:cNvPr id="5" name="Picture 4">
             <a:extLst>
               <a:ext uri="{FF2B5EF4-FFF2-40B4-BE49-F238E27FC236}">
-                <a16:creationId xmlns:a16="http://schemas.microsoft.com/office/drawing/2014/main" id="{E4C1265A-7E9C-47BC-ADB0-E65D85BF50C9}"/>
+                <a16:creationId xmlns:a16="http://schemas.microsoft.com/office/drawing/2014/main" id="{4B41A697-F142-409D-AA3B-1BA8B2186B0A}"/>
               </a:ext>
             </a:extLst>
           </p:cNvPr>
@@ -10225,7 +10225,7 @@
         </p:blipFill>
         <p:spPr>
           <a:xfrm>
-            <a:off x="6330177" y="1219077"/>
+            <a:off x="6448860" y="1497168"/>
             <a:ext cx="5055752" cy="3378970"/>
           </a:xfrm>
           <a:prstGeom prst="rect">

</xml_diff>

<commit_message>
Updated graph and powerpoint
</commit_message>
<xml_diff>
--- a/Drug Mortality and Socio-Economic conditions in Connecticut.pptx
+++ b/Drug Mortality and Socio-Economic conditions in Connecticut.pptx
@@ -7,22 +7,23 @@
   <p:sldIdLst>
     <p:sldId id="256" r:id="rId2"/>
     <p:sldId id="257" r:id="rId3"/>
-    <p:sldId id="266" r:id="rId4"/>
+    <p:sldId id="277" r:id="rId4"/>
     <p:sldId id="258" r:id="rId5"/>
     <p:sldId id="262" r:id="rId6"/>
-    <p:sldId id="272" r:id="rId7"/>
-    <p:sldId id="273" r:id="rId8"/>
-    <p:sldId id="274" r:id="rId9"/>
-    <p:sldId id="259" r:id="rId10"/>
-    <p:sldId id="264" r:id="rId11"/>
-    <p:sldId id="268" r:id="rId12"/>
-    <p:sldId id="261" r:id="rId13"/>
-    <p:sldId id="267" r:id="rId14"/>
-    <p:sldId id="260" r:id="rId15"/>
-    <p:sldId id="269" r:id="rId16"/>
-    <p:sldId id="270" r:id="rId17"/>
-    <p:sldId id="271" r:id="rId18"/>
-    <p:sldId id="265" r:id="rId19"/>
+    <p:sldId id="259" r:id="rId7"/>
+    <p:sldId id="264" r:id="rId8"/>
+    <p:sldId id="268" r:id="rId9"/>
+    <p:sldId id="272" r:id="rId10"/>
+    <p:sldId id="273" r:id="rId11"/>
+    <p:sldId id="275" r:id="rId12"/>
+    <p:sldId id="276" r:id="rId13"/>
+    <p:sldId id="261" r:id="rId14"/>
+    <p:sldId id="267" r:id="rId15"/>
+    <p:sldId id="260" r:id="rId16"/>
+    <p:sldId id="269" r:id="rId17"/>
+    <p:sldId id="270" r:id="rId18"/>
+    <p:sldId id="271" r:id="rId19"/>
+    <p:sldId id="265" r:id="rId20"/>
   </p:sldIdLst>
   <p:sldSz cx="12192000" cy="6858000"/>
   <p:notesSz cx="6858000" cy="9144000"/>
@@ -7756,7 +7757,7 @@
           <p:cNvPr id="2" name="Title 1">
             <a:extLst>
               <a:ext uri="{FF2B5EF4-FFF2-40B4-BE49-F238E27FC236}">
-                <a16:creationId xmlns:a16="http://schemas.microsoft.com/office/drawing/2014/main" id="{CCC4A7B5-8082-41BD-8216-D7174D2FC296}"/>
+                <a16:creationId xmlns:a16="http://schemas.microsoft.com/office/drawing/2014/main" id="{8BF87117-1E4E-4EE9-8760-25D09E6E6179}"/>
               </a:ext>
             </a:extLst>
           </p:cNvPr>
@@ -7769,12 +7770,14 @@
         </p:nvSpPr>
         <p:spPr/>
         <p:txBody>
-          <a:bodyPr/>
+          <a:bodyPr>
+            <a:normAutofit/>
+          </a:bodyPr>
           <a:lstStyle/>
           <a:p>
             <a:r>
               <a:rPr lang="en-US" dirty="0"/>
-              <a:t>Drug-Induced Mortality Rates by Drug</a:t>
+              <a:t>Drug-induced mortality rates and barriers to medical treatment</a:t>
             </a:r>
           </a:p>
         </p:txBody>
@@ -7784,7 +7787,7 @@
           <p:cNvPr id="5" name="Content Placeholder 4">
             <a:extLst>
               <a:ext uri="{FF2B5EF4-FFF2-40B4-BE49-F238E27FC236}">
-                <a16:creationId xmlns:a16="http://schemas.microsoft.com/office/drawing/2014/main" id="{DFB7AE71-0B7A-462D-932A-2B550F2B7D1C}"/>
+                <a16:creationId xmlns:a16="http://schemas.microsoft.com/office/drawing/2014/main" id="{69D2CC4C-4076-413C-B758-171D13D3279E}"/>
               </a:ext>
             </a:extLst>
           </p:cNvPr>
@@ -7792,7 +7795,7 @@
             <a:picLocks noGrp="1" noChangeAspect="1"/>
           </p:cNvPicPr>
           <p:nvPr>
-            <p:ph idx="1"/>
+            <p:ph sz="half" idx="1"/>
           </p:nvPr>
         </p:nvPicPr>
         <p:blipFill>
@@ -7803,15 +7806,47 @@
         </p:blipFill>
         <p:spPr>
           <a:xfrm>
-            <a:off x="2592925" y="1382001"/>
-            <a:ext cx="7968620" cy="5312414"/>
+            <a:off x="1433384" y="1825839"/>
+            <a:ext cx="6298127" cy="4901955"/>
           </a:xfrm>
+        </p:spPr>
+      </p:pic>
+      <p:pic>
+        <p:nvPicPr>
+          <p:cNvPr id="8" name="Content Placeholder 7">
+            <a:extLst>
+              <a:ext uri="{FF2B5EF4-FFF2-40B4-BE49-F238E27FC236}">
+                <a16:creationId xmlns:a16="http://schemas.microsoft.com/office/drawing/2014/main" id="{DCB84271-D29B-4877-BEF9-298CAC43DDED}"/>
+              </a:ext>
+            </a:extLst>
+          </p:cNvPr>
+          <p:cNvPicPr>
+            <a:picLocks noGrp="1" noChangeAspect="1"/>
+          </p:cNvPicPr>
+          <p:nvPr>
+            <p:ph sz="half" idx="2"/>
+          </p:nvPr>
+        </p:nvPicPr>
+        <p:blipFill>
+          <a:blip r:embed="rId3"/>
+          <a:stretch>
+            <a:fillRect/>
+          </a:stretch>
+        </p:blipFill>
+        <p:spPr>
+          <a:xfrm>
+            <a:off x="7731511" y="1905000"/>
+            <a:ext cx="4007407" cy="4613246"/>
+          </a:xfrm>
+          <a:prstGeom prst="rect">
+            <a:avLst/>
+          </a:prstGeom>
         </p:spPr>
       </p:pic>
     </p:spTree>
     <p:extLst>
       <p:ext uri="{BB962C8B-B14F-4D97-AF65-F5344CB8AC3E}">
-        <p14:creationId xmlns:p14="http://schemas.microsoft.com/office/powerpoint/2010/main" val="2160349714"/>
+        <p14:creationId xmlns:p14="http://schemas.microsoft.com/office/powerpoint/2010/main" val="824537481"/>
       </p:ext>
     </p:extLst>
   </p:cSld>
@@ -7843,7 +7878,7 @@
           <p:cNvPr id="2" name="Title 1">
             <a:extLst>
               <a:ext uri="{FF2B5EF4-FFF2-40B4-BE49-F238E27FC236}">
-                <a16:creationId xmlns:a16="http://schemas.microsoft.com/office/drawing/2014/main" id="{BB1C60A3-10D8-462D-B3B4-AF7F4B5F8101}"/>
+                <a16:creationId xmlns:a16="http://schemas.microsoft.com/office/drawing/2014/main" id="{5436FCFC-B062-4D1A-9BDB-4D73640E19B5}"/>
               </a:ext>
             </a:extLst>
           </p:cNvPr>
@@ -7854,48 +7889,97 @@
             <p:ph type="title"/>
           </p:nvPr>
         </p:nvSpPr>
-        <p:spPr/>
+        <p:spPr>
+          <a:xfrm>
+            <a:off x="1640156" y="204224"/>
+            <a:ext cx="8911687" cy="1280890"/>
+          </a:xfrm>
+        </p:spPr>
         <p:txBody>
-          <a:bodyPr/>
+          <a:bodyPr>
+            <a:noAutofit/>
+          </a:bodyPr>
           <a:lstStyle/>
           <a:p>
             <a:r>
-              <a:rPr lang="en-US" dirty="0" err="1"/>
-              <a:t>Fentynal</a:t>
-            </a:r>
-            <a:endParaRPr lang="en-US" dirty="0"/>
+              <a:rPr lang="en-US" sz="2800" dirty="0"/>
+              <a:t>Relationship between deaths (due to opioids overdose) and Naloxone prescribing pharmacies in Connecticut </a:t>
+            </a:r>
+            <a:r>
+              <a:rPr lang="en-US" sz="2000" b="1" i="1" dirty="0"/>
+              <a:t>(Deaths (Right) &amp; Pharmacies (Left)</a:t>
+            </a:r>
           </a:p>
         </p:txBody>
       </p:sp>
-      <p:sp>
-        <p:nvSpPr>
-          <p:cNvPr id="3" name="Content Placeholder 2">
+      <p:pic>
+        <p:nvPicPr>
+          <p:cNvPr id="14" name="Content Placeholder 13">
             <a:extLst>
               <a:ext uri="{FF2B5EF4-FFF2-40B4-BE49-F238E27FC236}">
-                <a16:creationId xmlns:a16="http://schemas.microsoft.com/office/drawing/2014/main" id="{DE910129-DA90-46EC-8EF1-7D23BD0B5F3F}"/>
+                <a16:creationId xmlns:a16="http://schemas.microsoft.com/office/drawing/2014/main" id="{73E6818F-D8E1-46A5-A23B-012F3901ABB8}"/>
               </a:ext>
             </a:extLst>
           </p:cNvPr>
-          <p:cNvSpPr>
-            <a:spLocks noGrp="1"/>
-          </p:cNvSpPr>
-          <p:nvPr>
-            <p:ph idx="1"/>
-          </p:nvPr>
-        </p:nvSpPr>
-        <p:spPr/>
-        <p:txBody>
-          <a:bodyPr/>
-          <a:lstStyle/>
-          <a:p>
-            <a:endParaRPr lang="en-US"/>
-          </a:p>
-        </p:txBody>
-      </p:sp>
+          <p:cNvPicPr>
+            <a:picLocks noGrp="1" noChangeAspect="1"/>
+          </p:cNvPicPr>
+          <p:nvPr>
+            <p:ph sz="half" idx="2"/>
+          </p:nvPr>
+        </p:nvPicPr>
+        <p:blipFill>
+          <a:blip r:embed="rId2"/>
+          <a:stretch>
+            <a:fillRect/>
+          </a:stretch>
+        </p:blipFill>
+        <p:spPr>
+          <a:xfrm>
+            <a:off x="6759146" y="1631090"/>
+            <a:ext cx="5432854" cy="4955059"/>
+          </a:xfrm>
+          <a:prstGeom prst="rect">
+            <a:avLst/>
+          </a:prstGeom>
+        </p:spPr>
+      </p:pic>
+      <p:pic>
+        <p:nvPicPr>
+          <p:cNvPr id="13" name="Content Placeholder 12">
+            <a:extLst>
+              <a:ext uri="{FF2B5EF4-FFF2-40B4-BE49-F238E27FC236}">
+                <a16:creationId xmlns:a16="http://schemas.microsoft.com/office/drawing/2014/main" id="{943F5CF1-D2A1-485B-AE17-0D0D20A7EAEB}"/>
+              </a:ext>
+            </a:extLst>
+          </p:cNvPr>
+          <p:cNvPicPr>
+            <a:picLocks noGrp="1" noChangeAspect="1"/>
+          </p:cNvPicPr>
+          <p:nvPr>
+            <p:ph sz="half" idx="1"/>
+          </p:nvPr>
+        </p:nvPicPr>
+        <p:blipFill>
+          <a:blip r:embed="rId3"/>
+          <a:stretch>
+            <a:fillRect/>
+          </a:stretch>
+        </p:blipFill>
+        <p:spPr>
+          <a:xfrm>
+            <a:off x="615802" y="1631091"/>
+            <a:ext cx="6143344" cy="4955059"/>
+          </a:xfrm>
+          <a:prstGeom prst="rect">
+            <a:avLst/>
+          </a:prstGeom>
+        </p:spPr>
+      </p:pic>
     </p:spTree>
     <p:extLst>
       <p:ext uri="{BB962C8B-B14F-4D97-AF65-F5344CB8AC3E}">
-        <p14:creationId xmlns:p14="http://schemas.microsoft.com/office/powerpoint/2010/main" val="2837072940"/>
+        <p14:creationId xmlns:p14="http://schemas.microsoft.com/office/powerpoint/2010/main" val="4115928322"/>
       </p:ext>
     </p:extLst>
   </p:cSld>
@@ -7906,6 +7990,143 @@
 </file>
 
 <file path=ppt/slides/slide12.xml><?xml version="1.0" encoding="utf-8"?>
+<p:sld xmlns:a="http://schemas.openxmlformats.org/drawingml/2006/main" xmlns:r="http://schemas.openxmlformats.org/officeDocument/2006/relationships" xmlns:p="http://schemas.openxmlformats.org/presentationml/2006/main">
+  <p:cSld>
+    <p:spTree>
+      <p:nvGrpSpPr>
+        <p:cNvPr id="1" name=""/>
+        <p:cNvGrpSpPr/>
+        <p:nvPr/>
+      </p:nvGrpSpPr>
+      <p:grpSpPr>
+        <a:xfrm>
+          <a:off x="0" y="0"/>
+          <a:ext cx="0" cy="0"/>
+          <a:chOff x="0" y="0"/>
+          <a:chExt cx="0" cy="0"/>
+        </a:xfrm>
+      </p:grpSpPr>
+      <p:sp>
+        <p:nvSpPr>
+          <p:cNvPr id="2" name="Title 1">
+            <a:extLst>
+              <a:ext uri="{FF2B5EF4-FFF2-40B4-BE49-F238E27FC236}">
+                <a16:creationId xmlns:a16="http://schemas.microsoft.com/office/drawing/2014/main" id="{9AAC960E-CDBC-4821-BB0E-862963C433D7}"/>
+              </a:ext>
+            </a:extLst>
+          </p:cNvPr>
+          <p:cNvSpPr>
+            <a:spLocks noGrp="1"/>
+          </p:cNvSpPr>
+          <p:nvPr>
+            <p:ph type="title"/>
+          </p:nvPr>
+        </p:nvSpPr>
+        <p:spPr>
+          <a:xfrm>
+            <a:off x="2043811" y="313711"/>
+            <a:ext cx="9213194" cy="929529"/>
+          </a:xfrm>
+        </p:spPr>
+        <p:txBody>
+          <a:bodyPr>
+            <a:noAutofit/>
+          </a:bodyPr>
+          <a:lstStyle/>
+          <a:p>
+            <a:r>
+              <a:rPr lang="en-US" sz="2000" b="1" dirty="0"/>
+              <a:t>Relationship between Opioids related deaths and Naloxone prescribing pharmacies in Connecticut.</a:t>
+            </a:r>
+            <a:r>
+              <a:rPr lang="en-US" sz="2000" dirty="0"/>
+              <a:t> </a:t>
+            </a:r>
+            <a:r>
+              <a:rPr lang="en-US" sz="1800" b="1" i="1" dirty="0"/>
+              <a:t>(Deaths (Right) &amp; Pharmacies (Left)</a:t>
+            </a:r>
+          </a:p>
+        </p:txBody>
+      </p:sp>
+      <p:pic>
+        <p:nvPicPr>
+          <p:cNvPr id="7" name="Content Placeholder 6">
+            <a:extLst>
+              <a:ext uri="{FF2B5EF4-FFF2-40B4-BE49-F238E27FC236}">
+                <a16:creationId xmlns:a16="http://schemas.microsoft.com/office/drawing/2014/main" id="{E6A84392-994A-4395-8A86-B64FFDBF855C}"/>
+              </a:ext>
+            </a:extLst>
+          </p:cNvPr>
+          <p:cNvPicPr>
+            <a:picLocks noGrp="1" noChangeAspect="1"/>
+          </p:cNvPicPr>
+          <p:nvPr>
+            <p:ph sz="half" idx="2"/>
+          </p:nvPr>
+        </p:nvPicPr>
+        <p:blipFill>
+          <a:blip r:embed="rId2"/>
+          <a:stretch>
+            <a:fillRect/>
+          </a:stretch>
+        </p:blipFill>
+        <p:spPr>
+          <a:xfrm>
+            <a:off x="6096000" y="1396314"/>
+            <a:ext cx="5877697" cy="5147975"/>
+          </a:xfrm>
+          <a:prstGeom prst="rect">
+            <a:avLst/>
+          </a:prstGeom>
+        </p:spPr>
+      </p:pic>
+      <p:pic>
+        <p:nvPicPr>
+          <p:cNvPr id="6" name="Content Placeholder 5">
+            <a:extLst>
+              <a:ext uri="{FF2B5EF4-FFF2-40B4-BE49-F238E27FC236}">
+                <a16:creationId xmlns:a16="http://schemas.microsoft.com/office/drawing/2014/main" id="{EFF55303-74FE-4F2C-9E70-7F1D10843A2B}"/>
+              </a:ext>
+            </a:extLst>
+          </p:cNvPr>
+          <p:cNvPicPr>
+            <a:picLocks noGrp="1" noChangeAspect="1"/>
+          </p:cNvPicPr>
+          <p:nvPr>
+            <p:ph sz="half" idx="1"/>
+          </p:nvPr>
+        </p:nvPicPr>
+        <p:blipFill>
+          <a:blip r:embed="rId3"/>
+          <a:stretch>
+            <a:fillRect/>
+          </a:stretch>
+        </p:blipFill>
+        <p:spPr>
+          <a:xfrm>
+            <a:off x="976184" y="1396315"/>
+            <a:ext cx="5301047" cy="5301048"/>
+          </a:xfrm>
+          <a:prstGeom prst="rect">
+            <a:avLst/>
+          </a:prstGeom>
+        </p:spPr>
+      </p:pic>
+    </p:spTree>
+    <p:extLst>
+      <p:ext uri="{BB962C8B-B14F-4D97-AF65-F5344CB8AC3E}">
+        <p14:creationId xmlns:p14="http://schemas.microsoft.com/office/powerpoint/2010/main" val="2821229071"/>
+      </p:ext>
+    </p:extLst>
+  </p:cSld>
+  <p:clrMapOvr>
+    <a:masterClrMapping/>
+  </p:clrMapOvr>
+</p:sld>
+</file>
+
+<file path=ppt/slides/slide13.xml><?xml version="1.0" encoding="utf-8"?>
 <p:sld xmlns:a="http://schemas.openxmlformats.org/drawingml/2006/main" xmlns:r="http://schemas.openxmlformats.org/officeDocument/2006/relationships" xmlns:p="http://schemas.openxmlformats.org/presentationml/2006/main">
   <p:cSld>
     <p:spTree>
@@ -7994,7 +8215,7 @@
 </p:sld>
 </file>
 
-<file path=ppt/slides/slide13.xml><?xml version="1.0" encoding="utf-8"?>
+<file path=ppt/slides/slide14.xml><?xml version="1.0" encoding="utf-8"?>
 <p:sld xmlns:a="http://schemas.openxmlformats.org/drawingml/2006/main" xmlns:r="http://schemas.openxmlformats.org/officeDocument/2006/relationships" xmlns:p="http://schemas.openxmlformats.org/presentationml/2006/main">
   <p:cSld>
     <p:spTree>
@@ -8081,7 +8302,7 @@
 </p:sld>
 </file>
 
-<file path=ppt/slides/slide14.xml><?xml version="1.0" encoding="utf-8"?>
+<file path=ppt/slides/slide15.xml><?xml version="1.0" encoding="utf-8"?>
 <p:sld xmlns:a="http://schemas.openxmlformats.org/drawingml/2006/main" xmlns:r="http://schemas.openxmlformats.org/officeDocument/2006/relationships" xmlns:p="http://schemas.openxmlformats.org/presentationml/2006/main">
   <p:cSld>
     <p:spTree>
@@ -8170,7 +8391,7 @@
 </p:sld>
 </file>
 
-<file path=ppt/slides/slide15.xml><?xml version="1.0" encoding="utf-8"?>
+<file path=ppt/slides/slide16.xml><?xml version="1.0" encoding="utf-8"?>
 <p:sld xmlns:a="http://schemas.openxmlformats.org/drawingml/2006/main" xmlns:r="http://schemas.openxmlformats.org/officeDocument/2006/relationships" xmlns:p="http://schemas.openxmlformats.org/presentationml/2006/main">
   <p:cSld>
     <p:spTree>
@@ -10269,7 +10490,7 @@
 </p:sld>
 </file>
 
-<file path=ppt/slides/slide16.xml><?xml version="1.0" encoding="utf-8"?>
+<file path=ppt/slides/slide17.xml><?xml version="1.0" encoding="utf-8"?>
 <p:sld xmlns:a="http://schemas.openxmlformats.org/drawingml/2006/main" xmlns:r="http://schemas.openxmlformats.org/officeDocument/2006/relationships" xmlns:p="http://schemas.openxmlformats.org/presentationml/2006/main">
   <p:cSld>
     <p:spTree>
@@ -10419,7 +10640,7 @@
 </p:sld>
 </file>
 
-<file path=ppt/slides/slide17.xml><?xml version="1.0" encoding="utf-8"?>
+<file path=ppt/slides/slide18.xml><?xml version="1.0" encoding="utf-8"?>
 <p:sld xmlns:a="http://schemas.openxmlformats.org/drawingml/2006/main" xmlns:r="http://schemas.openxmlformats.org/officeDocument/2006/relationships" xmlns:p="http://schemas.openxmlformats.org/presentationml/2006/main">
   <p:cSld>
     <p:spTree>
@@ -10480,38 +10701,37 @@
             <p:ph idx="1"/>
           </p:nvPr>
         </p:nvSpPr>
-        <p:spPr/>
+        <p:spPr>
+          <a:xfrm>
+            <a:off x="2592925" y="1655427"/>
+            <a:ext cx="8915400" cy="3777622"/>
+          </a:xfrm>
+        </p:spPr>
         <p:txBody>
-          <a:bodyPr/>
+          <a:bodyPr>
+            <a:normAutofit/>
+          </a:bodyPr>
           <a:lstStyle/>
           <a:p>
             <a:r>
-              <a:rPr lang="en-US" dirty="0"/>
+              <a:rPr lang="en-US" sz="2800" dirty="0"/>
               <a:t>Drug related mortality is expected to go up year-over-year.</a:t>
             </a:r>
           </a:p>
           <a:p>
             <a:r>
-              <a:rPr lang="en-US" dirty="0"/>
+              <a:rPr lang="en-US" sz="2800" dirty="0"/>
               <a:t>Fentanyl is fueling the increase.</a:t>
             </a:r>
           </a:p>
           <a:p>
             <a:r>
-              <a:rPr lang="en-US" dirty="0"/>
-              <a:t>Some groups (Males; White and Hispanic White; 30-39 </a:t>
-            </a:r>
-            <a:r>
-              <a:rPr lang="en-US"/>
-              <a:t>age group) </a:t>
-            </a:r>
-            <a:r>
-              <a:rPr lang="en-US" dirty="0"/>
-              <a:t>are affected disproportionately.</a:t>
-            </a:r>
-          </a:p>
-          <a:p>
-            <a:endParaRPr lang="en-US" dirty="0"/>
+              <a:rPr lang="en-US" sz="2800" dirty="0"/>
+              <a:t>Some groups (Males; White and Hispanic White; 30-39 age group) are affected disproportionately.</a:t>
+            </a:r>
+          </a:p>
+          <a:p>
+            <a:endParaRPr lang="en-US" sz="2800" dirty="0"/>
           </a:p>
         </p:txBody>
       </p:sp>
@@ -10528,7 +10748,7 @@
 </p:sld>
 </file>
 
-<file path=ppt/slides/slide18.xml><?xml version="1.0" encoding="utf-8"?>
+<file path=ppt/slides/slide19.xml><?xml version="1.0" encoding="utf-8"?>
 <p:sld xmlns:a="http://schemas.openxmlformats.org/drawingml/2006/main" xmlns:r="http://schemas.openxmlformats.org/officeDocument/2006/relationships" xmlns:p="http://schemas.openxmlformats.org/presentationml/2006/main">
   <p:cSld>
     <p:spTree>
@@ -10758,7 +10978,7 @@
           <p:cNvPr id="2" name="Title 1">
             <a:extLst>
               <a:ext uri="{FF2B5EF4-FFF2-40B4-BE49-F238E27FC236}">
-                <a16:creationId xmlns:a16="http://schemas.microsoft.com/office/drawing/2014/main" id="{5D177DDA-3006-43E9-9D9C-71348C54AF5E}"/>
+                <a16:creationId xmlns:a16="http://schemas.microsoft.com/office/drawing/2014/main" id="{5B5FA5E7-0948-45E3-9385-57DF166EF991}"/>
               </a:ext>
             </a:extLst>
           </p:cNvPr>
@@ -10786,7 +11006,7 @@
           <p:cNvPr id="3" name="Content Placeholder 2">
             <a:extLst>
               <a:ext uri="{FF2B5EF4-FFF2-40B4-BE49-F238E27FC236}">
-                <a16:creationId xmlns:a16="http://schemas.microsoft.com/office/drawing/2014/main" id="{BAE4EA54-CC89-49BF-9D45-2558E58BD415}"/>
+                <a16:creationId xmlns:a16="http://schemas.microsoft.com/office/drawing/2014/main" id="{5D8E1576-46BD-475B-876F-09CD641E3C22}"/>
               </a:ext>
             </a:extLst>
           </p:cNvPr>
@@ -10797,10 +11017,339 @@
             <p:ph idx="1"/>
           </p:nvPr>
         </p:nvSpPr>
-        <p:spPr/>
+        <p:spPr>
+          <a:xfrm>
+            <a:off x="2589212" y="1361813"/>
+            <a:ext cx="8915400" cy="5131266"/>
+          </a:xfrm>
+        </p:spPr>
         <p:txBody>
-          <a:bodyPr/>
+          <a:bodyPr>
+            <a:normAutofit fontScale="85000" lnSpcReduction="20000"/>
+          </a:bodyPr>
           <a:lstStyle/>
+          <a:p>
+            <a:r>
+              <a:rPr lang="en-US" i="1" dirty="0">
+                <a:hlinkClick r:id="rId2"/>
+              </a:rPr>
+              <a:t>Accidental Drug Overdose Related Deaths in Connecticut 2012-2017.csv</a:t>
+            </a:r>
+            <a:r>
+              <a:rPr lang="en-US" dirty="0"/>
+              <a:t>. (</a:t>
+            </a:r>
+            <a:r>
+              <a:rPr lang="en-US" dirty="0" err="1"/>
+              <a:t>source:</a:t>
+            </a:r>
+            <a:r>
+              <a:rPr lang="en-US" dirty="0" err="1">
+                <a:hlinkClick r:id="rId3"/>
+              </a:rPr>
+              <a:t>Data.gov</a:t>
+            </a:r>
+            <a:r>
+              <a:rPr lang="en-US" dirty="0"/>
+              <a:t>)</a:t>
+            </a:r>
+          </a:p>
+          <a:p>
+            <a:r>
+              <a:rPr lang="en-US" i="1" dirty="0"/>
+              <a:t>2016 Education Attainment Connecticut.csv</a:t>
+            </a:r>
+            <a:r>
+              <a:rPr lang="en-US" dirty="0"/>
+              <a:t> (source: </a:t>
+            </a:r>
+            <a:r>
+              <a:rPr lang="en-US" dirty="0">
+                <a:hlinkClick r:id="rId4"/>
+              </a:rPr>
+              <a:t>census.gov</a:t>
+            </a:r>
+            <a:r>
+              <a:rPr lang="en-US" dirty="0"/>
+              <a:t>)</a:t>
+            </a:r>
+          </a:p>
+          <a:p>
+            <a:r>
+              <a:rPr lang="en-US" i="1" dirty="0"/>
+              <a:t>2016 Employment Status by Age.csv</a:t>
+            </a:r>
+            <a:r>
+              <a:rPr lang="en-US" dirty="0"/>
+              <a:t> (source: </a:t>
+            </a:r>
+            <a:r>
+              <a:rPr lang="en-US" dirty="0">
+                <a:hlinkClick r:id="rId4"/>
+              </a:rPr>
+              <a:t>census.gov</a:t>
+            </a:r>
+            <a:r>
+              <a:rPr lang="en-US" dirty="0"/>
+              <a:t>)</a:t>
+            </a:r>
+          </a:p>
+          <a:p>
+            <a:r>
+              <a:rPr lang="en-US" i="1" dirty="0"/>
+              <a:t>2016 Median Household Income County.csv</a:t>
+            </a:r>
+            <a:r>
+              <a:rPr lang="en-US" dirty="0"/>
+              <a:t> (source: </a:t>
+            </a:r>
+            <a:r>
+              <a:rPr lang="en-US" dirty="0">
+                <a:hlinkClick r:id="rId4"/>
+              </a:rPr>
+              <a:t>census.gov</a:t>
+            </a:r>
+            <a:r>
+              <a:rPr lang="en-US" dirty="0"/>
+              <a:t>)</a:t>
+            </a:r>
+          </a:p>
+          <a:p>
+            <a:r>
+              <a:rPr lang="en-US" i="1" dirty="0"/>
+              <a:t>FairfieldCountyPopulation.csv</a:t>
+            </a:r>
+            <a:r>
+              <a:rPr lang="en-US" dirty="0"/>
+              <a:t> (source: </a:t>
+            </a:r>
+            <a:r>
+              <a:rPr lang="en-US" dirty="0">
+                <a:hlinkClick r:id="rId4"/>
+              </a:rPr>
+              <a:t>census.gov</a:t>
+            </a:r>
+            <a:r>
+              <a:rPr lang="en-US" dirty="0"/>
+              <a:t>)</a:t>
+            </a:r>
+          </a:p>
+          <a:p>
+            <a:r>
+              <a:rPr lang="en-US" i="1" dirty="0"/>
+              <a:t>HartfordCountyPopulation.csv</a:t>
+            </a:r>
+            <a:r>
+              <a:rPr lang="en-US" dirty="0"/>
+              <a:t> (source: </a:t>
+            </a:r>
+            <a:r>
+              <a:rPr lang="en-US" dirty="0">
+                <a:hlinkClick r:id="rId4"/>
+              </a:rPr>
+              <a:t>census.gov</a:t>
+            </a:r>
+            <a:r>
+              <a:rPr lang="en-US" dirty="0"/>
+              <a:t>)</a:t>
+            </a:r>
+          </a:p>
+          <a:p>
+            <a:r>
+              <a:rPr lang="en-US" i="1" dirty="0"/>
+              <a:t>LitchfieldCountyPopulation.csv</a:t>
+            </a:r>
+            <a:r>
+              <a:rPr lang="en-US" dirty="0"/>
+              <a:t> (source: </a:t>
+            </a:r>
+            <a:r>
+              <a:rPr lang="en-US" dirty="0">
+                <a:hlinkClick r:id="rId4"/>
+              </a:rPr>
+              <a:t>census.gov</a:t>
+            </a:r>
+            <a:r>
+              <a:rPr lang="en-US" dirty="0"/>
+              <a:t>)</a:t>
+            </a:r>
+          </a:p>
+          <a:p>
+            <a:r>
+              <a:rPr lang="en-US" i="1" dirty="0"/>
+              <a:t>MiddlesexCountyPopulation.csv</a:t>
+            </a:r>
+            <a:r>
+              <a:rPr lang="en-US" dirty="0"/>
+              <a:t> (source: </a:t>
+            </a:r>
+            <a:r>
+              <a:rPr lang="en-US" dirty="0">
+                <a:hlinkClick r:id="rId4"/>
+              </a:rPr>
+              <a:t>census.gov</a:t>
+            </a:r>
+            <a:r>
+              <a:rPr lang="en-US" dirty="0"/>
+              <a:t>)</a:t>
+            </a:r>
+          </a:p>
+          <a:p>
+            <a:r>
+              <a:rPr lang="en-US" i="1" dirty="0"/>
+              <a:t>NewHavenCountyPopulation.csv</a:t>
+            </a:r>
+            <a:r>
+              <a:rPr lang="en-US" dirty="0"/>
+              <a:t> (source: </a:t>
+            </a:r>
+            <a:r>
+              <a:rPr lang="en-US" dirty="0">
+                <a:hlinkClick r:id="rId4"/>
+              </a:rPr>
+              <a:t>census.gov</a:t>
+            </a:r>
+            <a:r>
+              <a:rPr lang="en-US" dirty="0"/>
+              <a:t>)</a:t>
+            </a:r>
+          </a:p>
+          <a:p>
+            <a:r>
+              <a:rPr lang="en-US" i="1" dirty="0"/>
+              <a:t>NewLondonCountyPopulation.csv</a:t>
+            </a:r>
+            <a:r>
+              <a:rPr lang="en-US" dirty="0"/>
+              <a:t> (source: </a:t>
+            </a:r>
+            <a:r>
+              <a:rPr lang="en-US" dirty="0">
+                <a:hlinkClick r:id="rId4"/>
+              </a:rPr>
+              <a:t>census.gov</a:t>
+            </a:r>
+            <a:r>
+              <a:rPr lang="en-US" dirty="0"/>
+              <a:t>)</a:t>
+            </a:r>
+          </a:p>
+          <a:p>
+            <a:r>
+              <a:rPr lang="en-US" i="1" dirty="0"/>
+              <a:t>TollandCountyPopulation.csv</a:t>
+            </a:r>
+            <a:r>
+              <a:rPr lang="en-US" dirty="0"/>
+              <a:t> (source: </a:t>
+            </a:r>
+            <a:r>
+              <a:rPr lang="en-US" dirty="0">
+                <a:hlinkClick r:id="rId4"/>
+              </a:rPr>
+              <a:t>census.gov</a:t>
+            </a:r>
+            <a:r>
+              <a:rPr lang="en-US" dirty="0"/>
+              <a:t>)</a:t>
+            </a:r>
+          </a:p>
+          <a:p>
+            <a:r>
+              <a:rPr lang="en-US" i="1" dirty="0"/>
+              <a:t>WindhamCountyPopulation.csv</a:t>
+            </a:r>
+            <a:r>
+              <a:rPr lang="en-US" dirty="0"/>
+              <a:t> (source: </a:t>
+            </a:r>
+            <a:r>
+              <a:rPr lang="en-US" dirty="0">
+                <a:hlinkClick r:id="rId4"/>
+              </a:rPr>
+              <a:t>census.gov</a:t>
+            </a:r>
+            <a:r>
+              <a:rPr lang="en-US" dirty="0"/>
+              <a:t>)</a:t>
+            </a:r>
+          </a:p>
+          <a:p>
+            <a:r>
+              <a:rPr lang="en-US" dirty="0"/>
+              <a:t>DEC_10_DP_DPDP1_with_ann.csv (source: </a:t>
+            </a:r>
+            <a:r>
+              <a:rPr lang="en-US" dirty="0">
+                <a:hlinkClick r:id="rId4"/>
+              </a:rPr>
+              <a:t>census.gov</a:t>
+            </a:r>
+            <a:r>
+              <a:rPr lang="en-US" dirty="0"/>
+              <a:t>)</a:t>
+            </a:r>
+          </a:p>
+          <a:p>
+            <a:r>
+              <a:rPr lang="en-US" i="1" dirty="0"/>
+              <a:t>PopByCountyByYear.csv</a:t>
+            </a:r>
+            <a:r>
+              <a:rPr lang="en-US" dirty="0"/>
+              <a:t> (source: </a:t>
+            </a:r>
+            <a:r>
+              <a:rPr lang="en-US" dirty="0">
+                <a:hlinkClick r:id="rId5"/>
+              </a:rPr>
+              <a:t>factfinder.census.gov</a:t>
+            </a:r>
+            <a:r>
+              <a:rPr lang="en-US" dirty="0"/>
+              <a:t>)</a:t>
+            </a:r>
+          </a:p>
+          <a:p>
+            <a:r>
+              <a:rPr lang="en-US" i="1" dirty="0"/>
+              <a:t>tl_2010_09_county10.json</a:t>
+            </a:r>
+            <a:r>
+              <a:rPr lang="en-US" dirty="0"/>
+              <a:t> (source: </a:t>
+            </a:r>
+            <a:r>
+              <a:rPr lang="en-US" dirty="0">
+                <a:hlinkClick r:id="rId5"/>
+              </a:rPr>
+              <a:t>factfinder.census.gov</a:t>
+            </a:r>
+            <a:r>
+              <a:rPr lang="en-US" dirty="0"/>
+              <a:t>)</a:t>
+            </a:r>
+          </a:p>
+          <a:p>
+            <a:r>
+              <a:rPr lang="en-US" i="1" dirty="0"/>
+              <a:t>Unemployment Rate by County.csv</a:t>
+            </a:r>
+            <a:r>
+              <a:rPr lang="en-US" dirty="0"/>
+              <a:t> (source: </a:t>
+            </a:r>
+            <a:r>
+              <a:rPr lang="en-US" dirty="0">
+                <a:hlinkClick r:id="rId6"/>
+              </a:rPr>
+              <a:t>BLS Public Data API</a:t>
+            </a:r>
+            <a:r>
+              <a:rPr lang="en-US" dirty="0"/>
+              <a:t>)</a:t>
+            </a:r>
+          </a:p>
           <a:p>
             <a:endParaRPr lang="en-US" dirty="0"/>
           </a:p>
@@ -10809,7 +11358,7 @@
     </p:spTree>
     <p:extLst>
       <p:ext uri="{BB962C8B-B14F-4D97-AF65-F5344CB8AC3E}">
-        <p14:creationId xmlns:p14="http://schemas.microsoft.com/office/powerpoint/2010/main" val="416682109"/>
+        <p14:creationId xmlns:p14="http://schemas.microsoft.com/office/powerpoint/2010/main" val="316175967"/>
       </p:ext>
     </p:extLst>
   </p:cSld>
@@ -11039,7 +11588,7 @@
           <p:cNvPr id="2" name="Title 1">
             <a:extLst>
               <a:ext uri="{FF2B5EF4-FFF2-40B4-BE49-F238E27FC236}">
-                <a16:creationId xmlns:a16="http://schemas.microsoft.com/office/drawing/2014/main" id="{B8E97443-B866-4821-958D-875892DA966B}"/>
+                <a16:creationId xmlns:a16="http://schemas.microsoft.com/office/drawing/2014/main" id="{CBB69504-185D-4B1C-B779-2E7B3E05190F}"/>
               </a:ext>
             </a:extLst>
           </p:cNvPr>
@@ -11050,128 +11599,60 @@
             <p:ph type="title"/>
           </p:nvPr>
         </p:nvSpPr>
-        <p:spPr/>
+        <p:spPr>
+          <a:xfrm>
+            <a:off x="2509035" y="607332"/>
+            <a:ext cx="8911687" cy="1280890"/>
+          </a:xfrm>
+        </p:spPr>
         <p:txBody>
-          <a:bodyPr>
-            <a:normAutofit/>
-          </a:bodyPr>
+          <a:bodyPr/>
           <a:lstStyle/>
           <a:p>
             <a:r>
               <a:rPr lang="en-US" dirty="0"/>
-              <a:t>Drug-induced mortality rates and barriers to medical treatment</a:t>
-            </a:r>
+              <a:t>Drug-Induced Mortality and Age</a:t>
+            </a:r>
+            <a:br>
+              <a:rPr lang="en-US" dirty="0"/>
+            </a:br>
+            <a:endParaRPr lang="en-US" dirty="0"/>
           </a:p>
         </p:txBody>
       </p:sp>
-      <p:sp>
-        <p:nvSpPr>
+      <p:pic>
+        <p:nvPicPr>
           <p:cNvPr id="7" name="Content Placeholder 6">
             <a:extLst>
               <a:ext uri="{FF2B5EF4-FFF2-40B4-BE49-F238E27FC236}">
-                <a16:creationId xmlns:a16="http://schemas.microsoft.com/office/drawing/2014/main" id="{C04A3BEE-6BC8-4049-A21D-6907C402A740}"/>
+                <a16:creationId xmlns:a16="http://schemas.microsoft.com/office/drawing/2014/main" id="{2CBE9DDE-8F5B-46ED-B87A-C3E7956FE63D}"/>
               </a:ext>
             </a:extLst>
           </p:cNvPr>
-          <p:cNvSpPr>
-            <a:spLocks noGrp="1"/>
-          </p:cNvSpPr>
+          <p:cNvPicPr>
+            <a:picLocks noGrp="1" noChangeAspect="1"/>
+          </p:cNvPicPr>
           <p:nvPr>
             <p:ph idx="1"/>
           </p:nvPr>
-        </p:nvSpPr>
-        <p:spPr/>
-        <p:txBody>
-          <a:bodyPr>
-            <a:normAutofit/>
-          </a:bodyPr>
-          <a:lstStyle/>
-          <a:p>
-            <a:r>
-              <a:rPr lang="en-US" dirty="0"/>
-              <a:t>Opioid abuse/misuse is at unprecedented levels. </a:t>
-            </a:r>
-          </a:p>
-          <a:p>
-            <a:r>
-              <a:rPr lang="en-US" dirty="0"/>
-              <a:t>Naloxone (Narcan) is the antidote to an opioid overdose.</a:t>
-            </a:r>
-          </a:p>
-          <a:p>
-            <a:r>
-              <a:rPr lang="en-US" b="1" dirty="0"/>
-              <a:t>AN ACT CONCERNING SUBSTANCE ABUSE AND OPIOID OVERDOSE PREVENTION in 2015</a:t>
-            </a:r>
-          </a:p>
-          <a:p>
-            <a:r>
-              <a:rPr lang="en-US" sz="1400" b="1" dirty="0"/>
-              <a:t>Allowed pharmacists to prescribe opioid antagonists like naloxone. The change was intended to make it easier for relatives or friends of those at risk to have an overdose-reversing drug on hand. In 2015 there were 723 deaths from drug overdoses in Connecticut.</a:t>
-            </a:r>
-          </a:p>
-          <a:p>
-            <a:r>
-              <a:rPr lang="en-US" dirty="0"/>
-              <a:t>Naloxone Pharmacies in Connecticut (Updated, June 14, 2018)</a:t>
-            </a:r>
-          </a:p>
-          <a:p>
-            <a:r>
-              <a:rPr lang="en-US" dirty="0"/>
-              <a:t>Source: The Connecticut Open Data Portal: </a:t>
-            </a:r>
-            <a:r>
-              <a:rPr lang="en-US" dirty="0">
-                <a:hlinkClick r:id="rId2"/>
-              </a:rPr>
-              <a:t>https://data.ct.gov</a:t>
-            </a:r>
-            <a:endParaRPr lang="en-US" dirty="0"/>
-          </a:p>
-          <a:p>
-            <a:r>
-              <a:rPr lang="en-US" dirty="0"/>
-              <a:t>Source: Connecticut General Assembly: </a:t>
-            </a:r>
-            <a:r>
-              <a:rPr lang="en-US" dirty="0">
-                <a:hlinkClick r:id="rId3"/>
-              </a:rPr>
-              <a:t>https://www.cga.ct.gov/default.asp</a:t>
-            </a:r>
-            <a:endParaRPr lang="en-US" dirty="0"/>
-          </a:p>
-          <a:p>
-            <a:pPr marL="0" indent="0">
-              <a:buNone/>
-            </a:pPr>
-            <a:endParaRPr lang="en-US" dirty="0"/>
-          </a:p>
-          <a:p>
-            <a:endParaRPr lang="en-US" dirty="0"/>
-          </a:p>
-          <a:p>
-            <a:endParaRPr lang="en-US" dirty="0"/>
-          </a:p>
-          <a:p>
-            <a:endParaRPr lang="en-US" dirty="0"/>
-          </a:p>
-          <a:p>
-            <a:pPr marL="0" indent="0">
-              <a:buNone/>
-            </a:pPr>
-            <a:endParaRPr lang="en-US" dirty="0"/>
-          </a:p>
-          <a:p>
-            <a:endParaRPr lang="en-US" dirty="0"/>
-          </a:p>
-        </p:txBody>
-      </p:sp>
+        </p:nvPicPr>
+        <p:blipFill>
+          <a:blip r:embed="rId2"/>
+          <a:stretch>
+            <a:fillRect/>
+          </a:stretch>
+        </p:blipFill>
+        <p:spPr>
+          <a:xfrm>
+            <a:off x="2686429" y="1247777"/>
+            <a:ext cx="8177313" cy="5451543"/>
+          </a:xfrm>
+        </p:spPr>
+      </p:pic>
     </p:spTree>
     <p:extLst>
       <p:ext uri="{BB962C8B-B14F-4D97-AF65-F5344CB8AC3E}">
-        <p14:creationId xmlns:p14="http://schemas.microsoft.com/office/powerpoint/2010/main" val="4248080474"/>
+        <p14:creationId xmlns:p14="http://schemas.microsoft.com/office/powerpoint/2010/main" val="2290168469"/>
       </p:ext>
     </p:extLst>
   </p:cSld>
@@ -11203,7 +11684,7 @@
           <p:cNvPr id="2" name="Title 1">
             <a:extLst>
               <a:ext uri="{FF2B5EF4-FFF2-40B4-BE49-F238E27FC236}">
-                <a16:creationId xmlns:a16="http://schemas.microsoft.com/office/drawing/2014/main" id="{8BF87117-1E4E-4EE9-8760-25D09E6E6179}"/>
+                <a16:creationId xmlns:a16="http://schemas.microsoft.com/office/drawing/2014/main" id="{CCC4A7B5-8082-41BD-8216-D7174D2FC296}"/>
               </a:ext>
             </a:extLst>
           </p:cNvPr>
@@ -11216,14 +11697,12 @@
         </p:nvSpPr>
         <p:spPr/>
         <p:txBody>
-          <a:bodyPr>
-            <a:normAutofit/>
-          </a:bodyPr>
+          <a:bodyPr/>
           <a:lstStyle/>
           <a:p>
             <a:r>
               <a:rPr lang="en-US" dirty="0"/>
-              <a:t>Drug-induced mortality rates and barriers to medical treatment</a:t>
+              <a:t>Drug-Induced Mortality by Drug</a:t>
             </a:r>
           </a:p>
         </p:txBody>
@@ -11233,7 +11712,7 @@
           <p:cNvPr id="5" name="Content Placeholder 4">
             <a:extLst>
               <a:ext uri="{FF2B5EF4-FFF2-40B4-BE49-F238E27FC236}">
-                <a16:creationId xmlns:a16="http://schemas.microsoft.com/office/drawing/2014/main" id="{69D2CC4C-4076-413C-B758-171D13D3279E}"/>
+                <a16:creationId xmlns:a16="http://schemas.microsoft.com/office/drawing/2014/main" id="{DFB7AE71-0B7A-462D-932A-2B550F2B7D1C}"/>
               </a:ext>
             </a:extLst>
           </p:cNvPr>
@@ -11241,7 +11720,7 @@
             <a:picLocks noGrp="1" noChangeAspect="1"/>
           </p:cNvPicPr>
           <p:nvPr>
-            <p:ph sz="half" idx="1"/>
+            <p:ph idx="1"/>
           </p:nvPr>
         </p:nvPicPr>
         <p:blipFill>
@@ -11252,47 +11731,15 @@
         </p:blipFill>
         <p:spPr>
           <a:xfrm>
-            <a:off x="1433384" y="1825839"/>
-            <a:ext cx="6298127" cy="4901955"/>
+            <a:off x="2592925" y="1382001"/>
+            <a:ext cx="7968620" cy="5312414"/>
           </a:xfrm>
-        </p:spPr>
-      </p:pic>
-      <p:pic>
-        <p:nvPicPr>
-          <p:cNvPr id="8" name="Content Placeholder 7">
-            <a:extLst>
-              <a:ext uri="{FF2B5EF4-FFF2-40B4-BE49-F238E27FC236}">
-                <a16:creationId xmlns:a16="http://schemas.microsoft.com/office/drawing/2014/main" id="{DCB84271-D29B-4877-BEF9-298CAC43DDED}"/>
-              </a:ext>
-            </a:extLst>
-          </p:cNvPr>
-          <p:cNvPicPr>
-            <a:picLocks noGrp="1" noChangeAspect="1"/>
-          </p:cNvPicPr>
-          <p:nvPr>
-            <p:ph sz="half" idx="2"/>
-          </p:nvPr>
-        </p:nvPicPr>
-        <p:blipFill>
-          <a:blip r:embed="rId3"/>
-          <a:stretch>
-            <a:fillRect/>
-          </a:stretch>
-        </p:blipFill>
-        <p:spPr>
-          <a:xfrm>
-            <a:off x="7731511" y="2133600"/>
-            <a:ext cx="4007407" cy="3575222"/>
-          </a:xfrm>
-          <a:prstGeom prst="rect">
-            <a:avLst/>
-          </a:prstGeom>
         </p:spPr>
       </p:pic>
     </p:spTree>
     <p:extLst>
       <p:ext uri="{BB962C8B-B14F-4D97-AF65-F5344CB8AC3E}">
-        <p14:creationId xmlns:p14="http://schemas.microsoft.com/office/powerpoint/2010/main" val="824537481"/>
+        <p14:creationId xmlns:p14="http://schemas.microsoft.com/office/powerpoint/2010/main" val="2160349714"/>
       </p:ext>
     </p:extLst>
   </p:cSld>
@@ -11324,7 +11771,7 @@
           <p:cNvPr id="2" name="Title 1">
             <a:extLst>
               <a:ext uri="{FF2B5EF4-FFF2-40B4-BE49-F238E27FC236}">
-                <a16:creationId xmlns:a16="http://schemas.microsoft.com/office/drawing/2014/main" id="{CCC4A7B5-8082-41BD-8216-D7174D2FC296}"/>
+                <a16:creationId xmlns:a16="http://schemas.microsoft.com/office/drawing/2014/main" id="{BB1C60A3-10D8-462D-B3B4-AF7F4B5F8101}"/>
               </a:ext>
             </a:extLst>
           </p:cNvPr>
@@ -11337,55 +11784,103 @@
         </p:nvSpPr>
         <p:spPr/>
         <p:txBody>
-          <a:bodyPr>
-            <a:normAutofit fontScale="90000"/>
-          </a:bodyPr>
+          <a:bodyPr/>
           <a:lstStyle/>
           <a:p>
             <a:r>
-              <a:rPr lang="en-US" dirty="0"/>
-              <a:t>Drug-induced mortality rates and barriers to medical treatment</a:t>
-            </a:r>
-            <a:br>
-              <a:rPr lang="en-US" dirty="0"/>
-            </a:br>
+              <a:rPr lang="en-US" dirty="0" err="1"/>
+              <a:t>Fentynal</a:t>
+            </a:r>
             <a:endParaRPr lang="en-US" dirty="0"/>
           </a:p>
         </p:txBody>
       </p:sp>
-      <p:pic>
-        <p:nvPicPr>
-          <p:cNvPr id="5" name="Content Placeholder 4">
+      <p:sp>
+        <p:nvSpPr>
+          <p:cNvPr id="3" name="Content Placeholder 2">
             <a:extLst>
               <a:ext uri="{FF2B5EF4-FFF2-40B4-BE49-F238E27FC236}">
-                <a16:creationId xmlns:a16="http://schemas.microsoft.com/office/drawing/2014/main" id="{5221623F-E95D-49BC-8BBB-8352392C4412}"/>
+                <a16:creationId xmlns:a16="http://schemas.microsoft.com/office/drawing/2014/main" id="{DE910129-DA90-46EC-8EF1-7D23BD0B5F3F}"/>
               </a:ext>
             </a:extLst>
           </p:cNvPr>
-          <p:cNvPicPr>
-            <a:picLocks noGrp="1" noChangeAspect="1"/>
-          </p:cNvPicPr>
-          <p:nvPr>
-            <p:ph sz="half" idx="1"/>
-          </p:nvPr>
-        </p:nvPicPr>
-        <p:blipFill>
-          <a:blip r:embed="rId2"/>
-          <a:stretch>
-            <a:fillRect/>
-          </a:stretch>
-        </p:blipFill>
+          <p:cNvSpPr>
+            <a:spLocks noGrp="1"/>
+          </p:cNvSpPr>
+          <p:nvPr>
+            <p:ph idx="1"/>
+          </p:nvPr>
+        </p:nvSpPr>
         <p:spPr>
           <a:xfrm>
-            <a:off x="1149178" y="1717588"/>
-            <a:ext cx="10812163" cy="5004487"/>
+            <a:off x="2592925" y="1613482"/>
+            <a:ext cx="8915400" cy="3777622"/>
           </a:xfrm>
         </p:spPr>
-      </p:pic>
+        <p:txBody>
+          <a:bodyPr>
+            <a:normAutofit fontScale="85000" lnSpcReduction="10000"/>
+          </a:bodyPr>
+          <a:lstStyle/>
+          <a:p>
+            <a:r>
+              <a:rPr lang="en-US" sz="2000" dirty="0"/>
+              <a:t>Fentanyl is a synthetic opioid similar to heroin, gives the user feelings of euphoria and sedation</a:t>
+            </a:r>
+          </a:p>
+          <a:p>
+            <a:r>
+              <a:rPr lang="en-US" sz="2000" dirty="0"/>
+              <a:t>30-50 times more potent than heroin</a:t>
+            </a:r>
+          </a:p>
+          <a:p>
+            <a:r>
+              <a:rPr lang="en-US" sz="2000" dirty="0"/>
+              <a:t>50-100 times more potent than morphine</a:t>
+            </a:r>
+          </a:p>
+          <a:p>
+            <a:r>
+              <a:rPr lang="en-US" sz="2000" dirty="0"/>
+              <a:t>Because of its potency, it provides a high profit margin for drug traffickers</a:t>
+            </a:r>
+          </a:p>
+          <a:p>
+            <a:r>
+              <a:rPr lang="en-US" sz="2000" dirty="0"/>
+              <a:t>It is usually combined with other drugs, so it can vary in potency, in some cases leading to an overdose.</a:t>
+            </a:r>
+          </a:p>
+          <a:p>
+            <a:r>
+              <a:rPr lang="en-US" sz="2000" dirty="0"/>
+              <a:t>Naloxone is effective against </a:t>
+            </a:r>
+            <a:r>
+              <a:rPr lang="en-US" sz="2000" dirty="0" err="1"/>
+              <a:t>Fentynal</a:t>
+            </a:r>
+            <a:r>
+              <a:rPr lang="en-US" sz="2000" dirty="0"/>
+              <a:t>, however since it is more powerful than heroin, it may take more than one dose</a:t>
+            </a:r>
+          </a:p>
+          <a:p>
+            <a:r>
+              <a:rPr lang="en-US" sz="2000" dirty="0"/>
+              <a:t>Street names are: Apache, China Girl, China Town, Dance Fever, Friend, Goodfellas, Great Bear, He-Man, Jackpot, King Ivory, Murder 8, and Tango &amp; Cash</a:t>
+            </a:r>
+          </a:p>
+          <a:p>
+            <a:endParaRPr lang="en-US" sz="2000" dirty="0"/>
+          </a:p>
+        </p:txBody>
+      </p:sp>
     </p:spTree>
     <p:extLst>
       <p:ext uri="{BB962C8B-B14F-4D97-AF65-F5344CB8AC3E}">
-        <p14:creationId xmlns:p14="http://schemas.microsoft.com/office/powerpoint/2010/main" val="3263681371"/>
+        <p14:creationId xmlns:p14="http://schemas.microsoft.com/office/powerpoint/2010/main" val="2837072940"/>
       </p:ext>
     </p:extLst>
   </p:cSld>
@@ -11417,7 +11912,7 @@
           <p:cNvPr id="2" name="Title 1">
             <a:extLst>
               <a:ext uri="{FF2B5EF4-FFF2-40B4-BE49-F238E27FC236}">
-                <a16:creationId xmlns:a16="http://schemas.microsoft.com/office/drawing/2014/main" id="{CBB69504-185D-4B1C-B779-2E7B3E05190F}"/>
+                <a16:creationId xmlns:a16="http://schemas.microsoft.com/office/drawing/2014/main" id="{B8E97443-B866-4821-958D-875892DA966B}"/>
               </a:ext>
             </a:extLst>
           </p:cNvPr>
@@ -11428,60 +11923,128 @@
             <p:ph type="title"/>
           </p:nvPr>
         </p:nvSpPr>
-        <p:spPr>
-          <a:xfrm>
-            <a:off x="2509035" y="607332"/>
-            <a:ext cx="8911687" cy="1280890"/>
-          </a:xfrm>
-        </p:spPr>
+        <p:spPr/>
         <p:txBody>
-          <a:bodyPr/>
+          <a:bodyPr>
+            <a:normAutofit/>
+          </a:bodyPr>
           <a:lstStyle/>
           <a:p>
             <a:r>
               <a:rPr lang="en-US" dirty="0"/>
-              <a:t>Drug-Induced Mortality Rates and Age</a:t>
-            </a:r>
-            <a:br>
-              <a:rPr lang="en-US" dirty="0"/>
-            </a:br>
-            <a:endParaRPr lang="en-US" dirty="0"/>
+              <a:t>Drug-induced mortality rates and barriers to medical treatment</a:t>
+            </a:r>
           </a:p>
         </p:txBody>
       </p:sp>
-      <p:pic>
-        <p:nvPicPr>
-          <p:cNvPr id="5" name="Content Placeholder 4">
+      <p:sp>
+        <p:nvSpPr>
+          <p:cNvPr id="7" name="Content Placeholder 6">
             <a:extLst>
               <a:ext uri="{FF2B5EF4-FFF2-40B4-BE49-F238E27FC236}">
-                <a16:creationId xmlns:a16="http://schemas.microsoft.com/office/drawing/2014/main" id="{45739901-9184-4471-B5FD-A2FC5BB690ED}"/>
+                <a16:creationId xmlns:a16="http://schemas.microsoft.com/office/drawing/2014/main" id="{C04A3BEE-6BC8-4049-A21D-6907C402A740}"/>
               </a:ext>
             </a:extLst>
           </p:cNvPr>
-          <p:cNvPicPr>
-            <a:picLocks noGrp="1" noChangeAspect="1"/>
-          </p:cNvPicPr>
+          <p:cNvSpPr>
+            <a:spLocks noGrp="1"/>
+          </p:cNvSpPr>
           <p:nvPr>
             <p:ph idx="1"/>
           </p:nvPr>
-        </p:nvPicPr>
-        <p:blipFill>
-          <a:blip r:embed="rId2"/>
-          <a:stretch>
-            <a:fillRect/>
-          </a:stretch>
-        </p:blipFill>
-        <p:spPr>
-          <a:xfrm>
-            <a:off x="2509035" y="1247777"/>
-            <a:ext cx="8082181" cy="5388122"/>
-          </a:xfrm>
-        </p:spPr>
-      </p:pic>
+        </p:nvSpPr>
+        <p:spPr/>
+        <p:txBody>
+          <a:bodyPr>
+            <a:normAutofit/>
+          </a:bodyPr>
+          <a:lstStyle/>
+          <a:p>
+            <a:r>
+              <a:rPr lang="en-US" dirty="0"/>
+              <a:t>Opioid abuse/misuse is at unprecedented levels. </a:t>
+            </a:r>
+          </a:p>
+          <a:p>
+            <a:r>
+              <a:rPr lang="en-US" dirty="0"/>
+              <a:t>Naloxone (Narcan) is the antidote to an opioid overdose.</a:t>
+            </a:r>
+          </a:p>
+          <a:p>
+            <a:r>
+              <a:rPr lang="en-US" b="1" dirty="0"/>
+              <a:t>AN ACT CONCERNING SUBSTANCE ABUSE AND OPIOID OVERDOSE PREVENTION in 2015</a:t>
+            </a:r>
+          </a:p>
+          <a:p>
+            <a:r>
+              <a:rPr lang="en-US" sz="1400" b="1" dirty="0"/>
+              <a:t>Allowed pharmacists to prescribe opioid antagonists like naloxone. The change was intended to make it easier for relatives or friends of those at risk to have an overdose-reversing drug on hand. In 2015 there were 723 deaths from drug overdoses in Connecticut.</a:t>
+            </a:r>
+          </a:p>
+          <a:p>
+            <a:r>
+              <a:rPr lang="en-US" dirty="0"/>
+              <a:t>Naloxone Pharmacies in Connecticut (Updated, June 14, 2018)</a:t>
+            </a:r>
+          </a:p>
+          <a:p>
+            <a:r>
+              <a:rPr lang="en-US" dirty="0"/>
+              <a:t>Source: The Connecticut Open Data Portal: </a:t>
+            </a:r>
+            <a:r>
+              <a:rPr lang="en-US" dirty="0">
+                <a:hlinkClick r:id="rId2"/>
+              </a:rPr>
+              <a:t>https://data.ct.gov</a:t>
+            </a:r>
+            <a:endParaRPr lang="en-US" dirty="0"/>
+          </a:p>
+          <a:p>
+            <a:r>
+              <a:rPr lang="en-US" dirty="0"/>
+              <a:t>Source: Connecticut General Assembly: </a:t>
+            </a:r>
+            <a:r>
+              <a:rPr lang="en-US" dirty="0">
+                <a:hlinkClick r:id="rId3"/>
+              </a:rPr>
+              <a:t>https://www.cga.ct.gov/default.asp</a:t>
+            </a:r>
+            <a:endParaRPr lang="en-US" dirty="0"/>
+          </a:p>
+          <a:p>
+            <a:pPr marL="0" indent="0">
+              <a:buNone/>
+            </a:pPr>
+            <a:endParaRPr lang="en-US" dirty="0"/>
+          </a:p>
+          <a:p>
+            <a:endParaRPr lang="en-US" dirty="0"/>
+          </a:p>
+          <a:p>
+            <a:endParaRPr lang="en-US" dirty="0"/>
+          </a:p>
+          <a:p>
+            <a:endParaRPr lang="en-US" dirty="0"/>
+          </a:p>
+          <a:p>
+            <a:pPr marL="0" indent="0">
+              <a:buNone/>
+            </a:pPr>
+            <a:endParaRPr lang="en-US" dirty="0"/>
+          </a:p>
+          <a:p>
+            <a:endParaRPr lang="en-US" dirty="0"/>
+          </a:p>
+        </p:txBody>
+      </p:sp>
     </p:spTree>
     <p:extLst>
       <p:ext uri="{BB962C8B-B14F-4D97-AF65-F5344CB8AC3E}">
-        <p14:creationId xmlns:p14="http://schemas.microsoft.com/office/powerpoint/2010/main" val="2290168469"/>
+        <p14:creationId xmlns:p14="http://schemas.microsoft.com/office/powerpoint/2010/main" val="4248080474"/>
       </p:ext>
     </p:extLst>
   </p:cSld>

</xml_diff>

<commit_message>
Uploading final changes to powerpoint slides and my notebook
</commit_message>
<xml_diff>
--- a/Drug Mortality and Socio-Economic conditions in Connecticut.pptx
+++ b/Drug Mortality and Socio-Economic conditions in Connecticut.pptx
@@ -8,22 +8,24 @@
     <p:sldId id="256" r:id="rId2"/>
     <p:sldId id="257" r:id="rId3"/>
     <p:sldId id="277" r:id="rId4"/>
-    <p:sldId id="258" r:id="rId5"/>
-    <p:sldId id="262" r:id="rId6"/>
-    <p:sldId id="259" r:id="rId7"/>
-    <p:sldId id="264" r:id="rId8"/>
-    <p:sldId id="268" r:id="rId9"/>
-    <p:sldId id="272" r:id="rId10"/>
-    <p:sldId id="273" r:id="rId11"/>
-    <p:sldId id="275" r:id="rId12"/>
-    <p:sldId id="276" r:id="rId13"/>
-    <p:sldId id="261" r:id="rId14"/>
-    <p:sldId id="267" r:id="rId15"/>
-    <p:sldId id="260" r:id="rId16"/>
-    <p:sldId id="269" r:id="rId17"/>
-    <p:sldId id="270" r:id="rId18"/>
-    <p:sldId id="271" r:id="rId19"/>
-    <p:sldId id="265" r:id="rId20"/>
+    <p:sldId id="278" r:id="rId5"/>
+    <p:sldId id="279" r:id="rId6"/>
+    <p:sldId id="262" r:id="rId7"/>
+    <p:sldId id="258" r:id="rId8"/>
+    <p:sldId id="259" r:id="rId9"/>
+    <p:sldId id="264" r:id="rId10"/>
+    <p:sldId id="268" r:id="rId11"/>
+    <p:sldId id="272" r:id="rId12"/>
+    <p:sldId id="273" r:id="rId13"/>
+    <p:sldId id="275" r:id="rId14"/>
+    <p:sldId id="276" r:id="rId15"/>
+    <p:sldId id="261" r:id="rId16"/>
+    <p:sldId id="267" r:id="rId17"/>
+    <p:sldId id="260" r:id="rId18"/>
+    <p:sldId id="269" r:id="rId19"/>
+    <p:sldId id="270" r:id="rId20"/>
+    <p:sldId id="271" r:id="rId21"/>
+    <p:sldId id="265" r:id="rId22"/>
   </p:sldIdLst>
   <p:sldSz cx="12192000" cy="6858000"/>
   <p:notesSz cx="6858000" cy="9144000"/>
@@ -319,7 +321,7 @@
             <a:fld id="{B61BEF0D-F0BB-DE4B-95CE-6DB70DBA9567}" type="datetimeFigureOut">
               <a:rPr lang="en-US" dirty="0"/>
               <a:pPr/>
-              <a:t>6/14/2018</a:t>
+              <a:t>6/15/2018</a:t>
             </a:fld>
             <a:endParaRPr lang="en-US" dirty="0"/>
           </a:p>
@@ -654,7 +656,7 @@
             <a:fld id="{B61BEF0D-F0BB-DE4B-95CE-6DB70DBA9567}" type="datetimeFigureOut">
               <a:rPr lang="en-US" dirty="0"/>
               <a:pPr/>
-              <a:t>6/14/2018</a:t>
+              <a:t>6/15/2018</a:t>
             </a:fld>
             <a:endParaRPr lang="en-US" dirty="0"/>
           </a:p>
@@ -1052,7 +1054,7 @@
             <a:fld id="{B61BEF0D-F0BB-DE4B-95CE-6DB70DBA9567}" type="datetimeFigureOut">
               <a:rPr lang="en-US" dirty="0"/>
               <a:pPr/>
-              <a:t>6/14/2018</a:t>
+              <a:t>6/15/2018</a:t>
             </a:fld>
             <a:endParaRPr lang="en-US" dirty="0"/>
           </a:p>
@@ -1385,7 +1387,7 @@
             <a:fld id="{B61BEF0D-F0BB-DE4B-95CE-6DB70DBA9567}" type="datetimeFigureOut">
               <a:rPr lang="en-US" dirty="0"/>
               <a:pPr/>
-              <a:t>6/14/2018</a:t>
+              <a:t>6/15/2018</a:t>
             </a:fld>
             <a:endParaRPr lang="en-US" dirty="0"/>
           </a:p>
@@ -1702,7 +1704,7 @@
             <a:fld id="{B61BEF0D-F0BB-DE4B-95CE-6DB70DBA9567}" type="datetimeFigureOut">
               <a:rPr lang="en-US" dirty="0"/>
               <a:pPr/>
-              <a:t>6/14/2018</a:t>
+              <a:t>6/15/2018</a:t>
             </a:fld>
             <a:endParaRPr lang="en-US" dirty="0"/>
           </a:p>
@@ -2095,7 +2097,7 @@
             <a:fld id="{B61BEF0D-F0BB-DE4B-95CE-6DB70DBA9567}" type="datetimeFigureOut">
               <a:rPr lang="en-US" dirty="0"/>
               <a:pPr/>
-              <a:t>6/14/2018</a:t>
+              <a:t>6/15/2018</a:t>
             </a:fld>
             <a:endParaRPr lang="en-US" dirty="0"/>
           </a:p>
@@ -2349,7 +2351,7 @@
             <a:fld id="{B61BEF0D-F0BB-DE4B-95CE-6DB70DBA9567}" type="datetimeFigureOut">
               <a:rPr lang="en-US" dirty="0"/>
               <a:pPr/>
-              <a:t>6/14/2018</a:t>
+              <a:t>6/15/2018</a:t>
             </a:fld>
             <a:endParaRPr lang="en-US" dirty="0"/>
           </a:p>
@@ -2608,7 +2610,7 @@
             <a:fld id="{B61BEF0D-F0BB-DE4B-95CE-6DB70DBA9567}" type="datetimeFigureOut">
               <a:rPr lang="en-US" dirty="0"/>
               <a:pPr/>
-              <a:t>6/14/2018</a:t>
+              <a:t>6/15/2018</a:t>
             </a:fld>
             <a:endParaRPr lang="en-US" dirty="0"/>
           </a:p>
@@ -2867,7 +2869,7 @@
             <a:fld id="{B61BEF0D-F0BB-DE4B-95CE-6DB70DBA9567}" type="datetimeFigureOut">
               <a:rPr lang="en-US" dirty="0"/>
               <a:pPr/>
-              <a:t>6/14/2018</a:t>
+              <a:t>6/15/2018</a:t>
             </a:fld>
             <a:endParaRPr lang="en-US" dirty="0"/>
           </a:p>
@@ -3193,7 +3195,7 @@
             <a:fld id="{B61BEF0D-F0BB-DE4B-95CE-6DB70DBA9567}" type="datetimeFigureOut">
               <a:rPr lang="en-US" dirty="0"/>
               <a:pPr/>
-              <a:t>6/14/2018</a:t>
+              <a:t>6/15/2018</a:t>
             </a:fld>
             <a:endParaRPr lang="en-US" dirty="0"/>
           </a:p>
@@ -3513,7 +3515,7 @@
             <a:fld id="{B61BEF0D-F0BB-DE4B-95CE-6DB70DBA9567}" type="datetimeFigureOut">
               <a:rPr lang="en-US" dirty="0"/>
               <a:pPr/>
-              <a:t>6/14/2018</a:t>
+              <a:t>6/15/2018</a:t>
             </a:fld>
             <a:endParaRPr lang="en-US" dirty="0"/>
           </a:p>
@@ -3967,7 +3969,7 @@
             <a:fld id="{B61BEF0D-F0BB-DE4B-95CE-6DB70DBA9567}" type="datetimeFigureOut">
               <a:rPr lang="en-US" dirty="0"/>
               <a:pPr/>
-              <a:t>6/14/2018</a:t>
+              <a:t>6/15/2018</a:t>
             </a:fld>
             <a:endParaRPr lang="en-US" dirty="0"/>
           </a:p>
@@ -4169,7 +4171,7 @@
             <a:fld id="{B61BEF0D-F0BB-DE4B-95CE-6DB70DBA9567}" type="datetimeFigureOut">
               <a:rPr lang="en-US" dirty="0"/>
               <a:pPr/>
-              <a:t>6/14/2018</a:t>
+              <a:t>6/15/2018</a:t>
             </a:fld>
             <a:endParaRPr lang="en-US" dirty="0"/>
           </a:p>
@@ -4343,7 +4345,7 @@
             <a:fld id="{B61BEF0D-F0BB-DE4B-95CE-6DB70DBA9567}" type="datetimeFigureOut">
               <a:rPr lang="en-US" dirty="0"/>
               <a:pPr/>
-              <a:t>6/14/2018</a:t>
+              <a:t>6/15/2018</a:t>
             </a:fld>
             <a:endParaRPr lang="en-US" dirty="0"/>
           </a:p>
@@ -4673,7 +4675,7 @@
             <a:fld id="{B61BEF0D-F0BB-DE4B-95CE-6DB70DBA9567}" type="datetimeFigureOut">
               <a:rPr lang="en-US" dirty="0"/>
               <a:pPr/>
-              <a:t>6/14/2018</a:t>
+              <a:t>6/15/2018</a:t>
             </a:fld>
             <a:endParaRPr lang="en-US" dirty="0"/>
           </a:p>
@@ -5015,7 +5017,7 @@
             <a:fld id="{B61BEF0D-F0BB-DE4B-95CE-6DB70DBA9567}" type="datetimeFigureOut">
               <a:rPr lang="en-US" dirty="0"/>
               <a:pPr/>
-              <a:t>6/14/2018</a:t>
+              <a:t>6/15/2018</a:t>
             </a:fld>
             <a:endParaRPr lang="en-US" dirty="0"/>
           </a:p>
@@ -7129,7 +7131,7 @@
             <a:fld id="{B61BEF0D-F0BB-DE4B-95CE-6DB70DBA9567}" type="datetimeFigureOut">
               <a:rPr lang="en-US" dirty="0"/>
               <a:pPr/>
-              <a:t>6/14/2018</a:t>
+              <a:t>6/15/2018</a:t>
             </a:fld>
             <a:endParaRPr lang="en-US" dirty="0"/>
           </a:p>
@@ -7757,6 +7759,310 @@
           <p:cNvPr id="2" name="Title 1">
             <a:extLst>
               <a:ext uri="{FF2B5EF4-FFF2-40B4-BE49-F238E27FC236}">
+                <a16:creationId xmlns:a16="http://schemas.microsoft.com/office/drawing/2014/main" id="{BB1C60A3-10D8-462D-B3B4-AF7F4B5F8101}"/>
+              </a:ext>
+            </a:extLst>
+          </p:cNvPr>
+          <p:cNvSpPr>
+            <a:spLocks noGrp="1"/>
+          </p:cNvSpPr>
+          <p:nvPr>
+            <p:ph type="title"/>
+          </p:nvPr>
+        </p:nvSpPr>
+        <p:spPr/>
+        <p:txBody>
+          <a:bodyPr/>
+          <a:lstStyle/>
+          <a:p>
+            <a:r>
+              <a:rPr lang="en-US" dirty="0"/>
+              <a:t>Fentanyl</a:t>
+            </a:r>
+          </a:p>
+        </p:txBody>
+      </p:sp>
+      <p:sp>
+        <p:nvSpPr>
+          <p:cNvPr id="3" name="Content Placeholder 2">
+            <a:extLst>
+              <a:ext uri="{FF2B5EF4-FFF2-40B4-BE49-F238E27FC236}">
+                <a16:creationId xmlns:a16="http://schemas.microsoft.com/office/drawing/2014/main" id="{DE910129-DA90-46EC-8EF1-7D23BD0B5F3F}"/>
+              </a:ext>
+            </a:extLst>
+          </p:cNvPr>
+          <p:cNvSpPr>
+            <a:spLocks noGrp="1"/>
+          </p:cNvSpPr>
+          <p:nvPr>
+            <p:ph idx="1"/>
+          </p:nvPr>
+        </p:nvSpPr>
+        <p:spPr>
+          <a:xfrm>
+            <a:off x="2592925" y="1613482"/>
+            <a:ext cx="8915400" cy="3777622"/>
+          </a:xfrm>
+        </p:spPr>
+        <p:txBody>
+          <a:bodyPr>
+            <a:normAutofit fontScale="85000" lnSpcReduction="10000"/>
+          </a:bodyPr>
+          <a:lstStyle/>
+          <a:p>
+            <a:r>
+              <a:rPr lang="en-US" sz="2000" dirty="0"/>
+              <a:t>Fentanyl is a synthetic opioid similar to heroin, gives the user feelings of euphoria and sedation</a:t>
+            </a:r>
+          </a:p>
+          <a:p>
+            <a:r>
+              <a:rPr lang="en-US" sz="2000" dirty="0"/>
+              <a:t>30-50 times more potent than heroin</a:t>
+            </a:r>
+          </a:p>
+          <a:p>
+            <a:r>
+              <a:rPr lang="en-US" sz="2000" dirty="0"/>
+              <a:t>50-100 times more potent than morphine</a:t>
+            </a:r>
+          </a:p>
+          <a:p>
+            <a:r>
+              <a:rPr lang="en-US" sz="2000" dirty="0"/>
+              <a:t>Because of its potency, it provides a high profit margin for drug traffickers</a:t>
+            </a:r>
+          </a:p>
+          <a:p>
+            <a:r>
+              <a:rPr lang="en-US" sz="2000" dirty="0"/>
+              <a:t>It is usually combined with other drugs, so it can vary in potency, in some cases leading to an overdose.</a:t>
+            </a:r>
+          </a:p>
+          <a:p>
+            <a:r>
+              <a:rPr lang="en-US" sz="2000" dirty="0"/>
+              <a:t>Naloxone is effective against </a:t>
+            </a:r>
+            <a:r>
+              <a:rPr lang="en-US" sz="2000" dirty="0" err="1"/>
+              <a:t>Fentynal</a:t>
+            </a:r>
+            <a:r>
+              <a:rPr lang="en-US" sz="2000" dirty="0"/>
+              <a:t>, however since it is more powerful than heroin, it may take more than one dose</a:t>
+            </a:r>
+          </a:p>
+          <a:p>
+            <a:r>
+              <a:rPr lang="en-US" sz="2000" dirty="0"/>
+              <a:t>Street names are: Apache, China Girl, China Town, Dance Fever, Friend, Goodfellas, Great Bear, He-Man, Jackpot, King Ivory, Murder 8, and Tango &amp; Cash</a:t>
+            </a:r>
+          </a:p>
+          <a:p>
+            <a:endParaRPr lang="en-US" sz="2000" dirty="0"/>
+          </a:p>
+        </p:txBody>
+      </p:sp>
+    </p:spTree>
+    <p:extLst>
+      <p:ext uri="{BB962C8B-B14F-4D97-AF65-F5344CB8AC3E}">
+        <p14:creationId xmlns:p14="http://schemas.microsoft.com/office/powerpoint/2010/main" val="2837072940"/>
+      </p:ext>
+    </p:extLst>
+  </p:cSld>
+  <p:clrMapOvr>
+    <a:masterClrMapping/>
+  </p:clrMapOvr>
+</p:sld>
+</file>
+
+<file path=ppt/slides/slide11.xml><?xml version="1.0" encoding="utf-8"?>
+<p:sld xmlns:a="http://schemas.openxmlformats.org/drawingml/2006/main" xmlns:r="http://schemas.openxmlformats.org/officeDocument/2006/relationships" xmlns:p="http://schemas.openxmlformats.org/presentationml/2006/main">
+  <p:cSld>
+    <p:spTree>
+      <p:nvGrpSpPr>
+        <p:cNvPr id="1" name=""/>
+        <p:cNvGrpSpPr/>
+        <p:nvPr/>
+      </p:nvGrpSpPr>
+      <p:grpSpPr>
+        <a:xfrm>
+          <a:off x="0" y="0"/>
+          <a:ext cx="0" cy="0"/>
+          <a:chOff x="0" y="0"/>
+          <a:chExt cx="0" cy="0"/>
+        </a:xfrm>
+      </p:grpSpPr>
+      <p:sp>
+        <p:nvSpPr>
+          <p:cNvPr id="2" name="Title 1">
+            <a:extLst>
+              <a:ext uri="{FF2B5EF4-FFF2-40B4-BE49-F238E27FC236}">
+                <a16:creationId xmlns:a16="http://schemas.microsoft.com/office/drawing/2014/main" id="{B8E97443-B866-4821-958D-875892DA966B}"/>
+              </a:ext>
+            </a:extLst>
+          </p:cNvPr>
+          <p:cNvSpPr>
+            <a:spLocks noGrp="1"/>
+          </p:cNvSpPr>
+          <p:nvPr>
+            <p:ph type="title"/>
+          </p:nvPr>
+        </p:nvSpPr>
+        <p:spPr/>
+        <p:txBody>
+          <a:bodyPr>
+            <a:normAutofit/>
+          </a:bodyPr>
+          <a:lstStyle/>
+          <a:p>
+            <a:r>
+              <a:rPr lang="en-US" dirty="0"/>
+              <a:t>Drug-induced mortality rates and barriers to medical treatment</a:t>
+            </a:r>
+          </a:p>
+        </p:txBody>
+      </p:sp>
+      <p:sp>
+        <p:nvSpPr>
+          <p:cNvPr id="7" name="Content Placeholder 6">
+            <a:extLst>
+              <a:ext uri="{FF2B5EF4-FFF2-40B4-BE49-F238E27FC236}">
+                <a16:creationId xmlns:a16="http://schemas.microsoft.com/office/drawing/2014/main" id="{C04A3BEE-6BC8-4049-A21D-6907C402A740}"/>
+              </a:ext>
+            </a:extLst>
+          </p:cNvPr>
+          <p:cNvSpPr>
+            <a:spLocks noGrp="1"/>
+          </p:cNvSpPr>
+          <p:nvPr>
+            <p:ph idx="1"/>
+          </p:nvPr>
+        </p:nvSpPr>
+        <p:spPr/>
+        <p:txBody>
+          <a:bodyPr>
+            <a:normAutofit/>
+          </a:bodyPr>
+          <a:lstStyle/>
+          <a:p>
+            <a:r>
+              <a:rPr lang="en-US" dirty="0"/>
+              <a:t>Opioid abuse/misuse is at unprecedented levels. </a:t>
+            </a:r>
+          </a:p>
+          <a:p>
+            <a:r>
+              <a:rPr lang="en-US" dirty="0"/>
+              <a:t>Naloxone (Narcan) is the antidote to an opioid overdose.</a:t>
+            </a:r>
+          </a:p>
+          <a:p>
+            <a:r>
+              <a:rPr lang="en-US" b="1" dirty="0"/>
+              <a:t>AN ACT CONCERNING SUBSTANCE ABUSE AND OPIOID OVERDOSE PREVENTION in 2015</a:t>
+            </a:r>
+          </a:p>
+          <a:p>
+            <a:r>
+              <a:rPr lang="en-US" sz="1400" b="1" dirty="0"/>
+              <a:t>Allowed pharmacists to prescribe opioid antagonists like naloxone. The change was intended to make it easier for relatives or friends of those at risk to have an overdose-reversing drug on hand. In 2015 there were 723 deaths from drug overdoses in Connecticut.</a:t>
+            </a:r>
+          </a:p>
+          <a:p>
+            <a:r>
+              <a:rPr lang="en-US" dirty="0"/>
+              <a:t>Naloxone Pharmacies in Connecticut (Updated, June 14, 2018)</a:t>
+            </a:r>
+          </a:p>
+          <a:p>
+            <a:r>
+              <a:rPr lang="en-US" dirty="0"/>
+              <a:t>Source: The Connecticut Open Data Portal: </a:t>
+            </a:r>
+            <a:r>
+              <a:rPr lang="en-US" dirty="0">
+                <a:hlinkClick r:id="rId2"/>
+              </a:rPr>
+              <a:t>https://data.ct.gov</a:t>
+            </a:r>
+            <a:endParaRPr lang="en-US" dirty="0"/>
+          </a:p>
+          <a:p>
+            <a:r>
+              <a:rPr lang="en-US" dirty="0"/>
+              <a:t>Source: Connecticut General Assembly: </a:t>
+            </a:r>
+            <a:r>
+              <a:rPr lang="en-US" dirty="0">
+                <a:hlinkClick r:id="rId3"/>
+              </a:rPr>
+              <a:t>https://www.cga.ct.gov/default.asp</a:t>
+            </a:r>
+            <a:endParaRPr lang="en-US" dirty="0"/>
+          </a:p>
+          <a:p>
+            <a:pPr marL="0" indent="0">
+              <a:buNone/>
+            </a:pPr>
+            <a:endParaRPr lang="en-US" dirty="0"/>
+          </a:p>
+          <a:p>
+            <a:endParaRPr lang="en-US" dirty="0"/>
+          </a:p>
+          <a:p>
+            <a:endParaRPr lang="en-US" dirty="0"/>
+          </a:p>
+          <a:p>
+            <a:endParaRPr lang="en-US" dirty="0"/>
+          </a:p>
+          <a:p>
+            <a:pPr marL="0" indent="0">
+              <a:buNone/>
+            </a:pPr>
+            <a:endParaRPr lang="en-US" dirty="0"/>
+          </a:p>
+          <a:p>
+            <a:endParaRPr lang="en-US" dirty="0"/>
+          </a:p>
+        </p:txBody>
+      </p:sp>
+    </p:spTree>
+    <p:extLst>
+      <p:ext uri="{BB962C8B-B14F-4D97-AF65-F5344CB8AC3E}">
+        <p14:creationId xmlns:p14="http://schemas.microsoft.com/office/powerpoint/2010/main" val="4248080474"/>
+      </p:ext>
+    </p:extLst>
+  </p:cSld>
+  <p:clrMapOvr>
+    <a:masterClrMapping/>
+  </p:clrMapOvr>
+</p:sld>
+</file>
+
+<file path=ppt/slides/slide12.xml><?xml version="1.0" encoding="utf-8"?>
+<p:sld xmlns:a="http://schemas.openxmlformats.org/drawingml/2006/main" xmlns:r="http://schemas.openxmlformats.org/officeDocument/2006/relationships" xmlns:p="http://schemas.openxmlformats.org/presentationml/2006/main">
+  <p:cSld>
+    <p:spTree>
+      <p:nvGrpSpPr>
+        <p:cNvPr id="1" name=""/>
+        <p:cNvGrpSpPr/>
+        <p:nvPr/>
+      </p:nvGrpSpPr>
+      <p:grpSpPr>
+        <a:xfrm>
+          <a:off x="0" y="0"/>
+          <a:ext cx="0" cy="0"/>
+          <a:chOff x="0" y="0"/>
+          <a:chExt cx="0" cy="0"/>
+        </a:xfrm>
+      </p:grpSpPr>
+      <p:sp>
+        <p:nvSpPr>
+          <p:cNvPr id="2" name="Title 1">
+            <a:extLst>
+              <a:ext uri="{FF2B5EF4-FFF2-40B4-BE49-F238E27FC236}">
                 <a16:creationId xmlns:a16="http://schemas.microsoft.com/office/drawing/2014/main" id="{8BF87117-1E4E-4EE9-8760-25D09E6E6179}"/>
               </a:ext>
             </a:extLst>
@@ -7856,7 +8162,7 @@
 </p:sld>
 </file>
 
-<file path=ppt/slides/slide11.xml><?xml version="1.0" encoding="utf-8"?>
+<file path=ppt/slides/slide13.xml><?xml version="1.0" encoding="utf-8"?>
 <p:sld xmlns:a="http://schemas.openxmlformats.org/drawingml/2006/main" xmlns:r="http://schemas.openxmlformats.org/officeDocument/2006/relationships" xmlns:p="http://schemas.openxmlformats.org/presentationml/2006/main">
   <p:cSld>
     <p:spTree>
@@ -7989,7 +8295,7 @@
 </p:sld>
 </file>
 
-<file path=ppt/slides/slide12.xml><?xml version="1.0" encoding="utf-8"?>
+<file path=ppt/slides/slide14.xml><?xml version="1.0" encoding="utf-8"?>
 <p:sld xmlns:a="http://schemas.openxmlformats.org/drawingml/2006/main" xmlns:r="http://schemas.openxmlformats.org/officeDocument/2006/relationships" xmlns:p="http://schemas.openxmlformats.org/presentationml/2006/main">
   <p:cSld>
     <p:spTree>
@@ -8051,38 +8357,6 @@
       </p:sp>
       <p:pic>
         <p:nvPicPr>
-          <p:cNvPr id="7" name="Content Placeholder 6">
-            <a:extLst>
-              <a:ext uri="{FF2B5EF4-FFF2-40B4-BE49-F238E27FC236}">
-                <a16:creationId xmlns:a16="http://schemas.microsoft.com/office/drawing/2014/main" id="{E6A84392-994A-4395-8A86-B64FFDBF855C}"/>
-              </a:ext>
-            </a:extLst>
-          </p:cNvPr>
-          <p:cNvPicPr>
-            <a:picLocks noGrp="1" noChangeAspect="1"/>
-          </p:cNvPicPr>
-          <p:nvPr>
-            <p:ph sz="half" idx="2"/>
-          </p:nvPr>
-        </p:nvPicPr>
-        <p:blipFill>
-          <a:blip r:embed="rId2"/>
-          <a:stretch>
-            <a:fillRect/>
-          </a:stretch>
-        </p:blipFill>
-        <p:spPr>
-          <a:xfrm>
-            <a:off x="6096000" y="1396314"/>
-            <a:ext cx="5877697" cy="5147975"/>
-          </a:xfrm>
-          <a:prstGeom prst="rect">
-            <a:avLst/>
-          </a:prstGeom>
-        </p:spPr>
-      </p:pic>
-      <p:pic>
-        <p:nvPicPr>
           <p:cNvPr id="6" name="Content Placeholder 5">
             <a:extLst>
               <a:ext uri="{FF2B5EF4-FFF2-40B4-BE49-F238E27FC236}">
@@ -8098,7 +8372,7 @@
           </p:nvPr>
         </p:nvPicPr>
         <p:blipFill>
-          <a:blip r:embed="rId3"/>
+          <a:blip r:embed="rId2"/>
           <a:stretch>
             <a:fillRect/>
           </a:stretch>
@@ -8111,6 +8385,35 @@
           <a:prstGeom prst="rect">
             <a:avLst/>
           </a:prstGeom>
+        </p:spPr>
+      </p:pic>
+      <p:pic>
+        <p:nvPicPr>
+          <p:cNvPr id="8" name="Content Placeholder 7">
+            <a:extLst>
+              <a:ext uri="{FF2B5EF4-FFF2-40B4-BE49-F238E27FC236}">
+                <a16:creationId xmlns:a16="http://schemas.microsoft.com/office/drawing/2014/main" id="{A3D39B5D-F442-41BC-9850-D99D39A0A163}"/>
+              </a:ext>
+            </a:extLst>
+          </p:cNvPr>
+          <p:cNvPicPr>
+            <a:picLocks noGrp="1" noChangeAspect="1"/>
+          </p:cNvPicPr>
+          <p:nvPr>
+            <p:ph sz="half" idx="2"/>
+          </p:nvPr>
+        </p:nvPicPr>
+        <p:blipFill>
+          <a:blip r:embed="rId3"/>
+          <a:stretch>
+            <a:fillRect/>
+          </a:stretch>
+        </p:blipFill>
+        <p:spPr>
+          <a:xfrm>
+            <a:off x="6284599" y="1310577"/>
+            <a:ext cx="5500912" cy="5386786"/>
+          </a:xfrm>
         </p:spPr>
       </p:pic>
     </p:spTree>
@@ -8126,7 +8429,7 @@
 </p:sld>
 </file>
 
-<file path=ppt/slides/slide13.xml><?xml version="1.0" encoding="utf-8"?>
+<file path=ppt/slides/slide15.xml><?xml version="1.0" encoding="utf-8"?>
 <p:sld xmlns:a="http://schemas.openxmlformats.org/drawingml/2006/main" xmlns:r="http://schemas.openxmlformats.org/officeDocument/2006/relationships" xmlns:p="http://schemas.openxmlformats.org/presentationml/2006/main">
   <p:cSld>
     <p:spTree>
@@ -8215,7 +8518,7 @@
 </p:sld>
 </file>
 
-<file path=ppt/slides/slide14.xml><?xml version="1.0" encoding="utf-8"?>
+<file path=ppt/slides/slide16.xml><?xml version="1.0" encoding="utf-8"?>
 <p:sld xmlns:a="http://schemas.openxmlformats.org/drawingml/2006/main" xmlns:r="http://schemas.openxmlformats.org/officeDocument/2006/relationships" xmlns:p="http://schemas.openxmlformats.org/presentationml/2006/main">
   <p:cSld>
     <p:spTree>
@@ -8302,7 +8605,7 @@
 </p:sld>
 </file>
 
-<file path=ppt/slides/slide15.xml><?xml version="1.0" encoding="utf-8"?>
+<file path=ppt/slides/slide17.xml><?xml version="1.0" encoding="utf-8"?>
 <p:sld xmlns:a="http://schemas.openxmlformats.org/drawingml/2006/main" xmlns:r="http://schemas.openxmlformats.org/officeDocument/2006/relationships" xmlns:p="http://schemas.openxmlformats.org/presentationml/2006/main">
   <p:cSld>
     <p:spTree>
@@ -8391,7 +8694,7 @@
 </p:sld>
 </file>
 
-<file path=ppt/slides/slide16.xml><?xml version="1.0" encoding="utf-8"?>
+<file path=ppt/slides/slide18.xml><?xml version="1.0" encoding="utf-8"?>
 <p:sld xmlns:a="http://schemas.openxmlformats.org/drawingml/2006/main" xmlns:r="http://schemas.openxmlformats.org/officeDocument/2006/relationships" xmlns:p="http://schemas.openxmlformats.org/presentationml/2006/main">
   <p:cSld>
     <p:spTree>
@@ -10490,7 +10793,7 @@
 </p:sld>
 </file>
 
-<file path=ppt/slides/slide17.xml><?xml version="1.0" encoding="utf-8"?>
+<file path=ppt/slides/slide19.xml><?xml version="1.0" encoding="utf-8"?>
 <p:sld xmlns:a="http://schemas.openxmlformats.org/drawingml/2006/main" xmlns:r="http://schemas.openxmlformats.org/officeDocument/2006/relationships" xmlns:p="http://schemas.openxmlformats.org/presentationml/2006/main">
   <p:cSld>
     <p:spTree>
@@ -10640,172 +10943,6 @@
 </p:sld>
 </file>
 
-<file path=ppt/slides/slide18.xml><?xml version="1.0" encoding="utf-8"?>
-<p:sld xmlns:a="http://schemas.openxmlformats.org/drawingml/2006/main" xmlns:r="http://schemas.openxmlformats.org/officeDocument/2006/relationships" xmlns:p="http://schemas.openxmlformats.org/presentationml/2006/main">
-  <p:cSld>
-    <p:spTree>
-      <p:nvGrpSpPr>
-        <p:cNvPr id="1" name=""/>
-        <p:cNvGrpSpPr/>
-        <p:nvPr/>
-      </p:nvGrpSpPr>
-      <p:grpSpPr>
-        <a:xfrm>
-          <a:off x="0" y="0"/>
-          <a:ext cx="0" cy="0"/>
-          <a:chOff x="0" y="0"/>
-          <a:chExt cx="0" cy="0"/>
-        </a:xfrm>
-      </p:grpSpPr>
-      <p:sp>
-        <p:nvSpPr>
-          <p:cNvPr id="2" name="Title 1">
-            <a:extLst>
-              <a:ext uri="{FF2B5EF4-FFF2-40B4-BE49-F238E27FC236}">
-                <a16:creationId xmlns:a16="http://schemas.microsoft.com/office/drawing/2014/main" id="{1CD3A979-029E-4483-9B62-80931FADF360}"/>
-              </a:ext>
-            </a:extLst>
-          </p:cNvPr>
-          <p:cNvSpPr>
-            <a:spLocks noGrp="1"/>
-          </p:cNvSpPr>
-          <p:nvPr>
-            <p:ph type="title"/>
-          </p:nvPr>
-        </p:nvSpPr>
-        <p:spPr/>
-        <p:txBody>
-          <a:bodyPr/>
-          <a:lstStyle/>
-          <a:p>
-            <a:r>
-              <a:rPr lang="en-US" dirty="0"/>
-              <a:t>Conclusions</a:t>
-            </a:r>
-          </a:p>
-        </p:txBody>
-      </p:sp>
-      <p:sp>
-        <p:nvSpPr>
-          <p:cNvPr id="3" name="Content Placeholder 2">
-            <a:extLst>
-              <a:ext uri="{FF2B5EF4-FFF2-40B4-BE49-F238E27FC236}">
-                <a16:creationId xmlns:a16="http://schemas.microsoft.com/office/drawing/2014/main" id="{E82706EF-A9EA-40FF-BBB5-63FB3B8BB9B9}"/>
-              </a:ext>
-            </a:extLst>
-          </p:cNvPr>
-          <p:cNvSpPr>
-            <a:spLocks noGrp="1"/>
-          </p:cNvSpPr>
-          <p:nvPr>
-            <p:ph idx="1"/>
-          </p:nvPr>
-        </p:nvSpPr>
-        <p:spPr>
-          <a:xfrm>
-            <a:off x="2592925" y="1655427"/>
-            <a:ext cx="8915400" cy="3777622"/>
-          </a:xfrm>
-        </p:spPr>
-        <p:txBody>
-          <a:bodyPr>
-            <a:normAutofit/>
-          </a:bodyPr>
-          <a:lstStyle/>
-          <a:p>
-            <a:r>
-              <a:rPr lang="en-US" sz="2800" dirty="0"/>
-              <a:t>Drug related mortality is expected to go up year-over-year.</a:t>
-            </a:r>
-          </a:p>
-          <a:p>
-            <a:r>
-              <a:rPr lang="en-US" sz="2800" dirty="0"/>
-              <a:t>Fentanyl is fueling the increase.</a:t>
-            </a:r>
-          </a:p>
-          <a:p>
-            <a:r>
-              <a:rPr lang="en-US" sz="2800" dirty="0"/>
-              <a:t>Some groups (Males; White and Hispanic White; 30-39 age group) are affected disproportionately.</a:t>
-            </a:r>
-          </a:p>
-          <a:p>
-            <a:endParaRPr lang="en-US" sz="2800" dirty="0"/>
-          </a:p>
-        </p:txBody>
-      </p:sp>
-    </p:spTree>
-    <p:extLst>
-      <p:ext uri="{BB962C8B-B14F-4D97-AF65-F5344CB8AC3E}">
-        <p14:creationId xmlns:p14="http://schemas.microsoft.com/office/powerpoint/2010/main" val="2956422025"/>
-      </p:ext>
-    </p:extLst>
-  </p:cSld>
-  <p:clrMapOvr>
-    <a:masterClrMapping/>
-  </p:clrMapOvr>
-</p:sld>
-</file>
-
-<file path=ppt/slides/slide19.xml><?xml version="1.0" encoding="utf-8"?>
-<p:sld xmlns:a="http://schemas.openxmlformats.org/drawingml/2006/main" xmlns:r="http://schemas.openxmlformats.org/officeDocument/2006/relationships" xmlns:p="http://schemas.openxmlformats.org/presentationml/2006/main">
-  <p:cSld>
-    <p:spTree>
-      <p:nvGrpSpPr>
-        <p:cNvPr id="1" name=""/>
-        <p:cNvGrpSpPr/>
-        <p:nvPr/>
-      </p:nvGrpSpPr>
-      <p:grpSpPr>
-        <a:xfrm>
-          <a:off x="0" y="0"/>
-          <a:ext cx="0" cy="0"/>
-          <a:chOff x="0" y="0"/>
-          <a:chExt cx="0" cy="0"/>
-        </a:xfrm>
-      </p:grpSpPr>
-      <p:sp>
-        <p:nvSpPr>
-          <p:cNvPr id="4" name="Title 3">
-            <a:extLst>
-              <a:ext uri="{FF2B5EF4-FFF2-40B4-BE49-F238E27FC236}">
-                <a16:creationId xmlns:a16="http://schemas.microsoft.com/office/drawing/2014/main" id="{D910DEF0-367B-4DA7-9C84-06F887D8581E}"/>
-              </a:ext>
-            </a:extLst>
-          </p:cNvPr>
-          <p:cNvSpPr>
-            <a:spLocks noGrp="1"/>
-          </p:cNvSpPr>
-          <p:nvPr>
-            <p:ph type="title"/>
-          </p:nvPr>
-        </p:nvSpPr>
-        <p:spPr/>
-        <p:txBody>
-          <a:bodyPr/>
-          <a:lstStyle/>
-          <a:p>
-            <a:r>
-              <a:rPr lang="en-US" dirty="0"/>
-              <a:t>Questions?</a:t>
-            </a:r>
-          </a:p>
-        </p:txBody>
-      </p:sp>
-    </p:spTree>
-    <p:extLst>
-      <p:ext uri="{BB962C8B-B14F-4D97-AF65-F5344CB8AC3E}">
-        <p14:creationId xmlns:p14="http://schemas.microsoft.com/office/powerpoint/2010/main" val="4241322623"/>
-      </p:ext>
-    </p:extLst>
-  </p:cSld>
-  <p:clrMapOvr>
-    <a:masterClrMapping/>
-  </p:clrMapOvr>
-</p:sld>
-</file>
-
 <file path=ppt/slides/slide2.xml><?xml version="1.0" encoding="utf-8"?>
 <p:sld xmlns:a="http://schemas.openxmlformats.org/drawingml/2006/main" xmlns:r="http://schemas.openxmlformats.org/officeDocument/2006/relationships" xmlns:p="http://schemas.openxmlformats.org/presentationml/2006/main">
   <p:cSld>
@@ -10947,6 +11084,172 @@
     <p:extLst>
       <p:ext uri="{BB962C8B-B14F-4D97-AF65-F5344CB8AC3E}">
         <p14:creationId xmlns:p14="http://schemas.microsoft.com/office/powerpoint/2010/main" val="1307435350"/>
+      </p:ext>
+    </p:extLst>
+  </p:cSld>
+  <p:clrMapOvr>
+    <a:masterClrMapping/>
+  </p:clrMapOvr>
+</p:sld>
+</file>
+
+<file path=ppt/slides/slide20.xml><?xml version="1.0" encoding="utf-8"?>
+<p:sld xmlns:a="http://schemas.openxmlformats.org/drawingml/2006/main" xmlns:r="http://schemas.openxmlformats.org/officeDocument/2006/relationships" xmlns:p="http://schemas.openxmlformats.org/presentationml/2006/main">
+  <p:cSld>
+    <p:spTree>
+      <p:nvGrpSpPr>
+        <p:cNvPr id="1" name=""/>
+        <p:cNvGrpSpPr/>
+        <p:nvPr/>
+      </p:nvGrpSpPr>
+      <p:grpSpPr>
+        <a:xfrm>
+          <a:off x="0" y="0"/>
+          <a:ext cx="0" cy="0"/>
+          <a:chOff x="0" y="0"/>
+          <a:chExt cx="0" cy="0"/>
+        </a:xfrm>
+      </p:grpSpPr>
+      <p:sp>
+        <p:nvSpPr>
+          <p:cNvPr id="2" name="Title 1">
+            <a:extLst>
+              <a:ext uri="{FF2B5EF4-FFF2-40B4-BE49-F238E27FC236}">
+                <a16:creationId xmlns:a16="http://schemas.microsoft.com/office/drawing/2014/main" id="{1CD3A979-029E-4483-9B62-80931FADF360}"/>
+              </a:ext>
+            </a:extLst>
+          </p:cNvPr>
+          <p:cNvSpPr>
+            <a:spLocks noGrp="1"/>
+          </p:cNvSpPr>
+          <p:nvPr>
+            <p:ph type="title"/>
+          </p:nvPr>
+        </p:nvSpPr>
+        <p:spPr/>
+        <p:txBody>
+          <a:bodyPr/>
+          <a:lstStyle/>
+          <a:p>
+            <a:r>
+              <a:rPr lang="en-US" dirty="0"/>
+              <a:t>Conclusions</a:t>
+            </a:r>
+          </a:p>
+        </p:txBody>
+      </p:sp>
+      <p:sp>
+        <p:nvSpPr>
+          <p:cNvPr id="3" name="Content Placeholder 2">
+            <a:extLst>
+              <a:ext uri="{FF2B5EF4-FFF2-40B4-BE49-F238E27FC236}">
+                <a16:creationId xmlns:a16="http://schemas.microsoft.com/office/drawing/2014/main" id="{E82706EF-A9EA-40FF-BBB5-63FB3B8BB9B9}"/>
+              </a:ext>
+            </a:extLst>
+          </p:cNvPr>
+          <p:cNvSpPr>
+            <a:spLocks noGrp="1"/>
+          </p:cNvSpPr>
+          <p:nvPr>
+            <p:ph idx="1"/>
+          </p:nvPr>
+        </p:nvSpPr>
+        <p:spPr>
+          <a:xfrm>
+            <a:off x="2592925" y="1655427"/>
+            <a:ext cx="8915400" cy="3777622"/>
+          </a:xfrm>
+        </p:spPr>
+        <p:txBody>
+          <a:bodyPr>
+            <a:normAutofit/>
+          </a:bodyPr>
+          <a:lstStyle/>
+          <a:p>
+            <a:r>
+              <a:rPr lang="en-US" sz="2800" dirty="0"/>
+              <a:t>Drug related mortality is expected to go up year-over-year.</a:t>
+            </a:r>
+          </a:p>
+          <a:p>
+            <a:r>
+              <a:rPr lang="en-US" sz="2800" dirty="0"/>
+              <a:t>Fentanyl is fueling the increase.</a:t>
+            </a:r>
+          </a:p>
+          <a:p>
+            <a:r>
+              <a:rPr lang="en-US" sz="2800" dirty="0"/>
+              <a:t>Some groups (Males; White and Hispanic White; 30-39 age group) are affected disproportionately.</a:t>
+            </a:r>
+          </a:p>
+          <a:p>
+            <a:endParaRPr lang="en-US" sz="2800" dirty="0"/>
+          </a:p>
+        </p:txBody>
+      </p:sp>
+    </p:spTree>
+    <p:extLst>
+      <p:ext uri="{BB962C8B-B14F-4D97-AF65-F5344CB8AC3E}">
+        <p14:creationId xmlns:p14="http://schemas.microsoft.com/office/powerpoint/2010/main" val="2956422025"/>
+      </p:ext>
+    </p:extLst>
+  </p:cSld>
+  <p:clrMapOvr>
+    <a:masterClrMapping/>
+  </p:clrMapOvr>
+</p:sld>
+</file>
+
+<file path=ppt/slides/slide21.xml><?xml version="1.0" encoding="utf-8"?>
+<p:sld xmlns:a="http://schemas.openxmlformats.org/drawingml/2006/main" xmlns:r="http://schemas.openxmlformats.org/officeDocument/2006/relationships" xmlns:p="http://schemas.openxmlformats.org/presentationml/2006/main">
+  <p:cSld>
+    <p:spTree>
+      <p:nvGrpSpPr>
+        <p:cNvPr id="1" name=""/>
+        <p:cNvGrpSpPr/>
+        <p:nvPr/>
+      </p:nvGrpSpPr>
+      <p:grpSpPr>
+        <a:xfrm>
+          <a:off x="0" y="0"/>
+          <a:ext cx="0" cy="0"/>
+          <a:chOff x="0" y="0"/>
+          <a:chExt cx="0" cy="0"/>
+        </a:xfrm>
+      </p:grpSpPr>
+      <p:sp>
+        <p:nvSpPr>
+          <p:cNvPr id="4" name="Title 3">
+            <a:extLst>
+              <a:ext uri="{FF2B5EF4-FFF2-40B4-BE49-F238E27FC236}">
+                <a16:creationId xmlns:a16="http://schemas.microsoft.com/office/drawing/2014/main" id="{D910DEF0-367B-4DA7-9C84-06F887D8581E}"/>
+              </a:ext>
+            </a:extLst>
+          </p:cNvPr>
+          <p:cNvSpPr>
+            <a:spLocks noGrp="1"/>
+          </p:cNvSpPr>
+          <p:nvPr>
+            <p:ph type="title"/>
+          </p:nvPr>
+        </p:nvSpPr>
+        <p:spPr/>
+        <p:txBody>
+          <a:bodyPr/>
+          <a:lstStyle/>
+          <a:p>
+            <a:r>
+              <a:rPr lang="en-US" dirty="0"/>
+              <a:t>Questions?</a:t>
+            </a:r>
+          </a:p>
+        </p:txBody>
+      </p:sp>
+    </p:spTree>
+    <p:extLst>
+      <p:ext uri="{BB962C8B-B14F-4D97-AF65-F5344CB8AC3E}">
+        <p14:creationId xmlns:p14="http://schemas.microsoft.com/office/powerpoint/2010/main" val="4241322623"/>
       </p:ext>
     </p:extLst>
   </p:cSld>
@@ -11390,7 +11693,7 @@
           <p:cNvPr id="2" name="Title 1">
             <a:extLst>
               <a:ext uri="{FF2B5EF4-FFF2-40B4-BE49-F238E27FC236}">
-                <a16:creationId xmlns:a16="http://schemas.microsoft.com/office/drawing/2014/main" id="{75007935-D4DA-4606-8398-F8A0B284B5E2}"/>
+                <a16:creationId xmlns:a16="http://schemas.microsoft.com/office/drawing/2014/main" id="{398B5F10-362B-4B06-93C4-B8AD9B0B84CC}"/>
               </a:ext>
             </a:extLst>
           </p:cNvPr>
@@ -11403,71 +11706,49 @@
         </p:nvSpPr>
         <p:spPr/>
         <p:txBody>
-          <a:bodyPr>
-            <a:normAutofit/>
-          </a:bodyPr>
+          <a:bodyPr/>
           <a:lstStyle/>
           <a:p>
             <a:r>
               <a:rPr lang="en-US" dirty="0"/>
-              <a:t>Struggles with data</a:t>
+              <a:t>Data Cleanup &amp; Analysis</a:t>
             </a:r>
           </a:p>
         </p:txBody>
       </p:sp>
-      <p:sp>
-        <p:nvSpPr>
-          <p:cNvPr id="3" name="Content Placeholder 2">
+      <p:pic>
+        <p:nvPicPr>
+          <p:cNvPr id="5" name="Content Placeholder 4">
             <a:extLst>
               <a:ext uri="{FF2B5EF4-FFF2-40B4-BE49-F238E27FC236}">
-                <a16:creationId xmlns:a16="http://schemas.microsoft.com/office/drawing/2014/main" id="{2629915A-1567-437B-A470-5DA2D92B5ACF}"/>
+                <a16:creationId xmlns:a16="http://schemas.microsoft.com/office/drawing/2014/main" id="{4DDA12D4-6F01-4935-80F1-DD235392C677}"/>
               </a:ext>
             </a:extLst>
           </p:cNvPr>
-          <p:cNvSpPr>
-            <a:spLocks noGrp="1"/>
-          </p:cNvSpPr>
+          <p:cNvPicPr>
+            <a:picLocks noGrp="1" noChangeAspect="1"/>
+          </p:cNvPicPr>
           <p:nvPr>
             <p:ph idx="1"/>
           </p:nvPr>
-        </p:nvSpPr>
-        <p:spPr/>
-        <p:txBody>
-          <a:bodyPr>
-            <a:normAutofit/>
-          </a:bodyPr>
-          <a:lstStyle/>
-          <a:p>
-            <a:pPr marL="0" indent="0">
-              <a:buNone/>
-            </a:pPr>
-            <a:r>
-              <a:rPr lang="en-US" sz="2800" dirty="0"/>
-              <a:t>We were not able to find reliable data to analyze and plot these trends:  </a:t>
-            </a:r>
-          </a:p>
-          <a:p>
-            <a:r>
-              <a:rPr lang="en-US" sz="2800" dirty="0"/>
-              <a:t>Drug-induced mortality rates and income</a:t>
-            </a:r>
-          </a:p>
-          <a:p>
-            <a:r>
-              <a:rPr lang="en-US" sz="2800" dirty="0"/>
-              <a:t>Drug-induced mortality rates and education</a:t>
-            </a:r>
-            <a:br>
-              <a:rPr lang="en-US" sz="2800" dirty="0"/>
-            </a:br>
-            <a:endParaRPr lang="en-US" sz="2800" dirty="0"/>
-          </a:p>
-        </p:txBody>
-      </p:sp>
+        </p:nvPicPr>
+        <p:blipFill>
+          <a:blip r:embed="rId2"/>
+          <a:stretch>
+            <a:fillRect/>
+          </a:stretch>
+        </p:blipFill>
+        <p:spPr>
+          <a:xfrm>
+            <a:off x="2592925" y="1264554"/>
+            <a:ext cx="8789582" cy="5203357"/>
+          </a:xfrm>
+        </p:spPr>
+      </p:pic>
     </p:spTree>
     <p:extLst>
       <p:ext uri="{BB962C8B-B14F-4D97-AF65-F5344CB8AC3E}">
-        <p14:creationId xmlns:p14="http://schemas.microsoft.com/office/powerpoint/2010/main" val="2289639885"/>
+        <p14:creationId xmlns:p14="http://schemas.microsoft.com/office/powerpoint/2010/main" val="1825679424"/>
       </p:ext>
     </p:extLst>
   </p:cSld>
@@ -11499,6 +11780,93 @@
           <p:cNvPr id="2" name="Title 1">
             <a:extLst>
               <a:ext uri="{FF2B5EF4-FFF2-40B4-BE49-F238E27FC236}">
+                <a16:creationId xmlns:a16="http://schemas.microsoft.com/office/drawing/2014/main" id="{84059349-F98A-4DC1-94BB-95E497A7A84C}"/>
+              </a:ext>
+            </a:extLst>
+          </p:cNvPr>
+          <p:cNvSpPr>
+            <a:spLocks noGrp="1"/>
+          </p:cNvSpPr>
+          <p:nvPr>
+            <p:ph type="title"/>
+          </p:nvPr>
+        </p:nvSpPr>
+        <p:spPr/>
+        <p:txBody>
+          <a:bodyPr/>
+          <a:lstStyle/>
+          <a:p>
+            <a:r>
+              <a:rPr lang="en-US" dirty="0"/>
+              <a:t>Additional Data</a:t>
+            </a:r>
+          </a:p>
+        </p:txBody>
+      </p:sp>
+      <p:pic>
+        <p:nvPicPr>
+          <p:cNvPr id="5" name="Content Placeholder 4">
+            <a:extLst>
+              <a:ext uri="{FF2B5EF4-FFF2-40B4-BE49-F238E27FC236}">
+                <a16:creationId xmlns:a16="http://schemas.microsoft.com/office/drawing/2014/main" id="{2B620E1D-68FA-456D-AE98-4426927795E0}"/>
+              </a:ext>
+            </a:extLst>
+          </p:cNvPr>
+          <p:cNvPicPr>
+            <a:picLocks noGrp="1" noChangeAspect="1"/>
+          </p:cNvPicPr>
+          <p:nvPr>
+            <p:ph idx="1"/>
+          </p:nvPr>
+        </p:nvPicPr>
+        <p:blipFill>
+          <a:blip r:embed="rId2"/>
+          <a:stretch>
+            <a:fillRect/>
+          </a:stretch>
+        </p:blipFill>
+        <p:spPr>
+          <a:xfrm>
+            <a:off x="2592924" y="1264554"/>
+            <a:ext cx="5687009" cy="5529737"/>
+          </a:xfrm>
+        </p:spPr>
+      </p:pic>
+    </p:spTree>
+    <p:extLst>
+      <p:ext uri="{BB962C8B-B14F-4D97-AF65-F5344CB8AC3E}">
+        <p14:creationId xmlns:p14="http://schemas.microsoft.com/office/powerpoint/2010/main" val="1711309681"/>
+      </p:ext>
+    </p:extLst>
+  </p:cSld>
+  <p:clrMapOvr>
+    <a:masterClrMapping/>
+  </p:clrMapOvr>
+</p:sld>
+</file>
+
+<file path=ppt/slides/slide6.xml><?xml version="1.0" encoding="utf-8"?>
+<p:sld xmlns:a="http://schemas.openxmlformats.org/drawingml/2006/main" xmlns:r="http://schemas.openxmlformats.org/officeDocument/2006/relationships" xmlns:p="http://schemas.openxmlformats.org/presentationml/2006/main">
+  <p:cSld>
+    <p:spTree>
+      <p:nvGrpSpPr>
+        <p:cNvPr id="1" name=""/>
+        <p:cNvGrpSpPr/>
+        <p:nvPr/>
+      </p:nvGrpSpPr>
+      <p:grpSpPr>
+        <a:xfrm>
+          <a:off x="0" y="0"/>
+          <a:ext cx="0" cy="0"/>
+          <a:chOff x="0" y="0"/>
+          <a:chExt cx="0" cy="0"/>
+        </a:xfrm>
+      </p:grpSpPr>
+      <p:sp>
+        <p:nvSpPr>
+          <p:cNvPr id="2" name="Title 1">
+            <a:extLst>
+              <a:ext uri="{FF2B5EF4-FFF2-40B4-BE49-F238E27FC236}">
                 <a16:creationId xmlns:a16="http://schemas.microsoft.com/office/drawing/2014/main" id="{B8E97443-B866-4821-958D-875892DA966B}"/>
               </a:ext>
             </a:extLst>
@@ -11510,7 +11878,12 @@
             <p:ph type="title"/>
           </p:nvPr>
         </p:nvSpPr>
-        <p:spPr/>
+        <p:spPr>
+          <a:xfrm>
+            <a:off x="2374812" y="236704"/>
+            <a:ext cx="8911687" cy="1280890"/>
+          </a:xfrm>
+        </p:spPr>
         <p:txBody>
           <a:bodyPr>
             <a:normAutofit/>
@@ -11548,8 +11921,8 @@
         </p:blipFill>
         <p:spPr>
           <a:xfrm>
-            <a:off x="3884517" y="2083266"/>
-            <a:ext cx="4538030" cy="4538030"/>
+            <a:off x="3305676" y="1588314"/>
+            <a:ext cx="5192371" cy="5192371"/>
           </a:xfrm>
         </p:spPr>
       </p:pic>
@@ -11566,7 +11939,116 @@
 </p:sld>
 </file>
 
-<file path=ppt/slides/slide6.xml><?xml version="1.0" encoding="utf-8"?>
+<file path=ppt/slides/slide7.xml><?xml version="1.0" encoding="utf-8"?>
+<p:sld xmlns:a="http://schemas.openxmlformats.org/drawingml/2006/main" xmlns:r="http://schemas.openxmlformats.org/officeDocument/2006/relationships" xmlns:p="http://schemas.openxmlformats.org/presentationml/2006/main">
+  <p:cSld>
+    <p:spTree>
+      <p:nvGrpSpPr>
+        <p:cNvPr id="1" name=""/>
+        <p:cNvGrpSpPr/>
+        <p:nvPr/>
+      </p:nvGrpSpPr>
+      <p:grpSpPr>
+        <a:xfrm>
+          <a:off x="0" y="0"/>
+          <a:ext cx="0" cy="0"/>
+          <a:chOff x="0" y="0"/>
+          <a:chExt cx="0" cy="0"/>
+        </a:xfrm>
+      </p:grpSpPr>
+      <p:sp>
+        <p:nvSpPr>
+          <p:cNvPr id="2" name="Title 1">
+            <a:extLst>
+              <a:ext uri="{FF2B5EF4-FFF2-40B4-BE49-F238E27FC236}">
+                <a16:creationId xmlns:a16="http://schemas.microsoft.com/office/drawing/2014/main" id="{75007935-D4DA-4606-8398-F8A0B284B5E2}"/>
+              </a:ext>
+            </a:extLst>
+          </p:cNvPr>
+          <p:cNvSpPr>
+            <a:spLocks noGrp="1"/>
+          </p:cNvSpPr>
+          <p:nvPr>
+            <p:ph type="title"/>
+          </p:nvPr>
+        </p:nvSpPr>
+        <p:spPr/>
+        <p:txBody>
+          <a:bodyPr>
+            <a:normAutofit/>
+          </a:bodyPr>
+          <a:lstStyle/>
+          <a:p>
+            <a:r>
+              <a:rPr lang="en-US" dirty="0"/>
+              <a:t>Struggles with data</a:t>
+            </a:r>
+          </a:p>
+        </p:txBody>
+      </p:sp>
+      <p:sp>
+        <p:nvSpPr>
+          <p:cNvPr id="3" name="Content Placeholder 2">
+            <a:extLst>
+              <a:ext uri="{FF2B5EF4-FFF2-40B4-BE49-F238E27FC236}">
+                <a16:creationId xmlns:a16="http://schemas.microsoft.com/office/drawing/2014/main" id="{2629915A-1567-437B-A470-5DA2D92B5ACF}"/>
+              </a:ext>
+            </a:extLst>
+          </p:cNvPr>
+          <p:cNvSpPr>
+            <a:spLocks noGrp="1"/>
+          </p:cNvSpPr>
+          <p:nvPr>
+            <p:ph idx="1"/>
+          </p:nvPr>
+        </p:nvSpPr>
+        <p:spPr/>
+        <p:txBody>
+          <a:bodyPr>
+            <a:normAutofit/>
+          </a:bodyPr>
+          <a:lstStyle/>
+          <a:p>
+            <a:pPr marL="0" indent="0">
+              <a:buNone/>
+            </a:pPr>
+            <a:r>
+              <a:rPr lang="en-US" sz="2800" dirty="0"/>
+              <a:t>We were not able to find reliable data to analyze and plot these trends:  </a:t>
+            </a:r>
+          </a:p>
+          <a:p>
+            <a:r>
+              <a:rPr lang="en-US" sz="2800" dirty="0"/>
+              <a:t>Drug-induced mortality rates and income</a:t>
+            </a:r>
+          </a:p>
+          <a:p>
+            <a:r>
+              <a:rPr lang="en-US" sz="2800" dirty="0"/>
+              <a:t>Drug-induced mortality rates and education</a:t>
+            </a:r>
+            <a:br>
+              <a:rPr lang="en-US" sz="2800" dirty="0"/>
+            </a:br>
+            <a:endParaRPr lang="en-US" sz="2800" dirty="0"/>
+          </a:p>
+        </p:txBody>
+      </p:sp>
+    </p:spTree>
+    <p:extLst>
+      <p:ext uri="{BB962C8B-B14F-4D97-AF65-F5344CB8AC3E}">
+        <p14:creationId xmlns:p14="http://schemas.microsoft.com/office/powerpoint/2010/main" val="2289639885"/>
+      </p:ext>
+    </p:extLst>
+  </p:cSld>
+  <p:clrMapOvr>
+    <a:masterClrMapping/>
+  </p:clrMapOvr>
+</p:sld>
+</file>
+
+<file path=ppt/slides/slide8.xml><?xml version="1.0" encoding="utf-8"?>
 <p:sld xmlns:a="http://schemas.openxmlformats.org/drawingml/2006/main" xmlns:r="http://schemas.openxmlformats.org/officeDocument/2006/relationships" xmlns:p="http://schemas.openxmlformats.org/presentationml/2006/main">
   <p:cSld>
     <p:spTree>
@@ -11662,7 +12144,7 @@
 </p:sld>
 </file>
 
-<file path=ppt/slides/slide7.xml><?xml version="1.0" encoding="utf-8"?>
+<file path=ppt/slides/slide9.xml><?xml version="1.0" encoding="utf-8"?>
 <p:sld xmlns:a="http://schemas.openxmlformats.org/drawingml/2006/main" xmlns:r="http://schemas.openxmlformats.org/officeDocument/2006/relationships" xmlns:p="http://schemas.openxmlformats.org/presentationml/2006/main">
   <p:cSld>
     <p:spTree>
@@ -11740,311 +12222,6 @@
     <p:extLst>
       <p:ext uri="{BB962C8B-B14F-4D97-AF65-F5344CB8AC3E}">
         <p14:creationId xmlns:p14="http://schemas.microsoft.com/office/powerpoint/2010/main" val="2160349714"/>
-      </p:ext>
-    </p:extLst>
-  </p:cSld>
-  <p:clrMapOvr>
-    <a:masterClrMapping/>
-  </p:clrMapOvr>
-</p:sld>
-</file>
-
-<file path=ppt/slides/slide8.xml><?xml version="1.0" encoding="utf-8"?>
-<p:sld xmlns:a="http://schemas.openxmlformats.org/drawingml/2006/main" xmlns:r="http://schemas.openxmlformats.org/officeDocument/2006/relationships" xmlns:p="http://schemas.openxmlformats.org/presentationml/2006/main">
-  <p:cSld>
-    <p:spTree>
-      <p:nvGrpSpPr>
-        <p:cNvPr id="1" name=""/>
-        <p:cNvGrpSpPr/>
-        <p:nvPr/>
-      </p:nvGrpSpPr>
-      <p:grpSpPr>
-        <a:xfrm>
-          <a:off x="0" y="0"/>
-          <a:ext cx="0" cy="0"/>
-          <a:chOff x="0" y="0"/>
-          <a:chExt cx="0" cy="0"/>
-        </a:xfrm>
-      </p:grpSpPr>
-      <p:sp>
-        <p:nvSpPr>
-          <p:cNvPr id="2" name="Title 1">
-            <a:extLst>
-              <a:ext uri="{FF2B5EF4-FFF2-40B4-BE49-F238E27FC236}">
-                <a16:creationId xmlns:a16="http://schemas.microsoft.com/office/drawing/2014/main" id="{BB1C60A3-10D8-462D-B3B4-AF7F4B5F8101}"/>
-              </a:ext>
-            </a:extLst>
-          </p:cNvPr>
-          <p:cNvSpPr>
-            <a:spLocks noGrp="1"/>
-          </p:cNvSpPr>
-          <p:nvPr>
-            <p:ph type="title"/>
-          </p:nvPr>
-        </p:nvSpPr>
-        <p:spPr/>
-        <p:txBody>
-          <a:bodyPr/>
-          <a:lstStyle/>
-          <a:p>
-            <a:r>
-              <a:rPr lang="en-US" dirty="0" err="1"/>
-              <a:t>Fentynal</a:t>
-            </a:r>
-            <a:endParaRPr lang="en-US" dirty="0"/>
-          </a:p>
-        </p:txBody>
-      </p:sp>
-      <p:sp>
-        <p:nvSpPr>
-          <p:cNvPr id="3" name="Content Placeholder 2">
-            <a:extLst>
-              <a:ext uri="{FF2B5EF4-FFF2-40B4-BE49-F238E27FC236}">
-                <a16:creationId xmlns:a16="http://schemas.microsoft.com/office/drawing/2014/main" id="{DE910129-DA90-46EC-8EF1-7D23BD0B5F3F}"/>
-              </a:ext>
-            </a:extLst>
-          </p:cNvPr>
-          <p:cNvSpPr>
-            <a:spLocks noGrp="1"/>
-          </p:cNvSpPr>
-          <p:nvPr>
-            <p:ph idx="1"/>
-          </p:nvPr>
-        </p:nvSpPr>
-        <p:spPr>
-          <a:xfrm>
-            <a:off x="2592925" y="1613482"/>
-            <a:ext cx="8915400" cy="3777622"/>
-          </a:xfrm>
-        </p:spPr>
-        <p:txBody>
-          <a:bodyPr>
-            <a:normAutofit fontScale="85000" lnSpcReduction="10000"/>
-          </a:bodyPr>
-          <a:lstStyle/>
-          <a:p>
-            <a:r>
-              <a:rPr lang="en-US" sz="2000" dirty="0"/>
-              <a:t>Fentanyl is a synthetic opioid similar to heroin, gives the user feelings of euphoria and sedation</a:t>
-            </a:r>
-          </a:p>
-          <a:p>
-            <a:r>
-              <a:rPr lang="en-US" sz="2000" dirty="0"/>
-              <a:t>30-50 times more potent than heroin</a:t>
-            </a:r>
-          </a:p>
-          <a:p>
-            <a:r>
-              <a:rPr lang="en-US" sz="2000" dirty="0"/>
-              <a:t>50-100 times more potent than morphine</a:t>
-            </a:r>
-          </a:p>
-          <a:p>
-            <a:r>
-              <a:rPr lang="en-US" sz="2000" dirty="0"/>
-              <a:t>Because of its potency, it provides a high profit margin for drug traffickers</a:t>
-            </a:r>
-          </a:p>
-          <a:p>
-            <a:r>
-              <a:rPr lang="en-US" sz="2000" dirty="0"/>
-              <a:t>It is usually combined with other drugs, so it can vary in potency, in some cases leading to an overdose.</a:t>
-            </a:r>
-          </a:p>
-          <a:p>
-            <a:r>
-              <a:rPr lang="en-US" sz="2000" dirty="0"/>
-              <a:t>Naloxone is effective against </a:t>
-            </a:r>
-            <a:r>
-              <a:rPr lang="en-US" sz="2000" dirty="0" err="1"/>
-              <a:t>Fentynal</a:t>
-            </a:r>
-            <a:r>
-              <a:rPr lang="en-US" sz="2000" dirty="0"/>
-              <a:t>, however since it is more powerful than heroin, it may take more than one dose</a:t>
-            </a:r>
-          </a:p>
-          <a:p>
-            <a:r>
-              <a:rPr lang="en-US" sz="2000" dirty="0"/>
-              <a:t>Street names are: Apache, China Girl, China Town, Dance Fever, Friend, Goodfellas, Great Bear, He-Man, Jackpot, King Ivory, Murder 8, and Tango &amp; Cash</a:t>
-            </a:r>
-          </a:p>
-          <a:p>
-            <a:endParaRPr lang="en-US" sz="2000" dirty="0"/>
-          </a:p>
-        </p:txBody>
-      </p:sp>
-    </p:spTree>
-    <p:extLst>
-      <p:ext uri="{BB962C8B-B14F-4D97-AF65-F5344CB8AC3E}">
-        <p14:creationId xmlns:p14="http://schemas.microsoft.com/office/powerpoint/2010/main" val="2837072940"/>
-      </p:ext>
-    </p:extLst>
-  </p:cSld>
-  <p:clrMapOvr>
-    <a:masterClrMapping/>
-  </p:clrMapOvr>
-</p:sld>
-</file>
-
-<file path=ppt/slides/slide9.xml><?xml version="1.0" encoding="utf-8"?>
-<p:sld xmlns:a="http://schemas.openxmlformats.org/drawingml/2006/main" xmlns:r="http://schemas.openxmlformats.org/officeDocument/2006/relationships" xmlns:p="http://schemas.openxmlformats.org/presentationml/2006/main">
-  <p:cSld>
-    <p:spTree>
-      <p:nvGrpSpPr>
-        <p:cNvPr id="1" name=""/>
-        <p:cNvGrpSpPr/>
-        <p:nvPr/>
-      </p:nvGrpSpPr>
-      <p:grpSpPr>
-        <a:xfrm>
-          <a:off x="0" y="0"/>
-          <a:ext cx="0" cy="0"/>
-          <a:chOff x="0" y="0"/>
-          <a:chExt cx="0" cy="0"/>
-        </a:xfrm>
-      </p:grpSpPr>
-      <p:sp>
-        <p:nvSpPr>
-          <p:cNvPr id="2" name="Title 1">
-            <a:extLst>
-              <a:ext uri="{FF2B5EF4-FFF2-40B4-BE49-F238E27FC236}">
-                <a16:creationId xmlns:a16="http://schemas.microsoft.com/office/drawing/2014/main" id="{B8E97443-B866-4821-958D-875892DA966B}"/>
-              </a:ext>
-            </a:extLst>
-          </p:cNvPr>
-          <p:cNvSpPr>
-            <a:spLocks noGrp="1"/>
-          </p:cNvSpPr>
-          <p:nvPr>
-            <p:ph type="title"/>
-          </p:nvPr>
-        </p:nvSpPr>
-        <p:spPr/>
-        <p:txBody>
-          <a:bodyPr>
-            <a:normAutofit/>
-          </a:bodyPr>
-          <a:lstStyle/>
-          <a:p>
-            <a:r>
-              <a:rPr lang="en-US" dirty="0"/>
-              <a:t>Drug-induced mortality rates and barriers to medical treatment</a:t>
-            </a:r>
-          </a:p>
-        </p:txBody>
-      </p:sp>
-      <p:sp>
-        <p:nvSpPr>
-          <p:cNvPr id="7" name="Content Placeholder 6">
-            <a:extLst>
-              <a:ext uri="{FF2B5EF4-FFF2-40B4-BE49-F238E27FC236}">
-                <a16:creationId xmlns:a16="http://schemas.microsoft.com/office/drawing/2014/main" id="{C04A3BEE-6BC8-4049-A21D-6907C402A740}"/>
-              </a:ext>
-            </a:extLst>
-          </p:cNvPr>
-          <p:cNvSpPr>
-            <a:spLocks noGrp="1"/>
-          </p:cNvSpPr>
-          <p:nvPr>
-            <p:ph idx="1"/>
-          </p:nvPr>
-        </p:nvSpPr>
-        <p:spPr/>
-        <p:txBody>
-          <a:bodyPr>
-            <a:normAutofit/>
-          </a:bodyPr>
-          <a:lstStyle/>
-          <a:p>
-            <a:r>
-              <a:rPr lang="en-US" dirty="0"/>
-              <a:t>Opioid abuse/misuse is at unprecedented levels. </a:t>
-            </a:r>
-          </a:p>
-          <a:p>
-            <a:r>
-              <a:rPr lang="en-US" dirty="0"/>
-              <a:t>Naloxone (Narcan) is the antidote to an opioid overdose.</a:t>
-            </a:r>
-          </a:p>
-          <a:p>
-            <a:r>
-              <a:rPr lang="en-US" b="1" dirty="0"/>
-              <a:t>AN ACT CONCERNING SUBSTANCE ABUSE AND OPIOID OVERDOSE PREVENTION in 2015</a:t>
-            </a:r>
-          </a:p>
-          <a:p>
-            <a:r>
-              <a:rPr lang="en-US" sz="1400" b="1" dirty="0"/>
-              <a:t>Allowed pharmacists to prescribe opioid antagonists like naloxone. The change was intended to make it easier for relatives or friends of those at risk to have an overdose-reversing drug on hand. In 2015 there were 723 deaths from drug overdoses in Connecticut.</a:t>
-            </a:r>
-          </a:p>
-          <a:p>
-            <a:r>
-              <a:rPr lang="en-US" dirty="0"/>
-              <a:t>Naloxone Pharmacies in Connecticut (Updated, June 14, 2018)</a:t>
-            </a:r>
-          </a:p>
-          <a:p>
-            <a:r>
-              <a:rPr lang="en-US" dirty="0"/>
-              <a:t>Source: The Connecticut Open Data Portal: </a:t>
-            </a:r>
-            <a:r>
-              <a:rPr lang="en-US" dirty="0">
-                <a:hlinkClick r:id="rId2"/>
-              </a:rPr>
-              <a:t>https://data.ct.gov</a:t>
-            </a:r>
-            <a:endParaRPr lang="en-US" dirty="0"/>
-          </a:p>
-          <a:p>
-            <a:r>
-              <a:rPr lang="en-US" dirty="0"/>
-              <a:t>Source: Connecticut General Assembly: </a:t>
-            </a:r>
-            <a:r>
-              <a:rPr lang="en-US" dirty="0">
-                <a:hlinkClick r:id="rId3"/>
-              </a:rPr>
-              <a:t>https://www.cga.ct.gov/default.asp</a:t>
-            </a:r>
-            <a:endParaRPr lang="en-US" dirty="0"/>
-          </a:p>
-          <a:p>
-            <a:pPr marL="0" indent="0">
-              <a:buNone/>
-            </a:pPr>
-            <a:endParaRPr lang="en-US" dirty="0"/>
-          </a:p>
-          <a:p>
-            <a:endParaRPr lang="en-US" dirty="0"/>
-          </a:p>
-          <a:p>
-            <a:endParaRPr lang="en-US" dirty="0"/>
-          </a:p>
-          <a:p>
-            <a:endParaRPr lang="en-US" dirty="0"/>
-          </a:p>
-          <a:p>
-            <a:pPr marL="0" indent="0">
-              <a:buNone/>
-            </a:pPr>
-            <a:endParaRPr lang="en-US" dirty="0"/>
-          </a:p>
-          <a:p>
-            <a:endParaRPr lang="en-US" dirty="0"/>
-          </a:p>
-        </p:txBody>
-      </p:sp>
-    </p:spTree>
-    <p:extLst>
-      <p:ext uri="{BB962C8B-B14F-4D97-AF65-F5344CB8AC3E}">
-        <p14:creationId xmlns:p14="http://schemas.microsoft.com/office/powerpoint/2010/main" val="4248080474"/>
       </p:ext>
     </p:extLst>
   </p:cSld>

</xml_diff>